<commit_message>
Some work on PV material properties...beginning decent down the dielectric function rabbit hole
</commit_message>
<xml_diff>
--- a/figures.pptx
+++ b/figures.pptx
@@ -9,6 +9,8 @@
     <p:sldId id="257" r:id="rId3"/>
     <p:sldId id="258" r:id="rId4"/>
     <p:sldId id="259" r:id="rId5"/>
+    <p:sldId id="260" r:id="rId6"/>
+    <p:sldId id="261" r:id="rId7"/>
   </p:sldIdLst>
   <p:sldSz cx="9144000" cy="6858000" type="screen4x3"/>
   <p:notesSz cx="6858000" cy="9144000"/>
@@ -3498,7 +3500,7 @@
       </p:grpSpPr>
       <p:grpSp>
         <p:nvGrpSpPr>
-          <p:cNvPr id="33" name="Group 32"/>
+          <p:cNvPr id="45" name="Group 44"/>
           <p:cNvGrpSpPr/>
           <p:nvPr/>
         </p:nvGrpSpPr>
@@ -3510,271 +3512,644 @@
             <a:chExt cx="8927904" cy="5919051"/>
           </a:xfrm>
         </p:grpSpPr>
-        <p:pic>
-          <p:nvPicPr>
-            <p:cNvPr id="6" name="Picture 5"/>
-            <p:cNvPicPr>
-              <a:picLocks noChangeAspect="1"/>
-            </p:cNvPicPr>
+        <p:grpSp>
+          <p:nvGrpSpPr>
+            <p:cNvPr id="33" name="Group 32"/>
+            <p:cNvGrpSpPr/>
             <p:nvPr/>
-          </p:nvPicPr>
-          <p:blipFill>
-            <a:blip r:embed="rId2"/>
-            <a:stretch>
-              <a:fillRect/>
-            </a:stretch>
-          </p:blipFill>
-          <p:spPr>
+          </p:nvGrpSpPr>
+          <p:grpSpPr>
             <a:xfrm>
-              <a:off x="961361" y="1684618"/>
-              <a:ext cx="3398820" cy="3503292"/>
+              <a:off x="80111" y="571482"/>
+              <a:ext cx="8927904" cy="5919051"/>
+              <a:chOff x="80111" y="571482"/>
+              <a:chExt cx="8927904" cy="5919051"/>
             </a:xfrm>
-            <a:prstGeom prst="rect">
-              <a:avLst/>
-            </a:prstGeom>
-          </p:spPr>
-        </p:pic>
-        <p:pic>
-          <p:nvPicPr>
-            <p:cNvPr id="7" name="Picture 6"/>
-            <p:cNvPicPr>
-              <a:picLocks noChangeAspect="1"/>
-            </p:cNvPicPr>
-            <p:nvPr/>
-          </p:nvPicPr>
-          <p:blipFill>
-            <a:blip r:embed="rId3"/>
-            <a:stretch>
-              <a:fillRect/>
-            </a:stretch>
-          </p:blipFill>
-          <p:spPr>
-            <a:xfrm>
-              <a:off x="2282709" y="634982"/>
-              <a:ext cx="1079500" cy="939800"/>
-            </a:xfrm>
-            <a:prstGeom prst="rect">
-              <a:avLst/>
-            </a:prstGeom>
-          </p:spPr>
-        </p:pic>
-        <p:cxnSp>
-          <p:nvCxnSpPr>
-            <p:cNvPr id="10" name="Straight Arrow Connector 9"/>
-            <p:cNvCxnSpPr/>
-            <p:nvPr/>
-          </p:nvCxnSpPr>
-          <p:spPr>
-            <a:xfrm>
-              <a:off x="1354216" y="5166679"/>
-              <a:ext cx="1306555" cy="0"/>
-            </a:xfrm>
-            <a:prstGeom prst="straightConnector1">
-              <a:avLst/>
-            </a:prstGeom>
-            <a:ln w="57150" cmpd="sng">
-              <a:solidFill>
-                <a:srgbClr val="000000"/>
-              </a:solidFill>
-              <a:headEnd type="arrow"/>
-              <a:tailEnd type="arrow"/>
-            </a:ln>
-            <a:effectLst/>
-          </p:spPr>
-          <p:style>
-            <a:lnRef idx="2">
-              <a:schemeClr val="accent1"/>
-            </a:lnRef>
-            <a:fillRef idx="0">
-              <a:schemeClr val="accent1"/>
-            </a:fillRef>
-            <a:effectRef idx="1">
-              <a:schemeClr val="accent1"/>
-            </a:effectRef>
-            <a:fontRef idx="minor">
-              <a:schemeClr val="tx1"/>
-            </a:fontRef>
-          </p:style>
-        </p:cxnSp>
-        <p:cxnSp>
-          <p:nvCxnSpPr>
-            <p:cNvPr id="11" name="Straight Arrow Connector 10"/>
-            <p:cNvCxnSpPr/>
-            <p:nvPr/>
-          </p:nvCxnSpPr>
-          <p:spPr>
-            <a:xfrm>
-              <a:off x="909066" y="3412670"/>
-              <a:ext cx="0" cy="1381817"/>
-            </a:xfrm>
-            <a:prstGeom prst="straightConnector1">
-              <a:avLst/>
-            </a:prstGeom>
-            <a:ln w="57150" cmpd="sng">
-              <a:solidFill>
-                <a:srgbClr val="000000"/>
-              </a:solidFill>
-              <a:headEnd type="arrow"/>
-              <a:tailEnd type="arrow"/>
-            </a:ln>
-            <a:effectLst/>
-          </p:spPr>
-          <p:style>
-            <a:lnRef idx="2">
-              <a:schemeClr val="accent1"/>
-            </a:lnRef>
-            <a:fillRef idx="0">
-              <a:schemeClr val="accent1"/>
-            </a:fillRef>
-            <a:effectRef idx="1">
-              <a:schemeClr val="accent1"/>
-            </a:effectRef>
-            <a:fontRef idx="minor">
-              <a:schemeClr val="tx1"/>
-            </a:fontRef>
-          </p:style>
-        </p:cxnSp>
+          </p:grpSpPr>
+          <p:pic>
+            <p:nvPicPr>
+              <p:cNvPr id="6" name="Picture 5"/>
+              <p:cNvPicPr>
+                <a:picLocks noChangeAspect="1"/>
+              </p:cNvPicPr>
+              <p:nvPr/>
+            </p:nvPicPr>
+            <p:blipFill>
+              <a:blip r:embed="rId2"/>
+              <a:stretch>
+                <a:fillRect/>
+              </a:stretch>
+            </p:blipFill>
+            <p:spPr>
+              <a:xfrm>
+                <a:off x="961361" y="1684618"/>
+                <a:ext cx="3398820" cy="3503292"/>
+              </a:xfrm>
+              <a:prstGeom prst="rect">
+                <a:avLst/>
+              </a:prstGeom>
+            </p:spPr>
+          </p:pic>
+          <p:pic>
+            <p:nvPicPr>
+              <p:cNvPr id="7" name="Picture 6"/>
+              <p:cNvPicPr>
+                <a:picLocks noChangeAspect="1"/>
+              </p:cNvPicPr>
+              <p:nvPr/>
+            </p:nvPicPr>
+            <p:blipFill>
+              <a:blip r:embed="rId3"/>
+              <a:stretch>
+                <a:fillRect/>
+              </a:stretch>
+            </p:blipFill>
+            <p:spPr>
+              <a:xfrm>
+                <a:off x="2282709" y="634982"/>
+                <a:ext cx="1079500" cy="939800"/>
+              </a:xfrm>
+              <a:prstGeom prst="rect">
+                <a:avLst/>
+              </a:prstGeom>
+            </p:spPr>
+          </p:pic>
+          <p:cxnSp>
+            <p:nvCxnSpPr>
+              <p:cNvPr id="10" name="Straight Arrow Connector 9"/>
+              <p:cNvCxnSpPr/>
+              <p:nvPr/>
+            </p:nvCxnSpPr>
+            <p:spPr>
+              <a:xfrm>
+                <a:off x="1354216" y="5166679"/>
+                <a:ext cx="1306555" cy="0"/>
+              </a:xfrm>
+              <a:prstGeom prst="straightConnector1">
+                <a:avLst/>
+              </a:prstGeom>
+              <a:ln w="57150" cmpd="sng">
+                <a:solidFill>
+                  <a:srgbClr val="000000"/>
+                </a:solidFill>
+                <a:headEnd type="arrow"/>
+                <a:tailEnd type="arrow"/>
+              </a:ln>
+              <a:effectLst/>
+            </p:spPr>
+            <p:style>
+              <a:lnRef idx="2">
+                <a:schemeClr val="accent1"/>
+              </a:lnRef>
+              <a:fillRef idx="0">
+                <a:schemeClr val="accent1"/>
+              </a:fillRef>
+              <a:effectRef idx="1">
+                <a:schemeClr val="accent1"/>
+              </a:effectRef>
+              <a:fontRef idx="minor">
+                <a:schemeClr val="tx1"/>
+              </a:fontRef>
+            </p:style>
+          </p:cxnSp>
+          <p:cxnSp>
+            <p:nvCxnSpPr>
+              <p:cNvPr id="11" name="Straight Arrow Connector 10"/>
+              <p:cNvCxnSpPr/>
+              <p:nvPr/>
+            </p:nvCxnSpPr>
+            <p:spPr>
+              <a:xfrm>
+                <a:off x="909066" y="3412670"/>
+                <a:ext cx="0" cy="1381817"/>
+              </a:xfrm>
+              <a:prstGeom prst="straightConnector1">
+                <a:avLst/>
+              </a:prstGeom>
+              <a:ln w="57150" cmpd="sng">
+                <a:solidFill>
+                  <a:srgbClr val="000000"/>
+                </a:solidFill>
+                <a:headEnd type="arrow"/>
+                <a:tailEnd type="arrow"/>
+              </a:ln>
+              <a:effectLst/>
+            </p:spPr>
+            <p:style>
+              <a:lnRef idx="2">
+                <a:schemeClr val="accent1"/>
+              </a:lnRef>
+              <a:fillRef idx="0">
+                <a:schemeClr val="accent1"/>
+              </a:fillRef>
+              <a:effectRef idx="1">
+                <a:schemeClr val="accent1"/>
+              </a:effectRef>
+              <a:fontRef idx="minor">
+                <a:schemeClr val="tx1"/>
+              </a:fontRef>
+            </p:style>
+          </p:cxnSp>
+          <p:sp>
+            <p:nvSpPr>
+              <p:cNvPr id="16" name="TextBox 15"/>
+              <p:cNvSpPr txBox="1"/>
+              <p:nvPr/>
+            </p:nvSpPr>
+            <p:spPr>
+              <a:xfrm>
+                <a:off x="1847396" y="5110162"/>
+                <a:ext cx="314659" cy="651460"/>
+              </a:xfrm>
+              <a:prstGeom prst="rect">
+                <a:avLst/>
+              </a:prstGeom>
+              <a:noFill/>
+            </p:spPr>
+            <p:txBody>
+              <a:bodyPr wrap="none" rtlCol="0">
+                <a:spAutoFit/>
+              </a:bodyPr>
+              <a:lstStyle/>
+              <a:p>
+                <a:pPr>
+                  <a:lnSpc>
+                    <a:spcPct val="90000"/>
+                  </a:lnSpc>
+                </a:pPr>
+                <a:r>
+                  <a:rPr lang="en-US" sz="2000" b="1" u="sng" dirty="0" smtClean="0"/>
+                  <a:t>a</a:t>
+                </a:r>
+              </a:p>
+              <a:p>
+                <a:pPr>
+                  <a:lnSpc>
+                    <a:spcPct val="90000"/>
+                  </a:lnSpc>
+                </a:pPr>
+                <a:r>
+                  <a:rPr lang="en-US" sz="2000" b="1" dirty="0"/>
+                  <a:t>2</a:t>
+                </a:r>
+              </a:p>
+            </p:txBody>
+          </p:sp>
+          <p:sp>
+            <p:nvSpPr>
+              <p:cNvPr id="17" name="TextBox 16"/>
+              <p:cNvSpPr txBox="1"/>
+              <p:nvPr/>
+            </p:nvSpPr>
+            <p:spPr>
+              <a:xfrm>
+                <a:off x="592572" y="3798314"/>
+                <a:ext cx="322299" cy="651460"/>
+              </a:xfrm>
+              <a:prstGeom prst="rect">
+                <a:avLst/>
+              </a:prstGeom>
+              <a:noFill/>
+            </p:spPr>
+            <p:txBody>
+              <a:bodyPr wrap="none" rtlCol="0">
+                <a:spAutoFit/>
+              </a:bodyPr>
+              <a:lstStyle/>
+              <a:p>
+                <a:pPr>
+                  <a:lnSpc>
+                    <a:spcPct val="90000"/>
+                  </a:lnSpc>
+                </a:pPr>
+                <a:r>
+                  <a:rPr lang="en-US" sz="2000" b="1" u="sng" dirty="0"/>
+                  <a:t>b</a:t>
+                </a:r>
+                <a:endParaRPr lang="en-US" sz="2000" b="1" u="sng" dirty="0" smtClean="0"/>
+              </a:p>
+              <a:p>
+                <a:pPr>
+                  <a:lnSpc>
+                    <a:spcPct val="90000"/>
+                  </a:lnSpc>
+                </a:pPr>
+                <a:r>
+                  <a:rPr lang="en-US" sz="2000" b="1" dirty="0"/>
+                  <a:t>2</a:t>
+                </a:r>
+              </a:p>
+            </p:txBody>
+          </p:sp>
+          <p:cxnSp>
+            <p:nvCxnSpPr>
+              <p:cNvPr id="18" name="Straight Arrow Connector 17"/>
+              <p:cNvCxnSpPr/>
+              <p:nvPr/>
+            </p:nvCxnSpPr>
+            <p:spPr>
+              <a:xfrm>
+                <a:off x="417625" y="2030853"/>
+                <a:ext cx="0" cy="2763634"/>
+              </a:xfrm>
+              <a:prstGeom prst="straightConnector1">
+                <a:avLst/>
+              </a:prstGeom>
+              <a:ln w="57150" cmpd="sng">
+                <a:solidFill>
+                  <a:schemeClr val="bg1">
+                    <a:lumMod val="50000"/>
+                  </a:schemeClr>
+                </a:solidFill>
+                <a:headEnd type="arrow"/>
+                <a:tailEnd type="arrow"/>
+              </a:ln>
+              <a:effectLst/>
+            </p:spPr>
+            <p:style>
+              <a:lnRef idx="2">
+                <a:schemeClr val="accent1"/>
+              </a:lnRef>
+              <a:fillRef idx="0">
+                <a:schemeClr val="accent1"/>
+              </a:fillRef>
+              <a:effectRef idx="1">
+                <a:schemeClr val="accent1"/>
+              </a:effectRef>
+              <a:fontRef idx="minor">
+                <a:schemeClr val="tx1"/>
+              </a:fontRef>
+            </p:style>
+          </p:cxnSp>
+          <p:sp>
+            <p:nvSpPr>
+              <p:cNvPr id="21" name="TextBox 20"/>
+              <p:cNvSpPr txBox="1"/>
+              <p:nvPr/>
+            </p:nvSpPr>
+            <p:spPr>
+              <a:xfrm>
+                <a:off x="80111" y="3058120"/>
+                <a:ext cx="349825" cy="461665"/>
+              </a:xfrm>
+              <a:prstGeom prst="rect">
+                <a:avLst/>
+              </a:prstGeom>
+              <a:noFill/>
+            </p:spPr>
+            <p:txBody>
+              <a:bodyPr wrap="none" rtlCol="0">
+                <a:spAutoFit/>
+              </a:bodyPr>
+              <a:lstStyle/>
+              <a:p>
+                <a:r>
+                  <a:rPr lang="en-US" sz="2400" b="1" dirty="0" smtClean="0">
+                    <a:solidFill>
+                      <a:schemeClr val="bg1">
+                        <a:lumMod val="50000"/>
+                      </a:schemeClr>
+                    </a:solidFill>
+                  </a:rPr>
+                  <a:t>b</a:t>
+                </a:r>
+                <a:endParaRPr lang="en-US" sz="2400" b="1" dirty="0">
+                  <a:solidFill>
+                    <a:schemeClr val="bg1">
+                      <a:lumMod val="50000"/>
+                    </a:schemeClr>
+                  </a:solidFill>
+                </a:endParaRPr>
+              </a:p>
+            </p:txBody>
+          </p:sp>
+          <p:cxnSp>
+            <p:nvCxnSpPr>
+              <p:cNvPr id="22" name="Straight Arrow Connector 21"/>
+              <p:cNvCxnSpPr/>
+              <p:nvPr/>
+            </p:nvCxnSpPr>
+            <p:spPr>
+              <a:xfrm flipH="1">
+                <a:off x="1354216" y="5758060"/>
+                <a:ext cx="2630622" cy="3562"/>
+              </a:xfrm>
+              <a:prstGeom prst="straightConnector1">
+                <a:avLst/>
+              </a:prstGeom>
+              <a:ln w="57150" cmpd="sng">
+                <a:solidFill>
+                  <a:schemeClr val="bg1">
+                    <a:lumMod val="50000"/>
+                  </a:schemeClr>
+                </a:solidFill>
+                <a:headEnd type="arrow"/>
+                <a:tailEnd type="arrow"/>
+              </a:ln>
+              <a:effectLst/>
+            </p:spPr>
+            <p:style>
+              <a:lnRef idx="2">
+                <a:schemeClr val="accent1"/>
+              </a:lnRef>
+              <a:fillRef idx="0">
+                <a:schemeClr val="accent1"/>
+              </a:fillRef>
+              <a:effectRef idx="1">
+                <a:schemeClr val="accent1"/>
+              </a:effectRef>
+              <a:fontRef idx="minor">
+                <a:schemeClr val="tx1"/>
+              </a:fontRef>
+            </p:style>
+          </p:cxnSp>
+          <p:sp>
+            <p:nvSpPr>
+              <p:cNvPr id="25" name="TextBox 24"/>
+              <p:cNvSpPr txBox="1"/>
+              <p:nvPr/>
+            </p:nvSpPr>
+            <p:spPr>
+              <a:xfrm>
+                <a:off x="2485858" y="5761622"/>
+                <a:ext cx="336601" cy="461665"/>
+              </a:xfrm>
+              <a:prstGeom prst="rect">
+                <a:avLst/>
+              </a:prstGeom>
+              <a:noFill/>
+            </p:spPr>
+            <p:txBody>
+              <a:bodyPr wrap="none" rtlCol="0">
+                <a:spAutoFit/>
+              </a:bodyPr>
+              <a:lstStyle/>
+              <a:p>
+                <a:r>
+                  <a:rPr lang="en-US" sz="2400" b="1" dirty="0">
+                    <a:solidFill>
+                      <a:schemeClr val="bg1">
+                        <a:lumMod val="50000"/>
+                      </a:schemeClr>
+                    </a:solidFill>
+                  </a:rPr>
+                  <a:t>a</a:t>
+                </a:r>
+                <a:endParaRPr lang="en-US" sz="2400" b="1" dirty="0">
+                  <a:solidFill>
+                    <a:schemeClr val="bg1">
+                      <a:lumMod val="50000"/>
+                    </a:schemeClr>
+                  </a:solidFill>
+                </a:endParaRPr>
+              </a:p>
+            </p:txBody>
+          </p:sp>
+          <p:pic>
+            <p:nvPicPr>
+              <p:cNvPr id="26" name="Picture 25"/>
+              <p:cNvPicPr>
+                <a:picLocks noChangeAspect="1"/>
+              </p:cNvPicPr>
+              <p:nvPr/>
+            </p:nvPicPr>
+            <p:blipFill>
+              <a:blip r:embed="rId4"/>
+              <a:stretch>
+                <a:fillRect/>
+              </a:stretch>
+            </p:blipFill>
+            <p:spPr>
+              <a:xfrm>
+                <a:off x="4691923" y="1574782"/>
+                <a:ext cx="2960022" cy="4915751"/>
+              </a:xfrm>
+              <a:prstGeom prst="rect">
+                <a:avLst/>
+              </a:prstGeom>
+            </p:spPr>
+          </p:pic>
+          <p:pic>
+            <p:nvPicPr>
+              <p:cNvPr id="27" name="Picture 26"/>
+              <p:cNvPicPr>
+                <a:picLocks noChangeAspect="1"/>
+              </p:cNvPicPr>
+              <p:nvPr/>
+            </p:nvPicPr>
+            <p:blipFill>
+              <a:blip r:embed="rId5">
+                <a:extLst>
+                  <a:ext uri="{BEBA8EAE-BF5A-486C-A8C5-ECC9F3942E4B}">
+                    <a14:imgProps xmlns:a14="http://schemas.microsoft.com/office/drawing/2010/main">
+                      <a14:imgLayer r:embed="rId6">
+                        <a14:imgEffect>
+                          <a14:sharpenSoften amount="30000"/>
+                        </a14:imgEffect>
+                      </a14:imgLayer>
+                    </a14:imgProps>
+                  </a:ext>
+                </a:extLst>
+              </a:blip>
+              <a:stretch>
+                <a:fillRect/>
+              </a:stretch>
+            </p:blipFill>
+            <p:spPr>
+              <a:xfrm>
+                <a:off x="5503453" y="571482"/>
+                <a:ext cx="1104900" cy="1003300"/>
+              </a:xfrm>
+              <a:prstGeom prst="rect">
+                <a:avLst/>
+              </a:prstGeom>
+            </p:spPr>
+          </p:pic>
+          <p:cxnSp>
+            <p:nvCxnSpPr>
+              <p:cNvPr id="28" name="Straight Arrow Connector 27"/>
+              <p:cNvCxnSpPr/>
+              <p:nvPr/>
+            </p:nvCxnSpPr>
+            <p:spPr>
+              <a:xfrm>
+                <a:off x="8694558" y="1924135"/>
+                <a:ext cx="0" cy="4299152"/>
+              </a:xfrm>
+              <a:prstGeom prst="straightConnector1">
+                <a:avLst/>
+              </a:prstGeom>
+              <a:ln w="57150" cmpd="sng">
+                <a:solidFill>
+                  <a:schemeClr val="bg1">
+                    <a:lumMod val="50000"/>
+                  </a:schemeClr>
+                </a:solidFill>
+                <a:headEnd type="arrow"/>
+                <a:tailEnd type="arrow"/>
+              </a:ln>
+              <a:effectLst/>
+            </p:spPr>
+            <p:style>
+              <a:lnRef idx="2">
+                <a:schemeClr val="accent1"/>
+              </a:lnRef>
+              <a:fillRef idx="0">
+                <a:schemeClr val="accent1"/>
+              </a:fillRef>
+              <a:effectRef idx="1">
+                <a:schemeClr val="accent1"/>
+              </a:effectRef>
+              <a:fontRef idx="minor">
+                <a:schemeClr val="tx1"/>
+              </a:fontRef>
+            </p:style>
+          </p:cxnSp>
+          <p:sp>
+            <p:nvSpPr>
+              <p:cNvPr id="30" name="TextBox 29"/>
+              <p:cNvSpPr txBox="1"/>
+              <p:nvPr/>
+            </p:nvSpPr>
+            <p:spPr>
+              <a:xfrm>
+                <a:off x="8694558" y="3567481"/>
+                <a:ext cx="313457" cy="461665"/>
+              </a:xfrm>
+              <a:prstGeom prst="rect">
+                <a:avLst/>
+              </a:prstGeom>
+              <a:noFill/>
+            </p:spPr>
+            <p:txBody>
+              <a:bodyPr wrap="none" rtlCol="0">
+                <a:spAutoFit/>
+              </a:bodyPr>
+              <a:lstStyle/>
+              <a:p>
+                <a:r>
+                  <a:rPr lang="en-US" sz="2400" b="1" dirty="0">
+                    <a:solidFill>
+                      <a:schemeClr val="bg1">
+                        <a:lumMod val="50000"/>
+                      </a:schemeClr>
+                    </a:solidFill>
+                  </a:rPr>
+                  <a:t>c</a:t>
+                </a:r>
+                <a:endParaRPr lang="en-US" sz="2400" b="1" dirty="0">
+                  <a:solidFill>
+                    <a:schemeClr val="bg1">
+                      <a:lumMod val="50000"/>
+                    </a:schemeClr>
+                  </a:solidFill>
+                </a:endParaRPr>
+              </a:p>
+            </p:txBody>
+          </p:sp>
+          <p:cxnSp>
+            <p:nvCxnSpPr>
+              <p:cNvPr id="31" name="Straight Arrow Connector 30"/>
+              <p:cNvCxnSpPr/>
+              <p:nvPr/>
+            </p:nvCxnSpPr>
+            <p:spPr>
+              <a:xfrm>
+                <a:off x="7651945" y="4841470"/>
+                <a:ext cx="0" cy="1381817"/>
+              </a:xfrm>
+              <a:prstGeom prst="straightConnector1">
+                <a:avLst/>
+              </a:prstGeom>
+              <a:ln w="57150" cmpd="sng">
+                <a:solidFill>
+                  <a:srgbClr val="000000"/>
+                </a:solidFill>
+                <a:headEnd type="arrow"/>
+                <a:tailEnd type="arrow"/>
+              </a:ln>
+              <a:effectLst/>
+            </p:spPr>
+            <p:style>
+              <a:lnRef idx="2">
+                <a:schemeClr val="accent1"/>
+              </a:lnRef>
+              <a:fillRef idx="0">
+                <a:schemeClr val="accent1"/>
+              </a:fillRef>
+              <a:effectRef idx="1">
+                <a:schemeClr val="accent1"/>
+              </a:effectRef>
+              <a:fontRef idx="minor">
+                <a:schemeClr val="tx1"/>
+              </a:fontRef>
+            </p:style>
+          </p:cxnSp>
+          <p:sp>
+            <p:nvSpPr>
+              <p:cNvPr id="32" name="TextBox 31"/>
+              <p:cNvSpPr txBox="1"/>
+              <p:nvPr/>
+            </p:nvSpPr>
+            <p:spPr>
+              <a:xfrm>
+                <a:off x="7831222" y="5110162"/>
+                <a:ext cx="676587" cy="651460"/>
+              </a:xfrm>
+              <a:prstGeom prst="rect">
+                <a:avLst/>
+              </a:prstGeom>
+              <a:noFill/>
+            </p:spPr>
+            <p:txBody>
+              <a:bodyPr wrap="none" rtlCol="0">
+                <a:spAutoFit/>
+              </a:bodyPr>
+              <a:lstStyle/>
+              <a:p>
+                <a:pPr>
+                  <a:lnSpc>
+                    <a:spcPct val="90000"/>
+                  </a:lnSpc>
+                </a:pPr>
+                <a:r>
+                  <a:rPr lang="en-US" sz="2000" b="1" u="sng" dirty="0"/>
+                  <a:t>c</a:t>
+                </a:r>
+                <a:r>
+                  <a:rPr lang="en-US" sz="2000" b="1" dirty="0" smtClean="0"/>
+                  <a:t> ≈ </a:t>
+                </a:r>
+                <a:r>
+                  <a:rPr lang="en-US" sz="2000" b="1" u="sng" dirty="0" smtClean="0"/>
+                  <a:t>a</a:t>
+                </a:r>
+              </a:p>
+              <a:p>
+                <a:pPr>
+                  <a:lnSpc>
+                    <a:spcPct val="90000"/>
+                  </a:lnSpc>
+                </a:pPr>
+                <a:r>
+                  <a:rPr lang="en-US" sz="2000" b="1" dirty="0" smtClean="0"/>
+                  <a:t>4    2</a:t>
+                </a:r>
+                <a:endParaRPr lang="en-US" sz="2000" b="1" dirty="0"/>
+              </a:p>
+            </p:txBody>
+          </p:sp>
+        </p:grpSp>
         <p:sp>
           <p:nvSpPr>
-            <p:cNvPr id="16" name="TextBox 15"/>
+            <p:cNvPr id="34" name="TextBox 33"/>
             <p:cNvSpPr txBox="1"/>
             <p:nvPr/>
           </p:nvSpPr>
           <p:spPr>
             <a:xfrm>
-              <a:off x="1847396" y="5110162"/>
-              <a:ext cx="314659" cy="651460"/>
-            </a:xfrm>
-            <a:prstGeom prst="rect">
-              <a:avLst/>
-            </a:prstGeom>
-            <a:noFill/>
-          </p:spPr>
-          <p:txBody>
-            <a:bodyPr wrap="none" rtlCol="0">
-              <a:spAutoFit/>
-            </a:bodyPr>
-            <a:lstStyle/>
-            <a:p>
-              <a:pPr>
-                <a:lnSpc>
-                  <a:spcPct val="90000"/>
-                </a:lnSpc>
-              </a:pPr>
-              <a:r>
-                <a:rPr lang="en-US" sz="2000" b="1" u="sng" dirty="0" smtClean="0"/>
-                <a:t>a</a:t>
-              </a:r>
-            </a:p>
-            <a:p>
-              <a:pPr>
-                <a:lnSpc>
-                  <a:spcPct val="90000"/>
-                </a:lnSpc>
-              </a:pPr>
-              <a:r>
-                <a:rPr lang="en-US" sz="2000" b="1" dirty="0"/>
-                <a:t>2</a:t>
-              </a:r>
-            </a:p>
-          </p:txBody>
-        </p:sp>
-        <p:sp>
-          <p:nvSpPr>
-            <p:cNvPr id="17" name="TextBox 16"/>
-            <p:cNvSpPr txBox="1"/>
-            <p:nvPr/>
-          </p:nvSpPr>
-          <p:spPr>
-            <a:xfrm>
-              <a:off x="592572" y="3798314"/>
-              <a:ext cx="322299" cy="651460"/>
-            </a:xfrm>
-            <a:prstGeom prst="rect">
-              <a:avLst/>
-            </a:prstGeom>
-            <a:noFill/>
-          </p:spPr>
-          <p:txBody>
-            <a:bodyPr wrap="none" rtlCol="0">
-              <a:spAutoFit/>
-            </a:bodyPr>
-            <a:lstStyle/>
-            <a:p>
-              <a:pPr>
-                <a:lnSpc>
-                  <a:spcPct val="90000"/>
-                </a:lnSpc>
-              </a:pPr>
-              <a:r>
-                <a:rPr lang="en-US" sz="2000" b="1" u="sng" dirty="0"/>
-                <a:t>b</a:t>
-              </a:r>
-              <a:endParaRPr lang="en-US" sz="2000" b="1" u="sng" dirty="0" smtClean="0"/>
-            </a:p>
-            <a:p>
-              <a:pPr>
-                <a:lnSpc>
-                  <a:spcPct val="90000"/>
-                </a:lnSpc>
-              </a:pPr>
-              <a:r>
-                <a:rPr lang="en-US" sz="2000" b="1" dirty="0"/>
-                <a:t>2</a:t>
-              </a:r>
-            </a:p>
-          </p:txBody>
-        </p:sp>
-        <p:cxnSp>
-          <p:nvCxnSpPr>
-            <p:cNvPr id="18" name="Straight Arrow Connector 17"/>
-            <p:cNvCxnSpPr/>
-            <p:nvPr/>
-          </p:nvCxnSpPr>
-          <p:spPr>
-            <a:xfrm>
-              <a:off x="417625" y="2030853"/>
-              <a:ext cx="0" cy="2763634"/>
-            </a:xfrm>
-            <a:prstGeom prst="straightConnector1">
-              <a:avLst/>
-            </a:prstGeom>
-            <a:ln w="57150" cmpd="sng">
-              <a:solidFill>
-                <a:schemeClr val="bg1">
-                  <a:lumMod val="50000"/>
-                </a:schemeClr>
-              </a:solidFill>
-              <a:headEnd type="arrow"/>
-              <a:tailEnd type="arrow"/>
-            </a:ln>
-            <a:effectLst/>
-          </p:spPr>
-          <p:style>
-            <a:lnRef idx="2">
-              <a:schemeClr val="accent1"/>
-            </a:lnRef>
-            <a:fillRef idx="0">
-              <a:schemeClr val="accent1"/>
-            </a:fillRef>
-            <a:effectRef idx="1">
-              <a:schemeClr val="accent1"/>
-            </a:effectRef>
-            <a:fontRef idx="minor">
-              <a:schemeClr val="tx1"/>
-            </a:fontRef>
-          </p:style>
-        </p:cxnSp>
-        <p:sp>
-          <p:nvSpPr>
-            <p:cNvPr id="21" name="TextBox 20"/>
-            <p:cNvSpPr txBox="1"/>
-            <p:nvPr/>
-          </p:nvSpPr>
-          <p:spPr>
-            <a:xfrm>
-              <a:off x="80111" y="3058120"/>
-              <a:ext cx="349825" cy="461665"/>
+              <a:off x="6997710" y="4638991"/>
+              <a:ext cx="402674" cy="646331"/>
             </a:xfrm>
             <a:prstGeom prst="rect">
               <a:avLst/>
@@ -3788,75 +4163,23 @@
             <a:lstStyle/>
             <a:p>
               <a:r>
-                <a:rPr lang="en-US" sz="2400" b="1" dirty="0" smtClean="0">
-                  <a:solidFill>
-                    <a:schemeClr val="bg1">
-                      <a:lumMod val="50000"/>
-                    </a:schemeClr>
-                  </a:solidFill>
-                </a:rPr>
-                <a:t>b</a:t>
+                <a:rPr lang="en-US" sz="3600" b="1" dirty="0" smtClean="0"/>
+                <a:t>x</a:t>
               </a:r>
-              <a:endParaRPr lang="en-US" sz="2400" b="1" dirty="0">
-                <a:solidFill>
-                  <a:schemeClr val="bg1">
-                    <a:lumMod val="50000"/>
-                  </a:schemeClr>
-                </a:solidFill>
-              </a:endParaRPr>
+              <a:endParaRPr lang="en-US" sz="3600" b="1" dirty="0"/>
             </a:p>
           </p:txBody>
         </p:sp>
-        <p:cxnSp>
-          <p:nvCxnSpPr>
-            <p:cNvPr id="22" name="Straight Arrow Connector 21"/>
-            <p:cNvCxnSpPr/>
-            <p:nvPr/>
-          </p:nvCxnSpPr>
-          <p:spPr>
-            <a:xfrm flipH="1">
-              <a:off x="1354216" y="5758060"/>
-              <a:ext cx="2630622" cy="3562"/>
-            </a:xfrm>
-            <a:prstGeom prst="straightConnector1">
-              <a:avLst/>
-            </a:prstGeom>
-            <a:ln w="57150" cmpd="sng">
-              <a:solidFill>
-                <a:schemeClr val="bg1">
-                  <a:lumMod val="50000"/>
-                </a:schemeClr>
-              </a:solidFill>
-              <a:headEnd type="arrow"/>
-              <a:tailEnd type="arrow"/>
-            </a:ln>
-            <a:effectLst/>
-          </p:spPr>
-          <p:style>
-            <a:lnRef idx="2">
-              <a:schemeClr val="accent1"/>
-            </a:lnRef>
-            <a:fillRef idx="0">
-              <a:schemeClr val="accent1"/>
-            </a:fillRef>
-            <a:effectRef idx="1">
-              <a:schemeClr val="accent1"/>
-            </a:effectRef>
-            <a:fontRef idx="minor">
-              <a:schemeClr val="tx1"/>
-            </a:fontRef>
-          </p:style>
-        </p:cxnSp>
         <p:sp>
           <p:nvSpPr>
-            <p:cNvPr id="25" name="TextBox 24"/>
+            <p:cNvPr id="35" name="TextBox 34"/>
             <p:cNvSpPr txBox="1"/>
             <p:nvPr/>
           </p:nvSpPr>
           <p:spPr>
             <a:xfrm>
-              <a:off x="2485858" y="5761622"/>
-              <a:ext cx="336601" cy="461665"/>
+              <a:off x="4921211" y="4638991"/>
+              <a:ext cx="402674" cy="646331"/>
             </a:xfrm>
             <a:prstGeom prst="rect">
               <a:avLst/>
@@ -3870,135 +4193,23 @@
             <a:lstStyle/>
             <a:p>
               <a:r>
-                <a:rPr lang="en-US" sz="2400" b="1" dirty="0">
-                  <a:solidFill>
-                    <a:schemeClr val="bg1">
-                      <a:lumMod val="50000"/>
-                    </a:schemeClr>
-                  </a:solidFill>
-                </a:rPr>
-                <a:t>a</a:t>
+                <a:rPr lang="en-US" sz="3600" b="1" dirty="0" smtClean="0"/>
+                <a:t>x</a:t>
               </a:r>
-              <a:endParaRPr lang="en-US" sz="2400" b="1" dirty="0">
-                <a:solidFill>
-                  <a:schemeClr val="bg1">
-                    <a:lumMod val="50000"/>
-                  </a:schemeClr>
-                </a:solidFill>
-              </a:endParaRPr>
+              <a:endParaRPr lang="en-US" sz="3600" b="1" dirty="0"/>
             </a:p>
           </p:txBody>
         </p:sp>
-        <p:pic>
-          <p:nvPicPr>
-            <p:cNvPr id="26" name="Picture 25"/>
-            <p:cNvPicPr>
-              <a:picLocks noChangeAspect="1"/>
-            </p:cNvPicPr>
-            <p:nvPr/>
-          </p:nvPicPr>
-          <p:blipFill>
-            <a:blip r:embed="rId4"/>
-            <a:stretch>
-              <a:fillRect/>
-            </a:stretch>
-          </p:blipFill>
-          <p:spPr>
-            <a:xfrm>
-              <a:off x="4691923" y="1574782"/>
-              <a:ext cx="2960022" cy="4915751"/>
-            </a:xfrm>
-            <a:prstGeom prst="rect">
-              <a:avLst/>
-            </a:prstGeom>
-          </p:spPr>
-        </p:pic>
-        <p:pic>
-          <p:nvPicPr>
-            <p:cNvPr id="27" name="Picture 26"/>
-            <p:cNvPicPr>
-              <a:picLocks noChangeAspect="1"/>
-            </p:cNvPicPr>
-            <p:nvPr/>
-          </p:nvPicPr>
-          <p:blipFill>
-            <a:blip r:embed="rId5">
-              <a:extLst>
-                <a:ext uri="{BEBA8EAE-BF5A-486C-A8C5-ECC9F3942E4B}">
-                  <a14:imgProps xmlns:a14="http://schemas.microsoft.com/office/drawing/2010/main">
-                    <a14:imgLayer r:embed="rId6">
-                      <a14:imgEffect>
-                        <a14:sharpenSoften amount="30000"/>
-                      </a14:imgEffect>
-                    </a14:imgLayer>
-                  </a14:imgProps>
-                </a:ext>
-              </a:extLst>
-            </a:blip>
-            <a:stretch>
-              <a:fillRect/>
-            </a:stretch>
-          </p:blipFill>
-          <p:spPr>
-            <a:xfrm>
-              <a:off x="5503453" y="571482"/>
-              <a:ext cx="1104900" cy="1003300"/>
-            </a:xfrm>
-            <a:prstGeom prst="rect">
-              <a:avLst/>
-            </a:prstGeom>
-          </p:spPr>
-        </p:pic>
-        <p:cxnSp>
-          <p:nvCxnSpPr>
-            <p:cNvPr id="28" name="Straight Arrow Connector 27"/>
-            <p:cNvCxnSpPr/>
-            <p:nvPr/>
-          </p:nvCxnSpPr>
-          <p:spPr>
-            <a:xfrm>
-              <a:off x="8694558" y="1924135"/>
-              <a:ext cx="0" cy="4299152"/>
-            </a:xfrm>
-            <a:prstGeom prst="straightConnector1">
-              <a:avLst/>
-            </a:prstGeom>
-            <a:ln w="57150" cmpd="sng">
-              <a:solidFill>
-                <a:schemeClr val="bg1">
-                  <a:lumMod val="50000"/>
-                </a:schemeClr>
-              </a:solidFill>
-              <a:headEnd type="arrow"/>
-              <a:tailEnd type="arrow"/>
-            </a:ln>
-            <a:effectLst/>
-          </p:spPr>
-          <p:style>
-            <a:lnRef idx="2">
-              <a:schemeClr val="accent1"/>
-            </a:lnRef>
-            <a:fillRef idx="0">
-              <a:schemeClr val="accent1"/>
-            </a:fillRef>
-            <a:effectRef idx="1">
-              <a:schemeClr val="accent1"/>
-            </a:effectRef>
-            <a:fontRef idx="minor">
-              <a:schemeClr val="tx1"/>
-            </a:fontRef>
-          </p:style>
-        </p:cxnSp>
         <p:sp>
           <p:nvSpPr>
-            <p:cNvPr id="30" name="TextBox 29"/>
+            <p:cNvPr id="36" name="TextBox 35"/>
             <p:cNvSpPr txBox="1"/>
             <p:nvPr/>
           </p:nvSpPr>
           <p:spPr>
             <a:xfrm>
-              <a:off x="8694558" y="3567481"/>
-              <a:ext cx="313457" cy="461665"/>
+              <a:off x="5970866" y="5688649"/>
+              <a:ext cx="402674" cy="646331"/>
             </a:xfrm>
             <a:prstGeom prst="rect">
               <a:avLst/>
@@ -4012,73 +4223,23 @@
             <a:lstStyle/>
             <a:p>
               <a:r>
-                <a:rPr lang="en-US" sz="2400" b="1" dirty="0">
-                  <a:solidFill>
-                    <a:schemeClr val="bg1">
-                      <a:lumMod val="50000"/>
-                    </a:schemeClr>
-                  </a:solidFill>
-                </a:rPr>
-                <a:t>c</a:t>
+                <a:rPr lang="en-US" sz="3600" b="1" dirty="0" smtClean="0"/>
+                <a:t>x</a:t>
               </a:r>
-              <a:endParaRPr lang="en-US" sz="2400" b="1" dirty="0">
-                <a:solidFill>
-                  <a:schemeClr val="bg1">
-                    <a:lumMod val="50000"/>
-                  </a:schemeClr>
-                </a:solidFill>
-              </a:endParaRPr>
+              <a:endParaRPr lang="en-US" sz="3600" b="1" dirty="0"/>
             </a:p>
           </p:txBody>
         </p:sp>
-        <p:cxnSp>
-          <p:nvCxnSpPr>
-            <p:cNvPr id="31" name="Straight Arrow Connector 30"/>
-            <p:cNvCxnSpPr/>
-            <p:nvPr/>
-          </p:nvCxnSpPr>
-          <p:spPr>
-            <a:xfrm>
-              <a:off x="7651945" y="4841470"/>
-              <a:ext cx="0" cy="1381817"/>
-            </a:xfrm>
-            <a:prstGeom prst="straightConnector1">
-              <a:avLst/>
-            </a:prstGeom>
-            <a:ln w="57150" cmpd="sng">
-              <a:solidFill>
-                <a:srgbClr val="000000"/>
-              </a:solidFill>
-              <a:headEnd type="arrow"/>
-              <a:tailEnd type="arrow"/>
-            </a:ln>
-            <a:effectLst/>
-          </p:spPr>
-          <p:style>
-            <a:lnRef idx="2">
-              <a:schemeClr val="accent1"/>
-            </a:lnRef>
-            <a:fillRef idx="0">
-              <a:schemeClr val="accent1"/>
-            </a:fillRef>
-            <a:effectRef idx="1">
-              <a:schemeClr val="accent1"/>
-            </a:effectRef>
-            <a:fontRef idx="minor">
-              <a:schemeClr val="tx1"/>
-            </a:fontRef>
-          </p:style>
-        </p:cxnSp>
         <p:sp>
           <p:nvSpPr>
-            <p:cNvPr id="32" name="TextBox 31"/>
+            <p:cNvPr id="37" name="TextBox 36"/>
             <p:cNvSpPr txBox="1"/>
             <p:nvPr/>
           </p:nvSpPr>
           <p:spPr>
             <a:xfrm>
-              <a:off x="7831222" y="5110162"/>
-              <a:ext cx="676587" cy="651460"/>
+              <a:off x="4935123" y="2536706"/>
+              <a:ext cx="402674" cy="646331"/>
             </a:xfrm>
             <a:prstGeom prst="rect">
               <a:avLst/>
@@ -4091,49 +4252,418 @@
             </a:bodyPr>
             <a:lstStyle/>
             <a:p>
-              <a:pPr>
-                <a:lnSpc>
-                  <a:spcPct val="90000"/>
-                </a:lnSpc>
-              </a:pPr>
               <a:r>
-                <a:rPr lang="en-US" sz="2000" b="1" u="sng" dirty="0"/>
-                <a:t>c</a:t>
+                <a:rPr lang="en-US" sz="3600" b="1" dirty="0" smtClean="0"/>
+                <a:t>x</a:t>
               </a:r>
+              <a:endParaRPr lang="en-US" sz="3600" b="1" dirty="0"/>
+            </a:p>
+          </p:txBody>
+        </p:sp>
+        <p:sp>
+          <p:nvSpPr>
+            <p:cNvPr id="38" name="TextBox 37"/>
+            <p:cNvSpPr txBox="1"/>
+            <p:nvPr/>
+          </p:nvSpPr>
+          <p:spPr>
+            <a:xfrm>
+              <a:off x="6997710" y="2549664"/>
+              <a:ext cx="402674" cy="646331"/>
+            </a:xfrm>
+            <a:prstGeom prst="rect">
+              <a:avLst/>
+            </a:prstGeom>
+            <a:noFill/>
+          </p:spPr>
+          <p:txBody>
+            <a:bodyPr wrap="none" rtlCol="0">
+              <a:spAutoFit/>
+            </a:bodyPr>
+            <a:lstStyle/>
+            <a:p>
               <a:r>
-                <a:rPr lang="en-US" sz="2000" b="1" dirty="0" smtClean="0"/>
-                <a:t> ≈ </a:t>
+                <a:rPr lang="en-US" sz="3600" b="1" dirty="0" smtClean="0"/>
+                <a:t>x</a:t>
               </a:r>
+              <a:endParaRPr lang="en-US" sz="3600" b="1" dirty="0"/>
+            </a:p>
+          </p:txBody>
+        </p:sp>
+        <p:sp>
+          <p:nvSpPr>
+            <p:cNvPr id="39" name="TextBox 38"/>
+            <p:cNvSpPr txBox="1"/>
+            <p:nvPr/>
+          </p:nvSpPr>
+          <p:spPr>
+            <a:xfrm>
+              <a:off x="5970866" y="1505371"/>
+              <a:ext cx="402674" cy="646331"/>
+            </a:xfrm>
+            <a:prstGeom prst="rect">
+              <a:avLst/>
+            </a:prstGeom>
+            <a:noFill/>
+          </p:spPr>
+          <p:txBody>
+            <a:bodyPr wrap="none" rtlCol="0">
+              <a:spAutoFit/>
+            </a:bodyPr>
+            <a:lstStyle/>
+            <a:p>
               <a:r>
-                <a:rPr lang="en-US" sz="2000" b="1" u="sng" dirty="0" smtClean="0"/>
-                <a:t>a</a:t>
+                <a:rPr lang="en-US" sz="3600" b="1" dirty="0" smtClean="0"/>
+                <a:t>x</a:t>
               </a:r>
+              <a:endParaRPr lang="en-US" sz="3600" b="1" dirty="0"/>
             </a:p>
+          </p:txBody>
+        </p:sp>
+        <p:sp>
+          <p:nvSpPr>
+            <p:cNvPr id="40" name="TextBox 39"/>
+            <p:cNvSpPr txBox="1"/>
+            <p:nvPr/>
+          </p:nvSpPr>
+          <p:spPr>
+            <a:xfrm>
+              <a:off x="5965362" y="3580439"/>
+              <a:ext cx="402674" cy="646331"/>
+            </a:xfrm>
+            <a:prstGeom prst="rect">
+              <a:avLst/>
+            </a:prstGeom>
+            <a:noFill/>
+          </p:spPr>
+          <p:txBody>
+            <a:bodyPr wrap="none" rtlCol="0">
+              <a:spAutoFit/>
+            </a:bodyPr>
+            <a:lstStyle/>
             <a:p>
-              <a:pPr>
-                <a:lnSpc>
-                  <a:spcPct val="90000"/>
-                </a:lnSpc>
-              </a:pPr>
               <a:r>
-                <a:rPr lang="en-US" sz="2000" b="1" dirty="0" smtClean="0"/>
-                <a:t>4    2</a:t>
+                <a:rPr lang="en-US" sz="3600" b="1" dirty="0" smtClean="0"/>
+                <a:t>x</a:t>
               </a:r>
-              <a:endParaRPr lang="en-US" sz="2000" b="1" dirty="0"/>
+              <a:endParaRPr lang="en-US" sz="3600" b="1" dirty="0"/>
+            </a:p>
+          </p:txBody>
+        </p:sp>
+        <p:sp>
+          <p:nvSpPr>
+            <p:cNvPr id="41" name="TextBox 40"/>
+            <p:cNvSpPr txBox="1"/>
+            <p:nvPr/>
+          </p:nvSpPr>
+          <p:spPr>
+            <a:xfrm>
+              <a:off x="1152879" y="3050630"/>
+              <a:ext cx="402674" cy="646331"/>
+            </a:xfrm>
+            <a:prstGeom prst="rect">
+              <a:avLst/>
+            </a:prstGeom>
+            <a:noFill/>
+          </p:spPr>
+          <p:txBody>
+            <a:bodyPr wrap="none" rtlCol="0">
+              <a:spAutoFit/>
+            </a:bodyPr>
+            <a:lstStyle/>
+            <a:p>
+              <a:r>
+                <a:rPr lang="en-US" sz="3600" b="1" dirty="0" smtClean="0"/>
+                <a:t>x</a:t>
+              </a:r>
+              <a:endParaRPr lang="en-US" sz="3600" b="1" dirty="0"/>
+            </a:p>
+          </p:txBody>
+        </p:sp>
+        <p:sp>
+          <p:nvSpPr>
+            <p:cNvPr id="42" name="TextBox 41"/>
+            <p:cNvSpPr txBox="1"/>
+            <p:nvPr/>
+          </p:nvSpPr>
+          <p:spPr>
+            <a:xfrm>
+              <a:off x="3741966" y="3056656"/>
+              <a:ext cx="402674" cy="646331"/>
+            </a:xfrm>
+            <a:prstGeom prst="rect">
+              <a:avLst/>
+            </a:prstGeom>
+            <a:noFill/>
+          </p:spPr>
+          <p:txBody>
+            <a:bodyPr wrap="none" rtlCol="0">
+              <a:spAutoFit/>
+            </a:bodyPr>
+            <a:lstStyle/>
+            <a:p>
+              <a:r>
+                <a:rPr lang="en-US" sz="3600" b="1" dirty="0" smtClean="0"/>
+                <a:t>x</a:t>
+              </a:r>
+              <a:endParaRPr lang="en-US" sz="3600" b="1" dirty="0"/>
+            </a:p>
+          </p:txBody>
+        </p:sp>
+        <p:sp>
+          <p:nvSpPr>
+            <p:cNvPr id="43" name="TextBox 42"/>
+            <p:cNvSpPr txBox="1"/>
+            <p:nvPr/>
+          </p:nvSpPr>
+          <p:spPr>
+            <a:xfrm>
+              <a:off x="2458662" y="4354699"/>
+              <a:ext cx="402674" cy="646331"/>
+            </a:xfrm>
+            <a:prstGeom prst="rect">
+              <a:avLst/>
+            </a:prstGeom>
+            <a:noFill/>
+          </p:spPr>
+          <p:txBody>
+            <a:bodyPr wrap="none" rtlCol="0">
+              <a:spAutoFit/>
+            </a:bodyPr>
+            <a:lstStyle/>
+            <a:p>
+              <a:r>
+                <a:rPr lang="en-US" sz="3600" b="1" dirty="0" smtClean="0"/>
+                <a:t>x</a:t>
+              </a:r>
+              <a:endParaRPr lang="en-US" sz="3600" b="1" dirty="0"/>
+            </a:p>
+          </p:txBody>
+        </p:sp>
+        <p:sp>
+          <p:nvSpPr>
+            <p:cNvPr id="44" name="TextBox 43"/>
+            <p:cNvSpPr txBox="1"/>
+            <p:nvPr/>
+          </p:nvSpPr>
+          <p:spPr>
+            <a:xfrm>
+              <a:off x="2433697" y="1776704"/>
+              <a:ext cx="402674" cy="646331"/>
+            </a:xfrm>
+            <a:prstGeom prst="rect">
+              <a:avLst/>
+            </a:prstGeom>
+            <a:noFill/>
+          </p:spPr>
+          <p:txBody>
+            <a:bodyPr wrap="none" rtlCol="0">
+              <a:spAutoFit/>
+            </a:bodyPr>
+            <a:lstStyle/>
+            <a:p>
+              <a:r>
+                <a:rPr lang="en-US" sz="3600" b="1" dirty="0" smtClean="0"/>
+                <a:t>x</a:t>
+              </a:r>
+              <a:endParaRPr lang="en-US" sz="3600" b="1" dirty="0"/>
             </a:p>
           </p:txBody>
         </p:sp>
       </p:grpSp>
-      <p:sp>
-        <p:nvSpPr>
-          <p:cNvPr id="34" name="TextBox 33"/>
+    </p:spTree>
+    <p:extLst>
+      <p:ext uri="{BB962C8B-B14F-4D97-AF65-F5344CB8AC3E}">
+        <p14:creationId xmlns:p14="http://schemas.microsoft.com/office/powerpoint/2010/main" val="2663548405"/>
+      </p:ext>
+    </p:extLst>
+  </p:cSld>
+  <p:clrMapOvr>
+    <a:masterClrMapping/>
+  </p:clrMapOvr>
+</p:sld>
+</file>
+
+<file path=ppt/slides/slide5.xml><?xml version="1.0" encoding="utf-8"?>
+<p:sld xmlns:a="http://schemas.openxmlformats.org/drawingml/2006/main" xmlns:r="http://schemas.openxmlformats.org/officeDocument/2006/relationships" xmlns:p="http://schemas.openxmlformats.org/presentationml/2006/main">
+  <p:cSld>
+    <p:spTree>
+      <p:nvGrpSpPr>
+        <p:cNvPr id="1" name=""/>
+        <p:cNvGrpSpPr/>
+        <p:nvPr/>
+      </p:nvGrpSpPr>
+      <p:grpSpPr>
+        <a:xfrm>
+          <a:off x="0" y="0"/>
+          <a:ext cx="0" cy="0"/>
+          <a:chOff x="0" y="0"/>
+          <a:chExt cx="0" cy="0"/>
+        </a:xfrm>
+      </p:grpSpPr>
+      <p:pic>
+        <p:nvPicPr>
+          <p:cNvPr id="4" name="Picture 3"/>
+          <p:cNvPicPr>
+            <a:picLocks noChangeAspect="1"/>
+          </p:cNvPicPr>
+          <p:nvPr/>
+        </p:nvPicPr>
+        <p:blipFill rotWithShape="1">
+          <a:blip r:embed="rId2"/>
+          <a:srcRect b="21086"/>
+          <a:stretch/>
+        </p:blipFill>
+        <p:spPr>
+          <a:xfrm>
+            <a:off x="0" y="1219200"/>
+            <a:ext cx="9144000" cy="3484539"/>
+          </a:xfrm>
+          <a:prstGeom prst="rect">
+            <a:avLst/>
+          </a:prstGeom>
+        </p:spPr>
+      </p:pic>
+      <p:pic>
+        <p:nvPicPr>
+          <p:cNvPr id="5" name="Picture 4"/>
+          <p:cNvPicPr>
+            <a:picLocks noChangeAspect="1"/>
+          </p:cNvPicPr>
+          <p:nvPr/>
+        </p:nvPicPr>
+        <p:blipFill>
+          <a:blip r:embed="rId2"/>
+          <a:stretch>
+            <a:fillRect/>
+          </a:stretch>
+        </p:blipFill>
+        <p:spPr>
+          <a:xfrm>
+            <a:off x="9630106" y="2442361"/>
+            <a:ext cx="9144000" cy="4415639"/>
+          </a:xfrm>
+          <a:prstGeom prst="rect">
+            <a:avLst/>
+          </a:prstGeom>
+        </p:spPr>
+      </p:pic>
+    </p:spTree>
+    <p:extLst>
+      <p:ext uri="{BB962C8B-B14F-4D97-AF65-F5344CB8AC3E}">
+        <p14:creationId xmlns:p14="http://schemas.microsoft.com/office/powerpoint/2010/main" val="127022296"/>
+      </p:ext>
+    </p:extLst>
+  </p:cSld>
+  <p:clrMapOvr>
+    <a:masterClrMapping/>
+  </p:clrMapOvr>
+</p:sld>
+</file>
+
+<file path=ppt/slides/slide6.xml><?xml version="1.0" encoding="utf-8"?>
+<p:sld xmlns:a="http://schemas.openxmlformats.org/drawingml/2006/main" xmlns:r="http://schemas.openxmlformats.org/officeDocument/2006/relationships" xmlns:p="http://schemas.openxmlformats.org/presentationml/2006/main">
+  <p:cSld>
+    <p:spTree>
+      <p:nvGrpSpPr>
+        <p:cNvPr id="1" name=""/>
+        <p:cNvGrpSpPr/>
+        <p:nvPr/>
+      </p:nvGrpSpPr>
+      <p:grpSpPr>
+        <a:xfrm>
+          <a:off x="0" y="0"/>
+          <a:ext cx="0" cy="0"/>
+          <a:chOff x="0" y="0"/>
+          <a:chExt cx="0" cy="0"/>
+        </a:xfrm>
+      </p:grpSpPr>
+      <p:pic>
+        <p:nvPicPr>
+          <p:cNvPr id="4" name="Picture 3" descr="dielectric_mechanisms.png"/>
+          <p:cNvPicPr>
+            <a:picLocks noChangeAspect="1"/>
+          </p:cNvPicPr>
+          <p:nvPr/>
+        </p:nvPicPr>
+        <p:blipFill rotWithShape="1">
+          <a:blip r:embed="rId2">
+            <a:extLst>
+              <a:ext uri="{BEBA8EAE-BF5A-486C-A8C5-ECC9F3942E4B}">
+                <a14:imgProps xmlns:a14="http://schemas.microsoft.com/office/drawing/2010/main">
+                  <a14:imgLayer r:embed="rId3">
+                    <a14:imgEffect>
+                      <a14:sharpenSoften amount="30000"/>
+                    </a14:imgEffect>
+                  </a14:imgLayer>
+                </a14:imgProps>
+              </a:ext>
+              <a:ext uri="{28A0092B-C50C-407E-A947-70E740481C1C}">
+                <a14:useLocalDpi xmlns:a14="http://schemas.microsoft.com/office/drawing/2010/main" val="0"/>
+              </a:ext>
+            </a:extLst>
+          </a:blip>
+          <a:srcRect t="6976" r="66986" b="45818"/>
+          <a:stretch/>
+        </p:blipFill>
+        <p:spPr>
+          <a:xfrm>
+            <a:off x="165100" y="673814"/>
+            <a:ext cx="2906118" cy="2189895"/>
+          </a:xfrm>
+          <a:prstGeom prst="rect">
+            <a:avLst/>
+          </a:prstGeom>
+        </p:spPr>
+      </p:pic>
+      <p:pic>
+        <p:nvPicPr>
+          <p:cNvPr id="5" name="Picture 4" descr="dielectric_mechanisms.png"/>
+          <p:cNvPicPr>
+            <a:picLocks noChangeAspect="1"/>
+          </p:cNvPicPr>
+          <p:nvPr/>
+        </p:nvPicPr>
+        <p:blipFill rotWithShape="1">
+          <a:blip r:embed="rId2">
+            <a:extLst>
+              <a:ext uri="{BEBA8EAE-BF5A-486C-A8C5-ECC9F3942E4B}">
+                <a14:imgProps xmlns:a14="http://schemas.microsoft.com/office/drawing/2010/main">
+                  <a14:imgLayer r:embed="rId4">
+                    <a14:imgEffect>
+                      <a14:sharpenSoften amount="30000"/>
+                    </a14:imgEffect>
+                  </a14:imgLayer>
+                </a14:imgProps>
+              </a:ext>
+              <a:ext uri="{28A0092B-C50C-407E-A947-70E740481C1C}">
+                <a14:useLocalDpi xmlns:a14="http://schemas.microsoft.com/office/drawing/2010/main" val="0"/>
+              </a:ext>
+            </a:extLst>
+          </a:blip>
+          <a:srcRect l="33049" t="11165" r="5618" b="41909"/>
+          <a:stretch/>
+        </p:blipFill>
+        <p:spPr>
+          <a:xfrm>
+            <a:off x="3213764" y="803393"/>
+            <a:ext cx="5398929" cy="2176937"/>
+          </a:xfrm>
+          <a:prstGeom prst="rect">
+            <a:avLst/>
+          </a:prstGeom>
+        </p:spPr>
+      </p:pic>
+      <p:sp>
+        <p:nvSpPr>
+          <p:cNvPr id="6" name="TextBox 5"/>
           <p:cNvSpPr txBox="1"/>
           <p:nvPr/>
         </p:nvSpPr>
         <p:spPr>
           <a:xfrm>
-            <a:off x="6997710" y="4638991"/>
-            <a:ext cx="402674" cy="646331"/>
+            <a:off x="255486" y="328771"/>
+            <a:ext cx="336601" cy="461665"/>
           </a:xfrm>
           <a:prstGeom prst="rect">
             <a:avLst/>
@@ -4147,23 +4677,23 @@
           <a:lstStyle/>
           <a:p>
             <a:r>
-              <a:rPr lang="en-US" sz="3600" b="1" dirty="0" smtClean="0"/>
-              <a:t>x</a:t>
-            </a:r>
-            <a:endParaRPr lang="en-US" sz="3600" b="1" dirty="0"/>
-          </a:p>
-        </p:txBody>
-      </p:sp>
-      <p:sp>
-        <p:nvSpPr>
-          <p:cNvPr id="35" name="TextBox 34"/>
+              <a:rPr lang="en-US" sz="2400" b="1" dirty="0" smtClean="0"/>
+              <a:t>a</a:t>
+            </a:r>
+            <a:endParaRPr lang="en-US" sz="2400" b="1" dirty="0"/>
+          </a:p>
+        </p:txBody>
+      </p:sp>
+      <p:sp>
+        <p:nvSpPr>
+          <p:cNvPr id="7" name="TextBox 6"/>
           <p:cNvSpPr txBox="1"/>
           <p:nvPr/>
         </p:nvSpPr>
         <p:spPr>
           <a:xfrm>
-            <a:off x="4921211" y="4638991"/>
-            <a:ext cx="402674" cy="646331"/>
+            <a:off x="3356026" y="344138"/>
+            <a:ext cx="349825" cy="461665"/>
           </a:xfrm>
           <a:prstGeom prst="rect">
             <a:avLst/>
@@ -4177,287 +4707,17 @@
           <a:lstStyle/>
           <a:p>
             <a:r>
-              <a:rPr lang="en-US" sz="3600" b="1" dirty="0" smtClean="0"/>
-              <a:t>x</a:t>
-            </a:r>
-            <a:endParaRPr lang="en-US" sz="3600" b="1" dirty="0"/>
-          </a:p>
-        </p:txBody>
-      </p:sp>
-      <p:sp>
-        <p:nvSpPr>
-          <p:cNvPr id="36" name="TextBox 35"/>
-          <p:cNvSpPr txBox="1"/>
-          <p:nvPr/>
-        </p:nvSpPr>
-        <p:spPr>
-          <a:xfrm>
-            <a:off x="5970866" y="5688649"/>
-            <a:ext cx="402674" cy="646331"/>
-          </a:xfrm>
-          <a:prstGeom prst="rect">
-            <a:avLst/>
-          </a:prstGeom>
-          <a:noFill/>
-        </p:spPr>
-        <p:txBody>
-          <a:bodyPr wrap="none" rtlCol="0">
-            <a:spAutoFit/>
-          </a:bodyPr>
-          <a:lstStyle/>
-          <a:p>
-            <a:r>
-              <a:rPr lang="en-US" sz="3600" b="1" dirty="0" smtClean="0"/>
-              <a:t>x</a:t>
-            </a:r>
-            <a:endParaRPr lang="en-US" sz="3600" b="1" dirty="0"/>
-          </a:p>
-        </p:txBody>
-      </p:sp>
-      <p:sp>
-        <p:nvSpPr>
-          <p:cNvPr id="37" name="TextBox 36"/>
-          <p:cNvSpPr txBox="1"/>
-          <p:nvPr/>
-        </p:nvSpPr>
-        <p:spPr>
-          <a:xfrm>
-            <a:off x="4935123" y="2536706"/>
-            <a:ext cx="402674" cy="646331"/>
-          </a:xfrm>
-          <a:prstGeom prst="rect">
-            <a:avLst/>
-          </a:prstGeom>
-          <a:noFill/>
-        </p:spPr>
-        <p:txBody>
-          <a:bodyPr wrap="none" rtlCol="0">
-            <a:spAutoFit/>
-          </a:bodyPr>
-          <a:lstStyle/>
-          <a:p>
-            <a:r>
-              <a:rPr lang="en-US" sz="3600" b="1" dirty="0" smtClean="0"/>
-              <a:t>x</a:t>
-            </a:r>
-            <a:endParaRPr lang="en-US" sz="3600" b="1" dirty="0"/>
-          </a:p>
-        </p:txBody>
-      </p:sp>
-      <p:sp>
-        <p:nvSpPr>
-          <p:cNvPr id="38" name="TextBox 37"/>
-          <p:cNvSpPr txBox="1"/>
-          <p:nvPr/>
-        </p:nvSpPr>
-        <p:spPr>
-          <a:xfrm>
-            <a:off x="6997710" y="2549664"/>
-            <a:ext cx="402674" cy="646331"/>
-          </a:xfrm>
-          <a:prstGeom prst="rect">
-            <a:avLst/>
-          </a:prstGeom>
-          <a:noFill/>
-        </p:spPr>
-        <p:txBody>
-          <a:bodyPr wrap="none" rtlCol="0">
-            <a:spAutoFit/>
-          </a:bodyPr>
-          <a:lstStyle/>
-          <a:p>
-            <a:r>
-              <a:rPr lang="en-US" sz="3600" b="1" dirty="0" smtClean="0"/>
-              <a:t>x</a:t>
-            </a:r>
-            <a:endParaRPr lang="en-US" sz="3600" b="1" dirty="0"/>
-          </a:p>
-        </p:txBody>
-      </p:sp>
-      <p:sp>
-        <p:nvSpPr>
-          <p:cNvPr id="39" name="TextBox 38"/>
-          <p:cNvSpPr txBox="1"/>
-          <p:nvPr/>
-        </p:nvSpPr>
-        <p:spPr>
-          <a:xfrm>
-            <a:off x="5970866" y="1505371"/>
-            <a:ext cx="402674" cy="646331"/>
-          </a:xfrm>
-          <a:prstGeom prst="rect">
-            <a:avLst/>
-          </a:prstGeom>
-          <a:noFill/>
-        </p:spPr>
-        <p:txBody>
-          <a:bodyPr wrap="none" rtlCol="0">
-            <a:spAutoFit/>
-          </a:bodyPr>
-          <a:lstStyle/>
-          <a:p>
-            <a:r>
-              <a:rPr lang="en-US" sz="3600" b="1" dirty="0" smtClean="0"/>
-              <a:t>x</a:t>
-            </a:r>
-            <a:endParaRPr lang="en-US" sz="3600" b="1" dirty="0"/>
-          </a:p>
-        </p:txBody>
-      </p:sp>
-      <p:sp>
-        <p:nvSpPr>
-          <p:cNvPr id="40" name="TextBox 39"/>
-          <p:cNvSpPr txBox="1"/>
-          <p:nvPr/>
-        </p:nvSpPr>
-        <p:spPr>
-          <a:xfrm>
-            <a:off x="5965362" y="3580439"/>
-            <a:ext cx="402674" cy="646331"/>
-          </a:xfrm>
-          <a:prstGeom prst="rect">
-            <a:avLst/>
-          </a:prstGeom>
-          <a:noFill/>
-        </p:spPr>
-        <p:txBody>
-          <a:bodyPr wrap="none" rtlCol="0">
-            <a:spAutoFit/>
-          </a:bodyPr>
-          <a:lstStyle/>
-          <a:p>
-            <a:r>
-              <a:rPr lang="en-US" sz="3600" b="1" dirty="0" smtClean="0"/>
-              <a:t>x</a:t>
-            </a:r>
-            <a:endParaRPr lang="en-US" sz="3600" b="1" dirty="0"/>
-          </a:p>
-        </p:txBody>
-      </p:sp>
-      <p:sp>
-        <p:nvSpPr>
-          <p:cNvPr id="41" name="TextBox 40"/>
-          <p:cNvSpPr txBox="1"/>
-          <p:nvPr/>
-        </p:nvSpPr>
-        <p:spPr>
-          <a:xfrm>
-            <a:off x="1152879" y="3050630"/>
-            <a:ext cx="402674" cy="646331"/>
-          </a:xfrm>
-          <a:prstGeom prst="rect">
-            <a:avLst/>
-          </a:prstGeom>
-          <a:noFill/>
-        </p:spPr>
-        <p:txBody>
-          <a:bodyPr wrap="none" rtlCol="0">
-            <a:spAutoFit/>
-          </a:bodyPr>
-          <a:lstStyle/>
-          <a:p>
-            <a:r>
-              <a:rPr lang="en-US" sz="3600" b="1" dirty="0" smtClean="0"/>
-              <a:t>x</a:t>
-            </a:r>
-            <a:endParaRPr lang="en-US" sz="3600" b="1" dirty="0"/>
-          </a:p>
-        </p:txBody>
-      </p:sp>
-      <p:sp>
-        <p:nvSpPr>
-          <p:cNvPr id="42" name="TextBox 41"/>
-          <p:cNvSpPr txBox="1"/>
-          <p:nvPr/>
-        </p:nvSpPr>
-        <p:spPr>
-          <a:xfrm>
-            <a:off x="3741966" y="3056656"/>
-            <a:ext cx="402674" cy="646331"/>
-          </a:xfrm>
-          <a:prstGeom prst="rect">
-            <a:avLst/>
-          </a:prstGeom>
-          <a:noFill/>
-        </p:spPr>
-        <p:txBody>
-          <a:bodyPr wrap="none" rtlCol="0">
-            <a:spAutoFit/>
-          </a:bodyPr>
-          <a:lstStyle/>
-          <a:p>
-            <a:r>
-              <a:rPr lang="en-US" sz="3600" b="1" dirty="0" smtClean="0"/>
-              <a:t>x</a:t>
-            </a:r>
-            <a:endParaRPr lang="en-US" sz="3600" b="1" dirty="0"/>
-          </a:p>
-        </p:txBody>
-      </p:sp>
-      <p:sp>
-        <p:nvSpPr>
-          <p:cNvPr id="43" name="TextBox 42"/>
-          <p:cNvSpPr txBox="1"/>
-          <p:nvPr/>
-        </p:nvSpPr>
-        <p:spPr>
-          <a:xfrm>
-            <a:off x="2458662" y="4354699"/>
-            <a:ext cx="402674" cy="646331"/>
-          </a:xfrm>
-          <a:prstGeom prst="rect">
-            <a:avLst/>
-          </a:prstGeom>
-          <a:noFill/>
-        </p:spPr>
-        <p:txBody>
-          <a:bodyPr wrap="none" rtlCol="0">
-            <a:spAutoFit/>
-          </a:bodyPr>
-          <a:lstStyle/>
-          <a:p>
-            <a:r>
-              <a:rPr lang="en-US" sz="3600" b="1" dirty="0" smtClean="0"/>
-              <a:t>x</a:t>
-            </a:r>
-            <a:endParaRPr lang="en-US" sz="3600" b="1" dirty="0"/>
-          </a:p>
-        </p:txBody>
-      </p:sp>
-      <p:sp>
-        <p:nvSpPr>
-          <p:cNvPr id="44" name="TextBox 43"/>
-          <p:cNvSpPr txBox="1"/>
-          <p:nvPr/>
-        </p:nvSpPr>
-        <p:spPr>
-          <a:xfrm>
-            <a:off x="2433697" y="1776704"/>
-            <a:ext cx="402674" cy="646331"/>
-          </a:xfrm>
-          <a:prstGeom prst="rect">
-            <a:avLst/>
-          </a:prstGeom>
-          <a:noFill/>
-        </p:spPr>
-        <p:txBody>
-          <a:bodyPr wrap="none" rtlCol="0">
-            <a:spAutoFit/>
-          </a:bodyPr>
-          <a:lstStyle/>
-          <a:p>
-            <a:r>
-              <a:rPr lang="en-US" sz="3600" b="1" dirty="0" smtClean="0"/>
-              <a:t>x</a:t>
-            </a:r>
-            <a:endParaRPr lang="en-US" sz="3600" b="1" dirty="0"/>
+              <a:rPr lang="en-US" sz="2400" b="1" dirty="0"/>
+              <a:t>b</a:t>
+            </a:r>
+            <a:endParaRPr lang="en-US" sz="2400" b="1" dirty="0"/>
           </a:p>
         </p:txBody>
       </p:sp>
     </p:spTree>
     <p:extLst>
       <p:ext uri="{BB962C8B-B14F-4D97-AF65-F5344CB8AC3E}">
-        <p14:creationId xmlns:p14="http://schemas.microsoft.com/office/powerpoint/2010/main" val="2663548405"/>
+        <p14:creationId xmlns:p14="http://schemas.microsoft.com/office/powerpoint/2010/main" val="1499775613"/>
       </p:ext>
     </p:extLst>
   </p:cSld>

</xml_diff>

<commit_message>
PV material properties section completed for now.
</commit_message>
<xml_diff>
--- a/figures.pptx
+++ b/figures.pptx
@@ -11,6 +11,9 @@
     <p:sldId id="259" r:id="rId5"/>
     <p:sldId id="260" r:id="rId6"/>
     <p:sldId id="261" r:id="rId7"/>
+    <p:sldId id="262" r:id="rId8"/>
+    <p:sldId id="263" r:id="rId9"/>
+    <p:sldId id="264" r:id="rId10"/>
   </p:sldIdLst>
   <p:sldSz cx="9144000" cy="6858000" type="screen4x3"/>
   <p:notesSz cx="6858000" cy="9144000"/>
@@ -4580,7 +4583,7 @@
       </p:grpSpPr>
       <p:pic>
         <p:nvPicPr>
-          <p:cNvPr id="4" name="Picture 3" descr="dielectric_mechanisms.png"/>
+          <p:cNvPr id="5" name="Picture 4" descr="dielectric_mechanisms.png"/>
           <p:cNvPicPr>
             <a:picLocks noChangeAspect="1"/>
           </p:cNvPicPr>
@@ -4603,50 +4606,12 @@
               </a:ext>
             </a:extLst>
           </a:blip>
-          <a:srcRect t="6976" r="66986" b="45818"/>
-          <a:stretch/>
-        </p:blipFill>
-        <p:spPr>
-          <a:xfrm>
-            <a:off x="165100" y="673814"/>
-            <a:ext cx="2906118" cy="2189895"/>
-          </a:xfrm>
-          <a:prstGeom prst="rect">
-            <a:avLst/>
-          </a:prstGeom>
-        </p:spPr>
-      </p:pic>
-      <p:pic>
-        <p:nvPicPr>
-          <p:cNvPr id="5" name="Picture 4" descr="dielectric_mechanisms.png"/>
-          <p:cNvPicPr>
-            <a:picLocks noChangeAspect="1"/>
-          </p:cNvPicPr>
-          <p:nvPr/>
-        </p:nvPicPr>
-        <p:blipFill rotWithShape="1">
-          <a:blip r:embed="rId2">
-            <a:extLst>
-              <a:ext uri="{BEBA8EAE-BF5A-486C-A8C5-ECC9F3942E4B}">
-                <a14:imgProps xmlns:a14="http://schemas.microsoft.com/office/drawing/2010/main">
-                  <a14:imgLayer r:embed="rId4">
-                    <a14:imgEffect>
-                      <a14:sharpenSoften amount="30000"/>
-                    </a14:imgEffect>
-                  </a14:imgLayer>
-                </a14:imgProps>
-              </a:ext>
-              <a:ext uri="{28A0092B-C50C-407E-A947-70E740481C1C}">
-                <a14:useLocalDpi xmlns:a14="http://schemas.microsoft.com/office/drawing/2010/main" val="0"/>
-              </a:ext>
-            </a:extLst>
-          </a:blip>
           <a:srcRect l="33049" t="11165" r="5618" b="41909"/>
           <a:stretch/>
         </p:blipFill>
         <p:spPr>
           <a:xfrm>
-            <a:off x="3213764" y="803393"/>
+            <a:off x="9395076" y="3654145"/>
             <a:ext cx="5398929" cy="2176937"/>
           </a:xfrm>
           <a:prstGeom prst="rect">
@@ -4654,70 +4619,796 @@
           </a:prstGeom>
         </p:spPr>
       </p:pic>
-      <p:sp>
-        <p:nvSpPr>
-          <p:cNvPr id="6" name="TextBox 5"/>
-          <p:cNvSpPr txBox="1"/>
+      <p:grpSp>
+        <p:nvGrpSpPr>
+          <p:cNvPr id="11" name="Group 10"/>
+          <p:cNvGrpSpPr/>
           <p:nvPr/>
-        </p:nvSpPr>
+        </p:nvGrpSpPr>
+        <p:grpSpPr>
+          <a:xfrm>
+            <a:off x="165100" y="328771"/>
+            <a:ext cx="7549564" cy="3094006"/>
+            <a:chOff x="165100" y="328771"/>
+            <a:chExt cx="7549564" cy="3094006"/>
+          </a:xfrm>
+        </p:grpSpPr>
+        <p:pic>
+          <p:nvPicPr>
+            <p:cNvPr id="4" name="Picture 3" descr="dielectric_mechanisms.png"/>
+            <p:cNvPicPr>
+              <a:picLocks noChangeAspect="1"/>
+            </p:cNvPicPr>
+            <p:nvPr/>
+          </p:nvPicPr>
+          <p:blipFill rotWithShape="1">
+            <a:blip r:embed="rId2">
+              <a:extLst>
+                <a:ext uri="{BEBA8EAE-BF5A-486C-A8C5-ECC9F3942E4B}">
+                  <a14:imgProps xmlns:a14="http://schemas.microsoft.com/office/drawing/2010/main">
+                    <a14:imgLayer r:embed="rId4">
+                      <a14:imgEffect>
+                        <a14:sharpenSoften amount="30000"/>
+                      </a14:imgEffect>
+                    </a14:imgLayer>
+                  </a14:imgProps>
+                </a:ext>
+                <a:ext uri="{28A0092B-C50C-407E-A947-70E740481C1C}">
+                  <a14:useLocalDpi xmlns:a14="http://schemas.microsoft.com/office/drawing/2010/main" val="0"/>
+                </a:ext>
+              </a:extLst>
+            </a:blip>
+            <a:srcRect t="6976" r="66986" b="45818"/>
+            <a:stretch/>
+          </p:blipFill>
+          <p:spPr>
+            <a:xfrm>
+              <a:off x="165100" y="673814"/>
+              <a:ext cx="2906118" cy="2189895"/>
+            </a:xfrm>
+            <a:prstGeom prst="rect">
+              <a:avLst/>
+            </a:prstGeom>
+          </p:spPr>
+        </p:pic>
+        <p:sp>
+          <p:nvSpPr>
+            <p:cNvPr id="6" name="TextBox 5"/>
+            <p:cNvSpPr txBox="1"/>
+            <p:nvPr/>
+          </p:nvSpPr>
+          <p:spPr>
+            <a:xfrm>
+              <a:off x="255486" y="328771"/>
+              <a:ext cx="336601" cy="461665"/>
+            </a:xfrm>
+            <a:prstGeom prst="rect">
+              <a:avLst/>
+            </a:prstGeom>
+            <a:noFill/>
+          </p:spPr>
+          <p:txBody>
+            <a:bodyPr wrap="none" rtlCol="0">
+              <a:spAutoFit/>
+            </a:bodyPr>
+            <a:lstStyle/>
+            <a:p>
+              <a:r>
+                <a:rPr lang="en-US" sz="2400" b="1" dirty="0" smtClean="0"/>
+                <a:t>a</a:t>
+              </a:r>
+              <a:endParaRPr lang="en-US" sz="2400" b="1" dirty="0"/>
+            </a:p>
+          </p:txBody>
+        </p:sp>
+        <p:pic>
+          <p:nvPicPr>
+            <p:cNvPr id="9" name="Picture 8"/>
+            <p:cNvPicPr>
+              <a:picLocks noChangeAspect="1"/>
+            </p:cNvPicPr>
+            <p:nvPr/>
+          </p:nvPicPr>
+          <p:blipFill>
+            <a:blip r:embed="rId5"/>
+            <a:stretch>
+              <a:fillRect/>
+            </a:stretch>
+          </p:blipFill>
+          <p:spPr>
+            <a:xfrm>
+              <a:off x="3211219" y="687182"/>
+              <a:ext cx="4503445" cy="2735595"/>
+            </a:xfrm>
+            <a:prstGeom prst="rect">
+              <a:avLst/>
+            </a:prstGeom>
+          </p:spPr>
+        </p:pic>
+        <p:sp>
+          <p:nvSpPr>
+            <p:cNvPr id="10" name="TextBox 9"/>
+            <p:cNvSpPr txBox="1"/>
+            <p:nvPr/>
+          </p:nvSpPr>
+          <p:spPr>
+            <a:xfrm>
+              <a:off x="3356026" y="344138"/>
+              <a:ext cx="349825" cy="461665"/>
+            </a:xfrm>
+            <a:prstGeom prst="rect">
+              <a:avLst/>
+            </a:prstGeom>
+            <a:noFill/>
+          </p:spPr>
+          <p:txBody>
+            <a:bodyPr wrap="none" rtlCol="0">
+              <a:spAutoFit/>
+            </a:bodyPr>
+            <a:lstStyle/>
+            <a:p>
+              <a:r>
+                <a:rPr lang="en-US" sz="2400" b="1" dirty="0"/>
+                <a:t>b</a:t>
+              </a:r>
+              <a:endParaRPr lang="en-US" sz="2400" b="1" dirty="0"/>
+            </a:p>
+          </p:txBody>
+        </p:sp>
+      </p:grpSp>
+    </p:spTree>
+    <p:extLst>
+      <p:ext uri="{BB962C8B-B14F-4D97-AF65-F5344CB8AC3E}">
+        <p14:creationId xmlns:p14="http://schemas.microsoft.com/office/powerpoint/2010/main" val="1499775613"/>
+      </p:ext>
+    </p:extLst>
+  </p:cSld>
+  <p:clrMapOvr>
+    <a:masterClrMapping/>
+  </p:clrMapOvr>
+</p:sld>
+</file>
+
+<file path=ppt/slides/slide7.xml><?xml version="1.0" encoding="utf-8"?>
+<p:sld xmlns:a="http://schemas.openxmlformats.org/drawingml/2006/main" xmlns:r="http://schemas.openxmlformats.org/officeDocument/2006/relationships" xmlns:p="http://schemas.openxmlformats.org/presentationml/2006/main">
+  <p:cSld>
+    <p:spTree>
+      <p:nvGrpSpPr>
+        <p:cNvPr id="1" name=""/>
+        <p:cNvGrpSpPr/>
+        <p:nvPr/>
+      </p:nvGrpSpPr>
+      <p:grpSpPr>
+        <a:xfrm>
+          <a:off x="0" y="0"/>
+          <a:ext cx="0" cy="0"/>
+          <a:chOff x="0" y="0"/>
+          <a:chExt cx="0" cy="0"/>
+        </a:xfrm>
+      </p:grpSpPr>
+      <p:pic>
+        <p:nvPicPr>
+          <p:cNvPr id="5" name="Picture 4"/>
+          <p:cNvPicPr>
+            <a:picLocks noChangeAspect="1"/>
+          </p:cNvPicPr>
+          <p:nvPr/>
+        </p:nvPicPr>
+        <p:blipFill>
+          <a:blip r:embed="rId2">
+            <a:extLst>
+              <a:ext uri="{BEBA8EAE-BF5A-486C-A8C5-ECC9F3942E4B}">
+                <a14:imgProps xmlns:a14="http://schemas.microsoft.com/office/drawing/2010/main">
+                  <a14:imgLayer r:embed="rId3">
+                    <a14:imgEffect>
+                      <a14:sharpenSoften amount="30000"/>
+                    </a14:imgEffect>
+                  </a14:imgLayer>
+                </a14:imgProps>
+              </a:ext>
+            </a:extLst>
+          </a:blip>
+          <a:stretch>
+            <a:fillRect/>
+          </a:stretch>
+        </p:blipFill>
         <p:spPr>
           <a:xfrm>
-            <a:off x="255486" y="328771"/>
-            <a:ext cx="336601" cy="461665"/>
+            <a:off x="855279" y="3123475"/>
+            <a:ext cx="3354421" cy="3734525"/>
           </a:xfrm>
           <a:prstGeom prst="rect">
             <a:avLst/>
           </a:prstGeom>
-          <a:noFill/>
         </p:spPr>
-        <p:txBody>
-          <a:bodyPr wrap="none" rtlCol="0">
-            <a:spAutoFit/>
-          </a:bodyPr>
-          <a:lstStyle/>
-          <a:p>
-            <a:r>
-              <a:rPr lang="en-US" sz="2400" b="1" dirty="0" smtClean="0"/>
-              <a:t>a</a:t>
-            </a:r>
-            <a:endParaRPr lang="en-US" sz="2400" b="1" dirty="0"/>
-          </a:p>
-        </p:txBody>
-      </p:sp>
-      <p:sp>
-        <p:nvSpPr>
-          <p:cNvPr id="7" name="TextBox 6"/>
-          <p:cNvSpPr txBox="1"/>
+      </p:pic>
+      <p:grpSp>
+        <p:nvGrpSpPr>
+          <p:cNvPr id="25" name="Group 24"/>
+          <p:cNvGrpSpPr/>
           <p:nvPr/>
-        </p:nvSpPr>
+        </p:nvGrpSpPr>
+        <p:grpSpPr>
+          <a:xfrm>
+            <a:off x="0" y="136665"/>
+            <a:ext cx="8773059" cy="6420062"/>
+            <a:chOff x="0" y="136665"/>
+            <a:chExt cx="8773059" cy="6420062"/>
+          </a:xfrm>
+        </p:grpSpPr>
+        <p:pic>
+          <p:nvPicPr>
+            <p:cNvPr id="4" name="Picture 3"/>
+            <p:cNvPicPr>
+              <a:picLocks noChangeAspect="1"/>
+            </p:cNvPicPr>
+            <p:nvPr/>
+          </p:nvPicPr>
+          <p:blipFill>
+            <a:blip r:embed="rId4">
+              <a:extLst>
+                <a:ext uri="{BEBA8EAE-BF5A-486C-A8C5-ECC9F3942E4B}">
+                  <a14:imgProps xmlns:a14="http://schemas.microsoft.com/office/drawing/2010/main">
+                    <a14:imgLayer r:embed="rId5">
+                      <a14:imgEffect>
+                        <a14:sharpenSoften amount="30000"/>
+                      </a14:imgEffect>
+                    </a14:imgLayer>
+                  </a14:imgProps>
+                </a:ext>
+              </a:extLst>
+            </a:blip>
+            <a:stretch>
+              <a:fillRect/>
+            </a:stretch>
+          </p:blipFill>
+          <p:spPr>
+            <a:xfrm>
+              <a:off x="981408" y="136665"/>
+              <a:ext cx="3228292" cy="3091113"/>
+            </a:xfrm>
+            <a:prstGeom prst="rect">
+              <a:avLst/>
+            </a:prstGeom>
+          </p:spPr>
+        </p:pic>
+        <p:pic>
+          <p:nvPicPr>
+            <p:cNvPr id="6" name="Picture 5"/>
+            <p:cNvPicPr>
+              <a:picLocks noChangeAspect="1"/>
+            </p:cNvPicPr>
+            <p:nvPr/>
+          </p:nvPicPr>
+          <p:blipFill rotWithShape="1">
+            <a:blip r:embed="rId6">
+              <a:extLst>
+                <a:ext uri="{BEBA8EAE-BF5A-486C-A8C5-ECC9F3942E4B}">
+                  <a14:imgProps xmlns:a14="http://schemas.microsoft.com/office/drawing/2010/main">
+                    <a14:imgLayer r:embed="rId7">
+                      <a14:imgEffect>
+                        <a14:sharpenSoften amount="30000"/>
+                      </a14:imgEffect>
+                    </a14:imgLayer>
+                  </a14:imgProps>
+                </a:ext>
+              </a:extLst>
+            </a:blip>
+            <a:srcRect r="2737"/>
+            <a:stretch/>
+          </p:blipFill>
+          <p:spPr>
+            <a:xfrm>
+              <a:off x="4630768" y="3681809"/>
+              <a:ext cx="3287016" cy="2874918"/>
+            </a:xfrm>
+            <a:prstGeom prst="rect">
+              <a:avLst/>
+            </a:prstGeom>
+            <a:ln w="38100" cmpd="sng">
+              <a:solidFill>
+                <a:srgbClr val="0000FF"/>
+              </a:solidFill>
+            </a:ln>
+          </p:spPr>
+        </p:pic>
+        <p:pic>
+          <p:nvPicPr>
+            <p:cNvPr id="7" name="Picture 6"/>
+            <p:cNvPicPr>
+              <a:picLocks noChangeAspect="1"/>
+            </p:cNvPicPr>
+            <p:nvPr/>
+          </p:nvPicPr>
+          <p:blipFill rotWithShape="1">
+            <a:blip r:embed="rId8">
+              <a:extLst>
+                <a:ext uri="{BEBA8EAE-BF5A-486C-A8C5-ECC9F3942E4B}">
+                  <a14:imgProps xmlns:a14="http://schemas.microsoft.com/office/drawing/2010/main">
+                    <a14:imgLayer r:embed="rId9">
+                      <a14:imgEffect>
+                        <a14:sharpenSoften amount="30000"/>
+                      </a14:imgEffect>
+                    </a14:imgLayer>
+                  </a14:imgProps>
+                </a:ext>
+              </a:extLst>
+            </a:blip>
+            <a:srcRect l="3014" r="4772"/>
+            <a:stretch/>
+          </p:blipFill>
+          <p:spPr>
+            <a:xfrm>
+              <a:off x="4354134" y="266137"/>
+              <a:ext cx="4418925" cy="2857338"/>
+            </a:xfrm>
+            <a:prstGeom prst="rect">
+              <a:avLst/>
+            </a:prstGeom>
+            <a:ln w="38100" cmpd="sng">
+              <a:solidFill>
+                <a:srgbClr val="0000FF"/>
+              </a:solidFill>
+            </a:ln>
+          </p:spPr>
+        </p:pic>
+        <p:sp>
+          <p:nvSpPr>
+            <p:cNvPr id="8" name="Rectangle 7"/>
+            <p:cNvSpPr/>
+            <p:nvPr/>
+          </p:nvSpPr>
+          <p:spPr>
+            <a:xfrm rot="20348387">
+              <a:off x="1810437" y="788816"/>
+              <a:ext cx="1236311" cy="510590"/>
+            </a:xfrm>
+            <a:prstGeom prst="rect">
+              <a:avLst/>
+            </a:prstGeom>
+            <a:noFill/>
+            <a:ln w="38100" cmpd="sng">
+              <a:solidFill>
+                <a:srgbClr val="0000FF"/>
+              </a:solidFill>
+            </a:ln>
+          </p:spPr>
+          <p:style>
+            <a:lnRef idx="1">
+              <a:schemeClr val="accent1"/>
+            </a:lnRef>
+            <a:fillRef idx="3">
+              <a:schemeClr val="accent1"/>
+            </a:fillRef>
+            <a:effectRef idx="2">
+              <a:schemeClr val="accent1"/>
+            </a:effectRef>
+            <a:fontRef idx="minor">
+              <a:schemeClr val="lt1"/>
+            </a:fontRef>
+          </p:style>
+          <p:txBody>
+            <a:bodyPr rtlCol="0" anchor="ctr"/>
+            <a:lstStyle/>
+            <a:p>
+              <a:pPr algn="ctr"/>
+              <a:endParaRPr lang="en-US"/>
+            </a:p>
+          </p:txBody>
+        </p:sp>
+        <p:sp>
+          <p:nvSpPr>
+            <p:cNvPr id="9" name="Rectangle 8"/>
+            <p:cNvSpPr/>
+            <p:nvPr/>
+          </p:nvSpPr>
+          <p:spPr>
+            <a:xfrm rot="5400000">
+              <a:off x="1515344" y="3926517"/>
+              <a:ext cx="999998" cy="510590"/>
+            </a:xfrm>
+            <a:prstGeom prst="rect">
+              <a:avLst/>
+            </a:prstGeom>
+            <a:noFill/>
+            <a:ln w="38100" cmpd="sng">
+              <a:solidFill>
+                <a:srgbClr val="0000FF"/>
+              </a:solidFill>
+            </a:ln>
+          </p:spPr>
+          <p:style>
+            <a:lnRef idx="1">
+              <a:schemeClr val="accent1"/>
+            </a:lnRef>
+            <a:fillRef idx="3">
+              <a:schemeClr val="accent1"/>
+            </a:fillRef>
+            <a:effectRef idx="2">
+              <a:schemeClr val="accent1"/>
+            </a:effectRef>
+            <a:fontRef idx="minor">
+              <a:schemeClr val="lt1"/>
+            </a:fontRef>
+          </p:style>
+          <p:txBody>
+            <a:bodyPr rtlCol="0" anchor="ctr"/>
+            <a:lstStyle/>
+            <a:p>
+              <a:pPr algn="ctr"/>
+              <a:endParaRPr lang="en-US"/>
+            </a:p>
+          </p:txBody>
+        </p:sp>
+        <p:cxnSp>
+          <p:nvCxnSpPr>
+            <p:cNvPr id="15" name="Straight Arrow Connector 14"/>
+            <p:cNvCxnSpPr/>
+            <p:nvPr/>
+          </p:nvCxnSpPr>
+          <p:spPr>
+            <a:xfrm>
+              <a:off x="2786129" y="1243964"/>
+              <a:ext cx="1423571" cy="258827"/>
+            </a:xfrm>
+            <a:prstGeom prst="straightConnector1">
+              <a:avLst/>
+            </a:prstGeom>
+            <a:ln w="38100" cmpd="sng">
+              <a:solidFill>
+                <a:srgbClr val="0000FF"/>
+              </a:solidFill>
+              <a:tailEnd type="arrow"/>
+            </a:ln>
+          </p:spPr>
+          <p:style>
+            <a:lnRef idx="2">
+              <a:schemeClr val="accent1"/>
+            </a:lnRef>
+            <a:fillRef idx="0">
+              <a:schemeClr val="accent1"/>
+            </a:fillRef>
+            <a:effectRef idx="1">
+              <a:schemeClr val="accent1"/>
+            </a:effectRef>
+            <a:fontRef idx="minor">
+              <a:schemeClr val="tx1"/>
+            </a:fontRef>
+          </p:style>
+        </p:cxnSp>
+        <p:cxnSp>
+          <p:nvCxnSpPr>
+            <p:cNvPr id="17" name="Straight Arrow Connector 16"/>
+            <p:cNvCxnSpPr/>
+            <p:nvPr/>
+          </p:nvCxnSpPr>
+          <p:spPr>
+            <a:xfrm>
+              <a:off x="2385351" y="4221199"/>
+              <a:ext cx="2098370" cy="0"/>
+            </a:xfrm>
+            <a:prstGeom prst="straightConnector1">
+              <a:avLst/>
+            </a:prstGeom>
+            <a:ln w="38100" cmpd="sng">
+              <a:solidFill>
+                <a:srgbClr val="0000FF"/>
+              </a:solidFill>
+              <a:tailEnd type="arrow"/>
+            </a:ln>
+          </p:spPr>
+          <p:style>
+            <a:lnRef idx="2">
+              <a:schemeClr val="accent1"/>
+            </a:lnRef>
+            <a:fillRef idx="0">
+              <a:schemeClr val="accent1"/>
+            </a:fillRef>
+            <a:effectRef idx="1">
+              <a:schemeClr val="accent1"/>
+            </a:effectRef>
+            <a:fontRef idx="minor">
+              <a:schemeClr val="tx1"/>
+            </a:fontRef>
+          </p:style>
+        </p:cxnSp>
+        <p:sp>
+          <p:nvSpPr>
+            <p:cNvPr id="19" name="TextBox 18"/>
+            <p:cNvSpPr txBox="1"/>
+            <p:nvPr/>
+          </p:nvSpPr>
+          <p:spPr>
+            <a:xfrm>
+              <a:off x="283115" y="585431"/>
+              <a:ext cx="442574" cy="523220"/>
+            </a:xfrm>
+            <a:prstGeom prst="rect">
+              <a:avLst/>
+            </a:prstGeom>
+            <a:noFill/>
+            <a:ln>
+              <a:noFill/>
+            </a:ln>
+          </p:spPr>
+          <p:txBody>
+            <a:bodyPr wrap="none" rtlCol="0">
+              <a:spAutoFit/>
+            </a:bodyPr>
+            <a:lstStyle/>
+            <a:p>
+              <a:r>
+                <a:rPr lang="en-US" sz="2800" b="1" dirty="0" smtClean="0">
+                  <a:solidFill>
+                    <a:srgbClr val="0000FF"/>
+                  </a:solidFill>
+                </a:rPr>
+                <a:t>Si</a:t>
+              </a:r>
+              <a:endParaRPr lang="en-US" sz="2800" b="1" dirty="0">
+                <a:solidFill>
+                  <a:srgbClr val="0000FF"/>
+                </a:solidFill>
+              </a:endParaRPr>
+            </a:p>
+          </p:txBody>
+        </p:sp>
+        <p:sp>
+          <p:nvSpPr>
+            <p:cNvPr id="20" name="TextBox 19"/>
+            <p:cNvSpPr txBox="1"/>
+            <p:nvPr/>
+          </p:nvSpPr>
+          <p:spPr>
+            <a:xfrm>
+              <a:off x="0" y="3385085"/>
+              <a:ext cx="951553" cy="523220"/>
+            </a:xfrm>
+            <a:prstGeom prst="rect">
+              <a:avLst/>
+            </a:prstGeom>
+            <a:noFill/>
+            <a:ln>
+              <a:noFill/>
+            </a:ln>
+          </p:spPr>
+          <p:txBody>
+            <a:bodyPr wrap="none" rtlCol="0">
+              <a:spAutoFit/>
+            </a:bodyPr>
+            <a:lstStyle/>
+            <a:p>
+              <a:r>
+                <a:rPr lang="en-US" sz="2800" b="1" dirty="0" err="1" smtClean="0">
+                  <a:solidFill>
+                    <a:srgbClr val="0000FF"/>
+                  </a:solidFill>
+                </a:rPr>
+                <a:t>GaAs</a:t>
+              </a:r>
+              <a:endParaRPr lang="en-US" sz="2800" b="1" dirty="0">
+                <a:solidFill>
+                  <a:srgbClr val="0000FF"/>
+                </a:solidFill>
+              </a:endParaRPr>
+            </a:p>
+          </p:txBody>
+        </p:sp>
+        <p:sp>
+          <p:nvSpPr>
+            <p:cNvPr id="23" name="Rectangle 22"/>
+            <p:cNvSpPr/>
+            <p:nvPr/>
+          </p:nvSpPr>
+          <p:spPr>
+            <a:xfrm>
+              <a:off x="7723403" y="1878904"/>
+              <a:ext cx="907110" cy="1049595"/>
+            </a:xfrm>
+            <a:prstGeom prst="rect">
+              <a:avLst/>
+            </a:prstGeom>
+            <a:solidFill>
+              <a:schemeClr val="bg1"/>
+            </a:solidFill>
+            <a:ln>
+              <a:noFill/>
+            </a:ln>
+            <a:effectLst/>
+          </p:spPr>
+          <p:style>
+            <a:lnRef idx="1">
+              <a:schemeClr val="accent1"/>
+            </a:lnRef>
+            <a:fillRef idx="3">
+              <a:schemeClr val="accent1"/>
+            </a:fillRef>
+            <a:effectRef idx="2">
+              <a:schemeClr val="accent1"/>
+            </a:effectRef>
+            <a:fontRef idx="minor">
+              <a:schemeClr val="lt1"/>
+            </a:fontRef>
+          </p:style>
+          <p:txBody>
+            <a:bodyPr rtlCol="0" anchor="ctr"/>
+            <a:lstStyle/>
+            <a:p>
+              <a:pPr algn="ctr"/>
+              <a:endParaRPr lang="en-US"/>
+            </a:p>
+          </p:txBody>
+        </p:sp>
+        <p:sp>
+          <p:nvSpPr>
+            <p:cNvPr id="24" name="Rectangle 23"/>
+            <p:cNvSpPr/>
+            <p:nvPr/>
+          </p:nvSpPr>
+          <p:spPr>
+            <a:xfrm>
+              <a:off x="4742895" y="4807403"/>
+              <a:ext cx="730188" cy="971847"/>
+            </a:xfrm>
+            <a:prstGeom prst="rect">
+              <a:avLst/>
+            </a:prstGeom>
+            <a:solidFill>
+              <a:schemeClr val="bg1"/>
+            </a:solidFill>
+            <a:ln>
+              <a:noFill/>
+            </a:ln>
+            <a:effectLst/>
+          </p:spPr>
+          <p:style>
+            <a:lnRef idx="1">
+              <a:schemeClr val="accent1"/>
+            </a:lnRef>
+            <a:fillRef idx="3">
+              <a:schemeClr val="accent1"/>
+            </a:fillRef>
+            <a:effectRef idx="2">
+              <a:schemeClr val="accent1"/>
+            </a:effectRef>
+            <a:fontRef idx="minor">
+              <a:schemeClr val="lt1"/>
+            </a:fontRef>
+          </p:style>
+          <p:txBody>
+            <a:bodyPr rtlCol="0" anchor="ctr"/>
+            <a:lstStyle/>
+            <a:p>
+              <a:pPr algn="ctr"/>
+              <a:endParaRPr lang="en-US"/>
+            </a:p>
+          </p:txBody>
+        </p:sp>
+      </p:grpSp>
+    </p:spTree>
+    <p:extLst>
+      <p:ext uri="{BB962C8B-B14F-4D97-AF65-F5344CB8AC3E}">
+        <p14:creationId xmlns:p14="http://schemas.microsoft.com/office/powerpoint/2010/main" val="1042407515"/>
+      </p:ext>
+    </p:extLst>
+  </p:cSld>
+  <p:clrMapOvr>
+    <a:masterClrMapping/>
+  </p:clrMapOvr>
+</p:sld>
+</file>
+
+<file path=ppt/slides/slide8.xml><?xml version="1.0" encoding="utf-8"?>
+<p:sld xmlns:a="http://schemas.openxmlformats.org/drawingml/2006/main" xmlns:r="http://schemas.openxmlformats.org/officeDocument/2006/relationships" xmlns:p="http://schemas.openxmlformats.org/presentationml/2006/main">
+  <p:cSld>
+    <p:spTree>
+      <p:nvGrpSpPr>
+        <p:cNvPr id="1" name=""/>
+        <p:cNvGrpSpPr/>
+        <p:nvPr/>
+      </p:nvGrpSpPr>
+      <p:grpSpPr>
+        <a:xfrm>
+          <a:off x="0" y="0"/>
+          <a:ext cx="0" cy="0"/>
+          <a:chOff x="0" y="0"/>
+          <a:chExt cx="0" cy="0"/>
+        </a:xfrm>
+      </p:grpSpPr>
+      <p:pic>
+        <p:nvPicPr>
+          <p:cNvPr id="4" name="Picture 3"/>
+          <p:cNvPicPr>
+            <a:picLocks noChangeAspect="1"/>
+          </p:cNvPicPr>
+          <p:nvPr/>
+        </p:nvPicPr>
+        <p:blipFill>
+          <a:blip r:embed="rId2"/>
+          <a:stretch>
+            <a:fillRect/>
+          </a:stretch>
+        </p:blipFill>
         <p:spPr>
           <a:xfrm>
-            <a:off x="3356026" y="344138"/>
-            <a:ext cx="349825" cy="461665"/>
+            <a:off x="1066800" y="1866900"/>
+            <a:ext cx="2336800" cy="3111500"/>
           </a:xfrm>
           <a:prstGeom prst="rect">
             <a:avLst/>
           </a:prstGeom>
-          <a:noFill/>
         </p:spPr>
-        <p:txBody>
-          <a:bodyPr wrap="none" rtlCol="0">
-            <a:spAutoFit/>
-          </a:bodyPr>
-          <a:lstStyle/>
-          <a:p>
-            <a:r>
-              <a:rPr lang="en-US" sz="2400" b="1" dirty="0"/>
-              <a:t>b</a:t>
-            </a:r>
-            <a:endParaRPr lang="en-US" sz="2400" b="1" dirty="0"/>
-          </a:p>
-        </p:txBody>
-      </p:sp>
+      </p:pic>
     </p:spTree>
     <p:extLst>
       <p:ext uri="{BB962C8B-B14F-4D97-AF65-F5344CB8AC3E}">
-        <p14:creationId xmlns:p14="http://schemas.microsoft.com/office/powerpoint/2010/main" val="1499775613"/>
+        <p14:creationId xmlns:p14="http://schemas.microsoft.com/office/powerpoint/2010/main" val="517813264"/>
+      </p:ext>
+    </p:extLst>
+  </p:cSld>
+  <p:clrMapOvr>
+    <a:masterClrMapping/>
+  </p:clrMapOvr>
+</p:sld>
+</file>
+
+<file path=ppt/slides/slide9.xml><?xml version="1.0" encoding="utf-8"?>
+<p:sld xmlns:a="http://schemas.openxmlformats.org/drawingml/2006/main" xmlns:r="http://schemas.openxmlformats.org/officeDocument/2006/relationships" xmlns:p="http://schemas.openxmlformats.org/presentationml/2006/main">
+  <p:cSld>
+    <p:spTree>
+      <p:nvGrpSpPr>
+        <p:cNvPr id="1" name=""/>
+        <p:cNvGrpSpPr/>
+        <p:nvPr/>
+      </p:nvGrpSpPr>
+      <p:grpSpPr>
+        <a:xfrm>
+          <a:off x="0" y="0"/>
+          <a:ext cx="0" cy="0"/>
+          <a:chOff x="0" y="0"/>
+          <a:chExt cx="0" cy="0"/>
+        </a:xfrm>
+      </p:grpSpPr>
+      <p:pic>
+        <p:nvPicPr>
+          <p:cNvPr id="4" name="Picture 3"/>
+          <p:cNvPicPr>
+            <a:picLocks noChangeAspect="1"/>
+          </p:cNvPicPr>
+          <p:nvPr/>
+        </p:nvPicPr>
+        <p:blipFill>
+          <a:blip r:embed="rId2">
+            <a:extLst>
+              <a:ext uri="{BEBA8EAE-BF5A-486C-A8C5-ECC9F3942E4B}">
+                <a14:imgProps xmlns:a14="http://schemas.microsoft.com/office/drawing/2010/main">
+                  <a14:imgLayer r:embed="rId3">
+                    <a14:imgEffect>
+                      <a14:sharpenSoften amount="30000"/>
+                    </a14:imgEffect>
+                  </a14:imgLayer>
+                </a14:imgProps>
+              </a:ext>
+            </a:extLst>
+          </a:blip>
+          <a:stretch>
+            <a:fillRect/>
+          </a:stretch>
+        </p:blipFill>
+        <p:spPr>
+          <a:xfrm>
+            <a:off x="1244600" y="1066800"/>
+            <a:ext cx="6654800" cy="4724400"/>
+          </a:xfrm>
+          <a:prstGeom prst="rect">
+            <a:avLst/>
+          </a:prstGeom>
+        </p:spPr>
+      </p:pic>
+    </p:spTree>
+    <p:extLst>
+      <p:ext uri="{BB962C8B-B14F-4D97-AF65-F5344CB8AC3E}">
+        <p14:creationId xmlns:p14="http://schemas.microsoft.com/office/powerpoint/2010/main" val="1152263324"/>
       </p:ext>
     </p:extLst>
   </p:cSld>

</xml_diff>

<commit_message>
Work on report during Munich visit
</commit_message>
<xml_diff>
--- a/figures.pptx
+++ b/figures.pptx
@@ -296,7 +296,7 @@
           <a:p>
             <a:fld id="{BD36B709-E2C0-7E44-B5BA-A688CA57F161}" type="datetimeFigureOut">
               <a:rPr lang="en-US" smtClean="0"/>
-              <a:t>26/05/16</a:t>
+              <a:t>03-Jun-16</a:t>
             </a:fld>
             <a:endParaRPr lang="en-US"/>
           </a:p>
@@ -466,7 +466,7 @@
           <a:p>
             <a:fld id="{BD36B709-E2C0-7E44-B5BA-A688CA57F161}" type="datetimeFigureOut">
               <a:rPr lang="en-US" smtClean="0"/>
-              <a:t>26/05/16</a:t>
+              <a:t>03-Jun-16</a:t>
             </a:fld>
             <a:endParaRPr lang="en-US"/>
           </a:p>
@@ -646,7 +646,7 @@
           <a:p>
             <a:fld id="{BD36B709-E2C0-7E44-B5BA-A688CA57F161}" type="datetimeFigureOut">
               <a:rPr lang="en-US" smtClean="0"/>
-              <a:t>26/05/16</a:t>
+              <a:t>03-Jun-16</a:t>
             </a:fld>
             <a:endParaRPr lang="en-US"/>
           </a:p>
@@ -816,7 +816,7 @@
           <a:p>
             <a:fld id="{BD36B709-E2C0-7E44-B5BA-A688CA57F161}" type="datetimeFigureOut">
               <a:rPr lang="en-US" smtClean="0"/>
-              <a:t>26/05/16</a:t>
+              <a:t>03-Jun-16</a:t>
             </a:fld>
             <a:endParaRPr lang="en-US"/>
           </a:p>
@@ -1062,7 +1062,7 @@
           <a:p>
             <a:fld id="{BD36B709-E2C0-7E44-B5BA-A688CA57F161}" type="datetimeFigureOut">
               <a:rPr lang="en-US" smtClean="0"/>
-              <a:t>26/05/16</a:t>
+              <a:t>03-Jun-16</a:t>
             </a:fld>
             <a:endParaRPr lang="en-US"/>
           </a:p>
@@ -1350,7 +1350,7 @@
           <a:p>
             <a:fld id="{BD36B709-E2C0-7E44-B5BA-A688CA57F161}" type="datetimeFigureOut">
               <a:rPr lang="en-US" smtClean="0"/>
-              <a:t>26/05/16</a:t>
+              <a:t>03-Jun-16</a:t>
             </a:fld>
             <a:endParaRPr lang="en-US"/>
           </a:p>
@@ -1772,7 +1772,7 @@
           <a:p>
             <a:fld id="{BD36B709-E2C0-7E44-B5BA-A688CA57F161}" type="datetimeFigureOut">
               <a:rPr lang="en-US" smtClean="0"/>
-              <a:t>26/05/16</a:t>
+              <a:t>03-Jun-16</a:t>
             </a:fld>
             <a:endParaRPr lang="en-US"/>
           </a:p>
@@ -1890,7 +1890,7 @@
           <a:p>
             <a:fld id="{BD36B709-E2C0-7E44-B5BA-A688CA57F161}" type="datetimeFigureOut">
               <a:rPr lang="en-US" smtClean="0"/>
-              <a:t>26/05/16</a:t>
+              <a:t>03-Jun-16</a:t>
             </a:fld>
             <a:endParaRPr lang="en-US"/>
           </a:p>
@@ -1985,7 +1985,7 @@
           <a:p>
             <a:fld id="{BD36B709-E2C0-7E44-B5BA-A688CA57F161}" type="datetimeFigureOut">
               <a:rPr lang="en-US" smtClean="0"/>
-              <a:t>26/05/16</a:t>
+              <a:t>03-Jun-16</a:t>
             </a:fld>
             <a:endParaRPr lang="en-US"/>
           </a:p>
@@ -2262,7 +2262,7 @@
           <a:p>
             <a:fld id="{BD36B709-E2C0-7E44-B5BA-A688CA57F161}" type="datetimeFigureOut">
               <a:rPr lang="en-US" smtClean="0"/>
-              <a:t>26/05/16</a:t>
+              <a:t>03-Jun-16</a:t>
             </a:fld>
             <a:endParaRPr lang="en-US"/>
           </a:p>
@@ -2515,7 +2515,7 @@
           <a:p>
             <a:fld id="{BD36B709-E2C0-7E44-B5BA-A688CA57F161}" type="datetimeFigureOut">
               <a:rPr lang="en-US" smtClean="0"/>
-              <a:t>26/05/16</a:t>
+              <a:t>03-Jun-16</a:t>
             </a:fld>
             <a:endParaRPr lang="en-US"/>
           </a:p>
@@ -2728,7 +2728,7 @@
           <a:p>
             <a:fld id="{BD36B709-E2C0-7E44-B5BA-A688CA57F161}" type="datetimeFigureOut">
               <a:rPr lang="en-US" smtClean="0"/>
-              <a:t>26/05/16</a:t>
+              <a:t>03-Jun-16</a:t>
             </a:fld>
             <a:endParaRPr lang="en-US"/>
           </a:p>
@@ -3466,7 +3466,6 @@
                 <a:rPr lang="en-US" dirty="0"/>
                 <a:t>b</a:t>
               </a:r>
-              <a:endParaRPr lang="en-US" dirty="0"/>
             </a:p>
           </p:txBody>
         </p:sp>
@@ -3898,13 +3897,6 @@
                   </a:rPr>
                   <a:t>a</a:t>
                 </a:r>
-                <a:endParaRPr lang="en-US" sz="2400" b="1" dirty="0">
-                  <a:solidFill>
-                    <a:schemeClr val="bg1">
-                      <a:lumMod val="50000"/>
-                    </a:schemeClr>
-                  </a:solidFill>
-                </a:endParaRPr>
               </a:p>
             </p:txBody>
           </p:sp>
@@ -4040,13 +4032,6 @@
                   </a:rPr>
                   <a:t>c</a:t>
                 </a:r>
-                <a:endParaRPr lang="en-US" sz="2400" b="1" dirty="0">
-                  <a:solidFill>
-                    <a:schemeClr val="bg1">
-                      <a:lumMod val="50000"/>
-                    </a:schemeClr>
-                  </a:solidFill>
-                </a:endParaRPr>
               </a:p>
             </p:txBody>
           </p:sp>
@@ -4751,7 +4736,6 @@
                 <a:rPr lang="en-US" sz="2400" b="1" dirty="0"/>
                 <a:t>b</a:t>
               </a:r>
-              <a:endParaRPr lang="en-US" sz="2400" b="1" dirty="0"/>
             </a:p>
           </p:txBody>
         </p:sp>
@@ -4786,70 +4770,34 @@
           <a:chExt cx="0" cy="0"/>
         </a:xfrm>
       </p:grpSpPr>
-      <p:pic>
-        <p:nvPicPr>
-          <p:cNvPr id="5" name="Picture 4"/>
-          <p:cNvPicPr>
-            <a:picLocks noChangeAspect="1"/>
-          </p:cNvPicPr>
-          <p:nvPr/>
-        </p:nvPicPr>
-        <p:blipFill>
-          <a:blip r:embed="rId2">
-            <a:extLst>
-              <a:ext uri="{BEBA8EAE-BF5A-486C-A8C5-ECC9F3942E4B}">
-                <a14:imgProps xmlns:a14="http://schemas.microsoft.com/office/drawing/2010/main">
-                  <a14:imgLayer r:embed="rId3">
-                    <a14:imgEffect>
-                      <a14:sharpenSoften amount="30000"/>
-                    </a14:imgEffect>
-                  </a14:imgLayer>
-                </a14:imgProps>
-              </a:ext>
-            </a:extLst>
-          </a:blip>
-          <a:stretch>
-            <a:fillRect/>
-          </a:stretch>
-        </p:blipFill>
-        <p:spPr>
-          <a:xfrm>
-            <a:off x="855279" y="3123475"/>
-            <a:ext cx="3354421" cy="3734525"/>
-          </a:xfrm>
-          <a:prstGeom prst="rect">
-            <a:avLst/>
-          </a:prstGeom>
-        </p:spPr>
-      </p:pic>
       <p:grpSp>
         <p:nvGrpSpPr>
-          <p:cNvPr id="25" name="Group 24"/>
+          <p:cNvPr id="2" name="Group 1"/>
           <p:cNvGrpSpPr/>
           <p:nvPr/>
         </p:nvGrpSpPr>
         <p:grpSpPr>
           <a:xfrm>
             <a:off x="0" y="136665"/>
-            <a:ext cx="8773059" cy="6420062"/>
+            <a:ext cx="8773059" cy="6721335"/>
             <a:chOff x="0" y="136665"/>
-            <a:chExt cx="8773059" cy="6420062"/>
+            <a:chExt cx="8773059" cy="6721335"/>
           </a:xfrm>
         </p:grpSpPr>
         <p:pic>
           <p:nvPicPr>
-            <p:cNvPr id="4" name="Picture 3"/>
+            <p:cNvPr id="5" name="Picture 4"/>
             <p:cNvPicPr>
               <a:picLocks noChangeAspect="1"/>
             </p:cNvPicPr>
             <p:nvPr/>
           </p:nvPicPr>
           <p:blipFill>
-            <a:blip r:embed="rId4">
+            <a:blip r:embed="rId2">
               <a:extLst>
                 <a:ext uri="{BEBA8EAE-BF5A-486C-A8C5-ECC9F3942E4B}">
                   <a14:imgProps xmlns:a14="http://schemas.microsoft.com/office/drawing/2010/main">
-                    <a14:imgLayer r:embed="rId5">
+                    <a14:imgLayer r:embed="rId3">
                       <a14:imgEffect>
                         <a14:sharpenSoften amount="30000"/>
                       </a14:imgEffect>
@@ -4864,426 +4812,477 @@
           </p:blipFill>
           <p:spPr>
             <a:xfrm>
-              <a:off x="981408" y="136665"/>
-              <a:ext cx="3228292" cy="3091113"/>
+              <a:off x="855279" y="3123475"/>
+              <a:ext cx="3354421" cy="3734525"/>
             </a:xfrm>
             <a:prstGeom prst="rect">
               <a:avLst/>
             </a:prstGeom>
           </p:spPr>
         </p:pic>
-        <p:pic>
-          <p:nvPicPr>
-            <p:cNvPr id="6" name="Picture 5"/>
-            <p:cNvPicPr>
-              <a:picLocks noChangeAspect="1"/>
-            </p:cNvPicPr>
+        <p:grpSp>
+          <p:nvGrpSpPr>
+            <p:cNvPr id="25" name="Group 24"/>
+            <p:cNvGrpSpPr/>
             <p:nvPr/>
-          </p:nvPicPr>
-          <p:blipFill rotWithShape="1">
-            <a:blip r:embed="rId6">
-              <a:extLst>
-                <a:ext uri="{BEBA8EAE-BF5A-486C-A8C5-ECC9F3942E4B}">
-                  <a14:imgProps xmlns:a14="http://schemas.microsoft.com/office/drawing/2010/main">
-                    <a14:imgLayer r:embed="rId7">
-                      <a14:imgEffect>
-                        <a14:sharpenSoften amount="30000"/>
-                      </a14:imgEffect>
-                    </a14:imgLayer>
-                  </a14:imgProps>
-                </a:ext>
-              </a:extLst>
-            </a:blip>
-            <a:srcRect r="2737"/>
-            <a:stretch/>
-          </p:blipFill>
-          <p:spPr>
+          </p:nvGrpSpPr>
+          <p:grpSpPr>
             <a:xfrm>
-              <a:off x="4630768" y="3681809"/>
-              <a:ext cx="3287016" cy="2874918"/>
+              <a:off x="0" y="136665"/>
+              <a:ext cx="8773059" cy="6420062"/>
+              <a:chOff x="0" y="136665"/>
+              <a:chExt cx="8773059" cy="6420062"/>
             </a:xfrm>
-            <a:prstGeom prst="rect">
-              <a:avLst/>
-            </a:prstGeom>
-            <a:ln w="38100" cmpd="sng">
-              <a:solidFill>
-                <a:srgbClr val="0000FF"/>
-              </a:solidFill>
-            </a:ln>
-          </p:spPr>
-        </p:pic>
-        <p:pic>
-          <p:nvPicPr>
-            <p:cNvPr id="7" name="Picture 6"/>
-            <p:cNvPicPr>
-              <a:picLocks noChangeAspect="1"/>
-            </p:cNvPicPr>
-            <p:nvPr/>
-          </p:nvPicPr>
-          <p:blipFill rotWithShape="1">
-            <a:blip r:embed="rId8">
-              <a:extLst>
-                <a:ext uri="{BEBA8EAE-BF5A-486C-A8C5-ECC9F3942E4B}">
-                  <a14:imgProps xmlns:a14="http://schemas.microsoft.com/office/drawing/2010/main">
-                    <a14:imgLayer r:embed="rId9">
-                      <a14:imgEffect>
-                        <a14:sharpenSoften amount="30000"/>
-                      </a14:imgEffect>
-                    </a14:imgLayer>
-                  </a14:imgProps>
-                </a:ext>
-              </a:extLst>
-            </a:blip>
-            <a:srcRect l="3014" r="4772"/>
-            <a:stretch/>
-          </p:blipFill>
-          <p:spPr>
-            <a:xfrm>
-              <a:off x="4354134" y="266137"/>
-              <a:ext cx="4418925" cy="2857338"/>
-            </a:xfrm>
-            <a:prstGeom prst="rect">
-              <a:avLst/>
-            </a:prstGeom>
-            <a:ln w="38100" cmpd="sng">
-              <a:solidFill>
-                <a:srgbClr val="0000FF"/>
-              </a:solidFill>
-            </a:ln>
-          </p:spPr>
-        </p:pic>
-        <p:sp>
-          <p:nvSpPr>
-            <p:cNvPr id="8" name="Rectangle 7"/>
-            <p:cNvSpPr/>
-            <p:nvPr/>
-          </p:nvSpPr>
-          <p:spPr>
-            <a:xfrm rot="20348387">
-              <a:off x="1810437" y="788816"/>
-              <a:ext cx="1236311" cy="510590"/>
-            </a:xfrm>
-            <a:prstGeom prst="rect">
-              <a:avLst/>
-            </a:prstGeom>
-            <a:noFill/>
-            <a:ln w="38100" cmpd="sng">
-              <a:solidFill>
-                <a:srgbClr val="0000FF"/>
-              </a:solidFill>
-            </a:ln>
-          </p:spPr>
-          <p:style>
-            <a:lnRef idx="1">
-              <a:schemeClr val="accent1"/>
-            </a:lnRef>
-            <a:fillRef idx="3">
-              <a:schemeClr val="accent1"/>
-            </a:fillRef>
-            <a:effectRef idx="2">
-              <a:schemeClr val="accent1"/>
-            </a:effectRef>
-            <a:fontRef idx="minor">
-              <a:schemeClr val="lt1"/>
-            </a:fontRef>
-          </p:style>
-          <p:txBody>
-            <a:bodyPr rtlCol="0" anchor="ctr"/>
-            <a:lstStyle/>
-            <a:p>
-              <a:pPr algn="ctr"/>
-              <a:endParaRPr lang="en-US"/>
-            </a:p>
-          </p:txBody>
-        </p:sp>
-        <p:sp>
-          <p:nvSpPr>
-            <p:cNvPr id="9" name="Rectangle 8"/>
-            <p:cNvSpPr/>
-            <p:nvPr/>
-          </p:nvSpPr>
-          <p:spPr>
-            <a:xfrm rot="5400000">
-              <a:off x="1515344" y="3926517"/>
-              <a:ext cx="999998" cy="510590"/>
-            </a:xfrm>
-            <a:prstGeom prst="rect">
-              <a:avLst/>
-            </a:prstGeom>
-            <a:noFill/>
-            <a:ln w="38100" cmpd="sng">
-              <a:solidFill>
-                <a:srgbClr val="0000FF"/>
-              </a:solidFill>
-            </a:ln>
-          </p:spPr>
-          <p:style>
-            <a:lnRef idx="1">
-              <a:schemeClr val="accent1"/>
-            </a:lnRef>
-            <a:fillRef idx="3">
-              <a:schemeClr val="accent1"/>
-            </a:fillRef>
-            <a:effectRef idx="2">
-              <a:schemeClr val="accent1"/>
-            </a:effectRef>
-            <a:fontRef idx="minor">
-              <a:schemeClr val="lt1"/>
-            </a:fontRef>
-          </p:style>
-          <p:txBody>
-            <a:bodyPr rtlCol="0" anchor="ctr"/>
-            <a:lstStyle/>
-            <a:p>
-              <a:pPr algn="ctr"/>
-              <a:endParaRPr lang="en-US"/>
-            </a:p>
-          </p:txBody>
-        </p:sp>
-        <p:cxnSp>
-          <p:nvCxnSpPr>
-            <p:cNvPr id="15" name="Straight Arrow Connector 14"/>
-            <p:cNvCxnSpPr/>
-            <p:nvPr/>
-          </p:nvCxnSpPr>
-          <p:spPr>
-            <a:xfrm>
-              <a:off x="2786129" y="1243964"/>
-              <a:ext cx="1423571" cy="258827"/>
-            </a:xfrm>
-            <a:prstGeom prst="straightConnector1">
-              <a:avLst/>
-            </a:prstGeom>
-            <a:ln w="38100" cmpd="sng">
-              <a:solidFill>
-                <a:srgbClr val="0000FF"/>
-              </a:solidFill>
-              <a:tailEnd type="arrow"/>
-            </a:ln>
-          </p:spPr>
-          <p:style>
-            <a:lnRef idx="2">
-              <a:schemeClr val="accent1"/>
-            </a:lnRef>
-            <a:fillRef idx="0">
-              <a:schemeClr val="accent1"/>
-            </a:fillRef>
-            <a:effectRef idx="1">
-              <a:schemeClr val="accent1"/>
-            </a:effectRef>
-            <a:fontRef idx="minor">
-              <a:schemeClr val="tx1"/>
-            </a:fontRef>
-          </p:style>
-        </p:cxnSp>
-        <p:cxnSp>
-          <p:nvCxnSpPr>
-            <p:cNvPr id="17" name="Straight Arrow Connector 16"/>
-            <p:cNvCxnSpPr/>
-            <p:nvPr/>
-          </p:nvCxnSpPr>
-          <p:spPr>
-            <a:xfrm>
-              <a:off x="2385351" y="4221199"/>
-              <a:ext cx="2098370" cy="0"/>
-            </a:xfrm>
-            <a:prstGeom prst="straightConnector1">
-              <a:avLst/>
-            </a:prstGeom>
-            <a:ln w="38100" cmpd="sng">
-              <a:solidFill>
-                <a:srgbClr val="0000FF"/>
-              </a:solidFill>
-              <a:tailEnd type="arrow"/>
-            </a:ln>
-          </p:spPr>
-          <p:style>
-            <a:lnRef idx="2">
-              <a:schemeClr val="accent1"/>
-            </a:lnRef>
-            <a:fillRef idx="0">
-              <a:schemeClr val="accent1"/>
-            </a:fillRef>
-            <a:effectRef idx="1">
-              <a:schemeClr val="accent1"/>
-            </a:effectRef>
-            <a:fontRef idx="minor">
-              <a:schemeClr val="tx1"/>
-            </a:fontRef>
-          </p:style>
-        </p:cxnSp>
-        <p:sp>
-          <p:nvSpPr>
-            <p:cNvPr id="19" name="TextBox 18"/>
-            <p:cNvSpPr txBox="1"/>
-            <p:nvPr/>
-          </p:nvSpPr>
-          <p:spPr>
-            <a:xfrm>
-              <a:off x="283115" y="585431"/>
-              <a:ext cx="442574" cy="523220"/>
-            </a:xfrm>
-            <a:prstGeom prst="rect">
-              <a:avLst/>
-            </a:prstGeom>
-            <a:noFill/>
-            <a:ln>
+          </p:grpSpPr>
+          <p:pic>
+            <p:nvPicPr>
+              <p:cNvPr id="4" name="Picture 3"/>
+              <p:cNvPicPr>
+                <a:picLocks noChangeAspect="1"/>
+              </p:cNvPicPr>
+              <p:nvPr/>
+            </p:nvPicPr>
+            <p:blipFill>
+              <a:blip r:embed="rId4">
+                <a:extLst>
+                  <a:ext uri="{BEBA8EAE-BF5A-486C-A8C5-ECC9F3942E4B}">
+                    <a14:imgProps xmlns:a14="http://schemas.microsoft.com/office/drawing/2010/main">
+                      <a14:imgLayer r:embed="rId5">
+                        <a14:imgEffect>
+                          <a14:sharpenSoften amount="30000"/>
+                        </a14:imgEffect>
+                      </a14:imgLayer>
+                    </a14:imgProps>
+                  </a:ext>
+                </a:extLst>
+              </a:blip>
+              <a:stretch>
+                <a:fillRect/>
+              </a:stretch>
+            </p:blipFill>
+            <p:spPr>
+              <a:xfrm>
+                <a:off x="981408" y="136665"/>
+                <a:ext cx="3228292" cy="3091113"/>
+              </a:xfrm>
+              <a:prstGeom prst="rect">
+                <a:avLst/>
+              </a:prstGeom>
+            </p:spPr>
+          </p:pic>
+          <p:pic>
+            <p:nvPicPr>
+              <p:cNvPr id="6" name="Picture 5"/>
+              <p:cNvPicPr>
+                <a:picLocks noChangeAspect="1"/>
+              </p:cNvPicPr>
+              <p:nvPr/>
+            </p:nvPicPr>
+            <p:blipFill rotWithShape="1">
+              <a:blip r:embed="rId6">
+                <a:extLst>
+                  <a:ext uri="{BEBA8EAE-BF5A-486C-A8C5-ECC9F3942E4B}">
+                    <a14:imgProps xmlns:a14="http://schemas.microsoft.com/office/drawing/2010/main">
+                      <a14:imgLayer r:embed="rId7">
+                        <a14:imgEffect>
+                          <a14:sharpenSoften amount="30000"/>
+                        </a14:imgEffect>
+                      </a14:imgLayer>
+                    </a14:imgProps>
+                  </a:ext>
+                </a:extLst>
+              </a:blip>
+              <a:srcRect r="2737"/>
+              <a:stretch/>
+            </p:blipFill>
+            <p:spPr>
+              <a:xfrm>
+                <a:off x="4630768" y="3681809"/>
+                <a:ext cx="3287016" cy="2874918"/>
+              </a:xfrm>
+              <a:prstGeom prst="rect">
+                <a:avLst/>
+              </a:prstGeom>
+              <a:ln w="38100" cmpd="sng">
+                <a:solidFill>
+                  <a:srgbClr val="0000FF"/>
+                </a:solidFill>
+              </a:ln>
+            </p:spPr>
+          </p:pic>
+          <p:pic>
+            <p:nvPicPr>
+              <p:cNvPr id="7" name="Picture 6"/>
+              <p:cNvPicPr>
+                <a:picLocks noChangeAspect="1"/>
+              </p:cNvPicPr>
+              <p:nvPr/>
+            </p:nvPicPr>
+            <p:blipFill rotWithShape="1">
+              <a:blip r:embed="rId8">
+                <a:extLst>
+                  <a:ext uri="{BEBA8EAE-BF5A-486C-A8C5-ECC9F3942E4B}">
+                    <a14:imgProps xmlns:a14="http://schemas.microsoft.com/office/drawing/2010/main">
+                      <a14:imgLayer r:embed="rId9">
+                        <a14:imgEffect>
+                          <a14:sharpenSoften amount="30000"/>
+                        </a14:imgEffect>
+                      </a14:imgLayer>
+                    </a14:imgProps>
+                  </a:ext>
+                </a:extLst>
+              </a:blip>
+              <a:srcRect l="3014" r="4772"/>
+              <a:stretch/>
+            </p:blipFill>
+            <p:spPr>
+              <a:xfrm>
+                <a:off x="4354134" y="266137"/>
+                <a:ext cx="4418925" cy="2857338"/>
+              </a:xfrm>
+              <a:prstGeom prst="rect">
+                <a:avLst/>
+              </a:prstGeom>
+              <a:ln w="38100" cmpd="sng">
+                <a:solidFill>
+                  <a:srgbClr val="0000FF"/>
+                </a:solidFill>
+              </a:ln>
+            </p:spPr>
+          </p:pic>
+          <p:sp>
+            <p:nvSpPr>
+              <p:cNvPr id="8" name="Rectangle 7"/>
+              <p:cNvSpPr/>
+              <p:nvPr/>
+            </p:nvSpPr>
+            <p:spPr>
+              <a:xfrm rot="20348387">
+                <a:off x="1810437" y="788816"/>
+                <a:ext cx="1236311" cy="510590"/>
+              </a:xfrm>
+              <a:prstGeom prst="rect">
+                <a:avLst/>
+              </a:prstGeom>
               <a:noFill/>
-            </a:ln>
-          </p:spPr>
-          <p:txBody>
-            <a:bodyPr wrap="none" rtlCol="0">
-              <a:spAutoFit/>
-            </a:bodyPr>
-            <a:lstStyle/>
-            <a:p>
-              <a:r>
-                <a:rPr lang="en-US" sz="2800" b="1" dirty="0" smtClean="0">
+              <a:ln w="38100" cmpd="sng">
+                <a:solidFill>
+                  <a:srgbClr val="0000FF"/>
+                </a:solidFill>
+              </a:ln>
+            </p:spPr>
+            <p:style>
+              <a:lnRef idx="1">
+                <a:schemeClr val="accent1"/>
+              </a:lnRef>
+              <a:fillRef idx="3">
+                <a:schemeClr val="accent1"/>
+              </a:fillRef>
+              <a:effectRef idx="2">
+                <a:schemeClr val="accent1"/>
+              </a:effectRef>
+              <a:fontRef idx="minor">
+                <a:schemeClr val="lt1"/>
+              </a:fontRef>
+            </p:style>
+            <p:txBody>
+              <a:bodyPr rtlCol="0" anchor="ctr"/>
+              <a:lstStyle/>
+              <a:p>
+                <a:pPr algn="ctr"/>
+                <a:endParaRPr lang="en-US"/>
+              </a:p>
+            </p:txBody>
+          </p:sp>
+          <p:sp>
+            <p:nvSpPr>
+              <p:cNvPr id="9" name="Rectangle 8"/>
+              <p:cNvSpPr/>
+              <p:nvPr/>
+            </p:nvSpPr>
+            <p:spPr>
+              <a:xfrm rot="5400000">
+                <a:off x="1515344" y="3926517"/>
+                <a:ext cx="999998" cy="510590"/>
+              </a:xfrm>
+              <a:prstGeom prst="rect">
+                <a:avLst/>
+              </a:prstGeom>
+              <a:noFill/>
+              <a:ln w="38100" cmpd="sng">
+                <a:solidFill>
+                  <a:srgbClr val="0000FF"/>
+                </a:solidFill>
+              </a:ln>
+            </p:spPr>
+            <p:style>
+              <a:lnRef idx="1">
+                <a:schemeClr val="accent1"/>
+              </a:lnRef>
+              <a:fillRef idx="3">
+                <a:schemeClr val="accent1"/>
+              </a:fillRef>
+              <a:effectRef idx="2">
+                <a:schemeClr val="accent1"/>
+              </a:effectRef>
+              <a:fontRef idx="minor">
+                <a:schemeClr val="lt1"/>
+              </a:fontRef>
+            </p:style>
+            <p:txBody>
+              <a:bodyPr rtlCol="0" anchor="ctr"/>
+              <a:lstStyle/>
+              <a:p>
+                <a:pPr algn="ctr"/>
+                <a:endParaRPr lang="en-US"/>
+              </a:p>
+            </p:txBody>
+          </p:sp>
+          <p:cxnSp>
+            <p:nvCxnSpPr>
+              <p:cNvPr id="15" name="Straight Arrow Connector 14"/>
+              <p:cNvCxnSpPr/>
+              <p:nvPr/>
+            </p:nvCxnSpPr>
+            <p:spPr>
+              <a:xfrm>
+                <a:off x="2786129" y="1243964"/>
+                <a:ext cx="1423571" cy="258827"/>
+              </a:xfrm>
+              <a:prstGeom prst="straightConnector1">
+                <a:avLst/>
+              </a:prstGeom>
+              <a:ln w="38100" cmpd="sng">
+                <a:solidFill>
+                  <a:srgbClr val="0000FF"/>
+                </a:solidFill>
+                <a:tailEnd type="arrow"/>
+              </a:ln>
+            </p:spPr>
+            <p:style>
+              <a:lnRef idx="2">
+                <a:schemeClr val="accent1"/>
+              </a:lnRef>
+              <a:fillRef idx="0">
+                <a:schemeClr val="accent1"/>
+              </a:fillRef>
+              <a:effectRef idx="1">
+                <a:schemeClr val="accent1"/>
+              </a:effectRef>
+              <a:fontRef idx="minor">
+                <a:schemeClr val="tx1"/>
+              </a:fontRef>
+            </p:style>
+          </p:cxnSp>
+          <p:cxnSp>
+            <p:nvCxnSpPr>
+              <p:cNvPr id="17" name="Straight Arrow Connector 16"/>
+              <p:cNvCxnSpPr/>
+              <p:nvPr/>
+            </p:nvCxnSpPr>
+            <p:spPr>
+              <a:xfrm>
+                <a:off x="2385351" y="4221199"/>
+                <a:ext cx="2098370" cy="0"/>
+              </a:xfrm>
+              <a:prstGeom prst="straightConnector1">
+                <a:avLst/>
+              </a:prstGeom>
+              <a:ln w="38100" cmpd="sng">
+                <a:solidFill>
+                  <a:srgbClr val="0000FF"/>
+                </a:solidFill>
+                <a:tailEnd type="arrow"/>
+              </a:ln>
+            </p:spPr>
+            <p:style>
+              <a:lnRef idx="2">
+                <a:schemeClr val="accent1"/>
+              </a:lnRef>
+              <a:fillRef idx="0">
+                <a:schemeClr val="accent1"/>
+              </a:fillRef>
+              <a:effectRef idx="1">
+                <a:schemeClr val="accent1"/>
+              </a:effectRef>
+              <a:fontRef idx="minor">
+                <a:schemeClr val="tx1"/>
+              </a:fontRef>
+            </p:style>
+          </p:cxnSp>
+          <p:sp>
+            <p:nvSpPr>
+              <p:cNvPr id="19" name="TextBox 18"/>
+              <p:cNvSpPr txBox="1"/>
+              <p:nvPr/>
+            </p:nvSpPr>
+            <p:spPr>
+              <a:xfrm>
+                <a:off x="283115" y="585431"/>
+                <a:ext cx="442574" cy="523220"/>
+              </a:xfrm>
+              <a:prstGeom prst="rect">
+                <a:avLst/>
+              </a:prstGeom>
+              <a:noFill/>
+              <a:ln>
+                <a:noFill/>
+              </a:ln>
+            </p:spPr>
+            <p:txBody>
+              <a:bodyPr wrap="none" rtlCol="0">
+                <a:spAutoFit/>
+              </a:bodyPr>
+              <a:lstStyle/>
+              <a:p>
+                <a:r>
+                  <a:rPr lang="en-US" sz="2800" b="1" dirty="0" smtClean="0">
+                    <a:solidFill>
+                      <a:srgbClr val="0000FF"/>
+                    </a:solidFill>
+                  </a:rPr>
+                  <a:t>Si</a:t>
+                </a:r>
+                <a:endParaRPr lang="en-US" sz="2800" b="1" dirty="0">
                   <a:solidFill>
                     <a:srgbClr val="0000FF"/>
                   </a:solidFill>
-                </a:rPr>
-                <a:t>Si</a:t>
-              </a:r>
-              <a:endParaRPr lang="en-US" sz="2800" b="1" dirty="0">
-                <a:solidFill>
-                  <a:srgbClr val="0000FF"/>
-                </a:solidFill>
-              </a:endParaRPr>
-            </a:p>
-          </p:txBody>
-        </p:sp>
-        <p:sp>
-          <p:nvSpPr>
-            <p:cNvPr id="20" name="TextBox 19"/>
-            <p:cNvSpPr txBox="1"/>
-            <p:nvPr/>
-          </p:nvSpPr>
-          <p:spPr>
-            <a:xfrm>
-              <a:off x="0" y="3385085"/>
-              <a:ext cx="951553" cy="523220"/>
-            </a:xfrm>
-            <a:prstGeom prst="rect">
-              <a:avLst/>
-            </a:prstGeom>
-            <a:noFill/>
-            <a:ln>
+                </a:endParaRPr>
+              </a:p>
+            </p:txBody>
+          </p:sp>
+          <p:sp>
+            <p:nvSpPr>
+              <p:cNvPr id="20" name="TextBox 19"/>
+              <p:cNvSpPr txBox="1"/>
+              <p:nvPr/>
+            </p:nvSpPr>
+            <p:spPr>
+              <a:xfrm>
+                <a:off x="0" y="3385085"/>
+                <a:ext cx="951553" cy="523220"/>
+              </a:xfrm>
+              <a:prstGeom prst="rect">
+                <a:avLst/>
+              </a:prstGeom>
               <a:noFill/>
-            </a:ln>
-          </p:spPr>
-          <p:txBody>
-            <a:bodyPr wrap="none" rtlCol="0">
-              <a:spAutoFit/>
-            </a:bodyPr>
-            <a:lstStyle/>
-            <a:p>
-              <a:r>
-                <a:rPr lang="en-US" sz="2800" b="1" dirty="0" err="1" smtClean="0">
+              <a:ln>
+                <a:noFill/>
+              </a:ln>
+            </p:spPr>
+            <p:txBody>
+              <a:bodyPr wrap="none" rtlCol="0">
+                <a:spAutoFit/>
+              </a:bodyPr>
+              <a:lstStyle/>
+              <a:p>
+                <a:r>
+                  <a:rPr lang="en-US" sz="2800" b="1" dirty="0" err="1" smtClean="0">
+                    <a:solidFill>
+                      <a:srgbClr val="0000FF"/>
+                    </a:solidFill>
+                  </a:rPr>
+                  <a:t>GaAs</a:t>
+                </a:r>
+                <a:endParaRPr lang="en-US" sz="2800" b="1" dirty="0">
                   <a:solidFill>
                     <a:srgbClr val="0000FF"/>
                   </a:solidFill>
-                </a:rPr>
-                <a:t>GaAs</a:t>
-              </a:r>
-              <a:endParaRPr lang="en-US" sz="2800" b="1" dirty="0">
-                <a:solidFill>
-                  <a:srgbClr val="0000FF"/>
-                </a:solidFill>
-              </a:endParaRPr>
-            </a:p>
-          </p:txBody>
-        </p:sp>
-        <p:sp>
-          <p:nvSpPr>
-            <p:cNvPr id="23" name="Rectangle 22"/>
-            <p:cNvSpPr/>
-            <p:nvPr/>
-          </p:nvSpPr>
-          <p:spPr>
-            <a:xfrm>
-              <a:off x="7723403" y="1878904"/>
-              <a:ext cx="907110" cy="1049595"/>
-            </a:xfrm>
-            <a:prstGeom prst="rect">
-              <a:avLst/>
-            </a:prstGeom>
-            <a:solidFill>
-              <a:schemeClr val="bg1"/>
-            </a:solidFill>
-            <a:ln>
-              <a:noFill/>
-            </a:ln>
-            <a:effectLst/>
-          </p:spPr>
-          <p:style>
-            <a:lnRef idx="1">
-              <a:schemeClr val="accent1"/>
-            </a:lnRef>
-            <a:fillRef idx="3">
-              <a:schemeClr val="accent1"/>
-            </a:fillRef>
-            <a:effectRef idx="2">
-              <a:schemeClr val="accent1"/>
-            </a:effectRef>
-            <a:fontRef idx="minor">
-              <a:schemeClr val="lt1"/>
-            </a:fontRef>
-          </p:style>
-          <p:txBody>
-            <a:bodyPr rtlCol="0" anchor="ctr"/>
-            <a:lstStyle/>
-            <a:p>
-              <a:pPr algn="ctr"/>
-              <a:endParaRPr lang="en-US"/>
-            </a:p>
-          </p:txBody>
-        </p:sp>
-        <p:sp>
-          <p:nvSpPr>
-            <p:cNvPr id="24" name="Rectangle 23"/>
-            <p:cNvSpPr/>
-            <p:nvPr/>
-          </p:nvSpPr>
-          <p:spPr>
-            <a:xfrm>
-              <a:off x="4742895" y="4807403"/>
-              <a:ext cx="730188" cy="971847"/>
-            </a:xfrm>
-            <a:prstGeom prst="rect">
-              <a:avLst/>
-            </a:prstGeom>
-            <a:solidFill>
-              <a:schemeClr val="bg1"/>
-            </a:solidFill>
-            <a:ln>
-              <a:noFill/>
-            </a:ln>
-            <a:effectLst/>
-          </p:spPr>
-          <p:style>
-            <a:lnRef idx="1">
-              <a:schemeClr val="accent1"/>
-            </a:lnRef>
-            <a:fillRef idx="3">
-              <a:schemeClr val="accent1"/>
-            </a:fillRef>
-            <a:effectRef idx="2">
-              <a:schemeClr val="accent1"/>
-            </a:effectRef>
-            <a:fontRef idx="minor">
-              <a:schemeClr val="lt1"/>
-            </a:fontRef>
-          </p:style>
-          <p:txBody>
-            <a:bodyPr rtlCol="0" anchor="ctr"/>
-            <a:lstStyle/>
-            <a:p>
-              <a:pPr algn="ctr"/>
-              <a:endParaRPr lang="en-US"/>
-            </a:p>
-          </p:txBody>
-        </p:sp>
+                </a:endParaRPr>
+              </a:p>
+            </p:txBody>
+          </p:sp>
+          <p:sp>
+            <p:nvSpPr>
+              <p:cNvPr id="23" name="Rectangle 22"/>
+              <p:cNvSpPr/>
+              <p:nvPr/>
+            </p:nvSpPr>
+            <p:spPr>
+              <a:xfrm>
+                <a:off x="7723403" y="1878904"/>
+                <a:ext cx="907110" cy="1049595"/>
+              </a:xfrm>
+              <a:prstGeom prst="rect">
+                <a:avLst/>
+              </a:prstGeom>
+              <a:solidFill>
+                <a:schemeClr val="bg1"/>
+              </a:solidFill>
+              <a:ln>
+                <a:noFill/>
+              </a:ln>
+              <a:effectLst/>
+            </p:spPr>
+            <p:style>
+              <a:lnRef idx="1">
+                <a:schemeClr val="accent1"/>
+              </a:lnRef>
+              <a:fillRef idx="3">
+                <a:schemeClr val="accent1"/>
+              </a:fillRef>
+              <a:effectRef idx="2">
+                <a:schemeClr val="accent1"/>
+              </a:effectRef>
+              <a:fontRef idx="minor">
+                <a:schemeClr val="lt1"/>
+              </a:fontRef>
+            </p:style>
+            <p:txBody>
+              <a:bodyPr rtlCol="0" anchor="ctr"/>
+              <a:lstStyle/>
+              <a:p>
+                <a:pPr algn="ctr"/>
+                <a:endParaRPr lang="en-US"/>
+              </a:p>
+            </p:txBody>
+          </p:sp>
+          <p:sp>
+            <p:nvSpPr>
+              <p:cNvPr id="24" name="Rectangle 23"/>
+              <p:cNvSpPr/>
+              <p:nvPr/>
+            </p:nvSpPr>
+            <p:spPr>
+              <a:xfrm>
+                <a:off x="4742895" y="4807403"/>
+                <a:ext cx="730188" cy="971847"/>
+              </a:xfrm>
+              <a:prstGeom prst="rect">
+                <a:avLst/>
+              </a:prstGeom>
+              <a:solidFill>
+                <a:schemeClr val="bg1"/>
+              </a:solidFill>
+              <a:ln>
+                <a:noFill/>
+              </a:ln>
+              <a:effectLst/>
+            </p:spPr>
+            <p:style>
+              <a:lnRef idx="1">
+                <a:schemeClr val="accent1"/>
+              </a:lnRef>
+              <a:fillRef idx="3">
+                <a:schemeClr val="accent1"/>
+              </a:fillRef>
+              <a:effectRef idx="2">
+                <a:schemeClr val="accent1"/>
+              </a:effectRef>
+              <a:fontRef idx="minor">
+                <a:schemeClr val="lt1"/>
+              </a:fontRef>
+            </p:style>
+            <p:txBody>
+              <a:bodyPr rtlCol="0" anchor="ctr"/>
+              <a:lstStyle/>
+              <a:p>
+                <a:pPr algn="ctr"/>
+                <a:endParaRPr lang="en-US"/>
+              </a:p>
+            </p:txBody>
+          </p:sp>
+        </p:grpSp>
       </p:grpSp>
     </p:spTree>
     <p:extLst>

</xml_diff>

<commit_message>
Updated eris methodology section to include new method of generating initial ordered CZTS lattice as a supercell of unit cell determined from POSCAR visuals
</commit_message>
<xml_diff>
--- a/figures.pptx
+++ b/figures.pptx
@@ -14,6 +14,7 @@
     <p:sldId id="262" r:id="rId8"/>
     <p:sldId id="263" r:id="rId9"/>
     <p:sldId id="264" r:id="rId10"/>
+    <p:sldId id="265" r:id="rId11"/>
   </p:sldIdLst>
   <p:sldSz cx="9144000" cy="6858000" type="screen4x3"/>
   <p:notesSz cx="6858000" cy="9144000"/>
@@ -296,7 +297,7 @@
           <a:p>
             <a:fld id="{BD36B709-E2C0-7E44-B5BA-A688CA57F161}" type="datetimeFigureOut">
               <a:rPr lang="en-US" smtClean="0"/>
-              <a:t>03-Jun-16</a:t>
+              <a:t>26/05/16</a:t>
             </a:fld>
             <a:endParaRPr lang="en-US"/>
           </a:p>
@@ -466,7 +467,7 @@
           <a:p>
             <a:fld id="{BD36B709-E2C0-7E44-B5BA-A688CA57F161}" type="datetimeFigureOut">
               <a:rPr lang="en-US" smtClean="0"/>
-              <a:t>03-Jun-16</a:t>
+              <a:t>26/05/16</a:t>
             </a:fld>
             <a:endParaRPr lang="en-US"/>
           </a:p>
@@ -646,7 +647,7 @@
           <a:p>
             <a:fld id="{BD36B709-E2C0-7E44-B5BA-A688CA57F161}" type="datetimeFigureOut">
               <a:rPr lang="en-US" smtClean="0"/>
-              <a:t>03-Jun-16</a:t>
+              <a:t>26/05/16</a:t>
             </a:fld>
             <a:endParaRPr lang="en-US"/>
           </a:p>
@@ -816,7 +817,7 @@
           <a:p>
             <a:fld id="{BD36B709-E2C0-7E44-B5BA-A688CA57F161}" type="datetimeFigureOut">
               <a:rPr lang="en-US" smtClean="0"/>
-              <a:t>03-Jun-16</a:t>
+              <a:t>26/05/16</a:t>
             </a:fld>
             <a:endParaRPr lang="en-US"/>
           </a:p>
@@ -1062,7 +1063,7 @@
           <a:p>
             <a:fld id="{BD36B709-E2C0-7E44-B5BA-A688CA57F161}" type="datetimeFigureOut">
               <a:rPr lang="en-US" smtClean="0"/>
-              <a:t>03-Jun-16</a:t>
+              <a:t>26/05/16</a:t>
             </a:fld>
             <a:endParaRPr lang="en-US"/>
           </a:p>
@@ -1350,7 +1351,7 @@
           <a:p>
             <a:fld id="{BD36B709-E2C0-7E44-B5BA-A688CA57F161}" type="datetimeFigureOut">
               <a:rPr lang="en-US" smtClean="0"/>
-              <a:t>03-Jun-16</a:t>
+              <a:t>26/05/16</a:t>
             </a:fld>
             <a:endParaRPr lang="en-US"/>
           </a:p>
@@ -1772,7 +1773,7 @@
           <a:p>
             <a:fld id="{BD36B709-E2C0-7E44-B5BA-A688CA57F161}" type="datetimeFigureOut">
               <a:rPr lang="en-US" smtClean="0"/>
-              <a:t>03-Jun-16</a:t>
+              <a:t>26/05/16</a:t>
             </a:fld>
             <a:endParaRPr lang="en-US"/>
           </a:p>
@@ -1890,7 +1891,7 @@
           <a:p>
             <a:fld id="{BD36B709-E2C0-7E44-B5BA-A688CA57F161}" type="datetimeFigureOut">
               <a:rPr lang="en-US" smtClean="0"/>
-              <a:t>03-Jun-16</a:t>
+              <a:t>26/05/16</a:t>
             </a:fld>
             <a:endParaRPr lang="en-US"/>
           </a:p>
@@ -1985,7 +1986,7 @@
           <a:p>
             <a:fld id="{BD36B709-E2C0-7E44-B5BA-A688CA57F161}" type="datetimeFigureOut">
               <a:rPr lang="en-US" smtClean="0"/>
-              <a:t>03-Jun-16</a:t>
+              <a:t>26/05/16</a:t>
             </a:fld>
             <a:endParaRPr lang="en-US"/>
           </a:p>
@@ -2262,7 +2263,7 @@
           <a:p>
             <a:fld id="{BD36B709-E2C0-7E44-B5BA-A688CA57F161}" type="datetimeFigureOut">
               <a:rPr lang="en-US" smtClean="0"/>
-              <a:t>03-Jun-16</a:t>
+              <a:t>26/05/16</a:t>
             </a:fld>
             <a:endParaRPr lang="en-US"/>
           </a:p>
@@ -2515,7 +2516,7 @@
           <a:p>
             <a:fld id="{BD36B709-E2C0-7E44-B5BA-A688CA57F161}" type="datetimeFigureOut">
               <a:rPr lang="en-US" smtClean="0"/>
-              <a:t>03-Jun-16</a:t>
+              <a:t>26/05/16</a:t>
             </a:fld>
             <a:endParaRPr lang="en-US"/>
           </a:p>
@@ -2728,7 +2729,7 @@
           <a:p>
             <a:fld id="{BD36B709-E2C0-7E44-B5BA-A688CA57F161}" type="datetimeFigureOut">
               <a:rPr lang="en-US" smtClean="0"/>
-              <a:t>03-Jun-16</a:t>
+              <a:t>26/05/16</a:t>
             </a:fld>
             <a:endParaRPr lang="en-US"/>
           </a:p>
@@ -3149,6 +3150,1224 @@
     <p:extLst>
       <p:ext uri="{BB962C8B-B14F-4D97-AF65-F5344CB8AC3E}">
         <p14:creationId xmlns:p14="http://schemas.microsoft.com/office/powerpoint/2010/main" val="3434259407"/>
+      </p:ext>
+    </p:extLst>
+  </p:cSld>
+  <p:clrMapOvr>
+    <a:masterClrMapping/>
+  </p:clrMapOvr>
+</p:sld>
+</file>
+
+<file path=ppt/slides/slide10.xml><?xml version="1.0" encoding="utf-8"?>
+<p:sld xmlns:a="http://schemas.openxmlformats.org/drawingml/2006/main" xmlns:r="http://schemas.openxmlformats.org/officeDocument/2006/relationships" xmlns:p="http://schemas.openxmlformats.org/presentationml/2006/main">
+  <p:cSld>
+    <p:spTree>
+      <p:nvGrpSpPr>
+        <p:cNvPr id="1" name=""/>
+        <p:cNvGrpSpPr/>
+        <p:nvPr/>
+      </p:nvGrpSpPr>
+      <p:grpSpPr>
+        <a:xfrm>
+          <a:off x="0" y="0"/>
+          <a:ext cx="0" cy="0"/>
+          <a:chOff x="0" y="0"/>
+          <a:chExt cx="0" cy="0"/>
+        </a:xfrm>
+      </p:grpSpPr>
+      <p:pic>
+        <p:nvPicPr>
+          <p:cNvPr id="4" name="Picture 3"/>
+          <p:cNvPicPr>
+            <a:picLocks noChangeAspect="1"/>
+          </p:cNvPicPr>
+          <p:nvPr/>
+        </p:nvPicPr>
+        <p:blipFill>
+          <a:blip r:embed="rId2"/>
+          <a:stretch>
+            <a:fillRect/>
+          </a:stretch>
+        </p:blipFill>
+        <p:spPr>
+          <a:xfrm>
+            <a:off x="197531" y="1741427"/>
+            <a:ext cx="3358061" cy="3203454"/>
+          </a:xfrm>
+          <a:prstGeom prst="rect">
+            <a:avLst/>
+          </a:prstGeom>
+        </p:spPr>
+      </p:pic>
+      <p:pic>
+        <p:nvPicPr>
+          <p:cNvPr id="5" name="Picture 4"/>
+          <p:cNvPicPr>
+            <a:picLocks noChangeAspect="1"/>
+          </p:cNvPicPr>
+          <p:nvPr/>
+        </p:nvPicPr>
+        <p:blipFill>
+          <a:blip r:embed="rId3"/>
+          <a:stretch>
+            <a:fillRect/>
+          </a:stretch>
+        </p:blipFill>
+        <p:spPr>
+          <a:xfrm>
+            <a:off x="3491895" y="1650721"/>
+            <a:ext cx="3609489" cy="3233235"/>
+          </a:xfrm>
+          <a:prstGeom prst="rect">
+            <a:avLst/>
+          </a:prstGeom>
+        </p:spPr>
+      </p:pic>
+      <p:sp>
+        <p:nvSpPr>
+          <p:cNvPr id="8" name="TextBox 7"/>
+          <p:cNvSpPr txBox="1"/>
+          <p:nvPr/>
+        </p:nvSpPr>
+        <p:spPr>
+          <a:xfrm>
+            <a:off x="1259074" y="1640780"/>
+            <a:ext cx="377026" cy="584776"/>
+          </a:xfrm>
+          <a:prstGeom prst="rect">
+            <a:avLst/>
+          </a:prstGeom>
+          <a:noFill/>
+        </p:spPr>
+        <p:txBody>
+          <a:bodyPr wrap="none" rtlCol="0">
+            <a:spAutoFit/>
+          </a:bodyPr>
+          <a:lstStyle/>
+          <a:p>
+            <a:r>
+              <a:rPr lang="en-US" sz="3200" b="1" dirty="0" smtClean="0">
+                <a:solidFill>
+                  <a:schemeClr val="bg1">
+                    <a:lumMod val="50000"/>
+                  </a:schemeClr>
+                </a:solidFill>
+              </a:rPr>
+              <a:t>x</a:t>
+            </a:r>
+            <a:endParaRPr lang="en-US" sz="3200" b="1" dirty="0">
+              <a:solidFill>
+                <a:schemeClr val="bg1">
+                  <a:lumMod val="50000"/>
+                </a:schemeClr>
+              </a:solidFill>
+            </a:endParaRPr>
+          </a:p>
+        </p:txBody>
+      </p:sp>
+      <p:sp>
+        <p:nvSpPr>
+          <p:cNvPr id="9" name="TextBox 8"/>
+          <p:cNvSpPr txBox="1"/>
+          <p:nvPr/>
+        </p:nvSpPr>
+        <p:spPr>
+          <a:xfrm>
+            <a:off x="681816" y="2185284"/>
+            <a:ext cx="377026" cy="584776"/>
+          </a:xfrm>
+          <a:prstGeom prst="rect">
+            <a:avLst/>
+          </a:prstGeom>
+          <a:noFill/>
+        </p:spPr>
+        <p:txBody>
+          <a:bodyPr wrap="none" rtlCol="0">
+            <a:spAutoFit/>
+          </a:bodyPr>
+          <a:lstStyle/>
+          <a:p>
+            <a:r>
+              <a:rPr lang="en-US" sz="3200" b="1" dirty="0" smtClean="0">
+                <a:solidFill>
+                  <a:schemeClr val="bg1">
+                    <a:lumMod val="50000"/>
+                  </a:schemeClr>
+                </a:solidFill>
+              </a:rPr>
+              <a:t>x</a:t>
+            </a:r>
+            <a:endParaRPr lang="en-US" sz="3200" b="1" dirty="0">
+              <a:solidFill>
+                <a:schemeClr val="bg1">
+                  <a:lumMod val="50000"/>
+                </a:schemeClr>
+              </a:solidFill>
+            </a:endParaRPr>
+          </a:p>
+        </p:txBody>
+      </p:sp>
+      <p:sp>
+        <p:nvSpPr>
+          <p:cNvPr id="6" name="Rectangle 5"/>
+          <p:cNvSpPr/>
+          <p:nvPr/>
+        </p:nvSpPr>
+        <p:spPr>
+          <a:xfrm>
+            <a:off x="852567" y="1971482"/>
+            <a:ext cx="595020" cy="586116"/>
+          </a:xfrm>
+          <a:prstGeom prst="rect">
+            <a:avLst/>
+          </a:prstGeom>
+          <a:noFill/>
+          <a:ln w="50800">
+            <a:solidFill>
+              <a:schemeClr val="tx1"/>
+            </a:solidFill>
+            <a:prstDash val="sysDash"/>
+          </a:ln>
+        </p:spPr>
+        <p:style>
+          <a:lnRef idx="1">
+            <a:schemeClr val="accent1"/>
+          </a:lnRef>
+          <a:fillRef idx="3">
+            <a:schemeClr val="accent1"/>
+          </a:fillRef>
+          <a:effectRef idx="2">
+            <a:schemeClr val="accent1"/>
+          </a:effectRef>
+          <a:fontRef idx="minor">
+            <a:schemeClr val="lt1"/>
+          </a:fontRef>
+        </p:style>
+        <p:txBody>
+          <a:bodyPr rtlCol="0" anchor="ctr"/>
+          <a:lstStyle/>
+          <a:p>
+            <a:pPr algn="ctr"/>
+            <a:endParaRPr lang="en-US"/>
+          </a:p>
+        </p:txBody>
+      </p:sp>
+      <p:sp>
+        <p:nvSpPr>
+          <p:cNvPr id="10" name="TextBox 9"/>
+          <p:cNvSpPr txBox="1"/>
+          <p:nvPr/>
+        </p:nvSpPr>
+        <p:spPr>
+          <a:xfrm>
+            <a:off x="2415015" y="1608049"/>
+            <a:ext cx="377026" cy="584776"/>
+          </a:xfrm>
+          <a:prstGeom prst="rect">
+            <a:avLst/>
+          </a:prstGeom>
+          <a:noFill/>
+        </p:spPr>
+        <p:txBody>
+          <a:bodyPr wrap="none" rtlCol="0">
+            <a:spAutoFit/>
+          </a:bodyPr>
+          <a:lstStyle/>
+          <a:p>
+            <a:r>
+              <a:rPr lang="en-US" sz="3200" b="1" dirty="0" smtClean="0">
+                <a:solidFill>
+                  <a:schemeClr val="bg1">
+                    <a:lumMod val="50000"/>
+                  </a:schemeClr>
+                </a:solidFill>
+              </a:rPr>
+              <a:t>x</a:t>
+            </a:r>
+            <a:endParaRPr lang="en-US" sz="3200" b="1" dirty="0">
+              <a:solidFill>
+                <a:schemeClr val="bg1">
+                  <a:lumMod val="50000"/>
+                </a:schemeClr>
+              </a:solidFill>
+            </a:endParaRPr>
+          </a:p>
+        </p:txBody>
+      </p:sp>
+      <p:sp>
+        <p:nvSpPr>
+          <p:cNvPr id="11" name="TextBox 10"/>
+          <p:cNvSpPr txBox="1"/>
+          <p:nvPr/>
+        </p:nvSpPr>
+        <p:spPr>
+          <a:xfrm>
+            <a:off x="1828876" y="2163389"/>
+            <a:ext cx="377026" cy="584776"/>
+          </a:xfrm>
+          <a:prstGeom prst="rect">
+            <a:avLst/>
+          </a:prstGeom>
+          <a:noFill/>
+        </p:spPr>
+        <p:txBody>
+          <a:bodyPr wrap="none" rtlCol="0">
+            <a:spAutoFit/>
+          </a:bodyPr>
+          <a:lstStyle/>
+          <a:p>
+            <a:r>
+              <a:rPr lang="en-US" sz="3200" b="1" dirty="0" smtClean="0">
+                <a:solidFill>
+                  <a:schemeClr val="bg1">
+                    <a:lumMod val="50000"/>
+                  </a:schemeClr>
+                </a:solidFill>
+              </a:rPr>
+              <a:t>x</a:t>
+            </a:r>
+            <a:endParaRPr lang="en-US" sz="3200" b="1" dirty="0">
+              <a:solidFill>
+                <a:schemeClr val="bg1">
+                  <a:lumMod val="50000"/>
+                </a:schemeClr>
+              </a:solidFill>
+            </a:endParaRPr>
+          </a:p>
+        </p:txBody>
+      </p:sp>
+      <p:sp>
+        <p:nvSpPr>
+          <p:cNvPr id="12" name="TextBox 11"/>
+          <p:cNvSpPr txBox="1"/>
+          <p:nvPr/>
+        </p:nvSpPr>
+        <p:spPr>
+          <a:xfrm>
+            <a:off x="672935" y="3347273"/>
+            <a:ext cx="377026" cy="584776"/>
+          </a:xfrm>
+          <a:prstGeom prst="rect">
+            <a:avLst/>
+          </a:prstGeom>
+          <a:noFill/>
+        </p:spPr>
+        <p:txBody>
+          <a:bodyPr wrap="none" rtlCol="0">
+            <a:spAutoFit/>
+          </a:bodyPr>
+          <a:lstStyle/>
+          <a:p>
+            <a:r>
+              <a:rPr lang="en-US" sz="3200" b="1" dirty="0" smtClean="0">
+                <a:solidFill>
+                  <a:schemeClr val="bg1">
+                    <a:lumMod val="50000"/>
+                  </a:schemeClr>
+                </a:solidFill>
+              </a:rPr>
+              <a:t>x</a:t>
+            </a:r>
+            <a:endParaRPr lang="en-US" sz="3200" b="1" dirty="0">
+              <a:solidFill>
+                <a:schemeClr val="bg1">
+                  <a:lumMod val="50000"/>
+                </a:schemeClr>
+              </a:solidFill>
+            </a:endParaRPr>
+          </a:p>
+        </p:txBody>
+      </p:sp>
+      <p:sp>
+        <p:nvSpPr>
+          <p:cNvPr id="13" name="TextBox 12"/>
+          <p:cNvSpPr txBox="1"/>
+          <p:nvPr/>
+        </p:nvSpPr>
+        <p:spPr>
+          <a:xfrm>
+            <a:off x="1828876" y="3345243"/>
+            <a:ext cx="377026" cy="584776"/>
+          </a:xfrm>
+          <a:prstGeom prst="rect">
+            <a:avLst/>
+          </a:prstGeom>
+          <a:noFill/>
+        </p:spPr>
+        <p:txBody>
+          <a:bodyPr wrap="none" rtlCol="0">
+            <a:spAutoFit/>
+          </a:bodyPr>
+          <a:lstStyle/>
+          <a:p>
+            <a:r>
+              <a:rPr lang="en-US" sz="3200" b="1" dirty="0" smtClean="0">
+                <a:solidFill>
+                  <a:schemeClr val="bg1">
+                    <a:lumMod val="50000"/>
+                  </a:schemeClr>
+                </a:solidFill>
+              </a:rPr>
+              <a:t>x</a:t>
+            </a:r>
+            <a:endParaRPr lang="en-US" sz="3200" b="1" dirty="0">
+              <a:solidFill>
+                <a:schemeClr val="bg1">
+                  <a:lumMod val="50000"/>
+                </a:schemeClr>
+              </a:solidFill>
+            </a:endParaRPr>
+          </a:p>
+        </p:txBody>
+      </p:sp>
+      <p:sp>
+        <p:nvSpPr>
+          <p:cNvPr id="14" name="TextBox 13"/>
+          <p:cNvSpPr txBox="1"/>
+          <p:nvPr/>
+        </p:nvSpPr>
+        <p:spPr>
+          <a:xfrm>
+            <a:off x="2992275" y="2162717"/>
+            <a:ext cx="377026" cy="584776"/>
+          </a:xfrm>
+          <a:prstGeom prst="rect">
+            <a:avLst/>
+          </a:prstGeom>
+          <a:noFill/>
+        </p:spPr>
+        <p:txBody>
+          <a:bodyPr wrap="none" rtlCol="0">
+            <a:spAutoFit/>
+          </a:bodyPr>
+          <a:lstStyle/>
+          <a:p>
+            <a:r>
+              <a:rPr lang="en-US" sz="3200" b="1" dirty="0" smtClean="0">
+                <a:solidFill>
+                  <a:schemeClr val="bg1">
+                    <a:lumMod val="50000"/>
+                  </a:schemeClr>
+                </a:solidFill>
+              </a:rPr>
+              <a:t>x</a:t>
+            </a:r>
+            <a:endParaRPr lang="en-US" sz="3200" b="1" dirty="0">
+              <a:solidFill>
+                <a:schemeClr val="bg1">
+                  <a:lumMod val="50000"/>
+                </a:schemeClr>
+              </a:solidFill>
+            </a:endParaRPr>
+          </a:p>
+        </p:txBody>
+      </p:sp>
+      <p:sp>
+        <p:nvSpPr>
+          <p:cNvPr id="15" name="TextBox 14"/>
+          <p:cNvSpPr txBox="1"/>
+          <p:nvPr/>
+        </p:nvSpPr>
+        <p:spPr>
+          <a:xfrm>
+            <a:off x="2992275" y="3347273"/>
+            <a:ext cx="377026" cy="584776"/>
+          </a:xfrm>
+          <a:prstGeom prst="rect">
+            <a:avLst/>
+          </a:prstGeom>
+          <a:noFill/>
+        </p:spPr>
+        <p:txBody>
+          <a:bodyPr wrap="none" rtlCol="0">
+            <a:spAutoFit/>
+          </a:bodyPr>
+          <a:lstStyle/>
+          <a:p>
+            <a:r>
+              <a:rPr lang="en-US" sz="3200" b="1" dirty="0" smtClean="0">
+                <a:solidFill>
+                  <a:schemeClr val="bg1">
+                    <a:lumMod val="50000"/>
+                  </a:schemeClr>
+                </a:solidFill>
+              </a:rPr>
+              <a:t>x</a:t>
+            </a:r>
+            <a:endParaRPr lang="en-US" sz="3200" b="1" dirty="0">
+              <a:solidFill>
+                <a:schemeClr val="bg1">
+                  <a:lumMod val="50000"/>
+                </a:schemeClr>
+              </a:solidFill>
+            </a:endParaRPr>
+          </a:p>
+        </p:txBody>
+      </p:sp>
+      <p:sp>
+        <p:nvSpPr>
+          <p:cNvPr id="16" name="TextBox 15"/>
+          <p:cNvSpPr txBox="1"/>
+          <p:nvPr/>
+        </p:nvSpPr>
+        <p:spPr>
+          <a:xfrm>
+            <a:off x="1259074" y="3927989"/>
+            <a:ext cx="377026" cy="584776"/>
+          </a:xfrm>
+          <a:prstGeom prst="rect">
+            <a:avLst/>
+          </a:prstGeom>
+          <a:noFill/>
+        </p:spPr>
+        <p:txBody>
+          <a:bodyPr wrap="none" rtlCol="0">
+            <a:spAutoFit/>
+          </a:bodyPr>
+          <a:lstStyle/>
+          <a:p>
+            <a:r>
+              <a:rPr lang="en-US" sz="3200" b="1" dirty="0" smtClean="0">
+                <a:solidFill>
+                  <a:schemeClr val="bg1">
+                    <a:lumMod val="50000"/>
+                  </a:schemeClr>
+                </a:solidFill>
+              </a:rPr>
+              <a:t>x</a:t>
+            </a:r>
+            <a:endParaRPr lang="en-US" sz="3200" b="1" dirty="0">
+              <a:solidFill>
+                <a:schemeClr val="bg1">
+                  <a:lumMod val="50000"/>
+                </a:schemeClr>
+              </a:solidFill>
+            </a:endParaRPr>
+          </a:p>
+        </p:txBody>
+      </p:sp>
+      <p:sp>
+        <p:nvSpPr>
+          <p:cNvPr id="17" name="TextBox 16"/>
+          <p:cNvSpPr txBox="1"/>
+          <p:nvPr/>
+        </p:nvSpPr>
+        <p:spPr>
+          <a:xfrm>
+            <a:off x="2423896" y="3930018"/>
+            <a:ext cx="377026" cy="584776"/>
+          </a:xfrm>
+          <a:prstGeom prst="rect">
+            <a:avLst/>
+          </a:prstGeom>
+          <a:noFill/>
+        </p:spPr>
+        <p:txBody>
+          <a:bodyPr wrap="none" rtlCol="0">
+            <a:spAutoFit/>
+          </a:bodyPr>
+          <a:lstStyle/>
+          <a:p>
+            <a:r>
+              <a:rPr lang="en-US" sz="3200" b="1" dirty="0" smtClean="0">
+                <a:solidFill>
+                  <a:schemeClr val="bg1">
+                    <a:lumMod val="50000"/>
+                  </a:schemeClr>
+                </a:solidFill>
+              </a:rPr>
+              <a:t>x</a:t>
+            </a:r>
+            <a:endParaRPr lang="en-US" sz="3200" b="1" dirty="0">
+              <a:solidFill>
+                <a:schemeClr val="bg1">
+                  <a:lumMod val="50000"/>
+                </a:schemeClr>
+              </a:solidFill>
+            </a:endParaRPr>
+          </a:p>
+        </p:txBody>
+      </p:sp>
+      <p:sp>
+        <p:nvSpPr>
+          <p:cNvPr id="18" name="TextBox 17"/>
+          <p:cNvSpPr txBox="1"/>
+          <p:nvPr/>
+        </p:nvSpPr>
+        <p:spPr>
+          <a:xfrm>
+            <a:off x="1267955" y="2760465"/>
+            <a:ext cx="377026" cy="584776"/>
+          </a:xfrm>
+          <a:prstGeom prst="rect">
+            <a:avLst/>
+          </a:prstGeom>
+          <a:noFill/>
+        </p:spPr>
+        <p:txBody>
+          <a:bodyPr wrap="none" rtlCol="0">
+            <a:spAutoFit/>
+          </a:bodyPr>
+          <a:lstStyle/>
+          <a:p>
+            <a:r>
+              <a:rPr lang="en-US" sz="3200" b="1" dirty="0" smtClean="0">
+                <a:solidFill>
+                  <a:schemeClr val="bg1">
+                    <a:lumMod val="50000"/>
+                  </a:schemeClr>
+                </a:solidFill>
+              </a:rPr>
+              <a:t>x</a:t>
+            </a:r>
+            <a:endParaRPr lang="en-US" sz="3200" b="1" dirty="0">
+              <a:solidFill>
+                <a:schemeClr val="bg1">
+                  <a:lumMod val="50000"/>
+                </a:schemeClr>
+              </a:solidFill>
+            </a:endParaRPr>
+          </a:p>
+        </p:txBody>
+      </p:sp>
+      <p:sp>
+        <p:nvSpPr>
+          <p:cNvPr id="19" name="TextBox 18"/>
+          <p:cNvSpPr txBox="1"/>
+          <p:nvPr/>
+        </p:nvSpPr>
+        <p:spPr>
+          <a:xfrm>
+            <a:off x="2423896" y="2750268"/>
+            <a:ext cx="377026" cy="584776"/>
+          </a:xfrm>
+          <a:prstGeom prst="rect">
+            <a:avLst/>
+          </a:prstGeom>
+          <a:noFill/>
+        </p:spPr>
+        <p:txBody>
+          <a:bodyPr wrap="none" rtlCol="0">
+            <a:spAutoFit/>
+          </a:bodyPr>
+          <a:lstStyle/>
+          <a:p>
+            <a:r>
+              <a:rPr lang="en-US" sz="3200" b="1" dirty="0" smtClean="0">
+                <a:solidFill>
+                  <a:schemeClr val="bg1">
+                    <a:lumMod val="50000"/>
+                  </a:schemeClr>
+                </a:solidFill>
+              </a:rPr>
+              <a:t>x</a:t>
+            </a:r>
+            <a:endParaRPr lang="en-US" sz="3200" b="1" dirty="0">
+              <a:solidFill>
+                <a:schemeClr val="bg1">
+                  <a:lumMod val="50000"/>
+                </a:schemeClr>
+              </a:solidFill>
+            </a:endParaRPr>
+          </a:p>
+        </p:txBody>
+      </p:sp>
+      <p:sp>
+        <p:nvSpPr>
+          <p:cNvPr id="20" name="TextBox 19"/>
+          <p:cNvSpPr txBox="1"/>
+          <p:nvPr/>
+        </p:nvSpPr>
+        <p:spPr>
+          <a:xfrm>
+            <a:off x="4137912" y="1585465"/>
+            <a:ext cx="377026" cy="584776"/>
+          </a:xfrm>
+          <a:prstGeom prst="rect">
+            <a:avLst/>
+          </a:prstGeom>
+          <a:noFill/>
+        </p:spPr>
+        <p:txBody>
+          <a:bodyPr wrap="none" rtlCol="0">
+            <a:spAutoFit/>
+          </a:bodyPr>
+          <a:lstStyle/>
+          <a:p>
+            <a:r>
+              <a:rPr lang="en-US" sz="3200" b="1" dirty="0" smtClean="0">
+                <a:solidFill>
+                  <a:schemeClr val="bg1">
+                    <a:lumMod val="50000"/>
+                  </a:schemeClr>
+                </a:solidFill>
+              </a:rPr>
+              <a:t>x</a:t>
+            </a:r>
+            <a:endParaRPr lang="en-US" sz="3200" b="1" dirty="0">
+              <a:solidFill>
+                <a:schemeClr val="bg1">
+                  <a:lumMod val="50000"/>
+                </a:schemeClr>
+              </a:solidFill>
+            </a:endParaRPr>
+          </a:p>
+        </p:txBody>
+      </p:sp>
+      <p:sp>
+        <p:nvSpPr>
+          <p:cNvPr id="21" name="TextBox 20"/>
+          <p:cNvSpPr txBox="1"/>
+          <p:nvPr/>
+        </p:nvSpPr>
+        <p:spPr>
+          <a:xfrm>
+            <a:off x="4715170" y="2139539"/>
+            <a:ext cx="377026" cy="584776"/>
+          </a:xfrm>
+          <a:prstGeom prst="rect">
+            <a:avLst/>
+          </a:prstGeom>
+          <a:noFill/>
+        </p:spPr>
+        <p:txBody>
+          <a:bodyPr wrap="none" rtlCol="0">
+            <a:spAutoFit/>
+          </a:bodyPr>
+          <a:lstStyle/>
+          <a:p>
+            <a:r>
+              <a:rPr lang="en-US" sz="3200" b="1" dirty="0" smtClean="0">
+                <a:solidFill>
+                  <a:schemeClr val="bg1">
+                    <a:lumMod val="50000"/>
+                  </a:schemeClr>
+                </a:solidFill>
+              </a:rPr>
+              <a:t>x</a:t>
+            </a:r>
+            <a:endParaRPr lang="en-US" sz="3200" b="1" dirty="0">
+              <a:solidFill>
+                <a:schemeClr val="bg1">
+                  <a:lumMod val="50000"/>
+                </a:schemeClr>
+              </a:solidFill>
+            </a:endParaRPr>
+          </a:p>
+        </p:txBody>
+      </p:sp>
+      <p:sp>
+        <p:nvSpPr>
+          <p:cNvPr id="22" name="TextBox 21"/>
+          <p:cNvSpPr txBox="1"/>
+          <p:nvPr/>
+        </p:nvSpPr>
+        <p:spPr>
+          <a:xfrm>
+            <a:off x="5319071" y="1581406"/>
+            <a:ext cx="377026" cy="584776"/>
+          </a:xfrm>
+          <a:prstGeom prst="rect">
+            <a:avLst/>
+          </a:prstGeom>
+          <a:noFill/>
+        </p:spPr>
+        <p:txBody>
+          <a:bodyPr wrap="none" rtlCol="0">
+            <a:spAutoFit/>
+          </a:bodyPr>
+          <a:lstStyle/>
+          <a:p>
+            <a:r>
+              <a:rPr lang="en-US" sz="3200" b="1" dirty="0" smtClean="0">
+                <a:solidFill>
+                  <a:schemeClr val="bg1">
+                    <a:lumMod val="50000"/>
+                  </a:schemeClr>
+                </a:solidFill>
+              </a:rPr>
+              <a:t>x</a:t>
+            </a:r>
+            <a:endParaRPr lang="en-US" sz="3200" b="1" dirty="0">
+              <a:solidFill>
+                <a:schemeClr val="bg1">
+                  <a:lumMod val="50000"/>
+                </a:schemeClr>
+              </a:solidFill>
+            </a:endParaRPr>
+          </a:p>
+        </p:txBody>
+      </p:sp>
+      <p:sp>
+        <p:nvSpPr>
+          <p:cNvPr id="23" name="TextBox 22"/>
+          <p:cNvSpPr txBox="1"/>
+          <p:nvPr/>
+        </p:nvSpPr>
+        <p:spPr>
+          <a:xfrm>
+            <a:off x="6500232" y="1581403"/>
+            <a:ext cx="377026" cy="584776"/>
+          </a:xfrm>
+          <a:prstGeom prst="rect">
+            <a:avLst/>
+          </a:prstGeom>
+          <a:noFill/>
+        </p:spPr>
+        <p:txBody>
+          <a:bodyPr wrap="none" rtlCol="0">
+            <a:spAutoFit/>
+          </a:bodyPr>
+          <a:lstStyle/>
+          <a:p>
+            <a:r>
+              <a:rPr lang="en-US" sz="3200" b="1" dirty="0" smtClean="0">
+                <a:solidFill>
+                  <a:schemeClr val="bg1">
+                    <a:lumMod val="50000"/>
+                  </a:schemeClr>
+                </a:solidFill>
+              </a:rPr>
+              <a:t>x</a:t>
+            </a:r>
+            <a:endParaRPr lang="en-US" sz="3200" b="1" dirty="0">
+              <a:solidFill>
+                <a:schemeClr val="bg1">
+                  <a:lumMod val="50000"/>
+                </a:schemeClr>
+              </a:solidFill>
+            </a:endParaRPr>
+          </a:p>
+        </p:txBody>
+      </p:sp>
+      <p:sp>
+        <p:nvSpPr>
+          <p:cNvPr id="24" name="TextBox 23"/>
+          <p:cNvSpPr txBox="1"/>
+          <p:nvPr/>
+        </p:nvSpPr>
+        <p:spPr>
+          <a:xfrm>
+            <a:off x="5914092" y="2162717"/>
+            <a:ext cx="377026" cy="584776"/>
+          </a:xfrm>
+          <a:prstGeom prst="rect">
+            <a:avLst/>
+          </a:prstGeom>
+          <a:noFill/>
+        </p:spPr>
+        <p:txBody>
+          <a:bodyPr wrap="none" rtlCol="0">
+            <a:spAutoFit/>
+          </a:bodyPr>
+          <a:lstStyle/>
+          <a:p>
+            <a:r>
+              <a:rPr lang="en-US" sz="3200" b="1" dirty="0" smtClean="0">
+                <a:solidFill>
+                  <a:schemeClr val="bg1">
+                    <a:lumMod val="50000"/>
+                  </a:schemeClr>
+                </a:solidFill>
+              </a:rPr>
+              <a:t>x</a:t>
+            </a:r>
+            <a:endParaRPr lang="en-US" sz="3200" b="1" dirty="0">
+              <a:solidFill>
+                <a:schemeClr val="bg1">
+                  <a:lumMod val="50000"/>
+                </a:schemeClr>
+              </a:solidFill>
+            </a:endParaRPr>
+          </a:p>
+        </p:txBody>
+      </p:sp>
+      <p:sp>
+        <p:nvSpPr>
+          <p:cNvPr id="25" name="TextBox 24"/>
+          <p:cNvSpPr txBox="1"/>
+          <p:nvPr/>
+        </p:nvSpPr>
+        <p:spPr>
+          <a:xfrm>
+            <a:off x="4113283" y="2770060"/>
+            <a:ext cx="377026" cy="584776"/>
+          </a:xfrm>
+          <a:prstGeom prst="rect">
+            <a:avLst/>
+          </a:prstGeom>
+          <a:noFill/>
+        </p:spPr>
+        <p:txBody>
+          <a:bodyPr wrap="none" rtlCol="0">
+            <a:spAutoFit/>
+          </a:bodyPr>
+          <a:lstStyle/>
+          <a:p>
+            <a:r>
+              <a:rPr lang="en-US" sz="3200" b="1" dirty="0" smtClean="0">
+                <a:solidFill>
+                  <a:schemeClr val="bg1">
+                    <a:lumMod val="50000"/>
+                  </a:schemeClr>
+                </a:solidFill>
+              </a:rPr>
+              <a:t>x</a:t>
+            </a:r>
+            <a:endParaRPr lang="en-US" sz="3200" b="1" dirty="0">
+              <a:solidFill>
+                <a:schemeClr val="bg1">
+                  <a:lumMod val="50000"/>
+                </a:schemeClr>
+              </a:solidFill>
+            </a:endParaRPr>
+          </a:p>
+        </p:txBody>
+      </p:sp>
+      <p:sp>
+        <p:nvSpPr>
+          <p:cNvPr id="26" name="TextBox 25"/>
+          <p:cNvSpPr txBox="1"/>
+          <p:nvPr/>
+        </p:nvSpPr>
+        <p:spPr>
+          <a:xfrm>
+            <a:off x="5319071" y="2760467"/>
+            <a:ext cx="377026" cy="584776"/>
+          </a:xfrm>
+          <a:prstGeom prst="rect">
+            <a:avLst/>
+          </a:prstGeom>
+          <a:noFill/>
+        </p:spPr>
+        <p:txBody>
+          <a:bodyPr wrap="none" rtlCol="0">
+            <a:spAutoFit/>
+          </a:bodyPr>
+          <a:lstStyle/>
+          <a:p>
+            <a:r>
+              <a:rPr lang="en-US" sz="3200" b="1" dirty="0" smtClean="0">
+                <a:solidFill>
+                  <a:schemeClr val="bg1">
+                    <a:lumMod val="50000"/>
+                  </a:schemeClr>
+                </a:solidFill>
+              </a:rPr>
+              <a:t>x</a:t>
+            </a:r>
+            <a:endParaRPr lang="en-US" sz="3200" b="1" dirty="0">
+              <a:solidFill>
+                <a:schemeClr val="bg1">
+                  <a:lumMod val="50000"/>
+                </a:schemeClr>
+              </a:solidFill>
+            </a:endParaRPr>
+          </a:p>
+        </p:txBody>
+      </p:sp>
+      <p:sp>
+        <p:nvSpPr>
+          <p:cNvPr id="27" name="TextBox 26"/>
+          <p:cNvSpPr txBox="1"/>
+          <p:nvPr/>
+        </p:nvSpPr>
+        <p:spPr>
+          <a:xfrm>
+            <a:off x="6500232" y="2770060"/>
+            <a:ext cx="377026" cy="584776"/>
+          </a:xfrm>
+          <a:prstGeom prst="rect">
+            <a:avLst/>
+          </a:prstGeom>
+          <a:noFill/>
+        </p:spPr>
+        <p:txBody>
+          <a:bodyPr wrap="none" rtlCol="0">
+            <a:spAutoFit/>
+          </a:bodyPr>
+          <a:lstStyle/>
+          <a:p>
+            <a:r>
+              <a:rPr lang="en-US" sz="3200" b="1" dirty="0" smtClean="0">
+                <a:solidFill>
+                  <a:schemeClr val="bg1">
+                    <a:lumMod val="50000"/>
+                  </a:schemeClr>
+                </a:solidFill>
+              </a:rPr>
+              <a:t>x</a:t>
+            </a:r>
+            <a:endParaRPr lang="en-US" sz="3200" b="1" dirty="0">
+              <a:solidFill>
+                <a:schemeClr val="bg1">
+                  <a:lumMod val="50000"/>
+                </a:schemeClr>
+              </a:solidFill>
+            </a:endParaRPr>
+          </a:p>
+        </p:txBody>
+      </p:sp>
+      <p:sp>
+        <p:nvSpPr>
+          <p:cNvPr id="28" name="TextBox 27"/>
+          <p:cNvSpPr txBox="1"/>
+          <p:nvPr/>
+        </p:nvSpPr>
+        <p:spPr>
+          <a:xfrm>
+            <a:off x="4137912" y="3932049"/>
+            <a:ext cx="377026" cy="584776"/>
+          </a:xfrm>
+          <a:prstGeom prst="rect">
+            <a:avLst/>
+          </a:prstGeom>
+          <a:noFill/>
+        </p:spPr>
+        <p:txBody>
+          <a:bodyPr wrap="none" rtlCol="0">
+            <a:spAutoFit/>
+          </a:bodyPr>
+          <a:lstStyle/>
+          <a:p>
+            <a:r>
+              <a:rPr lang="en-US" sz="3200" b="1" dirty="0" smtClean="0">
+                <a:solidFill>
+                  <a:schemeClr val="bg1">
+                    <a:lumMod val="50000"/>
+                  </a:schemeClr>
+                </a:solidFill>
+              </a:rPr>
+              <a:t>x</a:t>
+            </a:r>
+            <a:endParaRPr lang="en-US" sz="3200" b="1" dirty="0">
+              <a:solidFill>
+                <a:schemeClr val="bg1">
+                  <a:lumMod val="50000"/>
+                </a:schemeClr>
+              </a:solidFill>
+            </a:endParaRPr>
+          </a:p>
+        </p:txBody>
+      </p:sp>
+      <p:sp>
+        <p:nvSpPr>
+          <p:cNvPr id="29" name="TextBox 28"/>
+          <p:cNvSpPr txBox="1"/>
+          <p:nvPr/>
+        </p:nvSpPr>
+        <p:spPr>
+          <a:xfrm>
+            <a:off x="5319071" y="3958692"/>
+            <a:ext cx="377026" cy="584776"/>
+          </a:xfrm>
+          <a:prstGeom prst="rect">
+            <a:avLst/>
+          </a:prstGeom>
+          <a:noFill/>
+        </p:spPr>
+        <p:txBody>
+          <a:bodyPr wrap="none" rtlCol="0">
+            <a:spAutoFit/>
+          </a:bodyPr>
+          <a:lstStyle/>
+          <a:p>
+            <a:r>
+              <a:rPr lang="en-US" sz="3200" b="1" dirty="0" smtClean="0">
+                <a:solidFill>
+                  <a:schemeClr val="bg1">
+                    <a:lumMod val="50000"/>
+                  </a:schemeClr>
+                </a:solidFill>
+              </a:rPr>
+              <a:t>x</a:t>
+            </a:r>
+            <a:endParaRPr lang="en-US" sz="3200" b="1" dirty="0">
+              <a:solidFill>
+                <a:schemeClr val="bg1">
+                  <a:lumMod val="50000"/>
+                </a:schemeClr>
+              </a:solidFill>
+            </a:endParaRPr>
+          </a:p>
+        </p:txBody>
+      </p:sp>
+      <p:sp>
+        <p:nvSpPr>
+          <p:cNvPr id="30" name="TextBox 29"/>
+          <p:cNvSpPr txBox="1"/>
+          <p:nvPr/>
+        </p:nvSpPr>
+        <p:spPr>
+          <a:xfrm>
+            <a:off x="6500232" y="3951149"/>
+            <a:ext cx="377026" cy="584776"/>
+          </a:xfrm>
+          <a:prstGeom prst="rect">
+            <a:avLst/>
+          </a:prstGeom>
+          <a:noFill/>
+        </p:spPr>
+        <p:txBody>
+          <a:bodyPr wrap="none" rtlCol="0">
+            <a:spAutoFit/>
+          </a:bodyPr>
+          <a:lstStyle/>
+          <a:p>
+            <a:r>
+              <a:rPr lang="en-US" sz="3200" b="1" dirty="0" smtClean="0">
+                <a:solidFill>
+                  <a:schemeClr val="bg1">
+                    <a:lumMod val="50000"/>
+                  </a:schemeClr>
+                </a:solidFill>
+              </a:rPr>
+              <a:t>x</a:t>
+            </a:r>
+            <a:endParaRPr lang="en-US" sz="3200" b="1" dirty="0">
+              <a:solidFill>
+                <a:schemeClr val="bg1">
+                  <a:lumMod val="50000"/>
+                </a:schemeClr>
+              </a:solidFill>
+            </a:endParaRPr>
+          </a:p>
+        </p:txBody>
+      </p:sp>
+      <p:sp>
+        <p:nvSpPr>
+          <p:cNvPr id="31" name="TextBox 30"/>
+          <p:cNvSpPr txBox="1"/>
+          <p:nvPr/>
+        </p:nvSpPr>
+        <p:spPr>
+          <a:xfrm>
+            <a:off x="4715170" y="3373916"/>
+            <a:ext cx="377026" cy="584776"/>
+          </a:xfrm>
+          <a:prstGeom prst="rect">
+            <a:avLst/>
+          </a:prstGeom>
+          <a:noFill/>
+        </p:spPr>
+        <p:txBody>
+          <a:bodyPr wrap="none" rtlCol="0">
+            <a:spAutoFit/>
+          </a:bodyPr>
+          <a:lstStyle/>
+          <a:p>
+            <a:r>
+              <a:rPr lang="en-US" sz="3200" b="1" dirty="0" smtClean="0">
+                <a:solidFill>
+                  <a:schemeClr val="bg1">
+                    <a:lumMod val="50000"/>
+                  </a:schemeClr>
+                </a:solidFill>
+              </a:rPr>
+              <a:t>x</a:t>
+            </a:r>
+            <a:endParaRPr lang="en-US" sz="3200" b="1" dirty="0">
+              <a:solidFill>
+                <a:schemeClr val="bg1">
+                  <a:lumMod val="50000"/>
+                </a:schemeClr>
+              </a:solidFill>
+            </a:endParaRPr>
+          </a:p>
+        </p:txBody>
+      </p:sp>
+      <p:sp>
+        <p:nvSpPr>
+          <p:cNvPr id="32" name="TextBox 31"/>
+          <p:cNvSpPr txBox="1"/>
+          <p:nvPr/>
+        </p:nvSpPr>
+        <p:spPr>
+          <a:xfrm>
+            <a:off x="5914092" y="3354124"/>
+            <a:ext cx="377026" cy="584776"/>
+          </a:xfrm>
+          <a:prstGeom prst="rect">
+            <a:avLst/>
+          </a:prstGeom>
+          <a:noFill/>
+        </p:spPr>
+        <p:txBody>
+          <a:bodyPr wrap="none" rtlCol="0">
+            <a:spAutoFit/>
+          </a:bodyPr>
+          <a:lstStyle/>
+          <a:p>
+            <a:r>
+              <a:rPr lang="en-US" sz="3200" b="1" dirty="0" smtClean="0">
+                <a:solidFill>
+                  <a:schemeClr val="bg1">
+                    <a:lumMod val="50000"/>
+                  </a:schemeClr>
+                </a:solidFill>
+              </a:rPr>
+              <a:t>x</a:t>
+            </a:r>
+            <a:endParaRPr lang="en-US" sz="3200" b="1" dirty="0">
+              <a:solidFill>
+                <a:schemeClr val="bg1">
+                  <a:lumMod val="50000"/>
+                </a:schemeClr>
+              </a:solidFill>
+            </a:endParaRPr>
+          </a:p>
+        </p:txBody>
+      </p:sp>
+      <p:sp>
+        <p:nvSpPr>
+          <p:cNvPr id="7" name="Rectangle 6"/>
+          <p:cNvSpPr/>
+          <p:nvPr/>
+        </p:nvSpPr>
+        <p:spPr>
+          <a:xfrm>
+            <a:off x="4308663" y="1935961"/>
+            <a:ext cx="595020" cy="586116"/>
+          </a:xfrm>
+          <a:prstGeom prst="rect">
+            <a:avLst/>
+          </a:prstGeom>
+          <a:noFill/>
+          <a:ln w="50800">
+            <a:solidFill>
+              <a:schemeClr val="tx1"/>
+            </a:solidFill>
+            <a:prstDash val="sysDash"/>
+          </a:ln>
+        </p:spPr>
+        <p:style>
+          <a:lnRef idx="1">
+            <a:schemeClr val="accent1"/>
+          </a:lnRef>
+          <a:fillRef idx="3">
+            <a:schemeClr val="accent1"/>
+          </a:fillRef>
+          <a:effectRef idx="2">
+            <a:schemeClr val="accent1"/>
+          </a:effectRef>
+          <a:fontRef idx="minor">
+            <a:schemeClr val="lt1"/>
+          </a:fontRef>
+        </p:style>
+        <p:txBody>
+          <a:bodyPr rtlCol="0" anchor="ctr"/>
+          <a:lstStyle/>
+          <a:p>
+            <a:pPr algn="ctr"/>
+            <a:endParaRPr lang="en-US"/>
+          </a:p>
+        </p:txBody>
+      </p:sp>
+    </p:spTree>
+    <p:extLst>
+      <p:ext uri="{BB962C8B-B14F-4D97-AF65-F5344CB8AC3E}">
+        <p14:creationId xmlns:p14="http://schemas.microsoft.com/office/powerpoint/2010/main" val="2484563120"/>
       </p:ext>
     </p:extLst>
   </p:cSld>
@@ -3466,6 +4685,7 @@
                 <a:rPr lang="en-US" dirty="0"/>
                 <a:t>b</a:t>
               </a:r>
+              <a:endParaRPr lang="en-US" dirty="0"/>
             </a:p>
           </p:txBody>
         </p:sp>
@@ -3897,6 +5117,13 @@
                   </a:rPr>
                   <a:t>a</a:t>
                 </a:r>
+                <a:endParaRPr lang="en-US" sz="2400" b="1" dirty="0">
+                  <a:solidFill>
+                    <a:schemeClr val="bg1">
+                      <a:lumMod val="50000"/>
+                    </a:schemeClr>
+                  </a:solidFill>
+                </a:endParaRPr>
               </a:p>
             </p:txBody>
           </p:sp>
@@ -4032,6 +5259,13 @@
                   </a:rPr>
                   <a:t>c</a:t>
                 </a:r>
+                <a:endParaRPr lang="en-US" sz="2400" b="1" dirty="0">
+                  <a:solidFill>
+                    <a:schemeClr val="bg1">
+                      <a:lumMod val="50000"/>
+                    </a:schemeClr>
+                  </a:solidFill>
+                </a:endParaRPr>
               </a:p>
             </p:txBody>
           </p:sp>
@@ -4736,6 +5970,7 @@
                 <a:rPr lang="en-US" sz="2400" b="1" dirty="0"/>
                 <a:t>b</a:t>
               </a:r>
+              <a:endParaRPr lang="en-US" sz="2400" b="1" dirty="0"/>
             </a:p>
           </p:txBody>
         </p:sp>
@@ -4770,34 +6005,70 @@
           <a:chExt cx="0" cy="0"/>
         </a:xfrm>
       </p:grpSpPr>
+      <p:pic>
+        <p:nvPicPr>
+          <p:cNvPr id="5" name="Picture 4"/>
+          <p:cNvPicPr>
+            <a:picLocks noChangeAspect="1"/>
+          </p:cNvPicPr>
+          <p:nvPr/>
+        </p:nvPicPr>
+        <p:blipFill>
+          <a:blip r:embed="rId2">
+            <a:extLst>
+              <a:ext uri="{BEBA8EAE-BF5A-486C-A8C5-ECC9F3942E4B}">
+                <a14:imgProps xmlns:a14="http://schemas.microsoft.com/office/drawing/2010/main">
+                  <a14:imgLayer r:embed="rId3">
+                    <a14:imgEffect>
+                      <a14:sharpenSoften amount="30000"/>
+                    </a14:imgEffect>
+                  </a14:imgLayer>
+                </a14:imgProps>
+              </a:ext>
+            </a:extLst>
+          </a:blip>
+          <a:stretch>
+            <a:fillRect/>
+          </a:stretch>
+        </p:blipFill>
+        <p:spPr>
+          <a:xfrm>
+            <a:off x="855279" y="3123475"/>
+            <a:ext cx="3354421" cy="3734525"/>
+          </a:xfrm>
+          <a:prstGeom prst="rect">
+            <a:avLst/>
+          </a:prstGeom>
+        </p:spPr>
+      </p:pic>
       <p:grpSp>
         <p:nvGrpSpPr>
-          <p:cNvPr id="2" name="Group 1"/>
+          <p:cNvPr id="25" name="Group 24"/>
           <p:cNvGrpSpPr/>
           <p:nvPr/>
         </p:nvGrpSpPr>
         <p:grpSpPr>
           <a:xfrm>
             <a:off x="0" y="136665"/>
-            <a:ext cx="8773059" cy="6721335"/>
+            <a:ext cx="8773059" cy="6420062"/>
             <a:chOff x="0" y="136665"/>
-            <a:chExt cx="8773059" cy="6721335"/>
+            <a:chExt cx="8773059" cy="6420062"/>
           </a:xfrm>
         </p:grpSpPr>
         <p:pic>
           <p:nvPicPr>
-            <p:cNvPr id="5" name="Picture 4"/>
+            <p:cNvPr id="4" name="Picture 3"/>
             <p:cNvPicPr>
               <a:picLocks noChangeAspect="1"/>
             </p:cNvPicPr>
             <p:nvPr/>
           </p:nvPicPr>
           <p:blipFill>
-            <a:blip r:embed="rId2">
+            <a:blip r:embed="rId4">
               <a:extLst>
                 <a:ext uri="{BEBA8EAE-BF5A-486C-A8C5-ECC9F3942E4B}">
                   <a14:imgProps xmlns:a14="http://schemas.microsoft.com/office/drawing/2010/main">
-                    <a14:imgLayer r:embed="rId3">
+                    <a14:imgLayer r:embed="rId5">
                       <a14:imgEffect>
                         <a14:sharpenSoften amount="30000"/>
                       </a14:imgEffect>
@@ -4812,477 +6083,426 @@
           </p:blipFill>
           <p:spPr>
             <a:xfrm>
-              <a:off x="855279" y="3123475"/>
-              <a:ext cx="3354421" cy="3734525"/>
+              <a:off x="981408" y="136665"/>
+              <a:ext cx="3228292" cy="3091113"/>
             </a:xfrm>
             <a:prstGeom prst="rect">
               <a:avLst/>
             </a:prstGeom>
           </p:spPr>
         </p:pic>
-        <p:grpSp>
-          <p:nvGrpSpPr>
-            <p:cNvPr id="25" name="Group 24"/>
-            <p:cNvGrpSpPr/>
+        <p:pic>
+          <p:nvPicPr>
+            <p:cNvPr id="6" name="Picture 5"/>
+            <p:cNvPicPr>
+              <a:picLocks noChangeAspect="1"/>
+            </p:cNvPicPr>
             <p:nvPr/>
-          </p:nvGrpSpPr>
-          <p:grpSpPr>
+          </p:nvPicPr>
+          <p:blipFill rotWithShape="1">
+            <a:blip r:embed="rId6">
+              <a:extLst>
+                <a:ext uri="{BEBA8EAE-BF5A-486C-A8C5-ECC9F3942E4B}">
+                  <a14:imgProps xmlns:a14="http://schemas.microsoft.com/office/drawing/2010/main">
+                    <a14:imgLayer r:embed="rId7">
+                      <a14:imgEffect>
+                        <a14:sharpenSoften amount="30000"/>
+                      </a14:imgEffect>
+                    </a14:imgLayer>
+                  </a14:imgProps>
+                </a:ext>
+              </a:extLst>
+            </a:blip>
+            <a:srcRect r="2737"/>
+            <a:stretch/>
+          </p:blipFill>
+          <p:spPr>
             <a:xfrm>
-              <a:off x="0" y="136665"/>
-              <a:ext cx="8773059" cy="6420062"/>
-              <a:chOff x="0" y="136665"/>
-              <a:chExt cx="8773059" cy="6420062"/>
+              <a:off x="4630768" y="3681809"/>
+              <a:ext cx="3287016" cy="2874918"/>
             </a:xfrm>
-          </p:grpSpPr>
-          <p:pic>
-            <p:nvPicPr>
-              <p:cNvPr id="4" name="Picture 3"/>
-              <p:cNvPicPr>
-                <a:picLocks noChangeAspect="1"/>
-              </p:cNvPicPr>
-              <p:nvPr/>
-            </p:nvPicPr>
-            <p:blipFill>
-              <a:blip r:embed="rId4">
-                <a:extLst>
-                  <a:ext uri="{BEBA8EAE-BF5A-486C-A8C5-ECC9F3942E4B}">
-                    <a14:imgProps xmlns:a14="http://schemas.microsoft.com/office/drawing/2010/main">
-                      <a14:imgLayer r:embed="rId5">
-                        <a14:imgEffect>
-                          <a14:sharpenSoften amount="30000"/>
-                        </a14:imgEffect>
-                      </a14:imgLayer>
-                    </a14:imgProps>
-                  </a:ext>
-                </a:extLst>
-              </a:blip>
-              <a:stretch>
-                <a:fillRect/>
-              </a:stretch>
-            </p:blipFill>
-            <p:spPr>
-              <a:xfrm>
-                <a:off x="981408" y="136665"/>
-                <a:ext cx="3228292" cy="3091113"/>
-              </a:xfrm>
-              <a:prstGeom prst="rect">
-                <a:avLst/>
-              </a:prstGeom>
-            </p:spPr>
-          </p:pic>
-          <p:pic>
-            <p:nvPicPr>
-              <p:cNvPr id="6" name="Picture 5"/>
-              <p:cNvPicPr>
-                <a:picLocks noChangeAspect="1"/>
-              </p:cNvPicPr>
-              <p:nvPr/>
-            </p:nvPicPr>
-            <p:blipFill rotWithShape="1">
-              <a:blip r:embed="rId6">
-                <a:extLst>
-                  <a:ext uri="{BEBA8EAE-BF5A-486C-A8C5-ECC9F3942E4B}">
-                    <a14:imgProps xmlns:a14="http://schemas.microsoft.com/office/drawing/2010/main">
-                      <a14:imgLayer r:embed="rId7">
-                        <a14:imgEffect>
-                          <a14:sharpenSoften amount="30000"/>
-                        </a14:imgEffect>
-                      </a14:imgLayer>
-                    </a14:imgProps>
-                  </a:ext>
-                </a:extLst>
-              </a:blip>
-              <a:srcRect r="2737"/>
-              <a:stretch/>
-            </p:blipFill>
-            <p:spPr>
-              <a:xfrm>
-                <a:off x="4630768" y="3681809"/>
-                <a:ext cx="3287016" cy="2874918"/>
-              </a:xfrm>
-              <a:prstGeom prst="rect">
-                <a:avLst/>
-              </a:prstGeom>
-              <a:ln w="38100" cmpd="sng">
+            <a:prstGeom prst="rect">
+              <a:avLst/>
+            </a:prstGeom>
+            <a:ln w="38100" cmpd="sng">
+              <a:solidFill>
+                <a:srgbClr val="0000FF"/>
+              </a:solidFill>
+            </a:ln>
+          </p:spPr>
+        </p:pic>
+        <p:pic>
+          <p:nvPicPr>
+            <p:cNvPr id="7" name="Picture 6"/>
+            <p:cNvPicPr>
+              <a:picLocks noChangeAspect="1"/>
+            </p:cNvPicPr>
+            <p:nvPr/>
+          </p:nvPicPr>
+          <p:blipFill rotWithShape="1">
+            <a:blip r:embed="rId8">
+              <a:extLst>
+                <a:ext uri="{BEBA8EAE-BF5A-486C-A8C5-ECC9F3942E4B}">
+                  <a14:imgProps xmlns:a14="http://schemas.microsoft.com/office/drawing/2010/main">
+                    <a14:imgLayer r:embed="rId9">
+                      <a14:imgEffect>
+                        <a14:sharpenSoften amount="30000"/>
+                      </a14:imgEffect>
+                    </a14:imgLayer>
+                  </a14:imgProps>
+                </a:ext>
+              </a:extLst>
+            </a:blip>
+            <a:srcRect l="3014" r="4772"/>
+            <a:stretch/>
+          </p:blipFill>
+          <p:spPr>
+            <a:xfrm>
+              <a:off x="4354134" y="266137"/>
+              <a:ext cx="4418925" cy="2857338"/>
+            </a:xfrm>
+            <a:prstGeom prst="rect">
+              <a:avLst/>
+            </a:prstGeom>
+            <a:ln w="38100" cmpd="sng">
+              <a:solidFill>
+                <a:srgbClr val="0000FF"/>
+              </a:solidFill>
+            </a:ln>
+          </p:spPr>
+        </p:pic>
+        <p:sp>
+          <p:nvSpPr>
+            <p:cNvPr id="8" name="Rectangle 7"/>
+            <p:cNvSpPr/>
+            <p:nvPr/>
+          </p:nvSpPr>
+          <p:spPr>
+            <a:xfrm rot="20348387">
+              <a:off x="1810437" y="788816"/>
+              <a:ext cx="1236311" cy="510590"/>
+            </a:xfrm>
+            <a:prstGeom prst="rect">
+              <a:avLst/>
+            </a:prstGeom>
+            <a:noFill/>
+            <a:ln w="38100" cmpd="sng">
+              <a:solidFill>
+                <a:srgbClr val="0000FF"/>
+              </a:solidFill>
+            </a:ln>
+          </p:spPr>
+          <p:style>
+            <a:lnRef idx="1">
+              <a:schemeClr val="accent1"/>
+            </a:lnRef>
+            <a:fillRef idx="3">
+              <a:schemeClr val="accent1"/>
+            </a:fillRef>
+            <a:effectRef idx="2">
+              <a:schemeClr val="accent1"/>
+            </a:effectRef>
+            <a:fontRef idx="minor">
+              <a:schemeClr val="lt1"/>
+            </a:fontRef>
+          </p:style>
+          <p:txBody>
+            <a:bodyPr rtlCol="0" anchor="ctr"/>
+            <a:lstStyle/>
+            <a:p>
+              <a:pPr algn="ctr"/>
+              <a:endParaRPr lang="en-US"/>
+            </a:p>
+          </p:txBody>
+        </p:sp>
+        <p:sp>
+          <p:nvSpPr>
+            <p:cNvPr id="9" name="Rectangle 8"/>
+            <p:cNvSpPr/>
+            <p:nvPr/>
+          </p:nvSpPr>
+          <p:spPr>
+            <a:xfrm rot="5400000">
+              <a:off x="1515344" y="3926517"/>
+              <a:ext cx="999998" cy="510590"/>
+            </a:xfrm>
+            <a:prstGeom prst="rect">
+              <a:avLst/>
+            </a:prstGeom>
+            <a:noFill/>
+            <a:ln w="38100" cmpd="sng">
+              <a:solidFill>
+                <a:srgbClr val="0000FF"/>
+              </a:solidFill>
+            </a:ln>
+          </p:spPr>
+          <p:style>
+            <a:lnRef idx="1">
+              <a:schemeClr val="accent1"/>
+            </a:lnRef>
+            <a:fillRef idx="3">
+              <a:schemeClr val="accent1"/>
+            </a:fillRef>
+            <a:effectRef idx="2">
+              <a:schemeClr val="accent1"/>
+            </a:effectRef>
+            <a:fontRef idx="minor">
+              <a:schemeClr val="lt1"/>
+            </a:fontRef>
+          </p:style>
+          <p:txBody>
+            <a:bodyPr rtlCol="0" anchor="ctr"/>
+            <a:lstStyle/>
+            <a:p>
+              <a:pPr algn="ctr"/>
+              <a:endParaRPr lang="en-US"/>
+            </a:p>
+          </p:txBody>
+        </p:sp>
+        <p:cxnSp>
+          <p:nvCxnSpPr>
+            <p:cNvPr id="15" name="Straight Arrow Connector 14"/>
+            <p:cNvCxnSpPr/>
+            <p:nvPr/>
+          </p:nvCxnSpPr>
+          <p:spPr>
+            <a:xfrm>
+              <a:off x="2786129" y="1243964"/>
+              <a:ext cx="1423571" cy="258827"/>
+            </a:xfrm>
+            <a:prstGeom prst="straightConnector1">
+              <a:avLst/>
+            </a:prstGeom>
+            <a:ln w="38100" cmpd="sng">
+              <a:solidFill>
+                <a:srgbClr val="0000FF"/>
+              </a:solidFill>
+              <a:tailEnd type="arrow"/>
+            </a:ln>
+          </p:spPr>
+          <p:style>
+            <a:lnRef idx="2">
+              <a:schemeClr val="accent1"/>
+            </a:lnRef>
+            <a:fillRef idx="0">
+              <a:schemeClr val="accent1"/>
+            </a:fillRef>
+            <a:effectRef idx="1">
+              <a:schemeClr val="accent1"/>
+            </a:effectRef>
+            <a:fontRef idx="minor">
+              <a:schemeClr val="tx1"/>
+            </a:fontRef>
+          </p:style>
+        </p:cxnSp>
+        <p:cxnSp>
+          <p:nvCxnSpPr>
+            <p:cNvPr id="17" name="Straight Arrow Connector 16"/>
+            <p:cNvCxnSpPr/>
+            <p:nvPr/>
+          </p:nvCxnSpPr>
+          <p:spPr>
+            <a:xfrm>
+              <a:off x="2385351" y="4221199"/>
+              <a:ext cx="2098370" cy="0"/>
+            </a:xfrm>
+            <a:prstGeom prst="straightConnector1">
+              <a:avLst/>
+            </a:prstGeom>
+            <a:ln w="38100" cmpd="sng">
+              <a:solidFill>
+                <a:srgbClr val="0000FF"/>
+              </a:solidFill>
+              <a:tailEnd type="arrow"/>
+            </a:ln>
+          </p:spPr>
+          <p:style>
+            <a:lnRef idx="2">
+              <a:schemeClr val="accent1"/>
+            </a:lnRef>
+            <a:fillRef idx="0">
+              <a:schemeClr val="accent1"/>
+            </a:fillRef>
+            <a:effectRef idx="1">
+              <a:schemeClr val="accent1"/>
+            </a:effectRef>
+            <a:fontRef idx="minor">
+              <a:schemeClr val="tx1"/>
+            </a:fontRef>
+          </p:style>
+        </p:cxnSp>
+        <p:sp>
+          <p:nvSpPr>
+            <p:cNvPr id="19" name="TextBox 18"/>
+            <p:cNvSpPr txBox="1"/>
+            <p:nvPr/>
+          </p:nvSpPr>
+          <p:spPr>
+            <a:xfrm>
+              <a:off x="283115" y="585431"/>
+              <a:ext cx="442574" cy="523220"/>
+            </a:xfrm>
+            <a:prstGeom prst="rect">
+              <a:avLst/>
+            </a:prstGeom>
+            <a:noFill/>
+            <a:ln>
+              <a:noFill/>
+            </a:ln>
+          </p:spPr>
+          <p:txBody>
+            <a:bodyPr wrap="none" rtlCol="0">
+              <a:spAutoFit/>
+            </a:bodyPr>
+            <a:lstStyle/>
+            <a:p>
+              <a:r>
+                <a:rPr lang="en-US" sz="2800" b="1" dirty="0" smtClean="0">
+                  <a:solidFill>
+                    <a:srgbClr val="0000FF"/>
+                  </a:solidFill>
+                </a:rPr>
+                <a:t>Si</a:t>
+              </a:r>
+              <a:endParaRPr lang="en-US" sz="2800" b="1" dirty="0">
                 <a:solidFill>
                   <a:srgbClr val="0000FF"/>
                 </a:solidFill>
-              </a:ln>
-            </p:spPr>
-          </p:pic>
-          <p:pic>
-            <p:nvPicPr>
-              <p:cNvPr id="7" name="Picture 6"/>
-              <p:cNvPicPr>
-                <a:picLocks noChangeAspect="1"/>
-              </p:cNvPicPr>
-              <p:nvPr/>
-            </p:nvPicPr>
-            <p:blipFill rotWithShape="1">
-              <a:blip r:embed="rId8">
-                <a:extLst>
-                  <a:ext uri="{BEBA8EAE-BF5A-486C-A8C5-ECC9F3942E4B}">
-                    <a14:imgProps xmlns:a14="http://schemas.microsoft.com/office/drawing/2010/main">
-                      <a14:imgLayer r:embed="rId9">
-                        <a14:imgEffect>
-                          <a14:sharpenSoften amount="30000"/>
-                        </a14:imgEffect>
-                      </a14:imgLayer>
-                    </a14:imgProps>
-                  </a:ext>
-                </a:extLst>
-              </a:blip>
-              <a:srcRect l="3014" r="4772"/>
-              <a:stretch/>
-            </p:blipFill>
-            <p:spPr>
-              <a:xfrm>
-                <a:off x="4354134" y="266137"/>
-                <a:ext cx="4418925" cy="2857338"/>
-              </a:xfrm>
-              <a:prstGeom prst="rect">
-                <a:avLst/>
-              </a:prstGeom>
-              <a:ln w="38100" cmpd="sng">
+              </a:endParaRPr>
+            </a:p>
+          </p:txBody>
+        </p:sp>
+        <p:sp>
+          <p:nvSpPr>
+            <p:cNvPr id="20" name="TextBox 19"/>
+            <p:cNvSpPr txBox="1"/>
+            <p:nvPr/>
+          </p:nvSpPr>
+          <p:spPr>
+            <a:xfrm>
+              <a:off x="0" y="3385085"/>
+              <a:ext cx="951553" cy="523220"/>
+            </a:xfrm>
+            <a:prstGeom prst="rect">
+              <a:avLst/>
+            </a:prstGeom>
+            <a:noFill/>
+            <a:ln>
+              <a:noFill/>
+            </a:ln>
+          </p:spPr>
+          <p:txBody>
+            <a:bodyPr wrap="none" rtlCol="0">
+              <a:spAutoFit/>
+            </a:bodyPr>
+            <a:lstStyle/>
+            <a:p>
+              <a:r>
+                <a:rPr lang="en-US" sz="2800" b="1" dirty="0" err="1" smtClean="0">
+                  <a:solidFill>
+                    <a:srgbClr val="0000FF"/>
+                  </a:solidFill>
+                </a:rPr>
+                <a:t>GaAs</a:t>
+              </a:r>
+              <a:endParaRPr lang="en-US" sz="2800" b="1" dirty="0">
                 <a:solidFill>
                   <a:srgbClr val="0000FF"/>
                 </a:solidFill>
-              </a:ln>
-            </p:spPr>
-          </p:pic>
-          <p:sp>
-            <p:nvSpPr>
-              <p:cNvPr id="8" name="Rectangle 7"/>
-              <p:cNvSpPr/>
-              <p:nvPr/>
-            </p:nvSpPr>
-            <p:spPr>
-              <a:xfrm rot="20348387">
-                <a:off x="1810437" y="788816"/>
-                <a:ext cx="1236311" cy="510590"/>
-              </a:xfrm>
-              <a:prstGeom prst="rect">
-                <a:avLst/>
-              </a:prstGeom>
+              </a:endParaRPr>
+            </a:p>
+          </p:txBody>
+        </p:sp>
+        <p:sp>
+          <p:nvSpPr>
+            <p:cNvPr id="23" name="Rectangle 22"/>
+            <p:cNvSpPr/>
+            <p:nvPr/>
+          </p:nvSpPr>
+          <p:spPr>
+            <a:xfrm>
+              <a:off x="7723403" y="1878904"/>
+              <a:ext cx="907110" cy="1049595"/>
+            </a:xfrm>
+            <a:prstGeom prst="rect">
+              <a:avLst/>
+            </a:prstGeom>
+            <a:solidFill>
+              <a:schemeClr val="bg1"/>
+            </a:solidFill>
+            <a:ln>
               <a:noFill/>
-              <a:ln w="38100" cmpd="sng">
-                <a:solidFill>
-                  <a:srgbClr val="0000FF"/>
-                </a:solidFill>
-              </a:ln>
-            </p:spPr>
-            <p:style>
-              <a:lnRef idx="1">
-                <a:schemeClr val="accent1"/>
-              </a:lnRef>
-              <a:fillRef idx="3">
-                <a:schemeClr val="accent1"/>
-              </a:fillRef>
-              <a:effectRef idx="2">
-                <a:schemeClr val="accent1"/>
-              </a:effectRef>
-              <a:fontRef idx="minor">
-                <a:schemeClr val="lt1"/>
-              </a:fontRef>
-            </p:style>
-            <p:txBody>
-              <a:bodyPr rtlCol="0" anchor="ctr"/>
-              <a:lstStyle/>
-              <a:p>
-                <a:pPr algn="ctr"/>
-                <a:endParaRPr lang="en-US"/>
-              </a:p>
-            </p:txBody>
-          </p:sp>
-          <p:sp>
-            <p:nvSpPr>
-              <p:cNvPr id="9" name="Rectangle 8"/>
-              <p:cNvSpPr/>
-              <p:nvPr/>
-            </p:nvSpPr>
-            <p:spPr>
-              <a:xfrm rot="5400000">
-                <a:off x="1515344" y="3926517"/>
-                <a:ext cx="999998" cy="510590"/>
-              </a:xfrm>
-              <a:prstGeom prst="rect">
-                <a:avLst/>
-              </a:prstGeom>
+            </a:ln>
+            <a:effectLst/>
+          </p:spPr>
+          <p:style>
+            <a:lnRef idx="1">
+              <a:schemeClr val="accent1"/>
+            </a:lnRef>
+            <a:fillRef idx="3">
+              <a:schemeClr val="accent1"/>
+            </a:fillRef>
+            <a:effectRef idx="2">
+              <a:schemeClr val="accent1"/>
+            </a:effectRef>
+            <a:fontRef idx="minor">
+              <a:schemeClr val="lt1"/>
+            </a:fontRef>
+          </p:style>
+          <p:txBody>
+            <a:bodyPr rtlCol="0" anchor="ctr"/>
+            <a:lstStyle/>
+            <a:p>
+              <a:pPr algn="ctr"/>
+              <a:endParaRPr lang="en-US"/>
+            </a:p>
+          </p:txBody>
+        </p:sp>
+        <p:sp>
+          <p:nvSpPr>
+            <p:cNvPr id="24" name="Rectangle 23"/>
+            <p:cNvSpPr/>
+            <p:nvPr/>
+          </p:nvSpPr>
+          <p:spPr>
+            <a:xfrm>
+              <a:off x="4742895" y="4807403"/>
+              <a:ext cx="730188" cy="971847"/>
+            </a:xfrm>
+            <a:prstGeom prst="rect">
+              <a:avLst/>
+            </a:prstGeom>
+            <a:solidFill>
+              <a:schemeClr val="bg1"/>
+            </a:solidFill>
+            <a:ln>
               <a:noFill/>
-              <a:ln w="38100" cmpd="sng">
-                <a:solidFill>
-                  <a:srgbClr val="0000FF"/>
-                </a:solidFill>
-              </a:ln>
-            </p:spPr>
-            <p:style>
-              <a:lnRef idx="1">
-                <a:schemeClr val="accent1"/>
-              </a:lnRef>
-              <a:fillRef idx="3">
-                <a:schemeClr val="accent1"/>
-              </a:fillRef>
-              <a:effectRef idx="2">
-                <a:schemeClr val="accent1"/>
-              </a:effectRef>
-              <a:fontRef idx="minor">
-                <a:schemeClr val="lt1"/>
-              </a:fontRef>
-            </p:style>
-            <p:txBody>
-              <a:bodyPr rtlCol="0" anchor="ctr"/>
-              <a:lstStyle/>
-              <a:p>
-                <a:pPr algn="ctr"/>
-                <a:endParaRPr lang="en-US"/>
-              </a:p>
-            </p:txBody>
-          </p:sp>
-          <p:cxnSp>
-            <p:nvCxnSpPr>
-              <p:cNvPr id="15" name="Straight Arrow Connector 14"/>
-              <p:cNvCxnSpPr/>
-              <p:nvPr/>
-            </p:nvCxnSpPr>
-            <p:spPr>
-              <a:xfrm>
-                <a:off x="2786129" y="1243964"/>
-                <a:ext cx="1423571" cy="258827"/>
-              </a:xfrm>
-              <a:prstGeom prst="straightConnector1">
-                <a:avLst/>
-              </a:prstGeom>
-              <a:ln w="38100" cmpd="sng">
-                <a:solidFill>
-                  <a:srgbClr val="0000FF"/>
-                </a:solidFill>
-                <a:tailEnd type="arrow"/>
-              </a:ln>
-            </p:spPr>
-            <p:style>
-              <a:lnRef idx="2">
-                <a:schemeClr val="accent1"/>
-              </a:lnRef>
-              <a:fillRef idx="0">
-                <a:schemeClr val="accent1"/>
-              </a:fillRef>
-              <a:effectRef idx="1">
-                <a:schemeClr val="accent1"/>
-              </a:effectRef>
-              <a:fontRef idx="minor">
-                <a:schemeClr val="tx1"/>
-              </a:fontRef>
-            </p:style>
-          </p:cxnSp>
-          <p:cxnSp>
-            <p:nvCxnSpPr>
-              <p:cNvPr id="17" name="Straight Arrow Connector 16"/>
-              <p:cNvCxnSpPr/>
-              <p:nvPr/>
-            </p:nvCxnSpPr>
-            <p:spPr>
-              <a:xfrm>
-                <a:off x="2385351" y="4221199"/>
-                <a:ext cx="2098370" cy="0"/>
-              </a:xfrm>
-              <a:prstGeom prst="straightConnector1">
-                <a:avLst/>
-              </a:prstGeom>
-              <a:ln w="38100" cmpd="sng">
-                <a:solidFill>
-                  <a:srgbClr val="0000FF"/>
-                </a:solidFill>
-                <a:tailEnd type="arrow"/>
-              </a:ln>
-            </p:spPr>
-            <p:style>
-              <a:lnRef idx="2">
-                <a:schemeClr val="accent1"/>
-              </a:lnRef>
-              <a:fillRef idx="0">
-                <a:schemeClr val="accent1"/>
-              </a:fillRef>
-              <a:effectRef idx="1">
-                <a:schemeClr val="accent1"/>
-              </a:effectRef>
-              <a:fontRef idx="minor">
-                <a:schemeClr val="tx1"/>
-              </a:fontRef>
-            </p:style>
-          </p:cxnSp>
-          <p:sp>
-            <p:nvSpPr>
-              <p:cNvPr id="19" name="TextBox 18"/>
-              <p:cNvSpPr txBox="1"/>
-              <p:nvPr/>
-            </p:nvSpPr>
-            <p:spPr>
-              <a:xfrm>
-                <a:off x="283115" y="585431"/>
-                <a:ext cx="442574" cy="523220"/>
-              </a:xfrm>
-              <a:prstGeom prst="rect">
-                <a:avLst/>
-              </a:prstGeom>
-              <a:noFill/>
-              <a:ln>
-                <a:noFill/>
-              </a:ln>
-            </p:spPr>
-            <p:txBody>
-              <a:bodyPr wrap="none" rtlCol="0">
-                <a:spAutoFit/>
-              </a:bodyPr>
-              <a:lstStyle/>
-              <a:p>
-                <a:r>
-                  <a:rPr lang="en-US" sz="2800" b="1" dirty="0" smtClean="0">
-                    <a:solidFill>
-                      <a:srgbClr val="0000FF"/>
-                    </a:solidFill>
-                  </a:rPr>
-                  <a:t>Si</a:t>
-                </a:r>
-                <a:endParaRPr lang="en-US" sz="2800" b="1" dirty="0">
-                  <a:solidFill>
-                    <a:srgbClr val="0000FF"/>
-                  </a:solidFill>
-                </a:endParaRPr>
-              </a:p>
-            </p:txBody>
-          </p:sp>
-          <p:sp>
-            <p:nvSpPr>
-              <p:cNvPr id="20" name="TextBox 19"/>
-              <p:cNvSpPr txBox="1"/>
-              <p:nvPr/>
-            </p:nvSpPr>
-            <p:spPr>
-              <a:xfrm>
-                <a:off x="0" y="3385085"/>
-                <a:ext cx="951553" cy="523220"/>
-              </a:xfrm>
-              <a:prstGeom prst="rect">
-                <a:avLst/>
-              </a:prstGeom>
-              <a:noFill/>
-              <a:ln>
-                <a:noFill/>
-              </a:ln>
-            </p:spPr>
-            <p:txBody>
-              <a:bodyPr wrap="none" rtlCol="0">
-                <a:spAutoFit/>
-              </a:bodyPr>
-              <a:lstStyle/>
-              <a:p>
-                <a:r>
-                  <a:rPr lang="en-US" sz="2800" b="1" dirty="0" err="1" smtClean="0">
-                    <a:solidFill>
-                      <a:srgbClr val="0000FF"/>
-                    </a:solidFill>
-                  </a:rPr>
-                  <a:t>GaAs</a:t>
-                </a:r>
-                <a:endParaRPr lang="en-US" sz="2800" b="1" dirty="0">
-                  <a:solidFill>
-                    <a:srgbClr val="0000FF"/>
-                  </a:solidFill>
-                </a:endParaRPr>
-              </a:p>
-            </p:txBody>
-          </p:sp>
-          <p:sp>
-            <p:nvSpPr>
-              <p:cNvPr id="23" name="Rectangle 22"/>
-              <p:cNvSpPr/>
-              <p:nvPr/>
-            </p:nvSpPr>
-            <p:spPr>
-              <a:xfrm>
-                <a:off x="7723403" y="1878904"/>
-                <a:ext cx="907110" cy="1049595"/>
-              </a:xfrm>
-              <a:prstGeom prst="rect">
-                <a:avLst/>
-              </a:prstGeom>
-              <a:solidFill>
-                <a:schemeClr val="bg1"/>
-              </a:solidFill>
-              <a:ln>
-                <a:noFill/>
-              </a:ln>
-              <a:effectLst/>
-            </p:spPr>
-            <p:style>
-              <a:lnRef idx="1">
-                <a:schemeClr val="accent1"/>
-              </a:lnRef>
-              <a:fillRef idx="3">
-                <a:schemeClr val="accent1"/>
-              </a:fillRef>
-              <a:effectRef idx="2">
-                <a:schemeClr val="accent1"/>
-              </a:effectRef>
-              <a:fontRef idx="minor">
-                <a:schemeClr val="lt1"/>
-              </a:fontRef>
-            </p:style>
-            <p:txBody>
-              <a:bodyPr rtlCol="0" anchor="ctr"/>
-              <a:lstStyle/>
-              <a:p>
-                <a:pPr algn="ctr"/>
-                <a:endParaRPr lang="en-US"/>
-              </a:p>
-            </p:txBody>
-          </p:sp>
-          <p:sp>
-            <p:nvSpPr>
-              <p:cNvPr id="24" name="Rectangle 23"/>
-              <p:cNvSpPr/>
-              <p:nvPr/>
-            </p:nvSpPr>
-            <p:spPr>
-              <a:xfrm>
-                <a:off x="4742895" y="4807403"/>
-                <a:ext cx="730188" cy="971847"/>
-              </a:xfrm>
-              <a:prstGeom prst="rect">
-                <a:avLst/>
-              </a:prstGeom>
-              <a:solidFill>
-                <a:schemeClr val="bg1"/>
-              </a:solidFill>
-              <a:ln>
-                <a:noFill/>
-              </a:ln>
-              <a:effectLst/>
-            </p:spPr>
-            <p:style>
-              <a:lnRef idx="1">
-                <a:schemeClr val="accent1"/>
-              </a:lnRef>
-              <a:fillRef idx="3">
-                <a:schemeClr val="accent1"/>
-              </a:fillRef>
-              <a:effectRef idx="2">
-                <a:schemeClr val="accent1"/>
-              </a:effectRef>
-              <a:fontRef idx="minor">
-                <a:schemeClr val="lt1"/>
-              </a:fontRef>
-            </p:style>
-            <p:txBody>
-              <a:bodyPr rtlCol="0" anchor="ctr"/>
-              <a:lstStyle/>
-              <a:p>
-                <a:pPr algn="ctr"/>
-                <a:endParaRPr lang="en-US"/>
-              </a:p>
-            </p:txBody>
-          </p:sp>
-        </p:grpSp>
+            </a:ln>
+            <a:effectLst/>
+          </p:spPr>
+          <p:style>
+            <a:lnRef idx="1">
+              <a:schemeClr val="accent1"/>
+            </a:lnRef>
+            <a:fillRef idx="3">
+              <a:schemeClr val="accent1"/>
+            </a:fillRef>
+            <a:effectRef idx="2">
+              <a:schemeClr val="accent1"/>
+            </a:effectRef>
+            <a:fontRef idx="minor">
+              <a:schemeClr val="lt1"/>
+            </a:fontRef>
+          </p:style>
+          <p:txBody>
+            <a:bodyPr rtlCol="0" anchor="ctr"/>
+            <a:lstStyle/>
+            <a:p>
+              <a:pPr algn="ctr"/>
+              <a:endParaRPr lang="en-US"/>
+            </a:p>
+          </p:txBody>
+        </p:sp>
       </p:grpSp>
     </p:spTree>
     <p:extLst>

</xml_diff>

<commit_message>
More work on defect theory section
</commit_message>
<xml_diff>
--- a/figures.pptx
+++ b/figures.pptx
@@ -15,6 +15,9 @@
     <p:sldId id="263" r:id="rId9"/>
     <p:sldId id="264" r:id="rId10"/>
     <p:sldId id="265" r:id="rId11"/>
+    <p:sldId id="267" r:id="rId12"/>
+    <p:sldId id="266" r:id="rId13"/>
+    <p:sldId id="268" r:id="rId14"/>
   </p:sldIdLst>
   <p:sldSz cx="9144000" cy="6858000" type="screen4x3"/>
   <p:notesSz cx="6858000" cy="9144000"/>
@@ -3176,6 +3179,1842 @@
           <a:chExt cx="0" cy="0"/>
         </a:xfrm>
       </p:grpSpPr>
+      <p:grpSp>
+        <p:nvGrpSpPr>
+          <p:cNvPr id="36" name="Group 35"/>
+          <p:cNvGrpSpPr/>
+          <p:nvPr/>
+        </p:nvGrpSpPr>
+        <p:grpSpPr>
+          <a:xfrm>
+            <a:off x="197531" y="1207939"/>
+            <a:ext cx="6903853" cy="3736942"/>
+            <a:chOff x="197531" y="1207939"/>
+            <a:chExt cx="6903853" cy="3736942"/>
+          </a:xfrm>
+        </p:grpSpPr>
+        <p:grpSp>
+          <p:nvGrpSpPr>
+            <p:cNvPr id="33" name="Group 32"/>
+            <p:cNvGrpSpPr/>
+            <p:nvPr/>
+          </p:nvGrpSpPr>
+          <p:grpSpPr>
+            <a:xfrm>
+              <a:off x="197531" y="1581403"/>
+              <a:ext cx="6903853" cy="3363478"/>
+              <a:chOff x="197531" y="1581403"/>
+              <a:chExt cx="6903853" cy="3363478"/>
+            </a:xfrm>
+          </p:grpSpPr>
+          <p:pic>
+            <p:nvPicPr>
+              <p:cNvPr id="4" name="Picture 3"/>
+              <p:cNvPicPr>
+                <a:picLocks noChangeAspect="1"/>
+              </p:cNvPicPr>
+              <p:nvPr/>
+            </p:nvPicPr>
+            <p:blipFill>
+              <a:blip r:embed="rId2"/>
+              <a:stretch>
+                <a:fillRect/>
+              </a:stretch>
+            </p:blipFill>
+            <p:spPr>
+              <a:xfrm>
+                <a:off x="197531" y="1741427"/>
+                <a:ext cx="3358061" cy="3203454"/>
+              </a:xfrm>
+              <a:prstGeom prst="rect">
+                <a:avLst/>
+              </a:prstGeom>
+            </p:spPr>
+          </p:pic>
+          <p:pic>
+            <p:nvPicPr>
+              <p:cNvPr id="5" name="Picture 4"/>
+              <p:cNvPicPr>
+                <a:picLocks noChangeAspect="1"/>
+              </p:cNvPicPr>
+              <p:nvPr/>
+            </p:nvPicPr>
+            <p:blipFill>
+              <a:blip r:embed="rId3"/>
+              <a:stretch>
+                <a:fillRect/>
+              </a:stretch>
+            </p:blipFill>
+            <p:spPr>
+              <a:xfrm>
+                <a:off x="3491895" y="1650721"/>
+                <a:ext cx="3609489" cy="3233235"/>
+              </a:xfrm>
+              <a:prstGeom prst="rect">
+                <a:avLst/>
+              </a:prstGeom>
+            </p:spPr>
+          </p:pic>
+          <p:sp>
+            <p:nvSpPr>
+              <p:cNvPr id="8" name="TextBox 7"/>
+              <p:cNvSpPr txBox="1"/>
+              <p:nvPr/>
+            </p:nvSpPr>
+            <p:spPr>
+              <a:xfrm>
+                <a:off x="1259074" y="1640780"/>
+                <a:ext cx="377026" cy="584776"/>
+              </a:xfrm>
+              <a:prstGeom prst="rect">
+                <a:avLst/>
+              </a:prstGeom>
+              <a:noFill/>
+            </p:spPr>
+            <p:txBody>
+              <a:bodyPr wrap="none" rtlCol="0">
+                <a:spAutoFit/>
+              </a:bodyPr>
+              <a:lstStyle/>
+              <a:p>
+                <a:r>
+                  <a:rPr lang="en-US" sz="3200" b="1" dirty="0" smtClean="0">
+                    <a:solidFill>
+                      <a:schemeClr val="bg1">
+                        <a:lumMod val="50000"/>
+                      </a:schemeClr>
+                    </a:solidFill>
+                  </a:rPr>
+                  <a:t>x</a:t>
+                </a:r>
+                <a:endParaRPr lang="en-US" sz="3200" b="1" dirty="0">
+                  <a:solidFill>
+                    <a:schemeClr val="bg1">
+                      <a:lumMod val="50000"/>
+                    </a:schemeClr>
+                  </a:solidFill>
+                </a:endParaRPr>
+              </a:p>
+            </p:txBody>
+          </p:sp>
+          <p:sp>
+            <p:nvSpPr>
+              <p:cNvPr id="9" name="TextBox 8"/>
+              <p:cNvSpPr txBox="1"/>
+              <p:nvPr/>
+            </p:nvSpPr>
+            <p:spPr>
+              <a:xfrm>
+                <a:off x="681816" y="2185284"/>
+                <a:ext cx="377026" cy="584776"/>
+              </a:xfrm>
+              <a:prstGeom prst="rect">
+                <a:avLst/>
+              </a:prstGeom>
+              <a:noFill/>
+            </p:spPr>
+            <p:txBody>
+              <a:bodyPr wrap="none" rtlCol="0">
+                <a:spAutoFit/>
+              </a:bodyPr>
+              <a:lstStyle/>
+              <a:p>
+                <a:r>
+                  <a:rPr lang="en-US" sz="3200" b="1" dirty="0" smtClean="0">
+                    <a:solidFill>
+                      <a:schemeClr val="bg1">
+                        <a:lumMod val="50000"/>
+                      </a:schemeClr>
+                    </a:solidFill>
+                  </a:rPr>
+                  <a:t>x</a:t>
+                </a:r>
+                <a:endParaRPr lang="en-US" sz="3200" b="1" dirty="0">
+                  <a:solidFill>
+                    <a:schemeClr val="bg1">
+                      <a:lumMod val="50000"/>
+                    </a:schemeClr>
+                  </a:solidFill>
+                </a:endParaRPr>
+              </a:p>
+            </p:txBody>
+          </p:sp>
+          <p:sp>
+            <p:nvSpPr>
+              <p:cNvPr id="6" name="Rectangle 5"/>
+              <p:cNvSpPr/>
+              <p:nvPr/>
+            </p:nvSpPr>
+            <p:spPr>
+              <a:xfrm>
+                <a:off x="852567" y="1971482"/>
+                <a:ext cx="595020" cy="586116"/>
+              </a:xfrm>
+              <a:prstGeom prst="rect">
+                <a:avLst/>
+              </a:prstGeom>
+              <a:noFill/>
+              <a:ln w="50800">
+                <a:solidFill>
+                  <a:schemeClr val="tx1"/>
+                </a:solidFill>
+                <a:prstDash val="sysDash"/>
+              </a:ln>
+            </p:spPr>
+            <p:style>
+              <a:lnRef idx="1">
+                <a:schemeClr val="accent1"/>
+              </a:lnRef>
+              <a:fillRef idx="3">
+                <a:schemeClr val="accent1"/>
+              </a:fillRef>
+              <a:effectRef idx="2">
+                <a:schemeClr val="accent1"/>
+              </a:effectRef>
+              <a:fontRef idx="minor">
+                <a:schemeClr val="lt1"/>
+              </a:fontRef>
+            </p:style>
+            <p:txBody>
+              <a:bodyPr rtlCol="0" anchor="ctr"/>
+              <a:lstStyle/>
+              <a:p>
+                <a:pPr algn="ctr"/>
+                <a:endParaRPr lang="en-US"/>
+              </a:p>
+            </p:txBody>
+          </p:sp>
+          <p:sp>
+            <p:nvSpPr>
+              <p:cNvPr id="10" name="TextBox 9"/>
+              <p:cNvSpPr txBox="1"/>
+              <p:nvPr/>
+            </p:nvSpPr>
+            <p:spPr>
+              <a:xfrm>
+                <a:off x="2415015" y="1608049"/>
+                <a:ext cx="377026" cy="584776"/>
+              </a:xfrm>
+              <a:prstGeom prst="rect">
+                <a:avLst/>
+              </a:prstGeom>
+              <a:noFill/>
+            </p:spPr>
+            <p:txBody>
+              <a:bodyPr wrap="none" rtlCol="0">
+                <a:spAutoFit/>
+              </a:bodyPr>
+              <a:lstStyle/>
+              <a:p>
+                <a:r>
+                  <a:rPr lang="en-US" sz="3200" b="1" dirty="0" smtClean="0">
+                    <a:solidFill>
+                      <a:schemeClr val="bg1">
+                        <a:lumMod val="50000"/>
+                      </a:schemeClr>
+                    </a:solidFill>
+                  </a:rPr>
+                  <a:t>x</a:t>
+                </a:r>
+                <a:endParaRPr lang="en-US" sz="3200" b="1" dirty="0">
+                  <a:solidFill>
+                    <a:schemeClr val="bg1">
+                      <a:lumMod val="50000"/>
+                    </a:schemeClr>
+                  </a:solidFill>
+                </a:endParaRPr>
+              </a:p>
+            </p:txBody>
+          </p:sp>
+          <p:sp>
+            <p:nvSpPr>
+              <p:cNvPr id="11" name="TextBox 10"/>
+              <p:cNvSpPr txBox="1"/>
+              <p:nvPr/>
+            </p:nvSpPr>
+            <p:spPr>
+              <a:xfrm>
+                <a:off x="1828876" y="2163389"/>
+                <a:ext cx="377026" cy="584776"/>
+              </a:xfrm>
+              <a:prstGeom prst="rect">
+                <a:avLst/>
+              </a:prstGeom>
+              <a:noFill/>
+            </p:spPr>
+            <p:txBody>
+              <a:bodyPr wrap="none" rtlCol="0">
+                <a:spAutoFit/>
+              </a:bodyPr>
+              <a:lstStyle/>
+              <a:p>
+                <a:r>
+                  <a:rPr lang="en-US" sz="3200" b="1" dirty="0" smtClean="0">
+                    <a:solidFill>
+                      <a:schemeClr val="bg1">
+                        <a:lumMod val="50000"/>
+                      </a:schemeClr>
+                    </a:solidFill>
+                  </a:rPr>
+                  <a:t>x</a:t>
+                </a:r>
+                <a:endParaRPr lang="en-US" sz="3200" b="1" dirty="0">
+                  <a:solidFill>
+                    <a:schemeClr val="bg1">
+                      <a:lumMod val="50000"/>
+                    </a:schemeClr>
+                  </a:solidFill>
+                </a:endParaRPr>
+              </a:p>
+            </p:txBody>
+          </p:sp>
+          <p:sp>
+            <p:nvSpPr>
+              <p:cNvPr id="12" name="TextBox 11"/>
+              <p:cNvSpPr txBox="1"/>
+              <p:nvPr/>
+            </p:nvSpPr>
+            <p:spPr>
+              <a:xfrm>
+                <a:off x="672935" y="3347273"/>
+                <a:ext cx="377026" cy="584776"/>
+              </a:xfrm>
+              <a:prstGeom prst="rect">
+                <a:avLst/>
+              </a:prstGeom>
+              <a:noFill/>
+            </p:spPr>
+            <p:txBody>
+              <a:bodyPr wrap="none" rtlCol="0">
+                <a:spAutoFit/>
+              </a:bodyPr>
+              <a:lstStyle/>
+              <a:p>
+                <a:r>
+                  <a:rPr lang="en-US" sz="3200" b="1" dirty="0" smtClean="0">
+                    <a:solidFill>
+                      <a:schemeClr val="bg1">
+                        <a:lumMod val="50000"/>
+                      </a:schemeClr>
+                    </a:solidFill>
+                  </a:rPr>
+                  <a:t>x</a:t>
+                </a:r>
+                <a:endParaRPr lang="en-US" sz="3200" b="1" dirty="0">
+                  <a:solidFill>
+                    <a:schemeClr val="bg1">
+                      <a:lumMod val="50000"/>
+                    </a:schemeClr>
+                  </a:solidFill>
+                </a:endParaRPr>
+              </a:p>
+            </p:txBody>
+          </p:sp>
+          <p:sp>
+            <p:nvSpPr>
+              <p:cNvPr id="13" name="TextBox 12"/>
+              <p:cNvSpPr txBox="1"/>
+              <p:nvPr/>
+            </p:nvSpPr>
+            <p:spPr>
+              <a:xfrm>
+                <a:off x="1828876" y="3345243"/>
+                <a:ext cx="377026" cy="584776"/>
+              </a:xfrm>
+              <a:prstGeom prst="rect">
+                <a:avLst/>
+              </a:prstGeom>
+              <a:noFill/>
+            </p:spPr>
+            <p:txBody>
+              <a:bodyPr wrap="none" rtlCol="0">
+                <a:spAutoFit/>
+              </a:bodyPr>
+              <a:lstStyle/>
+              <a:p>
+                <a:r>
+                  <a:rPr lang="en-US" sz="3200" b="1" dirty="0" smtClean="0">
+                    <a:solidFill>
+                      <a:schemeClr val="bg1">
+                        <a:lumMod val="50000"/>
+                      </a:schemeClr>
+                    </a:solidFill>
+                  </a:rPr>
+                  <a:t>x</a:t>
+                </a:r>
+                <a:endParaRPr lang="en-US" sz="3200" b="1" dirty="0">
+                  <a:solidFill>
+                    <a:schemeClr val="bg1">
+                      <a:lumMod val="50000"/>
+                    </a:schemeClr>
+                  </a:solidFill>
+                </a:endParaRPr>
+              </a:p>
+            </p:txBody>
+          </p:sp>
+          <p:sp>
+            <p:nvSpPr>
+              <p:cNvPr id="14" name="TextBox 13"/>
+              <p:cNvSpPr txBox="1"/>
+              <p:nvPr/>
+            </p:nvSpPr>
+            <p:spPr>
+              <a:xfrm>
+                <a:off x="2992275" y="2162717"/>
+                <a:ext cx="377026" cy="584776"/>
+              </a:xfrm>
+              <a:prstGeom prst="rect">
+                <a:avLst/>
+              </a:prstGeom>
+              <a:noFill/>
+            </p:spPr>
+            <p:txBody>
+              <a:bodyPr wrap="none" rtlCol="0">
+                <a:spAutoFit/>
+              </a:bodyPr>
+              <a:lstStyle/>
+              <a:p>
+                <a:r>
+                  <a:rPr lang="en-US" sz="3200" b="1" dirty="0" smtClean="0">
+                    <a:solidFill>
+                      <a:schemeClr val="bg1">
+                        <a:lumMod val="50000"/>
+                      </a:schemeClr>
+                    </a:solidFill>
+                  </a:rPr>
+                  <a:t>x</a:t>
+                </a:r>
+                <a:endParaRPr lang="en-US" sz="3200" b="1" dirty="0">
+                  <a:solidFill>
+                    <a:schemeClr val="bg1">
+                      <a:lumMod val="50000"/>
+                    </a:schemeClr>
+                  </a:solidFill>
+                </a:endParaRPr>
+              </a:p>
+            </p:txBody>
+          </p:sp>
+          <p:sp>
+            <p:nvSpPr>
+              <p:cNvPr id="15" name="TextBox 14"/>
+              <p:cNvSpPr txBox="1"/>
+              <p:nvPr/>
+            </p:nvSpPr>
+            <p:spPr>
+              <a:xfrm>
+                <a:off x="2992275" y="3347273"/>
+                <a:ext cx="377026" cy="584776"/>
+              </a:xfrm>
+              <a:prstGeom prst="rect">
+                <a:avLst/>
+              </a:prstGeom>
+              <a:noFill/>
+            </p:spPr>
+            <p:txBody>
+              <a:bodyPr wrap="none" rtlCol="0">
+                <a:spAutoFit/>
+              </a:bodyPr>
+              <a:lstStyle/>
+              <a:p>
+                <a:r>
+                  <a:rPr lang="en-US" sz="3200" b="1" dirty="0" smtClean="0">
+                    <a:solidFill>
+                      <a:schemeClr val="bg1">
+                        <a:lumMod val="50000"/>
+                      </a:schemeClr>
+                    </a:solidFill>
+                  </a:rPr>
+                  <a:t>x</a:t>
+                </a:r>
+                <a:endParaRPr lang="en-US" sz="3200" b="1" dirty="0">
+                  <a:solidFill>
+                    <a:schemeClr val="bg1">
+                      <a:lumMod val="50000"/>
+                    </a:schemeClr>
+                  </a:solidFill>
+                </a:endParaRPr>
+              </a:p>
+            </p:txBody>
+          </p:sp>
+          <p:sp>
+            <p:nvSpPr>
+              <p:cNvPr id="16" name="TextBox 15"/>
+              <p:cNvSpPr txBox="1"/>
+              <p:nvPr/>
+            </p:nvSpPr>
+            <p:spPr>
+              <a:xfrm>
+                <a:off x="1259074" y="3927989"/>
+                <a:ext cx="377026" cy="584776"/>
+              </a:xfrm>
+              <a:prstGeom prst="rect">
+                <a:avLst/>
+              </a:prstGeom>
+              <a:noFill/>
+            </p:spPr>
+            <p:txBody>
+              <a:bodyPr wrap="none" rtlCol="0">
+                <a:spAutoFit/>
+              </a:bodyPr>
+              <a:lstStyle/>
+              <a:p>
+                <a:r>
+                  <a:rPr lang="en-US" sz="3200" b="1" dirty="0" smtClean="0">
+                    <a:solidFill>
+                      <a:schemeClr val="bg1">
+                        <a:lumMod val="50000"/>
+                      </a:schemeClr>
+                    </a:solidFill>
+                  </a:rPr>
+                  <a:t>x</a:t>
+                </a:r>
+                <a:endParaRPr lang="en-US" sz="3200" b="1" dirty="0">
+                  <a:solidFill>
+                    <a:schemeClr val="bg1">
+                      <a:lumMod val="50000"/>
+                    </a:schemeClr>
+                  </a:solidFill>
+                </a:endParaRPr>
+              </a:p>
+            </p:txBody>
+          </p:sp>
+          <p:sp>
+            <p:nvSpPr>
+              <p:cNvPr id="17" name="TextBox 16"/>
+              <p:cNvSpPr txBox="1"/>
+              <p:nvPr/>
+            </p:nvSpPr>
+            <p:spPr>
+              <a:xfrm>
+                <a:off x="2423896" y="3930018"/>
+                <a:ext cx="377026" cy="584776"/>
+              </a:xfrm>
+              <a:prstGeom prst="rect">
+                <a:avLst/>
+              </a:prstGeom>
+              <a:noFill/>
+            </p:spPr>
+            <p:txBody>
+              <a:bodyPr wrap="none" rtlCol="0">
+                <a:spAutoFit/>
+              </a:bodyPr>
+              <a:lstStyle/>
+              <a:p>
+                <a:r>
+                  <a:rPr lang="en-US" sz="3200" b="1" dirty="0" smtClean="0">
+                    <a:solidFill>
+                      <a:schemeClr val="bg1">
+                        <a:lumMod val="50000"/>
+                      </a:schemeClr>
+                    </a:solidFill>
+                  </a:rPr>
+                  <a:t>x</a:t>
+                </a:r>
+                <a:endParaRPr lang="en-US" sz="3200" b="1" dirty="0">
+                  <a:solidFill>
+                    <a:schemeClr val="bg1">
+                      <a:lumMod val="50000"/>
+                    </a:schemeClr>
+                  </a:solidFill>
+                </a:endParaRPr>
+              </a:p>
+            </p:txBody>
+          </p:sp>
+          <p:sp>
+            <p:nvSpPr>
+              <p:cNvPr id="18" name="TextBox 17"/>
+              <p:cNvSpPr txBox="1"/>
+              <p:nvPr/>
+            </p:nvSpPr>
+            <p:spPr>
+              <a:xfrm>
+                <a:off x="1267955" y="2760465"/>
+                <a:ext cx="377026" cy="584776"/>
+              </a:xfrm>
+              <a:prstGeom prst="rect">
+                <a:avLst/>
+              </a:prstGeom>
+              <a:noFill/>
+            </p:spPr>
+            <p:txBody>
+              <a:bodyPr wrap="none" rtlCol="0">
+                <a:spAutoFit/>
+              </a:bodyPr>
+              <a:lstStyle/>
+              <a:p>
+                <a:r>
+                  <a:rPr lang="en-US" sz="3200" b="1" dirty="0" smtClean="0">
+                    <a:solidFill>
+                      <a:schemeClr val="bg1">
+                        <a:lumMod val="50000"/>
+                      </a:schemeClr>
+                    </a:solidFill>
+                  </a:rPr>
+                  <a:t>x</a:t>
+                </a:r>
+                <a:endParaRPr lang="en-US" sz="3200" b="1" dirty="0">
+                  <a:solidFill>
+                    <a:schemeClr val="bg1">
+                      <a:lumMod val="50000"/>
+                    </a:schemeClr>
+                  </a:solidFill>
+                </a:endParaRPr>
+              </a:p>
+            </p:txBody>
+          </p:sp>
+          <p:sp>
+            <p:nvSpPr>
+              <p:cNvPr id="19" name="TextBox 18"/>
+              <p:cNvSpPr txBox="1"/>
+              <p:nvPr/>
+            </p:nvSpPr>
+            <p:spPr>
+              <a:xfrm>
+                <a:off x="2423896" y="2750268"/>
+                <a:ext cx="377026" cy="584776"/>
+              </a:xfrm>
+              <a:prstGeom prst="rect">
+                <a:avLst/>
+              </a:prstGeom>
+              <a:noFill/>
+            </p:spPr>
+            <p:txBody>
+              <a:bodyPr wrap="none" rtlCol="0">
+                <a:spAutoFit/>
+              </a:bodyPr>
+              <a:lstStyle/>
+              <a:p>
+                <a:r>
+                  <a:rPr lang="en-US" sz="3200" b="1" dirty="0" smtClean="0">
+                    <a:solidFill>
+                      <a:schemeClr val="bg1">
+                        <a:lumMod val="50000"/>
+                      </a:schemeClr>
+                    </a:solidFill>
+                  </a:rPr>
+                  <a:t>x</a:t>
+                </a:r>
+                <a:endParaRPr lang="en-US" sz="3200" b="1" dirty="0">
+                  <a:solidFill>
+                    <a:schemeClr val="bg1">
+                      <a:lumMod val="50000"/>
+                    </a:schemeClr>
+                  </a:solidFill>
+                </a:endParaRPr>
+              </a:p>
+            </p:txBody>
+          </p:sp>
+          <p:sp>
+            <p:nvSpPr>
+              <p:cNvPr id="20" name="TextBox 19"/>
+              <p:cNvSpPr txBox="1"/>
+              <p:nvPr/>
+            </p:nvSpPr>
+            <p:spPr>
+              <a:xfrm>
+                <a:off x="4137912" y="1585465"/>
+                <a:ext cx="377026" cy="584776"/>
+              </a:xfrm>
+              <a:prstGeom prst="rect">
+                <a:avLst/>
+              </a:prstGeom>
+              <a:noFill/>
+            </p:spPr>
+            <p:txBody>
+              <a:bodyPr wrap="none" rtlCol="0">
+                <a:spAutoFit/>
+              </a:bodyPr>
+              <a:lstStyle/>
+              <a:p>
+                <a:r>
+                  <a:rPr lang="en-US" sz="3200" b="1" dirty="0" smtClean="0">
+                    <a:solidFill>
+                      <a:schemeClr val="bg1">
+                        <a:lumMod val="50000"/>
+                      </a:schemeClr>
+                    </a:solidFill>
+                  </a:rPr>
+                  <a:t>x</a:t>
+                </a:r>
+                <a:endParaRPr lang="en-US" sz="3200" b="1" dirty="0">
+                  <a:solidFill>
+                    <a:schemeClr val="bg1">
+                      <a:lumMod val="50000"/>
+                    </a:schemeClr>
+                  </a:solidFill>
+                </a:endParaRPr>
+              </a:p>
+            </p:txBody>
+          </p:sp>
+          <p:sp>
+            <p:nvSpPr>
+              <p:cNvPr id="21" name="TextBox 20"/>
+              <p:cNvSpPr txBox="1"/>
+              <p:nvPr/>
+            </p:nvSpPr>
+            <p:spPr>
+              <a:xfrm>
+                <a:off x="4715170" y="2139539"/>
+                <a:ext cx="377026" cy="584776"/>
+              </a:xfrm>
+              <a:prstGeom prst="rect">
+                <a:avLst/>
+              </a:prstGeom>
+              <a:noFill/>
+            </p:spPr>
+            <p:txBody>
+              <a:bodyPr wrap="none" rtlCol="0">
+                <a:spAutoFit/>
+              </a:bodyPr>
+              <a:lstStyle/>
+              <a:p>
+                <a:r>
+                  <a:rPr lang="en-US" sz="3200" b="1" dirty="0" smtClean="0">
+                    <a:solidFill>
+                      <a:schemeClr val="bg1">
+                        <a:lumMod val="50000"/>
+                      </a:schemeClr>
+                    </a:solidFill>
+                  </a:rPr>
+                  <a:t>x</a:t>
+                </a:r>
+                <a:endParaRPr lang="en-US" sz="3200" b="1" dirty="0">
+                  <a:solidFill>
+                    <a:schemeClr val="bg1">
+                      <a:lumMod val="50000"/>
+                    </a:schemeClr>
+                  </a:solidFill>
+                </a:endParaRPr>
+              </a:p>
+            </p:txBody>
+          </p:sp>
+          <p:sp>
+            <p:nvSpPr>
+              <p:cNvPr id="22" name="TextBox 21"/>
+              <p:cNvSpPr txBox="1"/>
+              <p:nvPr/>
+            </p:nvSpPr>
+            <p:spPr>
+              <a:xfrm>
+                <a:off x="5319071" y="1581406"/>
+                <a:ext cx="377026" cy="584776"/>
+              </a:xfrm>
+              <a:prstGeom prst="rect">
+                <a:avLst/>
+              </a:prstGeom>
+              <a:noFill/>
+            </p:spPr>
+            <p:txBody>
+              <a:bodyPr wrap="none" rtlCol="0">
+                <a:spAutoFit/>
+              </a:bodyPr>
+              <a:lstStyle/>
+              <a:p>
+                <a:r>
+                  <a:rPr lang="en-US" sz="3200" b="1" dirty="0" smtClean="0">
+                    <a:solidFill>
+                      <a:schemeClr val="bg1">
+                        <a:lumMod val="50000"/>
+                      </a:schemeClr>
+                    </a:solidFill>
+                  </a:rPr>
+                  <a:t>x</a:t>
+                </a:r>
+                <a:endParaRPr lang="en-US" sz="3200" b="1" dirty="0">
+                  <a:solidFill>
+                    <a:schemeClr val="bg1">
+                      <a:lumMod val="50000"/>
+                    </a:schemeClr>
+                  </a:solidFill>
+                </a:endParaRPr>
+              </a:p>
+            </p:txBody>
+          </p:sp>
+          <p:sp>
+            <p:nvSpPr>
+              <p:cNvPr id="23" name="TextBox 22"/>
+              <p:cNvSpPr txBox="1"/>
+              <p:nvPr/>
+            </p:nvSpPr>
+            <p:spPr>
+              <a:xfrm>
+                <a:off x="6500232" y="1581403"/>
+                <a:ext cx="377026" cy="584776"/>
+              </a:xfrm>
+              <a:prstGeom prst="rect">
+                <a:avLst/>
+              </a:prstGeom>
+              <a:noFill/>
+            </p:spPr>
+            <p:txBody>
+              <a:bodyPr wrap="none" rtlCol="0">
+                <a:spAutoFit/>
+              </a:bodyPr>
+              <a:lstStyle/>
+              <a:p>
+                <a:r>
+                  <a:rPr lang="en-US" sz="3200" b="1" dirty="0" smtClean="0">
+                    <a:solidFill>
+                      <a:schemeClr val="bg1">
+                        <a:lumMod val="50000"/>
+                      </a:schemeClr>
+                    </a:solidFill>
+                  </a:rPr>
+                  <a:t>x</a:t>
+                </a:r>
+                <a:endParaRPr lang="en-US" sz="3200" b="1" dirty="0">
+                  <a:solidFill>
+                    <a:schemeClr val="bg1">
+                      <a:lumMod val="50000"/>
+                    </a:schemeClr>
+                  </a:solidFill>
+                </a:endParaRPr>
+              </a:p>
+            </p:txBody>
+          </p:sp>
+          <p:sp>
+            <p:nvSpPr>
+              <p:cNvPr id="24" name="TextBox 23"/>
+              <p:cNvSpPr txBox="1"/>
+              <p:nvPr/>
+            </p:nvSpPr>
+            <p:spPr>
+              <a:xfrm>
+                <a:off x="5914092" y="2162717"/>
+                <a:ext cx="377026" cy="584776"/>
+              </a:xfrm>
+              <a:prstGeom prst="rect">
+                <a:avLst/>
+              </a:prstGeom>
+              <a:noFill/>
+            </p:spPr>
+            <p:txBody>
+              <a:bodyPr wrap="none" rtlCol="0">
+                <a:spAutoFit/>
+              </a:bodyPr>
+              <a:lstStyle/>
+              <a:p>
+                <a:r>
+                  <a:rPr lang="en-US" sz="3200" b="1" dirty="0" smtClean="0">
+                    <a:solidFill>
+                      <a:schemeClr val="bg1">
+                        <a:lumMod val="50000"/>
+                      </a:schemeClr>
+                    </a:solidFill>
+                  </a:rPr>
+                  <a:t>x</a:t>
+                </a:r>
+                <a:endParaRPr lang="en-US" sz="3200" b="1" dirty="0">
+                  <a:solidFill>
+                    <a:schemeClr val="bg1">
+                      <a:lumMod val="50000"/>
+                    </a:schemeClr>
+                  </a:solidFill>
+                </a:endParaRPr>
+              </a:p>
+            </p:txBody>
+          </p:sp>
+          <p:sp>
+            <p:nvSpPr>
+              <p:cNvPr id="25" name="TextBox 24"/>
+              <p:cNvSpPr txBox="1"/>
+              <p:nvPr/>
+            </p:nvSpPr>
+            <p:spPr>
+              <a:xfrm>
+                <a:off x="4113283" y="2770060"/>
+                <a:ext cx="377026" cy="584776"/>
+              </a:xfrm>
+              <a:prstGeom prst="rect">
+                <a:avLst/>
+              </a:prstGeom>
+              <a:noFill/>
+            </p:spPr>
+            <p:txBody>
+              <a:bodyPr wrap="none" rtlCol="0">
+                <a:spAutoFit/>
+              </a:bodyPr>
+              <a:lstStyle/>
+              <a:p>
+                <a:r>
+                  <a:rPr lang="en-US" sz="3200" b="1" dirty="0" smtClean="0">
+                    <a:solidFill>
+                      <a:schemeClr val="bg1">
+                        <a:lumMod val="50000"/>
+                      </a:schemeClr>
+                    </a:solidFill>
+                  </a:rPr>
+                  <a:t>x</a:t>
+                </a:r>
+                <a:endParaRPr lang="en-US" sz="3200" b="1" dirty="0">
+                  <a:solidFill>
+                    <a:schemeClr val="bg1">
+                      <a:lumMod val="50000"/>
+                    </a:schemeClr>
+                  </a:solidFill>
+                </a:endParaRPr>
+              </a:p>
+            </p:txBody>
+          </p:sp>
+          <p:sp>
+            <p:nvSpPr>
+              <p:cNvPr id="26" name="TextBox 25"/>
+              <p:cNvSpPr txBox="1"/>
+              <p:nvPr/>
+            </p:nvSpPr>
+            <p:spPr>
+              <a:xfrm>
+                <a:off x="5319071" y="2760467"/>
+                <a:ext cx="377026" cy="584776"/>
+              </a:xfrm>
+              <a:prstGeom prst="rect">
+                <a:avLst/>
+              </a:prstGeom>
+              <a:noFill/>
+            </p:spPr>
+            <p:txBody>
+              <a:bodyPr wrap="none" rtlCol="0">
+                <a:spAutoFit/>
+              </a:bodyPr>
+              <a:lstStyle/>
+              <a:p>
+                <a:r>
+                  <a:rPr lang="en-US" sz="3200" b="1" dirty="0" smtClean="0">
+                    <a:solidFill>
+                      <a:schemeClr val="bg1">
+                        <a:lumMod val="50000"/>
+                      </a:schemeClr>
+                    </a:solidFill>
+                  </a:rPr>
+                  <a:t>x</a:t>
+                </a:r>
+                <a:endParaRPr lang="en-US" sz="3200" b="1" dirty="0">
+                  <a:solidFill>
+                    <a:schemeClr val="bg1">
+                      <a:lumMod val="50000"/>
+                    </a:schemeClr>
+                  </a:solidFill>
+                </a:endParaRPr>
+              </a:p>
+            </p:txBody>
+          </p:sp>
+          <p:sp>
+            <p:nvSpPr>
+              <p:cNvPr id="27" name="TextBox 26"/>
+              <p:cNvSpPr txBox="1"/>
+              <p:nvPr/>
+            </p:nvSpPr>
+            <p:spPr>
+              <a:xfrm>
+                <a:off x="6500232" y="2770060"/>
+                <a:ext cx="377026" cy="584776"/>
+              </a:xfrm>
+              <a:prstGeom prst="rect">
+                <a:avLst/>
+              </a:prstGeom>
+              <a:noFill/>
+            </p:spPr>
+            <p:txBody>
+              <a:bodyPr wrap="none" rtlCol="0">
+                <a:spAutoFit/>
+              </a:bodyPr>
+              <a:lstStyle/>
+              <a:p>
+                <a:r>
+                  <a:rPr lang="en-US" sz="3200" b="1" dirty="0" smtClean="0">
+                    <a:solidFill>
+                      <a:schemeClr val="bg1">
+                        <a:lumMod val="50000"/>
+                      </a:schemeClr>
+                    </a:solidFill>
+                  </a:rPr>
+                  <a:t>x</a:t>
+                </a:r>
+                <a:endParaRPr lang="en-US" sz="3200" b="1" dirty="0">
+                  <a:solidFill>
+                    <a:schemeClr val="bg1">
+                      <a:lumMod val="50000"/>
+                    </a:schemeClr>
+                  </a:solidFill>
+                </a:endParaRPr>
+              </a:p>
+            </p:txBody>
+          </p:sp>
+          <p:sp>
+            <p:nvSpPr>
+              <p:cNvPr id="28" name="TextBox 27"/>
+              <p:cNvSpPr txBox="1"/>
+              <p:nvPr/>
+            </p:nvSpPr>
+            <p:spPr>
+              <a:xfrm>
+                <a:off x="4137912" y="3932049"/>
+                <a:ext cx="377026" cy="584776"/>
+              </a:xfrm>
+              <a:prstGeom prst="rect">
+                <a:avLst/>
+              </a:prstGeom>
+              <a:noFill/>
+            </p:spPr>
+            <p:txBody>
+              <a:bodyPr wrap="none" rtlCol="0">
+                <a:spAutoFit/>
+              </a:bodyPr>
+              <a:lstStyle/>
+              <a:p>
+                <a:r>
+                  <a:rPr lang="en-US" sz="3200" b="1" dirty="0" smtClean="0">
+                    <a:solidFill>
+                      <a:schemeClr val="bg1">
+                        <a:lumMod val="50000"/>
+                      </a:schemeClr>
+                    </a:solidFill>
+                  </a:rPr>
+                  <a:t>x</a:t>
+                </a:r>
+                <a:endParaRPr lang="en-US" sz="3200" b="1" dirty="0">
+                  <a:solidFill>
+                    <a:schemeClr val="bg1">
+                      <a:lumMod val="50000"/>
+                    </a:schemeClr>
+                  </a:solidFill>
+                </a:endParaRPr>
+              </a:p>
+            </p:txBody>
+          </p:sp>
+          <p:sp>
+            <p:nvSpPr>
+              <p:cNvPr id="29" name="TextBox 28"/>
+              <p:cNvSpPr txBox="1"/>
+              <p:nvPr/>
+            </p:nvSpPr>
+            <p:spPr>
+              <a:xfrm>
+                <a:off x="5319071" y="3958692"/>
+                <a:ext cx="377026" cy="584776"/>
+              </a:xfrm>
+              <a:prstGeom prst="rect">
+                <a:avLst/>
+              </a:prstGeom>
+              <a:noFill/>
+            </p:spPr>
+            <p:txBody>
+              <a:bodyPr wrap="none" rtlCol="0">
+                <a:spAutoFit/>
+              </a:bodyPr>
+              <a:lstStyle/>
+              <a:p>
+                <a:r>
+                  <a:rPr lang="en-US" sz="3200" b="1" dirty="0" smtClean="0">
+                    <a:solidFill>
+                      <a:schemeClr val="bg1">
+                        <a:lumMod val="50000"/>
+                      </a:schemeClr>
+                    </a:solidFill>
+                  </a:rPr>
+                  <a:t>x</a:t>
+                </a:r>
+                <a:endParaRPr lang="en-US" sz="3200" b="1" dirty="0">
+                  <a:solidFill>
+                    <a:schemeClr val="bg1">
+                      <a:lumMod val="50000"/>
+                    </a:schemeClr>
+                  </a:solidFill>
+                </a:endParaRPr>
+              </a:p>
+            </p:txBody>
+          </p:sp>
+          <p:sp>
+            <p:nvSpPr>
+              <p:cNvPr id="30" name="TextBox 29"/>
+              <p:cNvSpPr txBox="1"/>
+              <p:nvPr/>
+            </p:nvSpPr>
+            <p:spPr>
+              <a:xfrm>
+                <a:off x="6500232" y="3951149"/>
+                <a:ext cx="377026" cy="584776"/>
+              </a:xfrm>
+              <a:prstGeom prst="rect">
+                <a:avLst/>
+              </a:prstGeom>
+              <a:noFill/>
+            </p:spPr>
+            <p:txBody>
+              <a:bodyPr wrap="none" rtlCol="0">
+                <a:spAutoFit/>
+              </a:bodyPr>
+              <a:lstStyle/>
+              <a:p>
+                <a:r>
+                  <a:rPr lang="en-US" sz="3200" b="1" dirty="0" smtClean="0">
+                    <a:solidFill>
+                      <a:schemeClr val="bg1">
+                        <a:lumMod val="50000"/>
+                      </a:schemeClr>
+                    </a:solidFill>
+                  </a:rPr>
+                  <a:t>x</a:t>
+                </a:r>
+                <a:endParaRPr lang="en-US" sz="3200" b="1" dirty="0">
+                  <a:solidFill>
+                    <a:schemeClr val="bg1">
+                      <a:lumMod val="50000"/>
+                    </a:schemeClr>
+                  </a:solidFill>
+                </a:endParaRPr>
+              </a:p>
+            </p:txBody>
+          </p:sp>
+          <p:sp>
+            <p:nvSpPr>
+              <p:cNvPr id="31" name="TextBox 30"/>
+              <p:cNvSpPr txBox="1"/>
+              <p:nvPr/>
+            </p:nvSpPr>
+            <p:spPr>
+              <a:xfrm>
+                <a:off x="4715170" y="3373916"/>
+                <a:ext cx="377026" cy="584776"/>
+              </a:xfrm>
+              <a:prstGeom prst="rect">
+                <a:avLst/>
+              </a:prstGeom>
+              <a:noFill/>
+            </p:spPr>
+            <p:txBody>
+              <a:bodyPr wrap="none" rtlCol="0">
+                <a:spAutoFit/>
+              </a:bodyPr>
+              <a:lstStyle/>
+              <a:p>
+                <a:r>
+                  <a:rPr lang="en-US" sz="3200" b="1" dirty="0" smtClean="0">
+                    <a:solidFill>
+                      <a:schemeClr val="bg1">
+                        <a:lumMod val="50000"/>
+                      </a:schemeClr>
+                    </a:solidFill>
+                  </a:rPr>
+                  <a:t>x</a:t>
+                </a:r>
+                <a:endParaRPr lang="en-US" sz="3200" b="1" dirty="0">
+                  <a:solidFill>
+                    <a:schemeClr val="bg1">
+                      <a:lumMod val="50000"/>
+                    </a:schemeClr>
+                  </a:solidFill>
+                </a:endParaRPr>
+              </a:p>
+            </p:txBody>
+          </p:sp>
+          <p:sp>
+            <p:nvSpPr>
+              <p:cNvPr id="32" name="TextBox 31"/>
+              <p:cNvSpPr txBox="1"/>
+              <p:nvPr/>
+            </p:nvSpPr>
+            <p:spPr>
+              <a:xfrm>
+                <a:off x="5914092" y="3354124"/>
+                <a:ext cx="377026" cy="584776"/>
+              </a:xfrm>
+              <a:prstGeom prst="rect">
+                <a:avLst/>
+              </a:prstGeom>
+              <a:noFill/>
+            </p:spPr>
+            <p:txBody>
+              <a:bodyPr wrap="none" rtlCol="0">
+                <a:spAutoFit/>
+              </a:bodyPr>
+              <a:lstStyle/>
+              <a:p>
+                <a:r>
+                  <a:rPr lang="en-US" sz="3200" b="1" dirty="0" smtClean="0">
+                    <a:solidFill>
+                      <a:schemeClr val="bg1">
+                        <a:lumMod val="50000"/>
+                      </a:schemeClr>
+                    </a:solidFill>
+                  </a:rPr>
+                  <a:t>x</a:t>
+                </a:r>
+                <a:endParaRPr lang="en-US" sz="3200" b="1" dirty="0">
+                  <a:solidFill>
+                    <a:schemeClr val="bg1">
+                      <a:lumMod val="50000"/>
+                    </a:schemeClr>
+                  </a:solidFill>
+                </a:endParaRPr>
+              </a:p>
+            </p:txBody>
+          </p:sp>
+          <p:sp>
+            <p:nvSpPr>
+              <p:cNvPr id="7" name="Rectangle 6"/>
+              <p:cNvSpPr/>
+              <p:nvPr/>
+            </p:nvSpPr>
+            <p:spPr>
+              <a:xfrm>
+                <a:off x="4308663" y="1935961"/>
+                <a:ext cx="595020" cy="586116"/>
+              </a:xfrm>
+              <a:prstGeom prst="rect">
+                <a:avLst/>
+              </a:prstGeom>
+              <a:noFill/>
+              <a:ln w="50800">
+                <a:solidFill>
+                  <a:schemeClr val="tx1"/>
+                </a:solidFill>
+                <a:prstDash val="sysDash"/>
+              </a:ln>
+            </p:spPr>
+            <p:style>
+              <a:lnRef idx="1">
+                <a:schemeClr val="accent1"/>
+              </a:lnRef>
+              <a:fillRef idx="3">
+                <a:schemeClr val="accent1"/>
+              </a:fillRef>
+              <a:effectRef idx="2">
+                <a:schemeClr val="accent1"/>
+              </a:effectRef>
+              <a:fontRef idx="minor">
+                <a:schemeClr val="lt1"/>
+              </a:fontRef>
+            </p:style>
+            <p:txBody>
+              <a:bodyPr rtlCol="0" anchor="ctr"/>
+              <a:lstStyle/>
+              <a:p>
+                <a:pPr algn="ctr"/>
+                <a:endParaRPr lang="en-US"/>
+              </a:p>
+            </p:txBody>
+          </p:sp>
+        </p:grpSp>
+        <p:sp>
+          <p:nvSpPr>
+            <p:cNvPr id="34" name="TextBox 33"/>
+            <p:cNvSpPr txBox="1"/>
+            <p:nvPr/>
+          </p:nvSpPr>
+          <p:spPr>
+            <a:xfrm>
+              <a:off x="1754708" y="1207939"/>
+              <a:ext cx="660307" cy="400110"/>
+            </a:xfrm>
+            <a:prstGeom prst="rect">
+              <a:avLst/>
+            </a:prstGeom>
+            <a:noFill/>
+          </p:spPr>
+          <p:txBody>
+            <a:bodyPr wrap="none" rtlCol="0">
+              <a:spAutoFit/>
+            </a:bodyPr>
+            <a:lstStyle/>
+            <a:p>
+              <a:r>
+                <a:rPr lang="en-US" sz="2000" b="1" dirty="0" smtClean="0"/>
+                <a:t>z = 0</a:t>
+              </a:r>
+              <a:endParaRPr lang="en-US" sz="2000" b="1" dirty="0"/>
+            </a:p>
+          </p:txBody>
+        </p:sp>
+        <p:sp>
+          <p:nvSpPr>
+            <p:cNvPr id="35" name="TextBox 34"/>
+            <p:cNvSpPr txBox="1"/>
+            <p:nvPr/>
+          </p:nvSpPr>
+          <p:spPr>
+            <a:xfrm>
+              <a:off x="5253785" y="1207939"/>
+              <a:ext cx="660307" cy="400110"/>
+            </a:xfrm>
+            <a:prstGeom prst="rect">
+              <a:avLst/>
+            </a:prstGeom>
+            <a:noFill/>
+          </p:spPr>
+          <p:txBody>
+            <a:bodyPr wrap="none" rtlCol="0">
+              <a:spAutoFit/>
+            </a:bodyPr>
+            <a:lstStyle/>
+            <a:p>
+              <a:r>
+                <a:rPr lang="en-US" sz="2000" b="1" dirty="0" smtClean="0"/>
+                <a:t>z = 1</a:t>
+              </a:r>
+              <a:endParaRPr lang="en-US" sz="2000" b="1" dirty="0"/>
+            </a:p>
+          </p:txBody>
+        </p:sp>
+      </p:grpSp>
+    </p:spTree>
+    <p:extLst>
+      <p:ext uri="{BB962C8B-B14F-4D97-AF65-F5344CB8AC3E}">
+        <p14:creationId xmlns:p14="http://schemas.microsoft.com/office/powerpoint/2010/main" val="2484563120"/>
+      </p:ext>
+    </p:extLst>
+  </p:cSld>
+  <p:clrMapOvr>
+    <a:masterClrMapping/>
+  </p:clrMapOvr>
+</p:sld>
+</file>
+
+<file path=ppt/slides/slide11.xml><?xml version="1.0" encoding="utf-8"?>
+<p:sld xmlns:a="http://schemas.openxmlformats.org/drawingml/2006/main" xmlns:r="http://schemas.openxmlformats.org/officeDocument/2006/relationships" xmlns:p="http://schemas.openxmlformats.org/presentationml/2006/main">
+  <p:cSld>
+    <p:spTree>
+      <p:nvGrpSpPr>
+        <p:cNvPr id="1" name=""/>
+        <p:cNvGrpSpPr/>
+        <p:nvPr/>
+      </p:nvGrpSpPr>
+      <p:grpSpPr>
+        <a:xfrm>
+          <a:off x="0" y="0"/>
+          <a:ext cx="0" cy="0"/>
+          <a:chOff x="0" y="0"/>
+          <a:chExt cx="0" cy="0"/>
+        </a:xfrm>
+      </p:grpSpPr>
+      <p:grpSp>
+        <p:nvGrpSpPr>
+          <p:cNvPr id="8" name="Group 7"/>
+          <p:cNvGrpSpPr/>
+          <p:nvPr/>
+        </p:nvGrpSpPr>
+        <p:grpSpPr>
+          <a:xfrm>
+            <a:off x="0" y="1257730"/>
+            <a:ext cx="8997307" cy="4139985"/>
+            <a:chOff x="0" y="1257730"/>
+            <a:chExt cx="8997307" cy="4139985"/>
+          </a:xfrm>
+        </p:grpSpPr>
+        <p:pic>
+          <p:nvPicPr>
+            <p:cNvPr id="4" name="Picture 2"/>
+            <p:cNvPicPr>
+              <a:picLocks noChangeAspect="1" noChangeArrowheads="1"/>
+            </p:cNvPicPr>
+            <p:nvPr/>
+          </p:nvPicPr>
+          <p:blipFill rotWithShape="1">
+            <a:blip r:embed="rId2">
+              <a:extLst>
+                <a:ext uri="{28A0092B-C50C-407E-A947-70E740481C1C}">
+                  <a14:useLocalDpi xmlns:a14="http://schemas.microsoft.com/office/drawing/2010/main" val="0"/>
+                </a:ext>
+              </a:extLst>
+            </a:blip>
+            <a:srcRect l="28966" r="21277" b="42009"/>
+            <a:stretch/>
+          </p:blipFill>
+          <p:spPr bwMode="auto">
+            <a:xfrm>
+              <a:off x="0" y="1638011"/>
+              <a:ext cx="2988860" cy="3759704"/>
+            </a:xfrm>
+            <a:prstGeom prst="rect">
+              <a:avLst/>
+            </a:prstGeom>
+            <a:noFill/>
+            <a:ln>
+              <a:noFill/>
+            </a:ln>
+            <a:extLst>
+              <a:ext uri="{909E8E84-426E-40dd-AFC4-6F175D3DCCD1}">
+                <a14:hiddenFill xmlns:a14="http://schemas.microsoft.com/office/drawing/2010/main">
+                  <a:solidFill>
+                    <a:schemeClr val="accent1"/>
+                  </a:solidFill>
+                </a14:hiddenFill>
+              </a:ext>
+              <a:ext uri="{91240B29-F687-4f45-9708-019B960494DF}">
+                <a14:hiddenLine xmlns:a14="http://schemas.microsoft.com/office/drawing/2010/main" w="9525">
+                  <a:solidFill>
+                    <a:schemeClr val="tx1"/>
+                  </a:solidFill>
+                  <a:miter lim="800000"/>
+                  <a:headEnd/>
+                  <a:tailEnd/>
+                </a14:hiddenLine>
+              </a:ext>
+            </a:extLst>
+          </p:spPr>
+        </p:pic>
+        <p:pic>
+          <p:nvPicPr>
+            <p:cNvPr id="5" name="Picture 4"/>
+            <p:cNvPicPr>
+              <a:picLocks noChangeAspect="1"/>
+            </p:cNvPicPr>
+            <p:nvPr/>
+          </p:nvPicPr>
+          <p:blipFill>
+            <a:blip r:embed="rId3"/>
+            <a:stretch>
+              <a:fillRect/>
+            </a:stretch>
+          </p:blipFill>
+          <p:spPr>
+            <a:xfrm>
+              <a:off x="3120071" y="1934305"/>
+              <a:ext cx="5877236" cy="3178739"/>
+            </a:xfrm>
+            <a:prstGeom prst="rect">
+              <a:avLst/>
+            </a:prstGeom>
+            <a:ln w="12700" cmpd="sng">
+              <a:solidFill>
+                <a:schemeClr val="tx1"/>
+              </a:solidFill>
+            </a:ln>
+          </p:spPr>
+        </p:pic>
+        <p:sp>
+          <p:nvSpPr>
+            <p:cNvPr id="6" name="TextBox 5"/>
+            <p:cNvSpPr txBox="1"/>
+            <p:nvPr/>
+          </p:nvSpPr>
+          <p:spPr>
+            <a:xfrm>
+              <a:off x="222910" y="1257730"/>
+              <a:ext cx="298617" cy="369332"/>
+            </a:xfrm>
+            <a:prstGeom prst="rect">
+              <a:avLst/>
+            </a:prstGeom>
+            <a:noFill/>
+          </p:spPr>
+          <p:txBody>
+            <a:bodyPr wrap="none" rtlCol="0">
+              <a:spAutoFit/>
+            </a:bodyPr>
+            <a:lstStyle/>
+            <a:p>
+              <a:r>
+                <a:rPr lang="en-US" b="1" dirty="0" smtClean="0"/>
+                <a:t>a</a:t>
+              </a:r>
+              <a:endParaRPr lang="en-US" b="1" dirty="0"/>
+            </a:p>
+          </p:txBody>
+        </p:sp>
+        <p:sp>
+          <p:nvSpPr>
+            <p:cNvPr id="7" name="TextBox 6"/>
+            <p:cNvSpPr txBox="1"/>
+            <p:nvPr/>
+          </p:nvSpPr>
+          <p:spPr>
+            <a:xfrm>
+              <a:off x="3120071" y="1257730"/>
+              <a:ext cx="308535" cy="369332"/>
+            </a:xfrm>
+            <a:prstGeom prst="rect">
+              <a:avLst/>
+            </a:prstGeom>
+            <a:noFill/>
+          </p:spPr>
+          <p:txBody>
+            <a:bodyPr wrap="none" rtlCol="0">
+              <a:spAutoFit/>
+            </a:bodyPr>
+            <a:lstStyle/>
+            <a:p>
+              <a:r>
+                <a:rPr lang="en-US" b="1" dirty="0"/>
+                <a:t>b</a:t>
+              </a:r>
+              <a:endParaRPr lang="en-US" b="1" dirty="0"/>
+            </a:p>
+          </p:txBody>
+        </p:sp>
+      </p:grpSp>
+    </p:spTree>
+    <p:extLst>
+      <p:ext uri="{BB962C8B-B14F-4D97-AF65-F5344CB8AC3E}">
+        <p14:creationId xmlns:p14="http://schemas.microsoft.com/office/powerpoint/2010/main" val="3782302342"/>
+      </p:ext>
+    </p:extLst>
+  </p:cSld>
+  <p:clrMapOvr>
+    <a:masterClrMapping/>
+  </p:clrMapOvr>
+</p:sld>
+</file>
+
+<file path=ppt/slides/slide12.xml><?xml version="1.0" encoding="utf-8"?>
+<p:sld xmlns:a="http://schemas.openxmlformats.org/drawingml/2006/main" xmlns:r="http://schemas.openxmlformats.org/officeDocument/2006/relationships" xmlns:p="http://schemas.openxmlformats.org/presentationml/2006/main">
+  <p:cSld>
+    <p:spTree>
+      <p:nvGrpSpPr>
+        <p:cNvPr id="1" name=""/>
+        <p:cNvGrpSpPr/>
+        <p:nvPr/>
+      </p:nvGrpSpPr>
+      <p:grpSpPr>
+        <a:xfrm>
+          <a:off x="0" y="0"/>
+          <a:ext cx="0" cy="0"/>
+          <a:chOff x="0" y="0"/>
+          <a:chExt cx="0" cy="0"/>
+        </a:xfrm>
+      </p:grpSpPr>
+      <p:pic>
+        <p:nvPicPr>
+          <p:cNvPr id="4" name="Picture 3"/>
+          <p:cNvPicPr>
+            <a:picLocks noChangeAspect="1"/>
+          </p:cNvPicPr>
+          <p:nvPr/>
+        </p:nvPicPr>
+        <p:blipFill rotWithShape="1">
+          <a:blip r:embed="rId2"/>
+          <a:srcRect l="60439"/>
+          <a:stretch/>
+        </p:blipFill>
+        <p:spPr>
+          <a:xfrm>
+            <a:off x="6291620" y="1276254"/>
+            <a:ext cx="1537541" cy="1634642"/>
+          </a:xfrm>
+          <a:prstGeom prst="rect">
+            <a:avLst/>
+          </a:prstGeom>
+        </p:spPr>
+      </p:pic>
+      <p:pic>
+        <p:nvPicPr>
+          <p:cNvPr id="7" name="Picture 6"/>
+          <p:cNvPicPr>
+            <a:picLocks noChangeAspect="1"/>
+          </p:cNvPicPr>
+          <p:nvPr/>
+        </p:nvPicPr>
+        <p:blipFill rotWithShape="1">
+          <a:blip r:embed="rId3"/>
+          <a:srcRect l="1" r="50791"/>
+          <a:stretch/>
+        </p:blipFill>
+        <p:spPr>
+          <a:xfrm>
+            <a:off x="6072669" y="3470106"/>
+            <a:ext cx="2291314" cy="2126305"/>
+          </a:xfrm>
+          <a:prstGeom prst="rect">
+            <a:avLst/>
+          </a:prstGeom>
+          <a:ln w="12700">
+            <a:solidFill>
+              <a:schemeClr val="tx1"/>
+            </a:solidFill>
+          </a:ln>
+        </p:spPr>
+      </p:pic>
+      <p:cxnSp>
+        <p:nvCxnSpPr>
+          <p:cNvPr id="8" name="Straight Arrow Connector 7"/>
+          <p:cNvCxnSpPr/>
+          <p:nvPr/>
+        </p:nvCxnSpPr>
+        <p:spPr>
+          <a:xfrm>
+            <a:off x="7373572" y="4675544"/>
+            <a:ext cx="0" cy="497557"/>
+          </a:xfrm>
+          <a:prstGeom prst="straightConnector1">
+            <a:avLst/>
+          </a:prstGeom>
+          <a:ln>
+            <a:solidFill>
+              <a:srgbClr val="0000FF"/>
+            </a:solidFill>
+            <a:headEnd type="arrow"/>
+            <a:tailEnd type="arrow"/>
+          </a:ln>
+          <a:effectLst/>
+        </p:spPr>
+        <p:style>
+          <a:lnRef idx="2">
+            <a:schemeClr val="accent1"/>
+          </a:lnRef>
+          <a:fillRef idx="0">
+            <a:schemeClr val="accent1"/>
+          </a:fillRef>
+          <a:effectRef idx="1">
+            <a:schemeClr val="accent1"/>
+          </a:effectRef>
+          <a:fontRef idx="minor">
+            <a:schemeClr val="tx1"/>
+          </a:fontRef>
+        </p:style>
+      </p:cxnSp>
+      <p:sp>
+        <p:nvSpPr>
+          <p:cNvPr id="9" name="TextBox 8"/>
+          <p:cNvSpPr txBox="1"/>
+          <p:nvPr/>
+        </p:nvSpPr>
+        <p:spPr>
+          <a:xfrm>
+            <a:off x="6072668" y="4204748"/>
+            <a:ext cx="2488371" cy="338554"/>
+          </a:xfrm>
+          <a:prstGeom prst="rect">
+            <a:avLst/>
+          </a:prstGeom>
+          <a:noFill/>
+        </p:spPr>
+        <p:txBody>
+          <a:bodyPr wrap="square" rtlCol="0">
+            <a:spAutoFit/>
+          </a:bodyPr>
+          <a:lstStyle/>
+          <a:p>
+            <a:r>
+              <a:rPr lang="en-US" sz="1600" b="1" dirty="0">
+                <a:solidFill>
+                  <a:srgbClr val="0000FF"/>
+                </a:solidFill>
+              </a:rPr>
+              <a:t>b</a:t>
+            </a:r>
+            <a:r>
+              <a:rPr lang="en-US" sz="1600" b="1" dirty="0" smtClean="0">
+                <a:solidFill>
+                  <a:srgbClr val="0000FF"/>
+                </a:solidFill>
+              </a:rPr>
+              <a:t>and gap </a:t>
+            </a:r>
+            <a:r>
+              <a:rPr lang="en-US" sz="1600" b="1" dirty="0" smtClean="0">
+                <a:solidFill>
+                  <a:srgbClr val="0000FF"/>
+                </a:solidFill>
+              </a:rPr>
+              <a:t>not maintained</a:t>
+            </a:r>
+            <a:endParaRPr lang="en-US" sz="1600" b="1" dirty="0">
+              <a:solidFill>
+                <a:srgbClr val="0000FF"/>
+              </a:solidFill>
+            </a:endParaRPr>
+          </a:p>
+        </p:txBody>
+      </p:sp>
+      <p:pic>
+        <p:nvPicPr>
+          <p:cNvPr id="10" name="Picture 9"/>
+          <p:cNvPicPr>
+            <a:picLocks noChangeAspect="1"/>
+          </p:cNvPicPr>
+          <p:nvPr/>
+        </p:nvPicPr>
+        <p:blipFill rotWithShape="1">
+          <a:blip r:embed="rId4"/>
+          <a:srcRect l="2289" t="11057" r="783" b="2324"/>
+          <a:stretch/>
+        </p:blipFill>
+        <p:spPr>
+          <a:xfrm rot="10800000">
+            <a:off x="457692" y="1435143"/>
+            <a:ext cx="5277174" cy="4069926"/>
+          </a:xfrm>
+          <a:prstGeom prst="rect">
+            <a:avLst/>
+          </a:prstGeom>
+          <a:ln w="57150" cmpd="sng">
+            <a:noFill/>
+          </a:ln>
+          <a:effectLst/>
+        </p:spPr>
+        <p:style>
+          <a:lnRef idx="1">
+            <a:schemeClr val="dk1"/>
+          </a:lnRef>
+          <a:fillRef idx="3">
+            <a:schemeClr val="dk1"/>
+          </a:fillRef>
+          <a:effectRef idx="2">
+            <a:schemeClr val="dk1"/>
+          </a:effectRef>
+          <a:fontRef idx="minor">
+            <a:schemeClr val="lt1"/>
+          </a:fontRef>
+        </p:style>
+      </p:pic>
+      <p:sp>
+        <p:nvSpPr>
+          <p:cNvPr id="11" name="TextBox 10"/>
+          <p:cNvSpPr txBox="1"/>
+          <p:nvPr/>
+        </p:nvSpPr>
+        <p:spPr>
+          <a:xfrm>
+            <a:off x="667805" y="906922"/>
+            <a:ext cx="298617" cy="369332"/>
+          </a:xfrm>
+          <a:prstGeom prst="rect">
+            <a:avLst/>
+          </a:prstGeom>
+          <a:noFill/>
+        </p:spPr>
+        <p:txBody>
+          <a:bodyPr wrap="none" rtlCol="0">
+            <a:spAutoFit/>
+          </a:bodyPr>
+          <a:lstStyle/>
+          <a:p>
+            <a:r>
+              <a:rPr lang="en-US" b="1" dirty="0" smtClean="0"/>
+              <a:t>a</a:t>
+            </a:r>
+            <a:endParaRPr lang="en-US" b="1" dirty="0"/>
+          </a:p>
+        </p:txBody>
+      </p:sp>
+      <p:sp>
+        <p:nvSpPr>
+          <p:cNvPr id="12" name="TextBox 11"/>
+          <p:cNvSpPr txBox="1"/>
+          <p:nvPr/>
+        </p:nvSpPr>
+        <p:spPr>
+          <a:xfrm>
+            <a:off x="6072668" y="906922"/>
+            <a:ext cx="308535" cy="369332"/>
+          </a:xfrm>
+          <a:prstGeom prst="rect">
+            <a:avLst/>
+          </a:prstGeom>
+          <a:noFill/>
+        </p:spPr>
+        <p:txBody>
+          <a:bodyPr wrap="none" rtlCol="0">
+            <a:spAutoFit/>
+          </a:bodyPr>
+          <a:lstStyle/>
+          <a:p>
+            <a:r>
+              <a:rPr lang="en-US" b="1" dirty="0"/>
+              <a:t>b</a:t>
+            </a:r>
+            <a:endParaRPr lang="en-US" b="1" dirty="0"/>
+          </a:p>
+        </p:txBody>
+      </p:sp>
+      <p:sp>
+        <p:nvSpPr>
+          <p:cNvPr id="13" name="TextBox 12"/>
+          <p:cNvSpPr txBox="1"/>
+          <p:nvPr/>
+        </p:nvSpPr>
+        <p:spPr>
+          <a:xfrm>
+            <a:off x="6072668" y="3030336"/>
+            <a:ext cx="281259" cy="369332"/>
+          </a:xfrm>
+          <a:prstGeom prst="rect">
+            <a:avLst/>
+          </a:prstGeom>
+          <a:noFill/>
+        </p:spPr>
+        <p:txBody>
+          <a:bodyPr wrap="none" rtlCol="0">
+            <a:spAutoFit/>
+          </a:bodyPr>
+          <a:lstStyle/>
+          <a:p>
+            <a:r>
+              <a:rPr lang="en-US" b="1" dirty="0"/>
+              <a:t>c</a:t>
+            </a:r>
+            <a:endParaRPr lang="en-US" b="1" dirty="0"/>
+          </a:p>
+        </p:txBody>
+      </p:sp>
+      <p:cxnSp>
+        <p:nvCxnSpPr>
+          <p:cNvPr id="16" name="Straight Arrow Connector 15"/>
+          <p:cNvCxnSpPr/>
+          <p:nvPr/>
+        </p:nvCxnSpPr>
+        <p:spPr>
+          <a:xfrm>
+            <a:off x="7011445" y="4590114"/>
+            <a:ext cx="0" cy="676217"/>
+          </a:xfrm>
+          <a:prstGeom prst="straightConnector1">
+            <a:avLst/>
+          </a:prstGeom>
+          <a:ln>
+            <a:solidFill>
+              <a:srgbClr val="0000FF"/>
+            </a:solidFill>
+            <a:headEnd type="arrow"/>
+            <a:tailEnd type="arrow"/>
+          </a:ln>
+          <a:effectLst/>
+        </p:spPr>
+        <p:style>
+          <a:lnRef idx="2">
+            <a:schemeClr val="accent1"/>
+          </a:lnRef>
+          <a:fillRef idx="0">
+            <a:schemeClr val="accent1"/>
+          </a:fillRef>
+          <a:effectRef idx="1">
+            <a:schemeClr val="accent1"/>
+          </a:effectRef>
+          <a:fontRef idx="minor">
+            <a:schemeClr val="tx1"/>
+          </a:fontRef>
+        </p:style>
+      </p:cxnSp>
+    </p:spTree>
+    <p:extLst>
+      <p:ext uri="{BB962C8B-B14F-4D97-AF65-F5344CB8AC3E}">
+        <p14:creationId xmlns:p14="http://schemas.microsoft.com/office/powerpoint/2010/main" val="2117354097"/>
+      </p:ext>
+    </p:extLst>
+  </p:cSld>
+  <p:clrMapOvr>
+    <a:masterClrMapping/>
+  </p:clrMapOvr>
+</p:sld>
+</file>
+
+<file path=ppt/slides/slide13.xml><?xml version="1.0" encoding="utf-8"?>
+<p:sld xmlns:a="http://schemas.openxmlformats.org/drawingml/2006/main" xmlns:r="http://schemas.openxmlformats.org/officeDocument/2006/relationships" xmlns:p="http://schemas.openxmlformats.org/presentationml/2006/main">
+  <p:cSld>
+    <p:spTree>
+      <p:nvGrpSpPr>
+        <p:cNvPr id="1" name=""/>
+        <p:cNvGrpSpPr/>
+        <p:nvPr/>
+      </p:nvGrpSpPr>
+      <p:grpSpPr>
+        <a:xfrm>
+          <a:off x="0" y="0"/>
+          <a:ext cx="0" cy="0"/>
+          <a:chOff x="0" y="0"/>
+          <a:chExt cx="0" cy="0"/>
+        </a:xfrm>
+      </p:grpSpPr>
       <p:pic>
         <p:nvPicPr>
           <p:cNvPr id="4" name="Picture 3"/>
@@ -3192,48 +5031,62 @@
         </p:blipFill>
         <p:spPr>
           <a:xfrm>
-            <a:off x="197531" y="1741427"/>
-            <a:ext cx="3358061" cy="3203454"/>
+            <a:off x="2226352" y="1490272"/>
+            <a:ext cx="4627997" cy="4215602"/>
           </a:xfrm>
           <a:prstGeom prst="rect">
             <a:avLst/>
           </a:prstGeom>
         </p:spPr>
       </p:pic>
-      <p:pic>
-        <p:nvPicPr>
-          <p:cNvPr id="5" name="Picture 4"/>
-          <p:cNvPicPr>
-            <a:picLocks noChangeAspect="1"/>
-          </p:cNvPicPr>
+      <p:cxnSp>
+        <p:nvCxnSpPr>
+          <p:cNvPr id="5" name="Straight Arrow Connector 4"/>
+          <p:cNvCxnSpPr/>
           <p:nvPr/>
-        </p:nvPicPr>
-        <p:blipFill>
-          <a:blip r:embed="rId3"/>
-          <a:stretch>
-            <a:fillRect/>
-          </a:stretch>
-        </p:blipFill>
+        </p:nvCxnSpPr>
         <p:spPr>
           <a:xfrm>
-            <a:off x="3491895" y="1650721"/>
-            <a:ext cx="3609489" cy="3233235"/>
+            <a:off x="3070500" y="2329224"/>
+            <a:ext cx="0" cy="1331392"/>
           </a:xfrm>
-          <a:prstGeom prst="rect">
+          <a:prstGeom prst="straightConnector1">
             <a:avLst/>
           </a:prstGeom>
+          <a:ln>
+            <a:solidFill>
+              <a:srgbClr val="0000FF"/>
+            </a:solidFill>
+            <a:headEnd type="arrow"/>
+            <a:tailEnd type="arrow"/>
+          </a:ln>
+          <a:effectLst/>
         </p:spPr>
-      </p:pic>
+        <p:style>
+          <a:lnRef idx="2">
+            <a:schemeClr val="accent1"/>
+          </a:lnRef>
+          <a:fillRef idx="0">
+            <a:schemeClr val="accent1"/>
+          </a:fillRef>
+          <a:effectRef idx="1">
+            <a:schemeClr val="accent1"/>
+          </a:effectRef>
+          <a:fontRef idx="minor">
+            <a:schemeClr val="tx1"/>
+          </a:fontRef>
+        </p:style>
+      </p:cxnSp>
       <p:sp>
         <p:nvSpPr>
-          <p:cNvPr id="8" name="TextBox 7"/>
+          <p:cNvPr id="6" name="TextBox 5"/>
           <p:cNvSpPr txBox="1"/>
           <p:nvPr/>
         </p:nvSpPr>
         <p:spPr>
           <a:xfrm>
-            <a:off x="1259074" y="1640780"/>
-            <a:ext cx="377026" cy="584776"/>
+            <a:off x="3026708" y="2822233"/>
+            <a:ext cx="1286653" cy="584776"/>
           </a:xfrm>
           <a:prstGeom prst="rect">
             <a:avLst/>
@@ -3241,1133 +5094,86 @@
           <a:noFill/>
         </p:spPr>
         <p:txBody>
-          <a:bodyPr wrap="none" rtlCol="0">
+          <a:bodyPr wrap="square" rtlCol="0">
             <a:spAutoFit/>
           </a:bodyPr>
           <a:lstStyle/>
           <a:p>
+            <a:pPr algn="ctr"/>
             <a:r>
-              <a:rPr lang="en-US" sz="3200" b="1" dirty="0" smtClean="0">
+              <a:rPr lang="en-US" sz="1600" b="1" dirty="0">
                 <a:solidFill>
-                  <a:schemeClr val="bg1">
-                    <a:lumMod val="50000"/>
-                  </a:schemeClr>
+                  <a:srgbClr val="0000FF"/>
                 </a:solidFill>
               </a:rPr>
-              <a:t>x</a:t>
+              <a:t>b</a:t>
             </a:r>
-            <a:endParaRPr lang="en-US" sz="3200" b="1" dirty="0">
+            <a:r>
+              <a:rPr lang="en-US" sz="1600" b="1" dirty="0" smtClean="0">
+                <a:solidFill>
+                  <a:srgbClr val="0000FF"/>
+                </a:solidFill>
+              </a:rPr>
+              <a:t>and gap </a:t>
+            </a:r>
+            <a:r>
+              <a:rPr lang="en-US" sz="1600" b="1" dirty="0" smtClean="0">
+                <a:solidFill>
+                  <a:srgbClr val="0000FF"/>
+                </a:solidFill>
+              </a:rPr>
+              <a:t>maintained</a:t>
+            </a:r>
+            <a:endParaRPr lang="en-US" sz="1600" b="1" dirty="0">
               <a:solidFill>
-                <a:schemeClr val="bg1">
-                  <a:lumMod val="50000"/>
-                </a:schemeClr>
+                <a:srgbClr val="0000FF"/>
               </a:solidFill>
             </a:endParaRPr>
           </a:p>
         </p:txBody>
       </p:sp>
-      <p:sp>
-        <p:nvSpPr>
-          <p:cNvPr id="9" name="TextBox 8"/>
-          <p:cNvSpPr txBox="1"/>
+      <p:cxnSp>
+        <p:nvCxnSpPr>
+          <p:cNvPr id="10" name="Straight Arrow Connector 9"/>
+          <p:cNvCxnSpPr/>
           <p:nvPr/>
-        </p:nvSpPr>
+        </p:nvCxnSpPr>
         <p:spPr>
           <a:xfrm>
-            <a:off x="681816" y="2185284"/>
-            <a:ext cx="377026" cy="584776"/>
+            <a:off x="4284856" y="2514471"/>
+            <a:ext cx="0" cy="1331392"/>
           </a:xfrm>
-          <a:prstGeom prst="rect">
+          <a:prstGeom prst="straightConnector1">
             <a:avLst/>
           </a:prstGeom>
-          <a:noFill/>
-        </p:spPr>
-        <p:txBody>
-          <a:bodyPr wrap="none" rtlCol="0">
-            <a:spAutoFit/>
-          </a:bodyPr>
-          <a:lstStyle/>
-          <a:p>
-            <a:r>
-              <a:rPr lang="en-US" sz="3200" b="1" dirty="0" smtClean="0">
-                <a:solidFill>
-                  <a:schemeClr val="bg1">
-                    <a:lumMod val="50000"/>
-                  </a:schemeClr>
-                </a:solidFill>
-              </a:rPr>
-              <a:t>x</a:t>
-            </a:r>
-            <a:endParaRPr lang="en-US" sz="3200" b="1" dirty="0">
-              <a:solidFill>
-                <a:schemeClr val="bg1">
-                  <a:lumMod val="50000"/>
-                </a:schemeClr>
-              </a:solidFill>
-            </a:endParaRPr>
-          </a:p>
-        </p:txBody>
-      </p:sp>
-      <p:sp>
-        <p:nvSpPr>
-          <p:cNvPr id="6" name="Rectangle 5"/>
-          <p:cNvSpPr/>
-          <p:nvPr/>
-        </p:nvSpPr>
-        <p:spPr>
-          <a:xfrm>
-            <a:off x="852567" y="1971482"/>
-            <a:ext cx="595020" cy="586116"/>
-          </a:xfrm>
-          <a:prstGeom prst="rect">
-            <a:avLst/>
-          </a:prstGeom>
-          <a:noFill/>
-          <a:ln w="50800">
+          <a:ln>
             <a:solidFill>
-              <a:schemeClr val="tx1"/>
+              <a:srgbClr val="0000FF"/>
             </a:solidFill>
-            <a:prstDash val="sysDash"/>
+            <a:headEnd type="arrow"/>
+            <a:tailEnd type="arrow"/>
           </a:ln>
+          <a:effectLst/>
         </p:spPr>
         <p:style>
-          <a:lnRef idx="1">
+          <a:lnRef idx="2">
             <a:schemeClr val="accent1"/>
           </a:lnRef>
-          <a:fillRef idx="3">
+          <a:fillRef idx="0">
             <a:schemeClr val="accent1"/>
           </a:fillRef>
-          <a:effectRef idx="2">
+          <a:effectRef idx="1">
             <a:schemeClr val="accent1"/>
           </a:effectRef>
           <a:fontRef idx="minor">
-            <a:schemeClr val="lt1"/>
+            <a:schemeClr val="tx1"/>
           </a:fontRef>
         </p:style>
-        <p:txBody>
-          <a:bodyPr rtlCol="0" anchor="ctr"/>
-          <a:lstStyle/>
-          <a:p>
-            <a:pPr algn="ctr"/>
-            <a:endParaRPr lang="en-US"/>
-          </a:p>
-        </p:txBody>
-      </p:sp>
-      <p:sp>
-        <p:nvSpPr>
-          <p:cNvPr id="10" name="TextBox 9"/>
-          <p:cNvSpPr txBox="1"/>
-          <p:nvPr/>
-        </p:nvSpPr>
-        <p:spPr>
-          <a:xfrm>
-            <a:off x="2415015" y="1608049"/>
-            <a:ext cx="377026" cy="584776"/>
-          </a:xfrm>
-          <a:prstGeom prst="rect">
-            <a:avLst/>
-          </a:prstGeom>
-          <a:noFill/>
-        </p:spPr>
-        <p:txBody>
-          <a:bodyPr wrap="none" rtlCol="0">
-            <a:spAutoFit/>
-          </a:bodyPr>
-          <a:lstStyle/>
-          <a:p>
-            <a:r>
-              <a:rPr lang="en-US" sz="3200" b="1" dirty="0" smtClean="0">
-                <a:solidFill>
-                  <a:schemeClr val="bg1">
-                    <a:lumMod val="50000"/>
-                  </a:schemeClr>
-                </a:solidFill>
-              </a:rPr>
-              <a:t>x</a:t>
-            </a:r>
-            <a:endParaRPr lang="en-US" sz="3200" b="1" dirty="0">
-              <a:solidFill>
-                <a:schemeClr val="bg1">
-                  <a:lumMod val="50000"/>
-                </a:schemeClr>
-              </a:solidFill>
-            </a:endParaRPr>
-          </a:p>
-        </p:txBody>
-      </p:sp>
-      <p:sp>
-        <p:nvSpPr>
-          <p:cNvPr id="11" name="TextBox 10"/>
-          <p:cNvSpPr txBox="1"/>
-          <p:nvPr/>
-        </p:nvSpPr>
-        <p:spPr>
-          <a:xfrm>
-            <a:off x="1828876" y="2163389"/>
-            <a:ext cx="377026" cy="584776"/>
-          </a:xfrm>
-          <a:prstGeom prst="rect">
-            <a:avLst/>
-          </a:prstGeom>
-          <a:noFill/>
-        </p:spPr>
-        <p:txBody>
-          <a:bodyPr wrap="none" rtlCol="0">
-            <a:spAutoFit/>
-          </a:bodyPr>
-          <a:lstStyle/>
-          <a:p>
-            <a:r>
-              <a:rPr lang="en-US" sz="3200" b="1" dirty="0" smtClean="0">
-                <a:solidFill>
-                  <a:schemeClr val="bg1">
-                    <a:lumMod val="50000"/>
-                  </a:schemeClr>
-                </a:solidFill>
-              </a:rPr>
-              <a:t>x</a:t>
-            </a:r>
-            <a:endParaRPr lang="en-US" sz="3200" b="1" dirty="0">
-              <a:solidFill>
-                <a:schemeClr val="bg1">
-                  <a:lumMod val="50000"/>
-                </a:schemeClr>
-              </a:solidFill>
-            </a:endParaRPr>
-          </a:p>
-        </p:txBody>
-      </p:sp>
-      <p:sp>
-        <p:nvSpPr>
-          <p:cNvPr id="12" name="TextBox 11"/>
-          <p:cNvSpPr txBox="1"/>
-          <p:nvPr/>
-        </p:nvSpPr>
-        <p:spPr>
-          <a:xfrm>
-            <a:off x="672935" y="3347273"/>
-            <a:ext cx="377026" cy="584776"/>
-          </a:xfrm>
-          <a:prstGeom prst="rect">
-            <a:avLst/>
-          </a:prstGeom>
-          <a:noFill/>
-        </p:spPr>
-        <p:txBody>
-          <a:bodyPr wrap="none" rtlCol="0">
-            <a:spAutoFit/>
-          </a:bodyPr>
-          <a:lstStyle/>
-          <a:p>
-            <a:r>
-              <a:rPr lang="en-US" sz="3200" b="1" dirty="0" smtClean="0">
-                <a:solidFill>
-                  <a:schemeClr val="bg1">
-                    <a:lumMod val="50000"/>
-                  </a:schemeClr>
-                </a:solidFill>
-              </a:rPr>
-              <a:t>x</a:t>
-            </a:r>
-            <a:endParaRPr lang="en-US" sz="3200" b="1" dirty="0">
-              <a:solidFill>
-                <a:schemeClr val="bg1">
-                  <a:lumMod val="50000"/>
-                </a:schemeClr>
-              </a:solidFill>
-            </a:endParaRPr>
-          </a:p>
-        </p:txBody>
-      </p:sp>
-      <p:sp>
-        <p:nvSpPr>
-          <p:cNvPr id="13" name="TextBox 12"/>
-          <p:cNvSpPr txBox="1"/>
-          <p:nvPr/>
-        </p:nvSpPr>
-        <p:spPr>
-          <a:xfrm>
-            <a:off x="1828876" y="3345243"/>
-            <a:ext cx="377026" cy="584776"/>
-          </a:xfrm>
-          <a:prstGeom prst="rect">
-            <a:avLst/>
-          </a:prstGeom>
-          <a:noFill/>
-        </p:spPr>
-        <p:txBody>
-          <a:bodyPr wrap="none" rtlCol="0">
-            <a:spAutoFit/>
-          </a:bodyPr>
-          <a:lstStyle/>
-          <a:p>
-            <a:r>
-              <a:rPr lang="en-US" sz="3200" b="1" dirty="0" smtClean="0">
-                <a:solidFill>
-                  <a:schemeClr val="bg1">
-                    <a:lumMod val="50000"/>
-                  </a:schemeClr>
-                </a:solidFill>
-              </a:rPr>
-              <a:t>x</a:t>
-            </a:r>
-            <a:endParaRPr lang="en-US" sz="3200" b="1" dirty="0">
-              <a:solidFill>
-                <a:schemeClr val="bg1">
-                  <a:lumMod val="50000"/>
-                </a:schemeClr>
-              </a:solidFill>
-            </a:endParaRPr>
-          </a:p>
-        </p:txBody>
-      </p:sp>
-      <p:sp>
-        <p:nvSpPr>
-          <p:cNvPr id="14" name="TextBox 13"/>
-          <p:cNvSpPr txBox="1"/>
-          <p:nvPr/>
-        </p:nvSpPr>
-        <p:spPr>
-          <a:xfrm>
-            <a:off x="2992275" y="2162717"/>
-            <a:ext cx="377026" cy="584776"/>
-          </a:xfrm>
-          <a:prstGeom prst="rect">
-            <a:avLst/>
-          </a:prstGeom>
-          <a:noFill/>
-        </p:spPr>
-        <p:txBody>
-          <a:bodyPr wrap="none" rtlCol="0">
-            <a:spAutoFit/>
-          </a:bodyPr>
-          <a:lstStyle/>
-          <a:p>
-            <a:r>
-              <a:rPr lang="en-US" sz="3200" b="1" dirty="0" smtClean="0">
-                <a:solidFill>
-                  <a:schemeClr val="bg1">
-                    <a:lumMod val="50000"/>
-                  </a:schemeClr>
-                </a:solidFill>
-              </a:rPr>
-              <a:t>x</a:t>
-            </a:r>
-            <a:endParaRPr lang="en-US" sz="3200" b="1" dirty="0">
-              <a:solidFill>
-                <a:schemeClr val="bg1">
-                  <a:lumMod val="50000"/>
-                </a:schemeClr>
-              </a:solidFill>
-            </a:endParaRPr>
-          </a:p>
-        </p:txBody>
-      </p:sp>
-      <p:sp>
-        <p:nvSpPr>
-          <p:cNvPr id="15" name="TextBox 14"/>
-          <p:cNvSpPr txBox="1"/>
-          <p:nvPr/>
-        </p:nvSpPr>
-        <p:spPr>
-          <a:xfrm>
-            <a:off x="2992275" y="3347273"/>
-            <a:ext cx="377026" cy="584776"/>
-          </a:xfrm>
-          <a:prstGeom prst="rect">
-            <a:avLst/>
-          </a:prstGeom>
-          <a:noFill/>
-        </p:spPr>
-        <p:txBody>
-          <a:bodyPr wrap="none" rtlCol="0">
-            <a:spAutoFit/>
-          </a:bodyPr>
-          <a:lstStyle/>
-          <a:p>
-            <a:r>
-              <a:rPr lang="en-US" sz="3200" b="1" dirty="0" smtClean="0">
-                <a:solidFill>
-                  <a:schemeClr val="bg1">
-                    <a:lumMod val="50000"/>
-                  </a:schemeClr>
-                </a:solidFill>
-              </a:rPr>
-              <a:t>x</a:t>
-            </a:r>
-            <a:endParaRPr lang="en-US" sz="3200" b="1" dirty="0">
-              <a:solidFill>
-                <a:schemeClr val="bg1">
-                  <a:lumMod val="50000"/>
-                </a:schemeClr>
-              </a:solidFill>
-            </a:endParaRPr>
-          </a:p>
-        </p:txBody>
-      </p:sp>
-      <p:sp>
-        <p:nvSpPr>
-          <p:cNvPr id="16" name="TextBox 15"/>
-          <p:cNvSpPr txBox="1"/>
-          <p:nvPr/>
-        </p:nvSpPr>
-        <p:spPr>
-          <a:xfrm>
-            <a:off x="1259074" y="3927989"/>
-            <a:ext cx="377026" cy="584776"/>
-          </a:xfrm>
-          <a:prstGeom prst="rect">
-            <a:avLst/>
-          </a:prstGeom>
-          <a:noFill/>
-        </p:spPr>
-        <p:txBody>
-          <a:bodyPr wrap="none" rtlCol="0">
-            <a:spAutoFit/>
-          </a:bodyPr>
-          <a:lstStyle/>
-          <a:p>
-            <a:r>
-              <a:rPr lang="en-US" sz="3200" b="1" dirty="0" smtClean="0">
-                <a:solidFill>
-                  <a:schemeClr val="bg1">
-                    <a:lumMod val="50000"/>
-                  </a:schemeClr>
-                </a:solidFill>
-              </a:rPr>
-              <a:t>x</a:t>
-            </a:r>
-            <a:endParaRPr lang="en-US" sz="3200" b="1" dirty="0">
-              <a:solidFill>
-                <a:schemeClr val="bg1">
-                  <a:lumMod val="50000"/>
-                </a:schemeClr>
-              </a:solidFill>
-            </a:endParaRPr>
-          </a:p>
-        </p:txBody>
-      </p:sp>
-      <p:sp>
-        <p:nvSpPr>
-          <p:cNvPr id="17" name="TextBox 16"/>
-          <p:cNvSpPr txBox="1"/>
-          <p:nvPr/>
-        </p:nvSpPr>
-        <p:spPr>
-          <a:xfrm>
-            <a:off x="2423896" y="3930018"/>
-            <a:ext cx="377026" cy="584776"/>
-          </a:xfrm>
-          <a:prstGeom prst="rect">
-            <a:avLst/>
-          </a:prstGeom>
-          <a:noFill/>
-        </p:spPr>
-        <p:txBody>
-          <a:bodyPr wrap="none" rtlCol="0">
-            <a:spAutoFit/>
-          </a:bodyPr>
-          <a:lstStyle/>
-          <a:p>
-            <a:r>
-              <a:rPr lang="en-US" sz="3200" b="1" dirty="0" smtClean="0">
-                <a:solidFill>
-                  <a:schemeClr val="bg1">
-                    <a:lumMod val="50000"/>
-                  </a:schemeClr>
-                </a:solidFill>
-              </a:rPr>
-              <a:t>x</a:t>
-            </a:r>
-            <a:endParaRPr lang="en-US" sz="3200" b="1" dirty="0">
-              <a:solidFill>
-                <a:schemeClr val="bg1">
-                  <a:lumMod val="50000"/>
-                </a:schemeClr>
-              </a:solidFill>
-            </a:endParaRPr>
-          </a:p>
-        </p:txBody>
-      </p:sp>
-      <p:sp>
-        <p:nvSpPr>
-          <p:cNvPr id="18" name="TextBox 17"/>
-          <p:cNvSpPr txBox="1"/>
-          <p:nvPr/>
-        </p:nvSpPr>
-        <p:spPr>
-          <a:xfrm>
-            <a:off x="1267955" y="2760465"/>
-            <a:ext cx="377026" cy="584776"/>
-          </a:xfrm>
-          <a:prstGeom prst="rect">
-            <a:avLst/>
-          </a:prstGeom>
-          <a:noFill/>
-        </p:spPr>
-        <p:txBody>
-          <a:bodyPr wrap="none" rtlCol="0">
-            <a:spAutoFit/>
-          </a:bodyPr>
-          <a:lstStyle/>
-          <a:p>
-            <a:r>
-              <a:rPr lang="en-US" sz="3200" b="1" dirty="0" smtClean="0">
-                <a:solidFill>
-                  <a:schemeClr val="bg1">
-                    <a:lumMod val="50000"/>
-                  </a:schemeClr>
-                </a:solidFill>
-              </a:rPr>
-              <a:t>x</a:t>
-            </a:r>
-            <a:endParaRPr lang="en-US" sz="3200" b="1" dirty="0">
-              <a:solidFill>
-                <a:schemeClr val="bg1">
-                  <a:lumMod val="50000"/>
-                </a:schemeClr>
-              </a:solidFill>
-            </a:endParaRPr>
-          </a:p>
-        </p:txBody>
-      </p:sp>
-      <p:sp>
-        <p:nvSpPr>
-          <p:cNvPr id="19" name="TextBox 18"/>
-          <p:cNvSpPr txBox="1"/>
-          <p:nvPr/>
-        </p:nvSpPr>
-        <p:spPr>
-          <a:xfrm>
-            <a:off x="2423896" y="2750268"/>
-            <a:ext cx="377026" cy="584776"/>
-          </a:xfrm>
-          <a:prstGeom prst="rect">
-            <a:avLst/>
-          </a:prstGeom>
-          <a:noFill/>
-        </p:spPr>
-        <p:txBody>
-          <a:bodyPr wrap="none" rtlCol="0">
-            <a:spAutoFit/>
-          </a:bodyPr>
-          <a:lstStyle/>
-          <a:p>
-            <a:r>
-              <a:rPr lang="en-US" sz="3200" b="1" dirty="0" smtClean="0">
-                <a:solidFill>
-                  <a:schemeClr val="bg1">
-                    <a:lumMod val="50000"/>
-                  </a:schemeClr>
-                </a:solidFill>
-              </a:rPr>
-              <a:t>x</a:t>
-            </a:r>
-            <a:endParaRPr lang="en-US" sz="3200" b="1" dirty="0">
-              <a:solidFill>
-                <a:schemeClr val="bg1">
-                  <a:lumMod val="50000"/>
-                </a:schemeClr>
-              </a:solidFill>
-            </a:endParaRPr>
-          </a:p>
-        </p:txBody>
-      </p:sp>
-      <p:sp>
-        <p:nvSpPr>
-          <p:cNvPr id="20" name="TextBox 19"/>
-          <p:cNvSpPr txBox="1"/>
-          <p:nvPr/>
-        </p:nvSpPr>
-        <p:spPr>
-          <a:xfrm>
-            <a:off x="4137912" y="1585465"/>
-            <a:ext cx="377026" cy="584776"/>
-          </a:xfrm>
-          <a:prstGeom prst="rect">
-            <a:avLst/>
-          </a:prstGeom>
-          <a:noFill/>
-        </p:spPr>
-        <p:txBody>
-          <a:bodyPr wrap="none" rtlCol="0">
-            <a:spAutoFit/>
-          </a:bodyPr>
-          <a:lstStyle/>
-          <a:p>
-            <a:r>
-              <a:rPr lang="en-US" sz="3200" b="1" dirty="0" smtClean="0">
-                <a:solidFill>
-                  <a:schemeClr val="bg1">
-                    <a:lumMod val="50000"/>
-                  </a:schemeClr>
-                </a:solidFill>
-              </a:rPr>
-              <a:t>x</a:t>
-            </a:r>
-            <a:endParaRPr lang="en-US" sz="3200" b="1" dirty="0">
-              <a:solidFill>
-                <a:schemeClr val="bg1">
-                  <a:lumMod val="50000"/>
-                </a:schemeClr>
-              </a:solidFill>
-            </a:endParaRPr>
-          </a:p>
-        </p:txBody>
-      </p:sp>
-      <p:sp>
-        <p:nvSpPr>
-          <p:cNvPr id="21" name="TextBox 20"/>
-          <p:cNvSpPr txBox="1"/>
-          <p:nvPr/>
-        </p:nvSpPr>
-        <p:spPr>
-          <a:xfrm>
-            <a:off x="4715170" y="2139539"/>
-            <a:ext cx="377026" cy="584776"/>
-          </a:xfrm>
-          <a:prstGeom prst="rect">
-            <a:avLst/>
-          </a:prstGeom>
-          <a:noFill/>
-        </p:spPr>
-        <p:txBody>
-          <a:bodyPr wrap="none" rtlCol="0">
-            <a:spAutoFit/>
-          </a:bodyPr>
-          <a:lstStyle/>
-          <a:p>
-            <a:r>
-              <a:rPr lang="en-US" sz="3200" b="1" dirty="0" smtClean="0">
-                <a:solidFill>
-                  <a:schemeClr val="bg1">
-                    <a:lumMod val="50000"/>
-                  </a:schemeClr>
-                </a:solidFill>
-              </a:rPr>
-              <a:t>x</a:t>
-            </a:r>
-            <a:endParaRPr lang="en-US" sz="3200" b="1" dirty="0">
-              <a:solidFill>
-                <a:schemeClr val="bg1">
-                  <a:lumMod val="50000"/>
-                </a:schemeClr>
-              </a:solidFill>
-            </a:endParaRPr>
-          </a:p>
-        </p:txBody>
-      </p:sp>
-      <p:sp>
-        <p:nvSpPr>
-          <p:cNvPr id="22" name="TextBox 21"/>
-          <p:cNvSpPr txBox="1"/>
-          <p:nvPr/>
-        </p:nvSpPr>
-        <p:spPr>
-          <a:xfrm>
-            <a:off x="5319071" y="1581406"/>
-            <a:ext cx="377026" cy="584776"/>
-          </a:xfrm>
-          <a:prstGeom prst="rect">
-            <a:avLst/>
-          </a:prstGeom>
-          <a:noFill/>
-        </p:spPr>
-        <p:txBody>
-          <a:bodyPr wrap="none" rtlCol="0">
-            <a:spAutoFit/>
-          </a:bodyPr>
-          <a:lstStyle/>
-          <a:p>
-            <a:r>
-              <a:rPr lang="en-US" sz="3200" b="1" dirty="0" smtClean="0">
-                <a:solidFill>
-                  <a:schemeClr val="bg1">
-                    <a:lumMod val="50000"/>
-                  </a:schemeClr>
-                </a:solidFill>
-              </a:rPr>
-              <a:t>x</a:t>
-            </a:r>
-            <a:endParaRPr lang="en-US" sz="3200" b="1" dirty="0">
-              <a:solidFill>
-                <a:schemeClr val="bg1">
-                  <a:lumMod val="50000"/>
-                </a:schemeClr>
-              </a:solidFill>
-            </a:endParaRPr>
-          </a:p>
-        </p:txBody>
-      </p:sp>
-      <p:sp>
-        <p:nvSpPr>
-          <p:cNvPr id="23" name="TextBox 22"/>
-          <p:cNvSpPr txBox="1"/>
-          <p:nvPr/>
-        </p:nvSpPr>
-        <p:spPr>
-          <a:xfrm>
-            <a:off x="6500232" y="1581403"/>
-            <a:ext cx="377026" cy="584776"/>
-          </a:xfrm>
-          <a:prstGeom prst="rect">
-            <a:avLst/>
-          </a:prstGeom>
-          <a:noFill/>
-        </p:spPr>
-        <p:txBody>
-          <a:bodyPr wrap="none" rtlCol="0">
-            <a:spAutoFit/>
-          </a:bodyPr>
-          <a:lstStyle/>
-          <a:p>
-            <a:r>
-              <a:rPr lang="en-US" sz="3200" b="1" dirty="0" smtClean="0">
-                <a:solidFill>
-                  <a:schemeClr val="bg1">
-                    <a:lumMod val="50000"/>
-                  </a:schemeClr>
-                </a:solidFill>
-              </a:rPr>
-              <a:t>x</a:t>
-            </a:r>
-            <a:endParaRPr lang="en-US" sz="3200" b="1" dirty="0">
-              <a:solidFill>
-                <a:schemeClr val="bg1">
-                  <a:lumMod val="50000"/>
-                </a:schemeClr>
-              </a:solidFill>
-            </a:endParaRPr>
-          </a:p>
-        </p:txBody>
-      </p:sp>
-      <p:sp>
-        <p:nvSpPr>
-          <p:cNvPr id="24" name="TextBox 23"/>
-          <p:cNvSpPr txBox="1"/>
-          <p:nvPr/>
-        </p:nvSpPr>
-        <p:spPr>
-          <a:xfrm>
-            <a:off x="5914092" y="2162717"/>
-            <a:ext cx="377026" cy="584776"/>
-          </a:xfrm>
-          <a:prstGeom prst="rect">
-            <a:avLst/>
-          </a:prstGeom>
-          <a:noFill/>
-        </p:spPr>
-        <p:txBody>
-          <a:bodyPr wrap="none" rtlCol="0">
-            <a:spAutoFit/>
-          </a:bodyPr>
-          <a:lstStyle/>
-          <a:p>
-            <a:r>
-              <a:rPr lang="en-US" sz="3200" b="1" dirty="0" smtClean="0">
-                <a:solidFill>
-                  <a:schemeClr val="bg1">
-                    <a:lumMod val="50000"/>
-                  </a:schemeClr>
-                </a:solidFill>
-              </a:rPr>
-              <a:t>x</a:t>
-            </a:r>
-            <a:endParaRPr lang="en-US" sz="3200" b="1" dirty="0">
-              <a:solidFill>
-                <a:schemeClr val="bg1">
-                  <a:lumMod val="50000"/>
-                </a:schemeClr>
-              </a:solidFill>
-            </a:endParaRPr>
-          </a:p>
-        </p:txBody>
-      </p:sp>
-      <p:sp>
-        <p:nvSpPr>
-          <p:cNvPr id="25" name="TextBox 24"/>
-          <p:cNvSpPr txBox="1"/>
-          <p:nvPr/>
-        </p:nvSpPr>
-        <p:spPr>
-          <a:xfrm>
-            <a:off x="4113283" y="2770060"/>
-            <a:ext cx="377026" cy="584776"/>
-          </a:xfrm>
-          <a:prstGeom prst="rect">
-            <a:avLst/>
-          </a:prstGeom>
-          <a:noFill/>
-        </p:spPr>
-        <p:txBody>
-          <a:bodyPr wrap="none" rtlCol="0">
-            <a:spAutoFit/>
-          </a:bodyPr>
-          <a:lstStyle/>
-          <a:p>
-            <a:r>
-              <a:rPr lang="en-US" sz="3200" b="1" dirty="0" smtClean="0">
-                <a:solidFill>
-                  <a:schemeClr val="bg1">
-                    <a:lumMod val="50000"/>
-                  </a:schemeClr>
-                </a:solidFill>
-              </a:rPr>
-              <a:t>x</a:t>
-            </a:r>
-            <a:endParaRPr lang="en-US" sz="3200" b="1" dirty="0">
-              <a:solidFill>
-                <a:schemeClr val="bg1">
-                  <a:lumMod val="50000"/>
-                </a:schemeClr>
-              </a:solidFill>
-            </a:endParaRPr>
-          </a:p>
-        </p:txBody>
-      </p:sp>
-      <p:sp>
-        <p:nvSpPr>
-          <p:cNvPr id="26" name="TextBox 25"/>
-          <p:cNvSpPr txBox="1"/>
-          <p:nvPr/>
-        </p:nvSpPr>
-        <p:spPr>
-          <a:xfrm>
-            <a:off x="5319071" y="2760467"/>
-            <a:ext cx="377026" cy="584776"/>
-          </a:xfrm>
-          <a:prstGeom prst="rect">
-            <a:avLst/>
-          </a:prstGeom>
-          <a:noFill/>
-        </p:spPr>
-        <p:txBody>
-          <a:bodyPr wrap="none" rtlCol="0">
-            <a:spAutoFit/>
-          </a:bodyPr>
-          <a:lstStyle/>
-          <a:p>
-            <a:r>
-              <a:rPr lang="en-US" sz="3200" b="1" dirty="0" smtClean="0">
-                <a:solidFill>
-                  <a:schemeClr val="bg1">
-                    <a:lumMod val="50000"/>
-                  </a:schemeClr>
-                </a:solidFill>
-              </a:rPr>
-              <a:t>x</a:t>
-            </a:r>
-            <a:endParaRPr lang="en-US" sz="3200" b="1" dirty="0">
-              <a:solidFill>
-                <a:schemeClr val="bg1">
-                  <a:lumMod val="50000"/>
-                </a:schemeClr>
-              </a:solidFill>
-            </a:endParaRPr>
-          </a:p>
-        </p:txBody>
-      </p:sp>
-      <p:sp>
-        <p:nvSpPr>
-          <p:cNvPr id="27" name="TextBox 26"/>
-          <p:cNvSpPr txBox="1"/>
-          <p:nvPr/>
-        </p:nvSpPr>
-        <p:spPr>
-          <a:xfrm>
-            <a:off x="6500232" y="2770060"/>
-            <a:ext cx="377026" cy="584776"/>
-          </a:xfrm>
-          <a:prstGeom prst="rect">
-            <a:avLst/>
-          </a:prstGeom>
-          <a:noFill/>
-        </p:spPr>
-        <p:txBody>
-          <a:bodyPr wrap="none" rtlCol="0">
-            <a:spAutoFit/>
-          </a:bodyPr>
-          <a:lstStyle/>
-          <a:p>
-            <a:r>
-              <a:rPr lang="en-US" sz="3200" b="1" dirty="0" smtClean="0">
-                <a:solidFill>
-                  <a:schemeClr val="bg1">
-                    <a:lumMod val="50000"/>
-                  </a:schemeClr>
-                </a:solidFill>
-              </a:rPr>
-              <a:t>x</a:t>
-            </a:r>
-            <a:endParaRPr lang="en-US" sz="3200" b="1" dirty="0">
-              <a:solidFill>
-                <a:schemeClr val="bg1">
-                  <a:lumMod val="50000"/>
-                </a:schemeClr>
-              </a:solidFill>
-            </a:endParaRPr>
-          </a:p>
-        </p:txBody>
-      </p:sp>
-      <p:sp>
-        <p:nvSpPr>
-          <p:cNvPr id="28" name="TextBox 27"/>
-          <p:cNvSpPr txBox="1"/>
-          <p:nvPr/>
-        </p:nvSpPr>
-        <p:spPr>
-          <a:xfrm>
-            <a:off x="4137912" y="3932049"/>
-            <a:ext cx="377026" cy="584776"/>
-          </a:xfrm>
-          <a:prstGeom prst="rect">
-            <a:avLst/>
-          </a:prstGeom>
-          <a:noFill/>
-        </p:spPr>
-        <p:txBody>
-          <a:bodyPr wrap="none" rtlCol="0">
-            <a:spAutoFit/>
-          </a:bodyPr>
-          <a:lstStyle/>
-          <a:p>
-            <a:r>
-              <a:rPr lang="en-US" sz="3200" b="1" dirty="0" smtClean="0">
-                <a:solidFill>
-                  <a:schemeClr val="bg1">
-                    <a:lumMod val="50000"/>
-                  </a:schemeClr>
-                </a:solidFill>
-              </a:rPr>
-              <a:t>x</a:t>
-            </a:r>
-            <a:endParaRPr lang="en-US" sz="3200" b="1" dirty="0">
-              <a:solidFill>
-                <a:schemeClr val="bg1">
-                  <a:lumMod val="50000"/>
-                </a:schemeClr>
-              </a:solidFill>
-            </a:endParaRPr>
-          </a:p>
-        </p:txBody>
-      </p:sp>
-      <p:sp>
-        <p:nvSpPr>
-          <p:cNvPr id="29" name="TextBox 28"/>
-          <p:cNvSpPr txBox="1"/>
-          <p:nvPr/>
-        </p:nvSpPr>
-        <p:spPr>
-          <a:xfrm>
-            <a:off x="5319071" y="3958692"/>
-            <a:ext cx="377026" cy="584776"/>
-          </a:xfrm>
-          <a:prstGeom prst="rect">
-            <a:avLst/>
-          </a:prstGeom>
-          <a:noFill/>
-        </p:spPr>
-        <p:txBody>
-          <a:bodyPr wrap="none" rtlCol="0">
-            <a:spAutoFit/>
-          </a:bodyPr>
-          <a:lstStyle/>
-          <a:p>
-            <a:r>
-              <a:rPr lang="en-US" sz="3200" b="1" dirty="0" smtClean="0">
-                <a:solidFill>
-                  <a:schemeClr val="bg1">
-                    <a:lumMod val="50000"/>
-                  </a:schemeClr>
-                </a:solidFill>
-              </a:rPr>
-              <a:t>x</a:t>
-            </a:r>
-            <a:endParaRPr lang="en-US" sz="3200" b="1" dirty="0">
-              <a:solidFill>
-                <a:schemeClr val="bg1">
-                  <a:lumMod val="50000"/>
-                </a:schemeClr>
-              </a:solidFill>
-            </a:endParaRPr>
-          </a:p>
-        </p:txBody>
-      </p:sp>
-      <p:sp>
-        <p:nvSpPr>
-          <p:cNvPr id="30" name="TextBox 29"/>
-          <p:cNvSpPr txBox="1"/>
-          <p:nvPr/>
-        </p:nvSpPr>
-        <p:spPr>
-          <a:xfrm>
-            <a:off x="6500232" y="3951149"/>
-            <a:ext cx="377026" cy="584776"/>
-          </a:xfrm>
-          <a:prstGeom prst="rect">
-            <a:avLst/>
-          </a:prstGeom>
-          <a:noFill/>
-        </p:spPr>
-        <p:txBody>
-          <a:bodyPr wrap="none" rtlCol="0">
-            <a:spAutoFit/>
-          </a:bodyPr>
-          <a:lstStyle/>
-          <a:p>
-            <a:r>
-              <a:rPr lang="en-US" sz="3200" b="1" dirty="0" smtClean="0">
-                <a:solidFill>
-                  <a:schemeClr val="bg1">
-                    <a:lumMod val="50000"/>
-                  </a:schemeClr>
-                </a:solidFill>
-              </a:rPr>
-              <a:t>x</a:t>
-            </a:r>
-            <a:endParaRPr lang="en-US" sz="3200" b="1" dirty="0">
-              <a:solidFill>
-                <a:schemeClr val="bg1">
-                  <a:lumMod val="50000"/>
-                </a:schemeClr>
-              </a:solidFill>
-            </a:endParaRPr>
-          </a:p>
-        </p:txBody>
-      </p:sp>
-      <p:sp>
-        <p:nvSpPr>
-          <p:cNvPr id="31" name="TextBox 30"/>
-          <p:cNvSpPr txBox="1"/>
-          <p:nvPr/>
-        </p:nvSpPr>
-        <p:spPr>
-          <a:xfrm>
-            <a:off x="4715170" y="3373916"/>
-            <a:ext cx="377026" cy="584776"/>
-          </a:xfrm>
-          <a:prstGeom prst="rect">
-            <a:avLst/>
-          </a:prstGeom>
-          <a:noFill/>
-        </p:spPr>
-        <p:txBody>
-          <a:bodyPr wrap="none" rtlCol="0">
-            <a:spAutoFit/>
-          </a:bodyPr>
-          <a:lstStyle/>
-          <a:p>
-            <a:r>
-              <a:rPr lang="en-US" sz="3200" b="1" dirty="0" smtClean="0">
-                <a:solidFill>
-                  <a:schemeClr val="bg1">
-                    <a:lumMod val="50000"/>
-                  </a:schemeClr>
-                </a:solidFill>
-              </a:rPr>
-              <a:t>x</a:t>
-            </a:r>
-            <a:endParaRPr lang="en-US" sz="3200" b="1" dirty="0">
-              <a:solidFill>
-                <a:schemeClr val="bg1">
-                  <a:lumMod val="50000"/>
-                </a:schemeClr>
-              </a:solidFill>
-            </a:endParaRPr>
-          </a:p>
-        </p:txBody>
-      </p:sp>
-      <p:sp>
-        <p:nvSpPr>
-          <p:cNvPr id="32" name="TextBox 31"/>
-          <p:cNvSpPr txBox="1"/>
-          <p:nvPr/>
-        </p:nvSpPr>
-        <p:spPr>
-          <a:xfrm>
-            <a:off x="5914092" y="3354124"/>
-            <a:ext cx="377026" cy="584776"/>
-          </a:xfrm>
-          <a:prstGeom prst="rect">
-            <a:avLst/>
-          </a:prstGeom>
-          <a:noFill/>
-        </p:spPr>
-        <p:txBody>
-          <a:bodyPr wrap="none" rtlCol="0">
-            <a:spAutoFit/>
-          </a:bodyPr>
-          <a:lstStyle/>
-          <a:p>
-            <a:r>
-              <a:rPr lang="en-US" sz="3200" b="1" dirty="0" smtClean="0">
-                <a:solidFill>
-                  <a:schemeClr val="bg1">
-                    <a:lumMod val="50000"/>
-                  </a:schemeClr>
-                </a:solidFill>
-              </a:rPr>
-              <a:t>x</a:t>
-            </a:r>
-            <a:endParaRPr lang="en-US" sz="3200" b="1" dirty="0">
-              <a:solidFill>
-                <a:schemeClr val="bg1">
-                  <a:lumMod val="50000"/>
-                </a:schemeClr>
-              </a:solidFill>
-            </a:endParaRPr>
-          </a:p>
-        </p:txBody>
-      </p:sp>
-      <p:sp>
-        <p:nvSpPr>
-          <p:cNvPr id="7" name="Rectangle 6"/>
-          <p:cNvSpPr/>
-          <p:nvPr/>
-        </p:nvSpPr>
-        <p:spPr>
-          <a:xfrm>
-            <a:off x="4308663" y="1935961"/>
-            <a:ext cx="595020" cy="586116"/>
-          </a:xfrm>
-          <a:prstGeom prst="rect">
-            <a:avLst/>
-          </a:prstGeom>
-          <a:noFill/>
-          <a:ln w="50800">
-            <a:solidFill>
-              <a:schemeClr val="tx1"/>
-            </a:solidFill>
-            <a:prstDash val="sysDash"/>
-          </a:ln>
-        </p:spPr>
-        <p:style>
-          <a:lnRef idx="1">
-            <a:schemeClr val="accent1"/>
-          </a:lnRef>
-          <a:fillRef idx="3">
-            <a:schemeClr val="accent1"/>
-          </a:fillRef>
-          <a:effectRef idx="2">
-            <a:schemeClr val="accent1"/>
-          </a:effectRef>
-          <a:fontRef idx="minor">
-            <a:schemeClr val="lt1"/>
-          </a:fontRef>
-        </p:style>
-        <p:txBody>
-          <a:bodyPr rtlCol="0" anchor="ctr"/>
-          <a:lstStyle/>
-          <a:p>
-            <a:pPr algn="ctr"/>
-            <a:endParaRPr lang="en-US"/>
-          </a:p>
-        </p:txBody>
-      </p:sp>
+      </p:cxnSp>
     </p:spTree>
     <p:extLst>
       <p:ext uri="{BB962C8B-B14F-4D97-AF65-F5344CB8AC3E}">
-        <p14:creationId xmlns:p14="http://schemas.microsoft.com/office/powerpoint/2010/main" val="2484563120"/>
+        <p14:creationId xmlns:p14="http://schemas.microsoft.com/office/powerpoint/2010/main" val="3608034763"/>
       </p:ext>
     </p:extLst>
   </p:cSld>

</xml_diff>

<commit_message>
Some more work on vibrational properties section, specifically added CZTS phonon dispersion curves
</commit_message>
<xml_diff>
--- a/figures.pptx
+++ b/figures.pptx
@@ -16,8 +16,15 @@
     <p:sldId id="264" r:id="rId10"/>
     <p:sldId id="265" r:id="rId11"/>
     <p:sldId id="267" r:id="rId12"/>
-    <p:sldId id="266" r:id="rId13"/>
-    <p:sldId id="268" r:id="rId14"/>
+    <p:sldId id="269" r:id="rId13"/>
+    <p:sldId id="266" r:id="rId14"/>
+    <p:sldId id="268" r:id="rId15"/>
+    <p:sldId id="270" r:id="rId16"/>
+    <p:sldId id="271" r:id="rId17"/>
+    <p:sldId id="272" r:id="rId18"/>
+    <p:sldId id="273" r:id="rId19"/>
+    <p:sldId id="274" r:id="rId20"/>
+    <p:sldId id="275" r:id="rId21"/>
   </p:sldIdLst>
   <p:sldSz cx="9144000" cy="6858000" type="screen4x3"/>
   <p:notesSz cx="6858000" cy="9144000"/>
@@ -4487,162 +4494,58 @@
           <a:chExt cx="0" cy="0"/>
         </a:xfrm>
       </p:grpSpPr>
-      <p:grpSp>
-        <p:nvGrpSpPr>
-          <p:cNvPr id="8" name="Group 7"/>
-          <p:cNvGrpSpPr/>
+      <p:pic>
+        <p:nvPicPr>
+          <p:cNvPr id="4" name="Picture 2"/>
+          <p:cNvPicPr>
+            <a:picLocks noChangeAspect="1" noChangeArrowheads="1"/>
+          </p:cNvPicPr>
           <p:nvPr/>
-        </p:nvGrpSpPr>
-        <p:grpSpPr>
-          <a:xfrm>
-            <a:off x="0" y="1257730"/>
-            <a:ext cx="8997307" cy="4139985"/>
-            <a:chOff x="0" y="1257730"/>
-            <a:chExt cx="8997307" cy="4139985"/>
-          </a:xfrm>
-        </p:grpSpPr>
-        <p:pic>
-          <p:nvPicPr>
-            <p:cNvPr id="4" name="Picture 2"/>
-            <p:cNvPicPr>
-              <a:picLocks noChangeAspect="1" noChangeArrowheads="1"/>
-            </p:cNvPicPr>
-            <p:nvPr/>
-          </p:nvPicPr>
-          <p:blipFill rotWithShape="1">
-            <a:blip r:embed="rId2">
-              <a:extLst>
-                <a:ext uri="{28A0092B-C50C-407E-A947-70E740481C1C}">
-                  <a14:useLocalDpi xmlns:a14="http://schemas.microsoft.com/office/drawing/2010/main" val="0"/>
-                </a:ext>
-              </a:extLst>
-            </a:blip>
-            <a:srcRect l="28966" r="21277" b="42009"/>
-            <a:stretch/>
-          </p:blipFill>
-          <p:spPr bwMode="auto">
-            <a:xfrm>
-              <a:off x="0" y="1638011"/>
-              <a:ext cx="2988860" cy="3759704"/>
-            </a:xfrm>
-            <a:prstGeom prst="rect">
-              <a:avLst/>
-            </a:prstGeom>
-            <a:noFill/>
-            <a:ln>
-              <a:noFill/>
-            </a:ln>
+        </p:nvPicPr>
+        <p:blipFill rotWithShape="1">
+          <a:blip r:embed="rId2">
             <a:extLst>
-              <a:ext uri="{909E8E84-426E-40dd-AFC4-6F175D3DCCD1}">
-                <a14:hiddenFill xmlns:a14="http://schemas.microsoft.com/office/drawing/2010/main">
-                  <a:solidFill>
-                    <a:schemeClr val="accent1"/>
-                  </a:solidFill>
-                </a14:hiddenFill>
-              </a:ext>
-              <a:ext uri="{91240B29-F687-4f45-9708-019B960494DF}">
-                <a14:hiddenLine xmlns:a14="http://schemas.microsoft.com/office/drawing/2010/main" w="9525">
-                  <a:solidFill>
-                    <a:schemeClr val="tx1"/>
-                  </a:solidFill>
-                  <a:miter lim="800000"/>
-                  <a:headEnd/>
-                  <a:tailEnd/>
-                </a14:hiddenLine>
+              <a:ext uri="{28A0092B-C50C-407E-A947-70E740481C1C}">
+                <a14:useLocalDpi xmlns:a14="http://schemas.microsoft.com/office/drawing/2010/main" val="0"/>
               </a:ext>
             </a:extLst>
-          </p:spPr>
-        </p:pic>
-        <p:pic>
-          <p:nvPicPr>
-            <p:cNvPr id="5" name="Picture 4"/>
-            <p:cNvPicPr>
-              <a:picLocks noChangeAspect="1"/>
-            </p:cNvPicPr>
-            <p:nvPr/>
-          </p:nvPicPr>
-          <p:blipFill>
-            <a:blip r:embed="rId3"/>
-            <a:stretch>
-              <a:fillRect/>
-            </a:stretch>
-          </p:blipFill>
-          <p:spPr>
-            <a:xfrm>
-              <a:off x="3120071" y="1934305"/>
-              <a:ext cx="5877236" cy="3178739"/>
-            </a:xfrm>
-            <a:prstGeom prst="rect">
-              <a:avLst/>
-            </a:prstGeom>
-            <a:ln w="12700" cmpd="sng">
-              <a:solidFill>
-                <a:schemeClr val="tx1"/>
-              </a:solidFill>
-            </a:ln>
-          </p:spPr>
-        </p:pic>
-        <p:sp>
-          <p:nvSpPr>
-            <p:cNvPr id="6" name="TextBox 5"/>
-            <p:cNvSpPr txBox="1"/>
-            <p:nvPr/>
-          </p:nvSpPr>
-          <p:spPr>
-            <a:xfrm>
-              <a:off x="222910" y="1257730"/>
-              <a:ext cx="298617" cy="369332"/>
-            </a:xfrm>
-            <a:prstGeom prst="rect">
-              <a:avLst/>
-            </a:prstGeom>
+          </a:blip>
+          <a:srcRect l="28966" r="21277" b="42009"/>
+          <a:stretch/>
+        </p:blipFill>
+        <p:spPr bwMode="auto">
+          <a:xfrm>
+            <a:off x="2014362" y="1331447"/>
+            <a:ext cx="2988860" cy="3759704"/>
+          </a:xfrm>
+          <a:prstGeom prst="rect">
+            <a:avLst/>
+          </a:prstGeom>
+          <a:noFill/>
+          <a:ln>
             <a:noFill/>
-          </p:spPr>
-          <p:txBody>
-            <a:bodyPr wrap="none" rtlCol="0">
-              <a:spAutoFit/>
-            </a:bodyPr>
-            <a:lstStyle/>
-            <a:p>
-              <a:r>
-                <a:rPr lang="en-US" b="1" dirty="0" smtClean="0"/>
-                <a:t>a</a:t>
-              </a:r>
-              <a:endParaRPr lang="en-US" b="1" dirty="0"/>
-            </a:p>
-          </p:txBody>
-        </p:sp>
-        <p:sp>
-          <p:nvSpPr>
-            <p:cNvPr id="7" name="TextBox 6"/>
-            <p:cNvSpPr txBox="1"/>
-            <p:nvPr/>
-          </p:nvSpPr>
-          <p:spPr>
-            <a:xfrm>
-              <a:off x="3120071" y="1257730"/>
-              <a:ext cx="308535" cy="369332"/>
-            </a:xfrm>
-            <a:prstGeom prst="rect">
-              <a:avLst/>
-            </a:prstGeom>
-            <a:noFill/>
-          </p:spPr>
-          <p:txBody>
-            <a:bodyPr wrap="none" rtlCol="0">
-              <a:spAutoFit/>
-            </a:bodyPr>
-            <a:lstStyle/>
-            <a:p>
-              <a:r>
-                <a:rPr lang="en-US" b="1" dirty="0"/>
-                <a:t>b</a:t>
-              </a:r>
-              <a:endParaRPr lang="en-US" b="1" dirty="0"/>
-            </a:p>
-          </p:txBody>
-        </p:sp>
-      </p:grpSp>
+          </a:ln>
+          <a:extLst>
+            <a:ext uri="{909E8E84-426E-40dd-AFC4-6F175D3DCCD1}">
+              <a14:hiddenFill xmlns:a14="http://schemas.microsoft.com/office/drawing/2010/main">
+                <a:solidFill>
+                  <a:schemeClr val="accent1"/>
+                </a:solidFill>
+              </a14:hiddenFill>
+            </a:ext>
+            <a:ext uri="{91240B29-F687-4f45-9708-019B960494DF}">
+              <a14:hiddenLine xmlns:a14="http://schemas.microsoft.com/office/drawing/2010/main" w="9525">
+                <a:solidFill>
+                  <a:schemeClr val="tx1"/>
+                </a:solidFill>
+                <a:miter lim="800000"/>
+                <a:headEnd/>
+                <a:tailEnd/>
+              </a14:hiddenLine>
+            </a:ext>
+          </a:extLst>
+        </p:spPr>
+      </p:pic>
     </p:spTree>
     <p:extLst>
       <p:ext uri="{BB962C8B-B14F-4D97-AF65-F5344CB8AC3E}">
@@ -4673,318 +4576,492 @@
           <a:chExt cx="0" cy="0"/>
         </a:xfrm>
       </p:grpSpPr>
-      <p:pic>
-        <p:nvPicPr>
-          <p:cNvPr id="4" name="Picture 3"/>
-          <p:cNvPicPr>
-            <a:picLocks noChangeAspect="1"/>
-          </p:cNvPicPr>
+      <p:grpSp>
+        <p:nvGrpSpPr>
+          <p:cNvPr id="8" name="Group 7"/>
+          <p:cNvGrpSpPr/>
           <p:nvPr/>
-        </p:nvPicPr>
-        <p:blipFill rotWithShape="1">
-          <a:blip r:embed="rId2"/>
-          <a:srcRect l="60439"/>
-          <a:stretch/>
-        </p:blipFill>
-        <p:spPr>
+        </p:nvGrpSpPr>
+        <p:grpSpPr>
           <a:xfrm>
-            <a:off x="6291620" y="1276254"/>
-            <a:ext cx="1537541" cy="1634642"/>
+            <a:off x="0" y="1382861"/>
+            <a:ext cx="9187792" cy="4091495"/>
+            <a:chOff x="0" y="1382861"/>
+            <a:chExt cx="9187792" cy="4091495"/>
           </a:xfrm>
-          <a:prstGeom prst="rect">
-            <a:avLst/>
-          </a:prstGeom>
-        </p:spPr>
-      </p:pic>
-      <p:pic>
-        <p:nvPicPr>
-          <p:cNvPr id="7" name="Picture 6"/>
-          <p:cNvPicPr>
-            <a:picLocks noChangeAspect="1"/>
-          </p:cNvPicPr>
+        </p:grpSpPr>
+        <p:pic>
+          <p:nvPicPr>
+            <p:cNvPr id="4" name="Picture 3"/>
+            <p:cNvPicPr>
+              <a:picLocks noChangeAspect="1"/>
+            </p:cNvPicPr>
+            <p:nvPr/>
+          </p:nvPicPr>
+          <p:blipFill>
+            <a:blip r:embed="rId2"/>
+            <a:stretch>
+              <a:fillRect/>
+            </a:stretch>
+          </p:blipFill>
+          <p:spPr>
+            <a:xfrm>
+              <a:off x="0" y="1752193"/>
+              <a:ext cx="3323645" cy="3722163"/>
+            </a:xfrm>
+            <a:prstGeom prst="rect">
+              <a:avLst/>
+            </a:prstGeom>
+          </p:spPr>
+        </p:pic>
+        <p:pic>
+          <p:nvPicPr>
+            <p:cNvPr id="5" name="Picture 4"/>
+            <p:cNvPicPr>
+              <a:picLocks noChangeAspect="1"/>
+            </p:cNvPicPr>
+            <p:nvPr/>
+          </p:nvPicPr>
+          <p:blipFill>
+            <a:blip r:embed="rId3"/>
+            <a:stretch>
+              <a:fillRect/>
+            </a:stretch>
+          </p:blipFill>
+          <p:spPr>
+            <a:xfrm>
+              <a:off x="3310556" y="2054741"/>
+              <a:ext cx="5877236" cy="3178739"/>
+            </a:xfrm>
+            <a:prstGeom prst="rect">
+              <a:avLst/>
+            </a:prstGeom>
+            <a:ln w="12700" cmpd="sng">
+              <a:noFill/>
+            </a:ln>
+          </p:spPr>
+        </p:pic>
+        <p:sp>
+          <p:nvSpPr>
+            <p:cNvPr id="6" name="TextBox 5"/>
+            <p:cNvSpPr txBox="1"/>
+            <p:nvPr/>
+          </p:nvSpPr>
+          <p:spPr>
+            <a:xfrm>
+              <a:off x="104488" y="1382861"/>
+              <a:ext cx="298617" cy="369332"/>
+            </a:xfrm>
+            <a:prstGeom prst="rect">
+              <a:avLst/>
+            </a:prstGeom>
+            <a:noFill/>
+          </p:spPr>
+          <p:txBody>
+            <a:bodyPr wrap="none" rtlCol="0">
+              <a:spAutoFit/>
+            </a:bodyPr>
+            <a:lstStyle/>
+            <a:p>
+              <a:r>
+                <a:rPr lang="en-US" b="1" dirty="0" smtClean="0"/>
+                <a:t>a</a:t>
+              </a:r>
+              <a:endParaRPr lang="en-US" b="1" dirty="0"/>
+            </a:p>
+          </p:txBody>
+        </p:sp>
+        <p:sp>
+          <p:nvSpPr>
+            <p:cNvPr id="7" name="TextBox 6"/>
+            <p:cNvSpPr txBox="1"/>
+            <p:nvPr/>
+          </p:nvSpPr>
+          <p:spPr>
+            <a:xfrm>
+              <a:off x="3432608" y="1382861"/>
+              <a:ext cx="308535" cy="369332"/>
+            </a:xfrm>
+            <a:prstGeom prst="rect">
+              <a:avLst/>
+            </a:prstGeom>
+            <a:noFill/>
+          </p:spPr>
+          <p:txBody>
+            <a:bodyPr wrap="none" rtlCol="0">
+              <a:spAutoFit/>
+            </a:bodyPr>
+            <a:lstStyle/>
+            <a:p>
+              <a:r>
+                <a:rPr lang="en-US" b="1" dirty="0"/>
+                <a:t>b</a:t>
+              </a:r>
+              <a:endParaRPr lang="en-US" b="1" dirty="0"/>
+            </a:p>
+          </p:txBody>
+        </p:sp>
+      </p:grpSp>
+    </p:spTree>
+    <p:extLst>
+      <p:ext uri="{BB962C8B-B14F-4D97-AF65-F5344CB8AC3E}">
+        <p14:creationId xmlns:p14="http://schemas.microsoft.com/office/powerpoint/2010/main" val="1946252200"/>
+      </p:ext>
+    </p:extLst>
+  </p:cSld>
+  <p:clrMapOvr>
+    <a:masterClrMapping/>
+  </p:clrMapOvr>
+</p:sld>
+</file>
+
+<file path=ppt/slides/slide13.xml><?xml version="1.0" encoding="utf-8"?>
+<p:sld xmlns:a="http://schemas.openxmlformats.org/drawingml/2006/main" xmlns:r="http://schemas.openxmlformats.org/officeDocument/2006/relationships" xmlns:p="http://schemas.openxmlformats.org/presentationml/2006/main">
+  <p:cSld>
+    <p:spTree>
+      <p:nvGrpSpPr>
+        <p:cNvPr id="1" name=""/>
+        <p:cNvGrpSpPr/>
+        <p:nvPr/>
+      </p:nvGrpSpPr>
+      <p:grpSpPr>
+        <a:xfrm>
+          <a:off x="0" y="0"/>
+          <a:ext cx="0" cy="0"/>
+          <a:chOff x="0" y="0"/>
+          <a:chExt cx="0" cy="0"/>
+        </a:xfrm>
+      </p:grpSpPr>
+      <p:grpSp>
+        <p:nvGrpSpPr>
+          <p:cNvPr id="25" name="Group 24"/>
+          <p:cNvGrpSpPr/>
           <p:nvPr/>
-        </p:nvPicPr>
-        <p:blipFill rotWithShape="1">
-          <a:blip r:embed="rId3"/>
-          <a:srcRect l="1" r="50791"/>
-          <a:stretch/>
-        </p:blipFill>
-        <p:spPr>
+        </p:nvGrpSpPr>
+        <p:grpSpPr>
           <a:xfrm>
-            <a:off x="6072669" y="3470106"/>
-            <a:ext cx="2291314" cy="2126305"/>
+            <a:off x="457692" y="1040618"/>
+            <a:ext cx="8813389" cy="4805995"/>
+            <a:chOff x="457692" y="1040618"/>
+            <a:chExt cx="8813389" cy="4805995"/>
           </a:xfrm>
-          <a:prstGeom prst="rect">
-            <a:avLst/>
-          </a:prstGeom>
-          <a:ln w="12700">
-            <a:solidFill>
+        </p:grpSpPr>
+        <p:pic>
+          <p:nvPicPr>
+            <p:cNvPr id="4" name="Picture 3"/>
+            <p:cNvPicPr>
+              <a:picLocks noChangeAspect="1"/>
+            </p:cNvPicPr>
+            <p:nvPr/>
+          </p:nvPicPr>
+          <p:blipFill rotWithShape="1">
+            <a:blip r:embed="rId2"/>
+            <a:srcRect l="60439" r="-3199"/>
+            <a:stretch/>
+          </p:blipFill>
+          <p:spPr>
+            <a:xfrm>
+              <a:off x="6542640" y="1276254"/>
+              <a:ext cx="1661864" cy="1634642"/>
+            </a:xfrm>
+            <a:prstGeom prst="rect">
+              <a:avLst/>
+            </a:prstGeom>
+            <a:ln>
+              <a:solidFill>
+                <a:schemeClr val="tx1"/>
+              </a:solidFill>
+            </a:ln>
+          </p:spPr>
+        </p:pic>
+        <p:pic>
+          <p:nvPicPr>
+            <p:cNvPr id="7" name="Picture 6"/>
+            <p:cNvPicPr>
+              <a:picLocks noChangeAspect="1"/>
+            </p:cNvPicPr>
+            <p:nvPr/>
+          </p:nvPicPr>
+          <p:blipFill rotWithShape="1">
+            <a:blip r:embed="rId3"/>
+            <a:srcRect l="-9844" r="50791" b="-11767"/>
+            <a:stretch/>
+          </p:blipFill>
+          <p:spPr>
+            <a:xfrm>
+              <a:off x="5764605" y="3470106"/>
+              <a:ext cx="2749759" cy="2376507"/>
+            </a:xfrm>
+            <a:prstGeom prst="rect">
+              <a:avLst/>
+            </a:prstGeom>
+            <a:ln w="12700">
+              <a:noFill/>
+            </a:ln>
+          </p:spPr>
+        </p:pic>
+        <p:cxnSp>
+          <p:nvCxnSpPr>
+            <p:cNvPr id="8" name="Straight Arrow Connector 7"/>
+            <p:cNvCxnSpPr/>
+            <p:nvPr/>
+          </p:nvCxnSpPr>
+          <p:spPr>
+            <a:xfrm>
+              <a:off x="7373572" y="4675544"/>
+              <a:ext cx="0" cy="497557"/>
+            </a:xfrm>
+            <a:prstGeom prst="straightConnector1">
+              <a:avLst/>
+            </a:prstGeom>
+            <a:ln>
+              <a:solidFill>
+                <a:srgbClr val="0000FF"/>
+              </a:solidFill>
+              <a:headEnd type="arrow"/>
+              <a:tailEnd type="arrow"/>
+            </a:ln>
+            <a:effectLst/>
+          </p:spPr>
+          <p:style>
+            <a:lnRef idx="2">
+              <a:schemeClr val="accent1"/>
+            </a:lnRef>
+            <a:fillRef idx="0">
+              <a:schemeClr val="accent1"/>
+            </a:fillRef>
+            <a:effectRef idx="1">
+              <a:schemeClr val="accent1"/>
+            </a:effectRef>
+            <a:fontRef idx="minor">
               <a:schemeClr val="tx1"/>
-            </a:solidFill>
-          </a:ln>
-        </p:spPr>
-      </p:pic>
-      <p:cxnSp>
-        <p:nvCxnSpPr>
-          <p:cNvPr id="8" name="Straight Arrow Connector 7"/>
-          <p:cNvCxnSpPr/>
-          <p:nvPr/>
-        </p:nvCxnSpPr>
-        <p:spPr>
-          <a:xfrm>
-            <a:off x="7373572" y="4675544"/>
-            <a:ext cx="0" cy="497557"/>
-          </a:xfrm>
-          <a:prstGeom prst="straightConnector1">
-            <a:avLst/>
-          </a:prstGeom>
-          <a:ln>
-            <a:solidFill>
-              <a:srgbClr val="0000FF"/>
-            </a:solidFill>
-            <a:headEnd type="arrow"/>
-            <a:tailEnd type="arrow"/>
-          </a:ln>
-          <a:effectLst/>
-        </p:spPr>
-        <p:style>
-          <a:lnRef idx="2">
-            <a:schemeClr val="accent1"/>
-          </a:lnRef>
-          <a:fillRef idx="0">
-            <a:schemeClr val="accent1"/>
-          </a:fillRef>
-          <a:effectRef idx="1">
-            <a:schemeClr val="accent1"/>
-          </a:effectRef>
-          <a:fontRef idx="minor">
-            <a:schemeClr val="tx1"/>
-          </a:fontRef>
-        </p:style>
-      </p:cxnSp>
-      <p:sp>
-        <p:nvSpPr>
-          <p:cNvPr id="9" name="TextBox 8"/>
-          <p:cNvSpPr txBox="1"/>
-          <p:nvPr/>
-        </p:nvSpPr>
-        <p:spPr>
-          <a:xfrm>
-            <a:off x="6072668" y="4204748"/>
-            <a:ext cx="2488371" cy="338554"/>
-          </a:xfrm>
-          <a:prstGeom prst="rect">
-            <a:avLst/>
-          </a:prstGeom>
-          <a:noFill/>
-        </p:spPr>
-        <p:txBody>
-          <a:bodyPr wrap="square" rtlCol="0">
-            <a:spAutoFit/>
-          </a:bodyPr>
-          <a:lstStyle/>
-          <a:p>
-            <a:r>
-              <a:rPr lang="en-US" sz="1600" b="1" dirty="0">
+            </a:fontRef>
+          </p:style>
+        </p:cxnSp>
+        <p:sp>
+          <p:nvSpPr>
+            <p:cNvPr id="9" name="TextBox 8"/>
+            <p:cNvSpPr txBox="1"/>
+            <p:nvPr/>
+          </p:nvSpPr>
+          <p:spPr>
+            <a:xfrm>
+              <a:off x="6256467" y="5368639"/>
+              <a:ext cx="3014614" cy="338554"/>
+            </a:xfrm>
+            <a:prstGeom prst="rect">
+              <a:avLst/>
+            </a:prstGeom>
+            <a:noFill/>
+          </p:spPr>
+          <p:txBody>
+            <a:bodyPr wrap="square" rtlCol="0">
+              <a:spAutoFit/>
+            </a:bodyPr>
+            <a:lstStyle/>
+            <a:p>
+              <a:r>
+                <a:rPr lang="en-US" sz="1600" b="1" dirty="0">
+                  <a:solidFill>
+                    <a:srgbClr val="0000FF"/>
+                  </a:solidFill>
+                </a:rPr>
+                <a:t>b</a:t>
+              </a:r>
+              <a:r>
+                <a:rPr lang="en-US" sz="1600" b="1" dirty="0" smtClean="0">
+                  <a:solidFill>
+                    <a:srgbClr val="0000FF"/>
+                  </a:solidFill>
+                </a:rPr>
+                <a:t>and gap </a:t>
+              </a:r>
+              <a:r>
+                <a:rPr lang="en-US" sz="1600" b="1" dirty="0" smtClean="0">
+                  <a:solidFill>
+                    <a:srgbClr val="0000FF"/>
+                  </a:solidFill>
+                </a:rPr>
+                <a:t>not maintained</a:t>
+              </a:r>
+              <a:endParaRPr lang="en-US" sz="1600" b="1" dirty="0">
                 <a:solidFill>
                   <a:srgbClr val="0000FF"/>
                 </a:solidFill>
-              </a:rPr>
-              <a:t>b</a:t>
-            </a:r>
-            <a:r>
-              <a:rPr lang="en-US" sz="1600" b="1" dirty="0" smtClean="0">
-                <a:solidFill>
-                  <a:srgbClr val="0000FF"/>
-                </a:solidFill>
-              </a:rPr>
-              <a:t>and gap </a:t>
-            </a:r>
-            <a:r>
-              <a:rPr lang="en-US" sz="1600" b="1" dirty="0" smtClean="0">
-                <a:solidFill>
-                  <a:srgbClr val="0000FF"/>
-                </a:solidFill>
-              </a:rPr>
-              <a:t>not maintained</a:t>
-            </a:r>
-            <a:endParaRPr lang="en-US" sz="1600" b="1" dirty="0">
+              </a:endParaRPr>
+            </a:p>
+          </p:txBody>
+        </p:sp>
+        <p:pic>
+          <p:nvPicPr>
+            <p:cNvPr id="10" name="Picture 9"/>
+            <p:cNvPicPr>
+              <a:picLocks noChangeAspect="1"/>
+            </p:cNvPicPr>
+            <p:nvPr/>
+          </p:nvPicPr>
+          <p:blipFill rotWithShape="1">
+            <a:blip r:embed="rId4"/>
+            <a:srcRect l="2289" t="11057" r="783" b="2324"/>
+            <a:stretch/>
+          </p:blipFill>
+          <p:spPr>
+            <a:xfrm rot="10800000">
+              <a:off x="457692" y="1435143"/>
+              <a:ext cx="5277174" cy="4069926"/>
+            </a:xfrm>
+            <a:prstGeom prst="rect">
+              <a:avLst/>
+            </a:prstGeom>
+            <a:ln w="57150" cmpd="sng">
+              <a:noFill/>
+            </a:ln>
+            <a:effectLst/>
+          </p:spPr>
+          <p:style>
+            <a:lnRef idx="1">
+              <a:schemeClr val="dk1"/>
+            </a:lnRef>
+            <a:fillRef idx="3">
+              <a:schemeClr val="dk1"/>
+            </a:fillRef>
+            <a:effectRef idx="2">
+              <a:schemeClr val="dk1"/>
+            </a:effectRef>
+            <a:fontRef idx="minor">
+              <a:schemeClr val="lt1"/>
+            </a:fontRef>
+          </p:style>
+        </p:pic>
+        <p:sp>
+          <p:nvSpPr>
+            <p:cNvPr id="11" name="TextBox 10"/>
+            <p:cNvSpPr txBox="1"/>
+            <p:nvPr/>
+          </p:nvSpPr>
+          <p:spPr>
+            <a:xfrm>
+              <a:off x="667805" y="1040618"/>
+              <a:ext cx="298617" cy="369332"/>
+            </a:xfrm>
+            <a:prstGeom prst="rect">
+              <a:avLst/>
+            </a:prstGeom>
+            <a:noFill/>
+          </p:spPr>
+          <p:txBody>
+            <a:bodyPr wrap="none" rtlCol="0">
+              <a:spAutoFit/>
+            </a:bodyPr>
+            <a:lstStyle/>
+            <a:p>
+              <a:r>
+                <a:rPr lang="en-US" b="1" dirty="0" smtClean="0"/>
+                <a:t>a</a:t>
+              </a:r>
+              <a:endParaRPr lang="en-US" b="1" dirty="0"/>
+            </a:p>
+          </p:txBody>
+        </p:sp>
+        <p:sp>
+          <p:nvSpPr>
+            <p:cNvPr id="12" name="TextBox 11"/>
+            <p:cNvSpPr txBox="1"/>
+            <p:nvPr/>
+          </p:nvSpPr>
+          <p:spPr>
+            <a:xfrm>
+              <a:off x="6072668" y="1040618"/>
+              <a:ext cx="308535" cy="369332"/>
+            </a:xfrm>
+            <a:prstGeom prst="rect">
+              <a:avLst/>
+            </a:prstGeom>
+            <a:noFill/>
+          </p:spPr>
+          <p:txBody>
+            <a:bodyPr wrap="none" rtlCol="0">
+              <a:spAutoFit/>
+            </a:bodyPr>
+            <a:lstStyle/>
+            <a:p>
+              <a:r>
+                <a:rPr lang="en-US" b="1" dirty="0"/>
+                <a:t>b</a:t>
+              </a:r>
+              <a:endParaRPr lang="en-US" b="1" dirty="0"/>
+            </a:p>
+          </p:txBody>
+        </p:sp>
+        <p:sp>
+          <p:nvSpPr>
+            <p:cNvPr id="13" name="TextBox 12"/>
+            <p:cNvSpPr txBox="1"/>
+            <p:nvPr/>
+          </p:nvSpPr>
+          <p:spPr>
+            <a:xfrm>
+              <a:off x="6072668" y="3247592"/>
+              <a:ext cx="281259" cy="369332"/>
+            </a:xfrm>
+            <a:prstGeom prst="rect">
+              <a:avLst/>
+            </a:prstGeom>
+            <a:noFill/>
+          </p:spPr>
+          <p:txBody>
+            <a:bodyPr wrap="none" rtlCol="0">
+              <a:spAutoFit/>
+            </a:bodyPr>
+            <a:lstStyle/>
+            <a:p>
+              <a:r>
+                <a:rPr lang="en-US" b="1" dirty="0"/>
+                <a:t>c</a:t>
+              </a:r>
+              <a:endParaRPr lang="en-US" b="1" dirty="0"/>
+            </a:p>
+          </p:txBody>
+        </p:sp>
+        <p:cxnSp>
+          <p:nvCxnSpPr>
+            <p:cNvPr id="16" name="Straight Arrow Connector 15"/>
+            <p:cNvCxnSpPr/>
+            <p:nvPr/>
+          </p:nvCxnSpPr>
+          <p:spPr>
+            <a:xfrm>
+              <a:off x="7011445" y="4590114"/>
+              <a:ext cx="0" cy="676217"/>
+            </a:xfrm>
+            <a:prstGeom prst="straightConnector1">
+              <a:avLst/>
+            </a:prstGeom>
+            <a:ln>
               <a:solidFill>
                 <a:srgbClr val="0000FF"/>
               </a:solidFill>
-            </a:endParaRPr>
-          </a:p>
-        </p:txBody>
-      </p:sp>
-      <p:pic>
-        <p:nvPicPr>
-          <p:cNvPr id="10" name="Picture 9"/>
-          <p:cNvPicPr>
-            <a:picLocks noChangeAspect="1"/>
-          </p:cNvPicPr>
-          <p:nvPr/>
-        </p:nvPicPr>
-        <p:blipFill rotWithShape="1">
-          <a:blip r:embed="rId4"/>
-          <a:srcRect l="2289" t="11057" r="783" b="2324"/>
-          <a:stretch/>
-        </p:blipFill>
-        <p:spPr>
-          <a:xfrm rot="10800000">
-            <a:off x="457692" y="1435143"/>
-            <a:ext cx="5277174" cy="4069926"/>
-          </a:xfrm>
-          <a:prstGeom prst="rect">
-            <a:avLst/>
-          </a:prstGeom>
-          <a:ln w="57150" cmpd="sng">
-            <a:noFill/>
-          </a:ln>
-          <a:effectLst/>
-        </p:spPr>
-        <p:style>
-          <a:lnRef idx="1">
-            <a:schemeClr val="dk1"/>
-          </a:lnRef>
-          <a:fillRef idx="3">
-            <a:schemeClr val="dk1"/>
-          </a:fillRef>
-          <a:effectRef idx="2">
-            <a:schemeClr val="dk1"/>
-          </a:effectRef>
-          <a:fontRef idx="minor">
-            <a:schemeClr val="lt1"/>
-          </a:fontRef>
-        </p:style>
-      </p:pic>
-      <p:sp>
-        <p:nvSpPr>
-          <p:cNvPr id="11" name="TextBox 10"/>
-          <p:cNvSpPr txBox="1"/>
-          <p:nvPr/>
-        </p:nvSpPr>
-        <p:spPr>
-          <a:xfrm>
-            <a:off x="667805" y="906922"/>
-            <a:ext cx="298617" cy="369332"/>
-          </a:xfrm>
-          <a:prstGeom prst="rect">
-            <a:avLst/>
-          </a:prstGeom>
-          <a:noFill/>
-        </p:spPr>
-        <p:txBody>
-          <a:bodyPr wrap="none" rtlCol="0">
-            <a:spAutoFit/>
-          </a:bodyPr>
-          <a:lstStyle/>
-          <a:p>
-            <a:r>
-              <a:rPr lang="en-US" b="1" dirty="0" smtClean="0"/>
-              <a:t>a</a:t>
-            </a:r>
-            <a:endParaRPr lang="en-US" b="1" dirty="0"/>
-          </a:p>
-        </p:txBody>
-      </p:sp>
-      <p:sp>
-        <p:nvSpPr>
-          <p:cNvPr id="12" name="TextBox 11"/>
-          <p:cNvSpPr txBox="1"/>
-          <p:nvPr/>
-        </p:nvSpPr>
-        <p:spPr>
-          <a:xfrm>
-            <a:off x="6072668" y="906922"/>
-            <a:ext cx="308535" cy="369332"/>
-          </a:xfrm>
-          <a:prstGeom prst="rect">
-            <a:avLst/>
-          </a:prstGeom>
-          <a:noFill/>
-        </p:spPr>
-        <p:txBody>
-          <a:bodyPr wrap="none" rtlCol="0">
-            <a:spAutoFit/>
-          </a:bodyPr>
-          <a:lstStyle/>
-          <a:p>
-            <a:r>
-              <a:rPr lang="en-US" b="1" dirty="0"/>
-              <a:t>b</a:t>
-            </a:r>
-            <a:endParaRPr lang="en-US" b="1" dirty="0"/>
-          </a:p>
-        </p:txBody>
-      </p:sp>
-      <p:sp>
-        <p:nvSpPr>
-          <p:cNvPr id="13" name="TextBox 12"/>
-          <p:cNvSpPr txBox="1"/>
-          <p:nvPr/>
-        </p:nvSpPr>
-        <p:spPr>
-          <a:xfrm>
-            <a:off x="6072668" y="3030336"/>
-            <a:ext cx="281259" cy="369332"/>
-          </a:xfrm>
-          <a:prstGeom prst="rect">
-            <a:avLst/>
-          </a:prstGeom>
-          <a:noFill/>
-        </p:spPr>
-        <p:txBody>
-          <a:bodyPr wrap="none" rtlCol="0">
-            <a:spAutoFit/>
-          </a:bodyPr>
-          <a:lstStyle/>
-          <a:p>
-            <a:r>
-              <a:rPr lang="en-US" b="1" dirty="0"/>
-              <a:t>c</a:t>
-            </a:r>
-            <a:endParaRPr lang="en-US" b="1" dirty="0"/>
-          </a:p>
-        </p:txBody>
-      </p:sp>
-      <p:cxnSp>
-        <p:nvCxnSpPr>
-          <p:cNvPr id="16" name="Straight Arrow Connector 15"/>
-          <p:cNvCxnSpPr/>
-          <p:nvPr/>
-        </p:nvCxnSpPr>
-        <p:spPr>
-          <a:xfrm>
-            <a:off x="7011445" y="4590114"/>
-            <a:ext cx="0" cy="676217"/>
-          </a:xfrm>
-          <a:prstGeom prst="straightConnector1">
-            <a:avLst/>
-          </a:prstGeom>
-          <a:ln>
-            <a:solidFill>
-              <a:srgbClr val="0000FF"/>
-            </a:solidFill>
-            <a:headEnd type="arrow"/>
-            <a:tailEnd type="arrow"/>
-          </a:ln>
-          <a:effectLst/>
-        </p:spPr>
-        <p:style>
-          <a:lnRef idx="2">
-            <a:schemeClr val="accent1"/>
-          </a:lnRef>
-          <a:fillRef idx="0">
-            <a:schemeClr val="accent1"/>
-          </a:fillRef>
-          <a:effectRef idx="1">
-            <a:schemeClr val="accent1"/>
-          </a:effectRef>
-          <a:fontRef idx="minor">
-            <a:schemeClr val="tx1"/>
-          </a:fontRef>
-        </p:style>
-      </p:cxnSp>
+              <a:headEnd type="arrow"/>
+              <a:tailEnd type="arrow"/>
+            </a:ln>
+            <a:effectLst/>
+          </p:spPr>
+          <p:style>
+            <a:lnRef idx="2">
+              <a:schemeClr val="accent1"/>
+            </a:lnRef>
+            <a:fillRef idx="0">
+              <a:schemeClr val="accent1"/>
+            </a:fillRef>
+            <a:effectRef idx="1">
+              <a:schemeClr val="accent1"/>
+            </a:effectRef>
+            <a:fontRef idx="minor">
+              <a:schemeClr val="tx1"/>
+            </a:fontRef>
+          </p:style>
+        </p:cxnSp>
+      </p:grpSp>
     </p:spTree>
     <p:extLst>
       <p:ext uri="{BB962C8B-B14F-4D97-AF65-F5344CB8AC3E}">
@@ -4998,7 +5075,550 @@
 </p:sld>
 </file>
 
-<file path=ppt/slides/slide13.xml><?xml version="1.0" encoding="utf-8"?>
+<file path=ppt/slides/slide14.xml><?xml version="1.0" encoding="utf-8"?>
+<p:sld xmlns:a="http://schemas.openxmlformats.org/drawingml/2006/main" xmlns:r="http://schemas.openxmlformats.org/officeDocument/2006/relationships" xmlns:p="http://schemas.openxmlformats.org/presentationml/2006/main">
+  <p:cSld>
+    <p:spTree>
+      <p:nvGrpSpPr>
+        <p:cNvPr id="1" name=""/>
+        <p:cNvGrpSpPr/>
+        <p:nvPr/>
+      </p:nvGrpSpPr>
+      <p:grpSpPr>
+        <a:xfrm>
+          <a:off x="0" y="0"/>
+          <a:ext cx="0" cy="0"/>
+          <a:chOff x="0" y="0"/>
+          <a:chExt cx="0" cy="0"/>
+        </a:xfrm>
+      </p:grpSpPr>
+      <p:grpSp>
+        <p:nvGrpSpPr>
+          <p:cNvPr id="11" name="Group 10"/>
+          <p:cNvGrpSpPr/>
+          <p:nvPr/>
+        </p:nvGrpSpPr>
+        <p:grpSpPr>
+          <a:xfrm>
+            <a:off x="2226352" y="1490272"/>
+            <a:ext cx="4627997" cy="3195777"/>
+            <a:chOff x="2226352" y="1490272"/>
+            <a:chExt cx="4627997" cy="3195777"/>
+          </a:xfrm>
+        </p:grpSpPr>
+        <p:pic>
+          <p:nvPicPr>
+            <p:cNvPr id="4" name="Picture 3"/>
+            <p:cNvPicPr>
+              <a:picLocks noChangeAspect="1"/>
+            </p:cNvPicPr>
+            <p:nvPr/>
+          </p:nvPicPr>
+          <p:blipFill rotWithShape="1">
+            <a:blip r:embed="rId2"/>
+            <a:srcRect b="24192"/>
+            <a:stretch/>
+          </p:blipFill>
+          <p:spPr>
+            <a:xfrm>
+              <a:off x="2226352" y="1490272"/>
+              <a:ext cx="4627997" cy="3195777"/>
+            </a:xfrm>
+            <a:prstGeom prst="rect">
+              <a:avLst/>
+            </a:prstGeom>
+          </p:spPr>
+        </p:pic>
+        <p:cxnSp>
+          <p:nvCxnSpPr>
+            <p:cNvPr id="5" name="Straight Arrow Connector 4"/>
+            <p:cNvCxnSpPr/>
+            <p:nvPr/>
+          </p:nvCxnSpPr>
+          <p:spPr>
+            <a:xfrm>
+              <a:off x="3070500" y="2329224"/>
+              <a:ext cx="0" cy="1331392"/>
+            </a:xfrm>
+            <a:prstGeom prst="straightConnector1">
+              <a:avLst/>
+            </a:prstGeom>
+            <a:ln>
+              <a:solidFill>
+                <a:srgbClr val="0000FF"/>
+              </a:solidFill>
+              <a:headEnd type="arrow"/>
+              <a:tailEnd type="arrow"/>
+            </a:ln>
+            <a:effectLst/>
+          </p:spPr>
+          <p:style>
+            <a:lnRef idx="2">
+              <a:schemeClr val="accent1"/>
+            </a:lnRef>
+            <a:fillRef idx="0">
+              <a:schemeClr val="accent1"/>
+            </a:fillRef>
+            <a:effectRef idx="1">
+              <a:schemeClr val="accent1"/>
+            </a:effectRef>
+            <a:fontRef idx="minor">
+              <a:schemeClr val="tx1"/>
+            </a:fontRef>
+          </p:style>
+        </p:cxnSp>
+        <p:sp>
+          <p:nvSpPr>
+            <p:cNvPr id="6" name="TextBox 5"/>
+            <p:cNvSpPr txBox="1"/>
+            <p:nvPr/>
+          </p:nvSpPr>
+          <p:spPr>
+            <a:xfrm>
+              <a:off x="3026708" y="2822233"/>
+              <a:ext cx="1286653" cy="584776"/>
+            </a:xfrm>
+            <a:prstGeom prst="rect">
+              <a:avLst/>
+            </a:prstGeom>
+            <a:noFill/>
+          </p:spPr>
+          <p:txBody>
+            <a:bodyPr wrap="square" rtlCol="0">
+              <a:spAutoFit/>
+            </a:bodyPr>
+            <a:lstStyle/>
+            <a:p>
+              <a:pPr algn="ctr"/>
+              <a:r>
+                <a:rPr lang="en-US" sz="1600" b="1" dirty="0">
+                  <a:solidFill>
+                    <a:srgbClr val="0000FF"/>
+                  </a:solidFill>
+                </a:rPr>
+                <a:t>b</a:t>
+              </a:r>
+              <a:r>
+                <a:rPr lang="en-US" sz="1600" b="1" dirty="0" smtClean="0">
+                  <a:solidFill>
+                    <a:srgbClr val="0000FF"/>
+                  </a:solidFill>
+                </a:rPr>
+                <a:t>and gap </a:t>
+              </a:r>
+              <a:r>
+                <a:rPr lang="en-US" sz="1600" b="1" dirty="0" smtClean="0">
+                  <a:solidFill>
+                    <a:srgbClr val="0000FF"/>
+                  </a:solidFill>
+                </a:rPr>
+                <a:t>maintained</a:t>
+              </a:r>
+              <a:endParaRPr lang="en-US" sz="1600" b="1" dirty="0">
+                <a:solidFill>
+                  <a:srgbClr val="0000FF"/>
+                </a:solidFill>
+              </a:endParaRPr>
+            </a:p>
+          </p:txBody>
+        </p:sp>
+        <p:cxnSp>
+          <p:nvCxnSpPr>
+            <p:cNvPr id="10" name="Straight Arrow Connector 9"/>
+            <p:cNvCxnSpPr/>
+            <p:nvPr/>
+          </p:nvCxnSpPr>
+          <p:spPr>
+            <a:xfrm>
+              <a:off x="4284856" y="2514471"/>
+              <a:ext cx="0" cy="1331392"/>
+            </a:xfrm>
+            <a:prstGeom prst="straightConnector1">
+              <a:avLst/>
+            </a:prstGeom>
+            <a:ln>
+              <a:solidFill>
+                <a:srgbClr val="0000FF"/>
+              </a:solidFill>
+              <a:headEnd type="arrow"/>
+              <a:tailEnd type="arrow"/>
+            </a:ln>
+            <a:effectLst/>
+          </p:spPr>
+          <p:style>
+            <a:lnRef idx="2">
+              <a:schemeClr val="accent1"/>
+            </a:lnRef>
+            <a:fillRef idx="0">
+              <a:schemeClr val="accent1"/>
+            </a:fillRef>
+            <a:effectRef idx="1">
+              <a:schemeClr val="accent1"/>
+            </a:effectRef>
+            <a:fontRef idx="minor">
+              <a:schemeClr val="tx1"/>
+            </a:fontRef>
+          </p:style>
+        </p:cxnSp>
+      </p:grpSp>
+    </p:spTree>
+    <p:extLst>
+      <p:ext uri="{BB962C8B-B14F-4D97-AF65-F5344CB8AC3E}">
+        <p14:creationId xmlns:p14="http://schemas.microsoft.com/office/powerpoint/2010/main" val="3608034763"/>
+      </p:ext>
+    </p:extLst>
+  </p:cSld>
+  <p:clrMapOvr>
+    <a:masterClrMapping/>
+  </p:clrMapOvr>
+</p:sld>
+</file>
+
+<file path=ppt/slides/slide15.xml><?xml version="1.0" encoding="utf-8"?>
+<p:sld xmlns:a="http://schemas.openxmlformats.org/drawingml/2006/main" xmlns:r="http://schemas.openxmlformats.org/officeDocument/2006/relationships" xmlns:p="http://schemas.openxmlformats.org/presentationml/2006/main">
+  <p:cSld>
+    <p:spTree>
+      <p:nvGrpSpPr>
+        <p:cNvPr id="1" name=""/>
+        <p:cNvGrpSpPr/>
+        <p:nvPr/>
+      </p:nvGrpSpPr>
+      <p:grpSpPr>
+        <a:xfrm>
+          <a:off x="0" y="0"/>
+          <a:ext cx="0" cy="0"/>
+          <a:chOff x="0" y="0"/>
+          <a:chExt cx="0" cy="0"/>
+        </a:xfrm>
+      </p:grpSpPr>
+      <p:sp>
+        <p:nvSpPr>
+          <p:cNvPr id="5" name="Rectangle 4"/>
+          <p:cNvSpPr/>
+          <p:nvPr/>
+        </p:nvSpPr>
+        <p:spPr>
+          <a:xfrm>
+            <a:off x="-4330764" y="5295047"/>
+            <a:ext cx="4572000" cy="646331"/>
+          </a:xfrm>
+          <a:prstGeom prst="rect">
+            <a:avLst/>
+          </a:prstGeom>
+        </p:spPr>
+        <p:txBody>
+          <a:bodyPr>
+            <a:spAutoFit/>
+          </a:bodyPr>
+          <a:lstStyle/>
+          <a:p>
+            <a:r>
+              <a:rPr lang="en-US" dirty="0" smtClean="0"/>
+              <a:t>http://</a:t>
+            </a:r>
+            <a:r>
+              <a:rPr lang="en-US" dirty="0" err="1" smtClean="0"/>
+              <a:t>chemistry.tutorcircle.com</a:t>
+            </a:r>
+            <a:r>
+              <a:rPr lang="en-US" dirty="0" smtClean="0"/>
+              <a:t>/inorganic-chemistry/crystal-</a:t>
+            </a:r>
+            <a:r>
+              <a:rPr lang="en-US" dirty="0" err="1" smtClean="0"/>
+              <a:t>defects.html</a:t>
+            </a:r>
+            <a:endParaRPr lang="en-US" dirty="0"/>
+          </a:p>
+        </p:txBody>
+      </p:sp>
+      <p:sp>
+        <p:nvSpPr>
+          <p:cNvPr id="7" name="TextBox 6"/>
+          <p:cNvSpPr txBox="1"/>
+          <p:nvPr/>
+        </p:nvSpPr>
+        <p:spPr>
+          <a:xfrm>
+            <a:off x="10376289" y="4752761"/>
+            <a:ext cx="7122713" cy="369332"/>
+          </a:xfrm>
+          <a:prstGeom prst="rect">
+            <a:avLst/>
+          </a:prstGeom>
+          <a:noFill/>
+        </p:spPr>
+        <p:txBody>
+          <a:bodyPr wrap="none" rtlCol="0">
+            <a:spAutoFit/>
+          </a:bodyPr>
+          <a:lstStyle/>
+          <a:p>
+            <a:r>
+              <a:rPr lang="en-US" dirty="0" smtClean="0"/>
+              <a:t>http://</a:t>
+            </a:r>
+            <a:r>
+              <a:rPr lang="en-US" dirty="0" err="1" smtClean="0"/>
+              <a:t>www.tf.uni-kiel.de</a:t>
+            </a:r>
+            <a:r>
+              <a:rPr lang="en-US" dirty="0" smtClean="0"/>
+              <a:t>/</a:t>
+            </a:r>
+            <a:r>
+              <a:rPr lang="en-US" dirty="0" err="1" smtClean="0"/>
+              <a:t>matwis</a:t>
+            </a:r>
+            <a:r>
+              <a:rPr lang="en-US" dirty="0" smtClean="0"/>
+              <a:t>/</a:t>
+            </a:r>
+            <a:r>
+              <a:rPr lang="en-US" dirty="0" err="1" smtClean="0"/>
+              <a:t>amat</a:t>
+            </a:r>
+            <a:r>
+              <a:rPr lang="en-US" dirty="0" smtClean="0"/>
+              <a:t>/</a:t>
+            </a:r>
+            <a:r>
+              <a:rPr lang="en-US" dirty="0" err="1" smtClean="0"/>
+              <a:t>iss</a:t>
+            </a:r>
+            <a:r>
+              <a:rPr lang="en-US" dirty="0" smtClean="0"/>
+              <a:t>/kap_5/backbone/r5_2_1.html</a:t>
+            </a:r>
+            <a:endParaRPr lang="en-US" dirty="0"/>
+          </a:p>
+        </p:txBody>
+      </p:sp>
+      <p:grpSp>
+        <p:nvGrpSpPr>
+          <p:cNvPr id="13" name="Group 12"/>
+          <p:cNvGrpSpPr/>
+          <p:nvPr/>
+        </p:nvGrpSpPr>
+        <p:grpSpPr>
+          <a:xfrm>
+            <a:off x="0" y="965495"/>
+            <a:ext cx="9144000" cy="3159165"/>
+            <a:chOff x="0" y="965495"/>
+            <a:chExt cx="9144000" cy="3159165"/>
+          </a:xfrm>
+        </p:grpSpPr>
+        <p:pic>
+          <p:nvPicPr>
+            <p:cNvPr id="4" name="Picture 3"/>
+            <p:cNvPicPr>
+              <a:picLocks noChangeAspect="1"/>
+            </p:cNvPicPr>
+            <p:nvPr/>
+          </p:nvPicPr>
+          <p:blipFill rotWithShape="1">
+            <a:blip r:embed="rId2"/>
+            <a:srcRect r="57065" b="33210"/>
+            <a:stretch/>
+          </p:blipFill>
+          <p:spPr>
+            <a:xfrm>
+              <a:off x="0" y="1372274"/>
+              <a:ext cx="2671744" cy="2437965"/>
+            </a:xfrm>
+            <a:prstGeom prst="rect">
+              <a:avLst/>
+            </a:prstGeom>
+          </p:spPr>
+        </p:pic>
+        <p:pic>
+          <p:nvPicPr>
+            <p:cNvPr id="6" name="Picture 5"/>
+            <p:cNvPicPr>
+              <a:picLocks noChangeAspect="1"/>
+            </p:cNvPicPr>
+            <p:nvPr/>
+          </p:nvPicPr>
+          <p:blipFill>
+            <a:blip r:embed="rId3"/>
+            <a:stretch>
+              <a:fillRect/>
+            </a:stretch>
+          </p:blipFill>
+          <p:spPr>
+            <a:xfrm>
+              <a:off x="2928142" y="1459796"/>
+              <a:ext cx="6215858" cy="2178548"/>
+            </a:xfrm>
+            <a:prstGeom prst="rect">
+              <a:avLst/>
+            </a:prstGeom>
+          </p:spPr>
+        </p:pic>
+        <p:sp>
+          <p:nvSpPr>
+            <p:cNvPr id="8" name="TextBox 7"/>
+            <p:cNvSpPr txBox="1"/>
+            <p:nvPr/>
+          </p:nvSpPr>
+          <p:spPr>
+            <a:xfrm>
+              <a:off x="668360" y="1341144"/>
+              <a:ext cx="1223412" cy="369332"/>
+            </a:xfrm>
+            <a:prstGeom prst="rect">
+              <a:avLst/>
+            </a:prstGeom>
+            <a:noFill/>
+          </p:spPr>
+          <p:txBody>
+            <a:bodyPr wrap="none" rtlCol="0">
+              <a:spAutoFit/>
+            </a:bodyPr>
+            <a:lstStyle/>
+            <a:p>
+              <a:r>
+                <a:rPr lang="en-US" dirty="0" smtClean="0"/>
+                <a:t>Line defect</a:t>
+              </a:r>
+              <a:endParaRPr lang="en-US" dirty="0"/>
+            </a:p>
+          </p:txBody>
+        </p:sp>
+        <p:sp>
+          <p:nvSpPr>
+            <p:cNvPr id="9" name="TextBox 8"/>
+            <p:cNvSpPr txBox="1"/>
+            <p:nvPr/>
+          </p:nvSpPr>
+          <p:spPr>
+            <a:xfrm>
+              <a:off x="178405" y="3755328"/>
+              <a:ext cx="1713367" cy="369332"/>
+            </a:xfrm>
+            <a:prstGeom prst="rect">
+              <a:avLst/>
+            </a:prstGeom>
+            <a:noFill/>
+          </p:spPr>
+          <p:txBody>
+            <a:bodyPr wrap="none" rtlCol="0">
+              <a:spAutoFit/>
+            </a:bodyPr>
+            <a:lstStyle/>
+            <a:p>
+              <a:r>
+                <a:rPr lang="en-US" dirty="0" smtClean="0"/>
+                <a:t>Edge dislocation</a:t>
+              </a:r>
+            </a:p>
+          </p:txBody>
+        </p:sp>
+        <p:sp>
+          <p:nvSpPr>
+            <p:cNvPr id="10" name="TextBox 9"/>
+            <p:cNvSpPr txBox="1"/>
+            <p:nvPr/>
+          </p:nvSpPr>
+          <p:spPr>
+            <a:xfrm>
+              <a:off x="241236" y="998131"/>
+              <a:ext cx="336601" cy="461665"/>
+            </a:xfrm>
+            <a:prstGeom prst="rect">
+              <a:avLst/>
+            </a:prstGeom>
+            <a:noFill/>
+          </p:spPr>
+          <p:txBody>
+            <a:bodyPr wrap="none" rtlCol="0">
+              <a:spAutoFit/>
+            </a:bodyPr>
+            <a:lstStyle/>
+            <a:p>
+              <a:r>
+                <a:rPr lang="en-US" sz="2400" b="1" dirty="0" smtClean="0"/>
+                <a:t>a</a:t>
+              </a:r>
+              <a:endParaRPr lang="en-US" sz="2400" b="1" dirty="0"/>
+            </a:p>
+          </p:txBody>
+        </p:sp>
+        <p:sp>
+          <p:nvSpPr>
+            <p:cNvPr id="11" name="TextBox 10"/>
+            <p:cNvSpPr txBox="1"/>
+            <p:nvPr/>
+          </p:nvSpPr>
+          <p:spPr>
+            <a:xfrm>
+              <a:off x="2928142" y="965495"/>
+              <a:ext cx="349825" cy="461665"/>
+            </a:xfrm>
+            <a:prstGeom prst="rect">
+              <a:avLst/>
+            </a:prstGeom>
+            <a:noFill/>
+          </p:spPr>
+          <p:txBody>
+            <a:bodyPr wrap="none" rtlCol="0">
+              <a:spAutoFit/>
+            </a:bodyPr>
+            <a:lstStyle/>
+            <a:p>
+              <a:r>
+                <a:rPr lang="en-US" sz="2400" b="1" dirty="0"/>
+                <a:t>b</a:t>
+              </a:r>
+              <a:endParaRPr lang="en-US" sz="2400" b="1" dirty="0"/>
+            </a:p>
+          </p:txBody>
+        </p:sp>
+        <p:sp>
+          <p:nvSpPr>
+            <p:cNvPr id="12" name="TextBox 11"/>
+            <p:cNvSpPr txBox="1"/>
+            <p:nvPr/>
+          </p:nvSpPr>
+          <p:spPr>
+            <a:xfrm>
+              <a:off x="6041278" y="965495"/>
+              <a:ext cx="313457" cy="461665"/>
+            </a:xfrm>
+            <a:prstGeom prst="rect">
+              <a:avLst/>
+            </a:prstGeom>
+            <a:noFill/>
+          </p:spPr>
+          <p:txBody>
+            <a:bodyPr wrap="none" rtlCol="0">
+              <a:spAutoFit/>
+            </a:bodyPr>
+            <a:lstStyle/>
+            <a:p>
+              <a:r>
+                <a:rPr lang="en-US" sz="2400" b="1" dirty="0"/>
+                <a:t>c</a:t>
+              </a:r>
+              <a:endParaRPr lang="en-US" sz="2400" b="1" dirty="0"/>
+            </a:p>
+          </p:txBody>
+        </p:sp>
+      </p:grpSp>
+    </p:spTree>
+    <p:extLst>
+      <p:ext uri="{BB962C8B-B14F-4D97-AF65-F5344CB8AC3E}">
+        <p14:creationId xmlns:p14="http://schemas.microsoft.com/office/powerpoint/2010/main" val="162900113"/>
+      </p:ext>
+    </p:extLst>
+  </p:cSld>
+  <p:clrMapOvr>
+    <a:masterClrMapping/>
+  </p:clrMapOvr>
+</p:sld>
+</file>
+
+<file path=ppt/slides/slide16.xml><?xml version="1.0" encoding="utf-8"?>
 <p:sld xmlns:a="http://schemas.openxmlformats.org/drawingml/2006/main" xmlns:r="http://schemas.openxmlformats.org/officeDocument/2006/relationships" xmlns:p="http://schemas.openxmlformats.org/presentationml/2006/main">
   <p:cSld>
     <p:spTree>
@@ -5031,149 +5651,215 @@
         </p:blipFill>
         <p:spPr>
           <a:xfrm>
-            <a:off x="2226352" y="1490272"/>
-            <a:ext cx="4627997" cy="4215602"/>
+            <a:off x="0" y="1485900"/>
+            <a:ext cx="9144000" cy="3863126"/>
           </a:xfrm>
           <a:prstGeom prst="rect">
             <a:avLst/>
           </a:prstGeom>
         </p:spPr>
       </p:pic>
-      <p:cxnSp>
-        <p:nvCxnSpPr>
-          <p:cNvPr id="5" name="Straight Arrow Connector 4"/>
-          <p:cNvCxnSpPr/>
+    </p:spTree>
+    <p:extLst>
+      <p:ext uri="{BB962C8B-B14F-4D97-AF65-F5344CB8AC3E}">
+        <p14:creationId xmlns:p14="http://schemas.microsoft.com/office/powerpoint/2010/main" val="2991339320"/>
+      </p:ext>
+    </p:extLst>
+  </p:cSld>
+  <p:clrMapOvr>
+    <a:masterClrMapping/>
+  </p:clrMapOvr>
+</p:sld>
+</file>
+
+<file path=ppt/slides/slide17.xml><?xml version="1.0" encoding="utf-8"?>
+<p:sld xmlns:a="http://schemas.openxmlformats.org/drawingml/2006/main" xmlns:r="http://schemas.openxmlformats.org/officeDocument/2006/relationships" xmlns:p="http://schemas.openxmlformats.org/presentationml/2006/main">
+  <p:cSld>
+    <p:spTree>
+      <p:nvGrpSpPr>
+        <p:cNvPr id="1" name=""/>
+        <p:cNvGrpSpPr/>
+        <p:nvPr/>
+      </p:nvGrpSpPr>
+      <p:grpSpPr>
+        <a:xfrm>
+          <a:off x="0" y="0"/>
+          <a:ext cx="0" cy="0"/>
+          <a:chOff x="0" y="0"/>
+          <a:chExt cx="0" cy="0"/>
+        </a:xfrm>
+      </p:grpSpPr>
+      <p:pic>
+        <p:nvPicPr>
+          <p:cNvPr id="4" name="Picture 3"/>
+          <p:cNvPicPr>
+            <a:picLocks noChangeAspect="1"/>
+          </p:cNvPicPr>
           <p:nvPr/>
-        </p:nvCxnSpPr>
+        </p:nvPicPr>
+        <p:blipFill>
+          <a:blip r:embed="rId2"/>
+          <a:stretch>
+            <a:fillRect/>
+          </a:stretch>
+        </p:blipFill>
         <p:spPr>
           <a:xfrm>
-            <a:off x="3070500" y="2329224"/>
-            <a:ext cx="0" cy="1331392"/>
-          </a:xfrm>
-          <a:prstGeom prst="straightConnector1">
-            <a:avLst/>
-          </a:prstGeom>
-          <a:ln>
-            <a:solidFill>
-              <a:srgbClr val="0000FF"/>
-            </a:solidFill>
-            <a:headEnd type="arrow"/>
-            <a:tailEnd type="arrow"/>
-          </a:ln>
-          <a:effectLst/>
-        </p:spPr>
-        <p:style>
-          <a:lnRef idx="2">
-            <a:schemeClr val="accent1"/>
-          </a:lnRef>
-          <a:fillRef idx="0">
-            <a:schemeClr val="accent1"/>
-          </a:fillRef>
-          <a:effectRef idx="1">
-            <a:schemeClr val="accent1"/>
-          </a:effectRef>
-          <a:fontRef idx="minor">
-            <a:schemeClr val="tx1"/>
-          </a:fontRef>
-        </p:style>
-      </p:cxnSp>
-      <p:sp>
-        <p:nvSpPr>
-          <p:cNvPr id="6" name="TextBox 5"/>
-          <p:cNvSpPr txBox="1"/>
-          <p:nvPr/>
-        </p:nvSpPr>
-        <p:spPr>
-          <a:xfrm>
-            <a:off x="3026708" y="2822233"/>
-            <a:ext cx="1286653" cy="584776"/>
+            <a:off x="12700" y="723900"/>
+            <a:ext cx="9118600" cy="5410200"/>
           </a:xfrm>
           <a:prstGeom prst="rect">
             <a:avLst/>
           </a:prstGeom>
-          <a:noFill/>
         </p:spPr>
-        <p:txBody>
-          <a:bodyPr wrap="square" rtlCol="0">
-            <a:spAutoFit/>
-          </a:bodyPr>
-          <a:lstStyle/>
-          <a:p>
-            <a:pPr algn="ctr"/>
-            <a:r>
-              <a:rPr lang="en-US" sz="1600" b="1" dirty="0">
-                <a:solidFill>
-                  <a:srgbClr val="0000FF"/>
-                </a:solidFill>
-              </a:rPr>
-              <a:t>b</a:t>
-            </a:r>
-            <a:r>
-              <a:rPr lang="en-US" sz="1600" b="1" dirty="0" smtClean="0">
-                <a:solidFill>
-                  <a:srgbClr val="0000FF"/>
-                </a:solidFill>
-              </a:rPr>
-              <a:t>and gap </a:t>
-            </a:r>
-            <a:r>
-              <a:rPr lang="en-US" sz="1600" b="1" dirty="0" smtClean="0">
-                <a:solidFill>
-                  <a:srgbClr val="0000FF"/>
-                </a:solidFill>
-              </a:rPr>
-              <a:t>maintained</a:t>
-            </a:r>
-            <a:endParaRPr lang="en-US" sz="1600" b="1" dirty="0">
-              <a:solidFill>
-                <a:srgbClr val="0000FF"/>
-              </a:solidFill>
-            </a:endParaRPr>
-          </a:p>
-        </p:txBody>
-      </p:sp>
-      <p:cxnSp>
-        <p:nvCxnSpPr>
-          <p:cNvPr id="10" name="Straight Arrow Connector 9"/>
-          <p:cNvCxnSpPr/>
-          <p:nvPr/>
-        </p:nvCxnSpPr>
-        <p:spPr>
-          <a:xfrm>
-            <a:off x="4284856" y="2514471"/>
-            <a:ext cx="0" cy="1331392"/>
-          </a:xfrm>
-          <a:prstGeom prst="straightConnector1">
-            <a:avLst/>
-          </a:prstGeom>
-          <a:ln>
-            <a:solidFill>
-              <a:srgbClr val="0000FF"/>
-            </a:solidFill>
-            <a:headEnd type="arrow"/>
-            <a:tailEnd type="arrow"/>
-          </a:ln>
-          <a:effectLst/>
-        </p:spPr>
-        <p:style>
-          <a:lnRef idx="2">
-            <a:schemeClr val="accent1"/>
-          </a:lnRef>
-          <a:fillRef idx="0">
-            <a:schemeClr val="accent1"/>
-          </a:fillRef>
-          <a:effectRef idx="1">
-            <a:schemeClr val="accent1"/>
-          </a:effectRef>
-          <a:fontRef idx="minor">
-            <a:schemeClr val="tx1"/>
-          </a:fontRef>
-        </p:style>
-      </p:cxnSp>
+      </p:pic>
     </p:spTree>
     <p:extLst>
       <p:ext uri="{BB962C8B-B14F-4D97-AF65-F5344CB8AC3E}">
-        <p14:creationId xmlns:p14="http://schemas.microsoft.com/office/powerpoint/2010/main" val="3608034763"/>
+        <p14:creationId xmlns:p14="http://schemas.microsoft.com/office/powerpoint/2010/main" val="3567250386"/>
+      </p:ext>
+    </p:extLst>
+  </p:cSld>
+  <p:clrMapOvr>
+    <a:masterClrMapping/>
+  </p:clrMapOvr>
+</p:sld>
+</file>
+
+<file path=ppt/slides/slide18.xml><?xml version="1.0" encoding="utf-8"?>
+<p:sld xmlns:a="http://schemas.openxmlformats.org/drawingml/2006/main" xmlns:r="http://schemas.openxmlformats.org/officeDocument/2006/relationships" xmlns:p="http://schemas.openxmlformats.org/presentationml/2006/main">
+  <p:cSld>
+    <p:spTree>
+      <p:nvGrpSpPr>
+        <p:cNvPr id="1" name=""/>
+        <p:cNvGrpSpPr/>
+        <p:nvPr/>
+      </p:nvGrpSpPr>
+      <p:grpSpPr>
+        <a:xfrm>
+          <a:off x="0" y="0"/>
+          <a:ext cx="0" cy="0"/>
+          <a:chOff x="0" y="0"/>
+          <a:chExt cx="0" cy="0"/>
+        </a:xfrm>
+      </p:grpSpPr>
+      <p:pic>
+        <p:nvPicPr>
+          <p:cNvPr id="4" name="Picture 3"/>
+          <p:cNvPicPr>
+            <a:picLocks noChangeAspect="1"/>
+          </p:cNvPicPr>
+          <p:nvPr/>
+        </p:nvPicPr>
+        <p:blipFill>
+          <a:blip r:embed="rId2"/>
+          <a:stretch>
+            <a:fillRect/>
+          </a:stretch>
+        </p:blipFill>
+        <p:spPr>
+          <a:xfrm>
+            <a:off x="2565400" y="1219200"/>
+            <a:ext cx="4000500" cy="4406900"/>
+          </a:xfrm>
+          <a:prstGeom prst="rect">
+            <a:avLst/>
+          </a:prstGeom>
+        </p:spPr>
+      </p:pic>
+    </p:spTree>
+    <p:extLst>
+      <p:ext uri="{BB962C8B-B14F-4D97-AF65-F5344CB8AC3E}">
+        <p14:creationId xmlns:p14="http://schemas.microsoft.com/office/powerpoint/2010/main" val="3556913879"/>
+      </p:ext>
+    </p:extLst>
+  </p:cSld>
+  <p:clrMapOvr>
+    <a:masterClrMapping/>
+  </p:clrMapOvr>
+</p:sld>
+</file>
+
+<file path=ppt/slides/slide19.xml><?xml version="1.0" encoding="utf-8"?>
+<p:sld xmlns:a="http://schemas.openxmlformats.org/drawingml/2006/main" xmlns:r="http://schemas.openxmlformats.org/officeDocument/2006/relationships" xmlns:p="http://schemas.openxmlformats.org/presentationml/2006/main">
+  <p:cSld>
+    <p:spTree>
+      <p:nvGrpSpPr>
+        <p:cNvPr id="1" name=""/>
+        <p:cNvGrpSpPr/>
+        <p:nvPr/>
+      </p:nvGrpSpPr>
+      <p:grpSpPr>
+        <a:xfrm>
+          <a:off x="0" y="0"/>
+          <a:ext cx="0" cy="0"/>
+          <a:chOff x="0" y="0"/>
+          <a:chExt cx="0" cy="0"/>
+        </a:xfrm>
+      </p:grpSpPr>
+      <p:sp>
+        <p:nvSpPr>
+          <p:cNvPr id="2" name="Title 1"/>
+          <p:cNvSpPr>
+            <a:spLocks noGrp="1"/>
+          </p:cNvSpPr>
+          <p:nvPr>
+            <p:ph type="title"/>
+          </p:nvPr>
+        </p:nvSpPr>
+        <p:spPr/>
+        <p:txBody>
+          <a:bodyPr/>
+          <a:lstStyle/>
+          <a:p>
+            <a:r>
+              <a:rPr lang="en-US" dirty="0" err="1" smtClean="0"/>
+              <a:t>GaAs</a:t>
+            </a:r>
+            <a:r>
+              <a:rPr lang="en-US" dirty="0" smtClean="0"/>
+              <a:t> (from </a:t>
+            </a:r>
+            <a:r>
+              <a:rPr lang="en-US" dirty="0" err="1" smtClean="0"/>
+              <a:t>Yu&amp;Cardona</a:t>
+            </a:r>
+            <a:r>
+              <a:rPr lang="en-US" dirty="0" smtClean="0"/>
+              <a:t>)</a:t>
+            </a:r>
+            <a:endParaRPr lang="en-US" dirty="0"/>
+          </a:p>
+        </p:txBody>
+      </p:sp>
+      <p:pic>
+        <p:nvPicPr>
+          <p:cNvPr id="4" name="Picture 3"/>
+          <p:cNvPicPr>
+            <a:picLocks noChangeAspect="1"/>
+          </p:cNvPicPr>
+          <p:nvPr/>
+        </p:nvPicPr>
+        <p:blipFill>
+          <a:blip r:embed="rId2"/>
+          <a:stretch>
+            <a:fillRect/>
+          </a:stretch>
+        </p:blipFill>
+        <p:spPr>
+          <a:xfrm>
+            <a:off x="101600" y="1806766"/>
+            <a:ext cx="8585200" cy="4013200"/>
+          </a:xfrm>
+          <a:prstGeom prst="rect">
+            <a:avLst/>
+          </a:prstGeom>
+        </p:spPr>
+      </p:pic>
+    </p:spTree>
+    <p:extLst>
+      <p:ext uri="{BB962C8B-B14F-4D97-AF65-F5344CB8AC3E}">
+        <p14:creationId xmlns:p14="http://schemas.microsoft.com/office/powerpoint/2010/main" val="2023245449"/>
       </p:ext>
     </p:extLst>
   </p:cSld>
@@ -5324,6 +6010,131 @@
     <p:extLst>
       <p:ext uri="{BB962C8B-B14F-4D97-AF65-F5344CB8AC3E}">
         <p14:creationId xmlns:p14="http://schemas.microsoft.com/office/powerpoint/2010/main" val="1886353099"/>
+      </p:ext>
+    </p:extLst>
+  </p:cSld>
+  <p:clrMapOvr>
+    <a:masterClrMapping/>
+  </p:clrMapOvr>
+</p:sld>
+</file>
+
+<file path=ppt/slides/slide20.xml><?xml version="1.0" encoding="utf-8"?>
+<p:sld xmlns:a="http://schemas.openxmlformats.org/drawingml/2006/main" xmlns:r="http://schemas.openxmlformats.org/officeDocument/2006/relationships" xmlns:p="http://schemas.openxmlformats.org/presentationml/2006/main">
+  <p:cSld>
+    <p:spTree>
+      <p:nvGrpSpPr>
+        <p:cNvPr id="1" name=""/>
+        <p:cNvGrpSpPr/>
+        <p:nvPr/>
+      </p:nvGrpSpPr>
+      <p:grpSpPr>
+        <a:xfrm>
+          <a:off x="0" y="0"/>
+          <a:ext cx="0" cy="0"/>
+          <a:chOff x="0" y="0"/>
+          <a:chExt cx="0" cy="0"/>
+        </a:xfrm>
+      </p:grpSpPr>
+      <p:sp>
+        <p:nvSpPr>
+          <p:cNvPr id="2" name="Title 1"/>
+          <p:cNvSpPr>
+            <a:spLocks noGrp="1"/>
+          </p:cNvSpPr>
+          <p:nvPr>
+            <p:ph type="title"/>
+          </p:nvPr>
+        </p:nvSpPr>
+        <p:spPr/>
+        <p:txBody>
+          <a:bodyPr>
+            <a:normAutofit fontScale="90000"/>
+          </a:bodyPr>
+          <a:lstStyle/>
+          <a:p>
+            <a:r>
+              <a:rPr lang="en-US" dirty="0" err="1" smtClean="0"/>
+              <a:t>Kesterite</a:t>
+            </a:r>
+            <a:r>
+              <a:rPr lang="en-US" dirty="0" smtClean="0"/>
+              <a:t> CZTS, </a:t>
+            </a:r>
+            <a:r>
+              <a:rPr lang="en-US" dirty="0" err="1" smtClean="0"/>
+              <a:t>doi</a:t>
+            </a:r>
+            <a:r>
+              <a:rPr lang="en-US" dirty="0" smtClean="0"/>
+              <a:t>: </a:t>
+            </a:r>
+            <a:r>
+              <a:rPr lang="en-GB" dirty="0"/>
+              <a:t>10.1063/1.4704191</a:t>
+            </a:r>
+            <a:r>
+              <a:rPr lang="en-GB" dirty="0" smtClean="0">
+                <a:effectLst/>
+              </a:rPr>
+              <a:t> </a:t>
+            </a:r>
+            <a:endParaRPr lang="en-US" dirty="0"/>
+          </a:p>
+        </p:txBody>
+      </p:sp>
+      <p:pic>
+        <p:nvPicPr>
+          <p:cNvPr id="4" name="Picture 3"/>
+          <p:cNvPicPr>
+            <a:picLocks noChangeAspect="1"/>
+          </p:cNvPicPr>
+          <p:nvPr/>
+        </p:nvPicPr>
+        <p:blipFill>
+          <a:blip r:embed="rId2"/>
+          <a:stretch>
+            <a:fillRect/>
+          </a:stretch>
+        </p:blipFill>
+        <p:spPr>
+          <a:xfrm>
+            <a:off x="0" y="1630315"/>
+            <a:ext cx="6499801" cy="4207063"/>
+          </a:xfrm>
+          <a:prstGeom prst="rect">
+            <a:avLst/>
+          </a:prstGeom>
+        </p:spPr>
+      </p:pic>
+      <p:pic>
+        <p:nvPicPr>
+          <p:cNvPr id="5" name="Picture 4"/>
+          <p:cNvPicPr>
+            <a:picLocks noChangeAspect="1"/>
+          </p:cNvPicPr>
+          <p:nvPr/>
+        </p:nvPicPr>
+        <p:blipFill>
+          <a:blip r:embed="rId3"/>
+          <a:stretch>
+            <a:fillRect/>
+          </a:stretch>
+        </p:blipFill>
+        <p:spPr>
+          <a:xfrm>
+            <a:off x="6366129" y="1226208"/>
+            <a:ext cx="2929253" cy="5581656"/>
+          </a:xfrm>
+          <a:prstGeom prst="rect">
+            <a:avLst/>
+          </a:prstGeom>
+        </p:spPr>
+      </p:pic>
+    </p:spTree>
+    <p:extLst>
+      <p:ext uri="{BB962C8B-B14F-4D97-AF65-F5344CB8AC3E}">
+        <p14:creationId xmlns:p14="http://schemas.microsoft.com/office/powerpoint/2010/main" val="3939344656"/>
       </p:ext>
     </p:extLst>
   </p:cSld>

</xml_diff>

<commit_message>
Eris methodology sections updated and started on appendix for Cu-Zn defect calculations
</commit_message>
<xml_diff>
--- a/figures.pptx
+++ b/figures.pptx
@@ -25,6 +25,8 @@
     <p:sldId id="273" r:id="rId19"/>
     <p:sldId id="274" r:id="rId20"/>
     <p:sldId id="275" r:id="rId21"/>
+    <p:sldId id="276" r:id="rId22"/>
+    <p:sldId id="277" r:id="rId23"/>
   </p:sldIdLst>
   <p:sldSz cx="9144000" cy="6858000" type="screen4x3"/>
   <p:notesSz cx="6858000" cy="9144000"/>
@@ -307,7 +309,7 @@
           <a:p>
             <a:fld id="{BD36B709-E2C0-7E44-B5BA-A688CA57F161}" type="datetimeFigureOut">
               <a:rPr lang="en-US" smtClean="0"/>
-              <a:t>26/05/16</a:t>
+              <a:t>19/07/16</a:t>
             </a:fld>
             <a:endParaRPr lang="en-US"/>
           </a:p>
@@ -477,7 +479,7 @@
           <a:p>
             <a:fld id="{BD36B709-E2C0-7E44-B5BA-A688CA57F161}" type="datetimeFigureOut">
               <a:rPr lang="en-US" smtClean="0"/>
-              <a:t>26/05/16</a:t>
+              <a:t>19/07/16</a:t>
             </a:fld>
             <a:endParaRPr lang="en-US"/>
           </a:p>
@@ -657,7 +659,7 @@
           <a:p>
             <a:fld id="{BD36B709-E2C0-7E44-B5BA-A688CA57F161}" type="datetimeFigureOut">
               <a:rPr lang="en-US" smtClean="0"/>
-              <a:t>26/05/16</a:t>
+              <a:t>19/07/16</a:t>
             </a:fld>
             <a:endParaRPr lang="en-US"/>
           </a:p>
@@ -827,7 +829,7 @@
           <a:p>
             <a:fld id="{BD36B709-E2C0-7E44-B5BA-A688CA57F161}" type="datetimeFigureOut">
               <a:rPr lang="en-US" smtClean="0"/>
-              <a:t>26/05/16</a:t>
+              <a:t>19/07/16</a:t>
             </a:fld>
             <a:endParaRPr lang="en-US"/>
           </a:p>
@@ -1073,7 +1075,7 @@
           <a:p>
             <a:fld id="{BD36B709-E2C0-7E44-B5BA-A688CA57F161}" type="datetimeFigureOut">
               <a:rPr lang="en-US" smtClean="0"/>
-              <a:t>26/05/16</a:t>
+              <a:t>19/07/16</a:t>
             </a:fld>
             <a:endParaRPr lang="en-US"/>
           </a:p>
@@ -1361,7 +1363,7 @@
           <a:p>
             <a:fld id="{BD36B709-E2C0-7E44-B5BA-A688CA57F161}" type="datetimeFigureOut">
               <a:rPr lang="en-US" smtClean="0"/>
-              <a:t>26/05/16</a:t>
+              <a:t>19/07/16</a:t>
             </a:fld>
             <a:endParaRPr lang="en-US"/>
           </a:p>
@@ -1783,7 +1785,7 @@
           <a:p>
             <a:fld id="{BD36B709-E2C0-7E44-B5BA-A688CA57F161}" type="datetimeFigureOut">
               <a:rPr lang="en-US" smtClean="0"/>
-              <a:t>26/05/16</a:t>
+              <a:t>19/07/16</a:t>
             </a:fld>
             <a:endParaRPr lang="en-US"/>
           </a:p>
@@ -1901,7 +1903,7 @@
           <a:p>
             <a:fld id="{BD36B709-E2C0-7E44-B5BA-A688CA57F161}" type="datetimeFigureOut">
               <a:rPr lang="en-US" smtClean="0"/>
-              <a:t>26/05/16</a:t>
+              <a:t>19/07/16</a:t>
             </a:fld>
             <a:endParaRPr lang="en-US"/>
           </a:p>
@@ -1996,7 +1998,7 @@
           <a:p>
             <a:fld id="{BD36B709-E2C0-7E44-B5BA-A688CA57F161}" type="datetimeFigureOut">
               <a:rPr lang="en-US" smtClean="0"/>
-              <a:t>26/05/16</a:t>
+              <a:t>19/07/16</a:t>
             </a:fld>
             <a:endParaRPr lang="en-US"/>
           </a:p>
@@ -2273,7 +2275,7 @@
           <a:p>
             <a:fld id="{BD36B709-E2C0-7E44-B5BA-A688CA57F161}" type="datetimeFigureOut">
               <a:rPr lang="en-US" smtClean="0"/>
-              <a:t>26/05/16</a:t>
+              <a:t>19/07/16</a:t>
             </a:fld>
             <a:endParaRPr lang="en-US"/>
           </a:p>
@@ -2526,7 +2528,7 @@
           <a:p>
             <a:fld id="{BD36B709-E2C0-7E44-B5BA-A688CA57F161}" type="datetimeFigureOut">
               <a:rPr lang="en-US" smtClean="0"/>
-              <a:t>26/05/16</a:t>
+              <a:t>19/07/16</a:t>
             </a:fld>
             <a:endParaRPr lang="en-US"/>
           </a:p>
@@ -2739,7 +2741,7 @@
           <a:p>
             <a:fld id="{BD36B709-E2C0-7E44-B5BA-A688CA57F161}" type="datetimeFigureOut">
               <a:rPr lang="en-US" smtClean="0"/>
-              <a:t>26/05/16</a:t>
+              <a:t>19/07/16</a:t>
             </a:fld>
             <a:endParaRPr lang="en-US"/>
           </a:p>
@@ -4697,7 +4699,6 @@
                 <a:rPr lang="en-US" b="1" dirty="0"/>
                 <a:t>b</a:t>
               </a:r>
-              <a:endParaRPr lang="en-US" b="1" dirty="0"/>
             </a:p>
           </p:txBody>
         </p:sp>
@@ -4874,15 +4875,7 @@
                     <a:srgbClr val="0000FF"/>
                   </a:solidFill>
                 </a:rPr>
-                <a:t>and gap </a:t>
-              </a:r>
-              <a:r>
-                <a:rPr lang="en-US" sz="1600" b="1" dirty="0" smtClean="0">
-                  <a:solidFill>
-                    <a:srgbClr val="0000FF"/>
-                  </a:solidFill>
-                </a:rPr>
-                <a:t>not maintained</a:t>
+                <a:t>and gap not maintained</a:t>
               </a:r>
               <a:endParaRPr lang="en-US" sz="1600" b="1" dirty="0">
                 <a:solidFill>
@@ -4989,7 +4982,6 @@
                 <a:rPr lang="en-US" b="1" dirty="0"/>
                 <a:t>b</a:t>
               </a:r>
-              <a:endParaRPr lang="en-US" b="1" dirty="0"/>
             </a:p>
           </p:txBody>
         </p:sp>
@@ -5019,7 +5011,6 @@
                 <a:rPr lang="en-US" b="1" dirty="0"/>
                 <a:t>c</a:t>
               </a:r>
-              <a:endParaRPr lang="en-US" b="1" dirty="0"/>
             </a:p>
           </p:txBody>
         </p:sp>
@@ -5204,15 +5195,7 @@
                     <a:srgbClr val="0000FF"/>
                   </a:solidFill>
                 </a:rPr>
-                <a:t>and gap </a:t>
-              </a:r>
-              <a:r>
-                <a:rPr lang="en-US" sz="1600" b="1" dirty="0" smtClean="0">
-                  <a:solidFill>
-                    <a:srgbClr val="0000FF"/>
-                  </a:solidFill>
-                </a:rPr>
-                <a:t>maintained</a:t>
+                <a:t>and gap maintained</a:t>
               </a:r>
               <a:endParaRPr lang="en-US" sz="1600" b="1" dirty="0">
                 <a:solidFill>
@@ -5570,7 +5553,6 @@
                 <a:rPr lang="en-US" sz="2400" b="1" dirty="0"/>
                 <a:t>b</a:t>
               </a:r>
-              <a:endParaRPr lang="en-US" sz="2400" b="1" dirty="0"/>
             </a:p>
           </p:txBody>
         </p:sp>
@@ -5600,7 +5582,6 @@
                 <a:rPr lang="en-US" sz="2400" b="1" dirty="0"/>
                 <a:t>c</a:t>
               </a:r>
-              <a:endParaRPr lang="en-US" sz="2400" b="1" dirty="0"/>
             </a:p>
           </p:txBody>
         </p:sp>
@@ -6144,6 +6125,358 @@
 </p:sld>
 </file>
 
+<file path=ppt/slides/slide21.xml><?xml version="1.0" encoding="utf-8"?>
+<p:sld xmlns:a="http://schemas.openxmlformats.org/drawingml/2006/main" xmlns:r="http://schemas.openxmlformats.org/officeDocument/2006/relationships" xmlns:p="http://schemas.openxmlformats.org/presentationml/2006/main">
+  <p:cSld>
+    <p:spTree>
+      <p:nvGrpSpPr>
+        <p:cNvPr id="1" name=""/>
+        <p:cNvGrpSpPr/>
+        <p:nvPr/>
+      </p:nvGrpSpPr>
+      <p:grpSpPr>
+        <a:xfrm>
+          <a:off x="0" y="0"/>
+          <a:ext cx="0" cy="0"/>
+          <a:chOff x="0" y="0"/>
+          <a:chExt cx="0" cy="0"/>
+        </a:xfrm>
+      </p:grpSpPr>
+      <p:pic>
+        <p:nvPicPr>
+          <p:cNvPr id="4" name="Picture 3"/>
+          <p:cNvPicPr>
+            <a:picLocks noChangeAspect="1"/>
+          </p:cNvPicPr>
+          <p:nvPr/>
+        </p:nvPicPr>
+        <p:blipFill>
+          <a:blip r:embed="rId2"/>
+          <a:stretch>
+            <a:fillRect/>
+          </a:stretch>
+        </p:blipFill>
+        <p:spPr>
+          <a:xfrm>
+            <a:off x="787400" y="508000"/>
+            <a:ext cx="7569200" cy="5842000"/>
+          </a:xfrm>
+          <a:prstGeom prst="rect">
+            <a:avLst/>
+          </a:prstGeom>
+        </p:spPr>
+      </p:pic>
+    </p:spTree>
+    <p:extLst>
+      <p:ext uri="{BB962C8B-B14F-4D97-AF65-F5344CB8AC3E}">
+        <p14:creationId xmlns:p14="http://schemas.microsoft.com/office/powerpoint/2010/main" val="3423938695"/>
+      </p:ext>
+    </p:extLst>
+  </p:cSld>
+  <p:clrMapOvr>
+    <a:masterClrMapping/>
+  </p:clrMapOvr>
+</p:sld>
+</file>
+
+<file path=ppt/slides/slide22.xml><?xml version="1.0" encoding="utf-8"?>
+<p:sld xmlns:a="http://schemas.openxmlformats.org/drawingml/2006/main" xmlns:r="http://schemas.openxmlformats.org/officeDocument/2006/relationships" xmlns:p="http://schemas.openxmlformats.org/presentationml/2006/main">
+  <p:cSld>
+    <p:spTree>
+      <p:nvGrpSpPr>
+        <p:cNvPr id="1" name=""/>
+        <p:cNvGrpSpPr/>
+        <p:nvPr/>
+      </p:nvGrpSpPr>
+      <p:grpSpPr>
+        <a:xfrm>
+          <a:off x="0" y="0"/>
+          <a:ext cx="0" cy="0"/>
+          <a:chOff x="0" y="0"/>
+          <a:chExt cx="0" cy="0"/>
+        </a:xfrm>
+      </p:grpSpPr>
+      <p:pic>
+        <p:nvPicPr>
+          <p:cNvPr id="4" name="Picture 3" descr="Cu-Zn_eqm_conc.png"/>
+          <p:cNvPicPr>
+            <a:picLocks noChangeAspect="1"/>
+          </p:cNvPicPr>
+          <p:nvPr/>
+        </p:nvPicPr>
+        <p:blipFill>
+          <a:blip r:embed="rId2">
+            <a:extLst>
+              <a:ext uri="{28A0092B-C50C-407E-A947-70E740481C1C}">
+                <a14:useLocalDpi xmlns:a14="http://schemas.microsoft.com/office/drawing/2010/main" val="0"/>
+              </a:ext>
+            </a:extLst>
+          </a:blip>
+          <a:stretch>
+            <a:fillRect/>
+          </a:stretch>
+        </p:blipFill>
+        <p:spPr>
+          <a:xfrm>
+            <a:off x="1883522" y="1788762"/>
+            <a:ext cx="5351475" cy="4013607"/>
+          </a:xfrm>
+          <a:prstGeom prst="rect">
+            <a:avLst/>
+          </a:prstGeom>
+        </p:spPr>
+      </p:pic>
+      <p:cxnSp>
+        <p:nvCxnSpPr>
+          <p:cNvPr id="5" name="Straight Connector 4"/>
+          <p:cNvCxnSpPr/>
+          <p:nvPr/>
+        </p:nvCxnSpPr>
+        <p:spPr bwMode="auto">
+          <a:xfrm flipH="1">
+            <a:off x="2539768" y="4116990"/>
+            <a:ext cx="2155961" cy="0"/>
+          </a:xfrm>
+          <a:prstGeom prst="line">
+            <a:avLst/>
+          </a:prstGeom>
+          <a:solidFill>
+            <a:schemeClr val="accent1">
+              <a:alpha val="47000"/>
+            </a:schemeClr>
+          </a:solidFill>
+          <a:ln w="41275" cap="flat" cmpd="sng" algn="ctr">
+            <a:solidFill>
+              <a:schemeClr val="tx1"/>
+            </a:solidFill>
+            <a:prstDash val="dash"/>
+            <a:round/>
+            <a:headEnd type="none" w="med" len="med"/>
+            <a:tailEnd type="none" w="med" len="med"/>
+          </a:ln>
+          <a:effectLst>
+            <a:outerShdw blurRad="28575" dist="12700" dir="2700000" algn="ctr" rotWithShape="0">
+              <a:schemeClr val="bg2"/>
+            </a:outerShdw>
+          </a:effectLst>
+          <a:extLst/>
+        </p:spPr>
+      </p:cxnSp>
+      <p:cxnSp>
+        <p:nvCxnSpPr>
+          <p:cNvPr id="6" name="Straight Connector 5"/>
+          <p:cNvCxnSpPr/>
+          <p:nvPr/>
+        </p:nvCxnSpPr>
+        <p:spPr bwMode="auto">
+          <a:xfrm>
+            <a:off x="4686049" y="4110495"/>
+            <a:ext cx="9680" cy="1280865"/>
+          </a:xfrm>
+          <a:prstGeom prst="line">
+            <a:avLst/>
+          </a:prstGeom>
+          <a:solidFill>
+            <a:schemeClr val="accent1">
+              <a:alpha val="47000"/>
+            </a:schemeClr>
+          </a:solidFill>
+          <a:ln w="41275" cap="flat" cmpd="sng" algn="ctr">
+            <a:solidFill>
+              <a:schemeClr val="tx1"/>
+            </a:solidFill>
+            <a:prstDash val="dash"/>
+            <a:round/>
+            <a:headEnd type="none" w="med" len="med"/>
+            <a:tailEnd type="none" w="med" len="med"/>
+          </a:ln>
+          <a:effectLst>
+            <a:outerShdw blurRad="28575" dist="12700" dir="2700000" algn="ctr" rotWithShape="0">
+              <a:schemeClr val="bg2"/>
+            </a:outerShdw>
+          </a:effectLst>
+          <a:extLst/>
+        </p:spPr>
+      </p:cxnSp>
+      <p:cxnSp>
+        <p:nvCxnSpPr>
+          <p:cNvPr id="15" name="Straight Connector 14"/>
+          <p:cNvCxnSpPr/>
+          <p:nvPr/>
+        </p:nvCxnSpPr>
+        <p:spPr bwMode="auto">
+          <a:xfrm>
+            <a:off x="5902167" y="3006720"/>
+            <a:ext cx="0" cy="2384640"/>
+          </a:xfrm>
+          <a:prstGeom prst="line">
+            <a:avLst/>
+          </a:prstGeom>
+          <a:solidFill>
+            <a:schemeClr val="accent1">
+              <a:alpha val="47000"/>
+            </a:schemeClr>
+          </a:solidFill>
+          <a:ln w="41275" cap="flat" cmpd="sng" algn="ctr">
+            <a:solidFill>
+              <a:schemeClr val="tx1"/>
+            </a:solidFill>
+            <a:prstDash val="dash"/>
+            <a:round/>
+            <a:headEnd type="none" w="med" len="med"/>
+            <a:tailEnd type="none" w="med" len="med"/>
+          </a:ln>
+          <a:effectLst>
+            <a:outerShdw blurRad="28575" dist="12700" dir="2700000" algn="ctr" rotWithShape="0">
+              <a:schemeClr val="bg2"/>
+            </a:outerShdw>
+          </a:effectLst>
+          <a:extLst/>
+        </p:spPr>
+      </p:cxnSp>
+      <p:cxnSp>
+        <p:nvCxnSpPr>
+          <p:cNvPr id="17" name="Straight Connector 16"/>
+          <p:cNvCxnSpPr/>
+          <p:nvPr/>
+        </p:nvCxnSpPr>
+        <p:spPr bwMode="auto">
+          <a:xfrm flipH="1">
+            <a:off x="2539768" y="3006720"/>
+            <a:ext cx="3362400" cy="0"/>
+          </a:xfrm>
+          <a:prstGeom prst="line">
+            <a:avLst/>
+          </a:prstGeom>
+          <a:solidFill>
+            <a:schemeClr val="accent1">
+              <a:alpha val="47000"/>
+            </a:schemeClr>
+          </a:solidFill>
+          <a:ln w="41275" cap="flat" cmpd="sng" algn="ctr">
+            <a:solidFill>
+              <a:schemeClr val="tx1"/>
+            </a:solidFill>
+            <a:prstDash val="dash"/>
+            <a:round/>
+            <a:headEnd type="none" w="med" len="med"/>
+            <a:tailEnd type="none" w="med" len="med"/>
+          </a:ln>
+          <a:effectLst>
+            <a:outerShdw blurRad="28575" dist="12700" dir="2700000" algn="ctr" rotWithShape="0">
+              <a:schemeClr val="bg2"/>
+            </a:outerShdw>
+          </a:effectLst>
+          <a:extLst/>
+        </p:spPr>
+      </p:cxnSp>
+      <p:sp>
+        <p:nvSpPr>
+          <p:cNvPr id="19" name="Rectangle 18"/>
+          <p:cNvSpPr/>
+          <p:nvPr/>
+        </p:nvSpPr>
+        <p:spPr>
+          <a:xfrm>
+            <a:off x="2559614" y="3006720"/>
+            <a:ext cx="3342554" cy="1103775"/>
+          </a:xfrm>
+          <a:prstGeom prst="rect">
+            <a:avLst/>
+          </a:prstGeom>
+          <a:solidFill>
+            <a:schemeClr val="tx1">
+              <a:alpha val="20000"/>
+            </a:schemeClr>
+          </a:solidFill>
+          <a:ln>
+            <a:noFill/>
+          </a:ln>
+          <a:effectLst/>
+        </p:spPr>
+        <p:style>
+          <a:lnRef idx="1">
+            <a:schemeClr val="accent1"/>
+          </a:lnRef>
+          <a:fillRef idx="3">
+            <a:schemeClr val="accent1"/>
+          </a:fillRef>
+          <a:effectRef idx="2">
+            <a:schemeClr val="accent1"/>
+          </a:effectRef>
+          <a:fontRef idx="minor">
+            <a:schemeClr val="lt1"/>
+          </a:fontRef>
+        </p:style>
+        <p:txBody>
+          <a:bodyPr rtlCol="0" anchor="ctr"/>
+          <a:lstStyle/>
+          <a:p>
+            <a:pPr algn="ctr"/>
+            <a:endParaRPr lang="en-US"/>
+          </a:p>
+        </p:txBody>
+      </p:sp>
+      <p:sp>
+        <p:nvSpPr>
+          <p:cNvPr id="20" name="Rectangle 19"/>
+          <p:cNvSpPr/>
+          <p:nvPr/>
+        </p:nvSpPr>
+        <p:spPr>
+          <a:xfrm>
+            <a:off x="4695729" y="4110375"/>
+            <a:ext cx="1206438" cy="1280985"/>
+          </a:xfrm>
+          <a:prstGeom prst="rect">
+            <a:avLst/>
+          </a:prstGeom>
+          <a:solidFill>
+            <a:schemeClr val="tx1">
+              <a:alpha val="20000"/>
+            </a:schemeClr>
+          </a:solidFill>
+          <a:ln>
+            <a:noFill/>
+          </a:ln>
+          <a:effectLst/>
+        </p:spPr>
+        <p:style>
+          <a:lnRef idx="1">
+            <a:schemeClr val="accent1"/>
+          </a:lnRef>
+          <a:fillRef idx="3">
+            <a:schemeClr val="accent1"/>
+          </a:fillRef>
+          <a:effectRef idx="2">
+            <a:schemeClr val="accent1"/>
+          </a:effectRef>
+          <a:fontRef idx="minor">
+            <a:schemeClr val="lt1"/>
+          </a:fontRef>
+        </p:style>
+        <p:txBody>
+          <a:bodyPr rtlCol="0" anchor="ctr"/>
+          <a:lstStyle/>
+          <a:p>
+            <a:pPr algn="ctr"/>
+            <a:endParaRPr lang="en-US"/>
+          </a:p>
+        </p:txBody>
+      </p:sp>
+    </p:spTree>
+    <p:extLst>
+      <p:ext uri="{BB962C8B-B14F-4D97-AF65-F5344CB8AC3E}">
+        <p14:creationId xmlns:p14="http://schemas.microsoft.com/office/powerpoint/2010/main" val="289196052"/>
+      </p:ext>
+    </p:extLst>
+  </p:cSld>
+  <p:clrMapOvr>
+    <a:masterClrMapping/>
+  </p:clrMapOvr>
+</p:sld>
+</file>
+
 <file path=ppt/slides/slide3.xml><?xml version="1.0" encoding="utf-8"?>
 <p:sld xmlns:a="http://schemas.openxmlformats.org/drawingml/2006/main" xmlns:r="http://schemas.openxmlformats.org/officeDocument/2006/relationships" xmlns:p="http://schemas.openxmlformats.org/presentationml/2006/main">
   <p:cSld>
@@ -6302,7 +6635,6 @@
                 <a:rPr lang="en-US" dirty="0"/>
                 <a:t>b</a:t>
               </a:r>
-              <a:endParaRPr lang="en-US" dirty="0"/>
             </a:p>
           </p:txBody>
         </p:sp>
@@ -6734,13 +7066,6 @@
                   </a:rPr>
                   <a:t>a</a:t>
                 </a:r>
-                <a:endParaRPr lang="en-US" sz="2400" b="1" dirty="0">
-                  <a:solidFill>
-                    <a:schemeClr val="bg1">
-                      <a:lumMod val="50000"/>
-                    </a:schemeClr>
-                  </a:solidFill>
-                </a:endParaRPr>
               </a:p>
             </p:txBody>
           </p:sp>
@@ -6876,13 +7201,6 @@
                   </a:rPr>
                   <a:t>c</a:t>
                 </a:r>
-                <a:endParaRPr lang="en-US" sz="2400" b="1" dirty="0">
-                  <a:solidFill>
-                    <a:schemeClr val="bg1">
-                      <a:lumMod val="50000"/>
-                    </a:schemeClr>
-                  </a:solidFill>
-                </a:endParaRPr>
               </a:p>
             </p:txBody>
           </p:sp>
@@ -7587,7 +7905,6 @@
                 <a:rPr lang="en-US" sz="2400" b="1" dirty="0"/>
                 <a:t>b</a:t>
               </a:r>
-              <a:endParaRPr lang="en-US" sz="2400" b="1" dirty="0"/>
             </a:p>
           </p:txBody>
         </p:sp>

</xml_diff>

<commit_message>
Future work and appendices all finished.
</commit_message>
<xml_diff>
--- a/figures.pptx
+++ b/figures.pptx
@@ -27,6 +27,7 @@
     <p:sldId id="275" r:id="rId21"/>
     <p:sldId id="276" r:id="rId22"/>
     <p:sldId id="277" r:id="rId23"/>
+    <p:sldId id="278" r:id="rId24"/>
   </p:sldIdLst>
   <p:sldSz cx="9144000" cy="6858000" type="screen4x3"/>
   <p:notesSz cx="6858000" cy="9144000"/>
@@ -309,7 +310,7 @@
           <a:p>
             <a:fld id="{BD36B709-E2C0-7E44-B5BA-A688CA57F161}" type="datetimeFigureOut">
               <a:rPr lang="en-US" smtClean="0"/>
-              <a:t>19/07/16</a:t>
+              <a:t>21/07/16</a:t>
             </a:fld>
             <a:endParaRPr lang="en-US"/>
           </a:p>
@@ -479,7 +480,7 @@
           <a:p>
             <a:fld id="{BD36B709-E2C0-7E44-B5BA-A688CA57F161}" type="datetimeFigureOut">
               <a:rPr lang="en-US" smtClean="0"/>
-              <a:t>19/07/16</a:t>
+              <a:t>21/07/16</a:t>
             </a:fld>
             <a:endParaRPr lang="en-US"/>
           </a:p>
@@ -659,7 +660,7 @@
           <a:p>
             <a:fld id="{BD36B709-E2C0-7E44-B5BA-A688CA57F161}" type="datetimeFigureOut">
               <a:rPr lang="en-US" smtClean="0"/>
-              <a:t>19/07/16</a:t>
+              <a:t>21/07/16</a:t>
             </a:fld>
             <a:endParaRPr lang="en-US"/>
           </a:p>
@@ -829,7 +830,7 @@
           <a:p>
             <a:fld id="{BD36B709-E2C0-7E44-B5BA-A688CA57F161}" type="datetimeFigureOut">
               <a:rPr lang="en-US" smtClean="0"/>
-              <a:t>19/07/16</a:t>
+              <a:t>21/07/16</a:t>
             </a:fld>
             <a:endParaRPr lang="en-US"/>
           </a:p>
@@ -1075,7 +1076,7 @@
           <a:p>
             <a:fld id="{BD36B709-E2C0-7E44-B5BA-A688CA57F161}" type="datetimeFigureOut">
               <a:rPr lang="en-US" smtClean="0"/>
-              <a:t>19/07/16</a:t>
+              <a:t>21/07/16</a:t>
             </a:fld>
             <a:endParaRPr lang="en-US"/>
           </a:p>
@@ -1363,7 +1364,7 @@
           <a:p>
             <a:fld id="{BD36B709-E2C0-7E44-B5BA-A688CA57F161}" type="datetimeFigureOut">
               <a:rPr lang="en-US" smtClean="0"/>
-              <a:t>19/07/16</a:t>
+              <a:t>21/07/16</a:t>
             </a:fld>
             <a:endParaRPr lang="en-US"/>
           </a:p>
@@ -1785,7 +1786,7 @@
           <a:p>
             <a:fld id="{BD36B709-E2C0-7E44-B5BA-A688CA57F161}" type="datetimeFigureOut">
               <a:rPr lang="en-US" smtClean="0"/>
-              <a:t>19/07/16</a:t>
+              <a:t>21/07/16</a:t>
             </a:fld>
             <a:endParaRPr lang="en-US"/>
           </a:p>
@@ -1903,7 +1904,7 @@
           <a:p>
             <a:fld id="{BD36B709-E2C0-7E44-B5BA-A688CA57F161}" type="datetimeFigureOut">
               <a:rPr lang="en-US" smtClean="0"/>
-              <a:t>19/07/16</a:t>
+              <a:t>21/07/16</a:t>
             </a:fld>
             <a:endParaRPr lang="en-US"/>
           </a:p>
@@ -1998,7 +1999,7 @@
           <a:p>
             <a:fld id="{BD36B709-E2C0-7E44-B5BA-A688CA57F161}" type="datetimeFigureOut">
               <a:rPr lang="en-US" smtClean="0"/>
-              <a:t>19/07/16</a:t>
+              <a:t>21/07/16</a:t>
             </a:fld>
             <a:endParaRPr lang="en-US"/>
           </a:p>
@@ -2275,7 +2276,7 @@
           <a:p>
             <a:fld id="{BD36B709-E2C0-7E44-B5BA-A688CA57F161}" type="datetimeFigureOut">
               <a:rPr lang="en-US" smtClean="0"/>
-              <a:t>19/07/16</a:t>
+              <a:t>21/07/16</a:t>
             </a:fld>
             <a:endParaRPr lang="en-US"/>
           </a:p>
@@ -2528,7 +2529,7 @@
           <a:p>
             <a:fld id="{BD36B709-E2C0-7E44-B5BA-A688CA57F161}" type="datetimeFigureOut">
               <a:rPr lang="en-US" smtClean="0"/>
-              <a:t>19/07/16</a:t>
+              <a:t>21/07/16</a:t>
             </a:fld>
             <a:endParaRPr lang="en-US"/>
           </a:p>
@@ -2741,7 +2742,7 @@
           <a:p>
             <a:fld id="{BD36B709-E2C0-7E44-B5BA-A688CA57F161}" type="datetimeFigureOut">
               <a:rPr lang="en-US" smtClean="0"/>
-              <a:t>19/07/16</a:t>
+              <a:t>21/07/16</a:t>
             </a:fld>
             <a:endParaRPr lang="en-US"/>
           </a:p>
@@ -6468,6 +6469,79 @@
     <p:extLst>
       <p:ext uri="{BB962C8B-B14F-4D97-AF65-F5344CB8AC3E}">
         <p14:creationId xmlns:p14="http://schemas.microsoft.com/office/powerpoint/2010/main" val="289196052"/>
+      </p:ext>
+    </p:extLst>
+  </p:cSld>
+  <p:clrMapOvr>
+    <a:masterClrMapping/>
+  </p:clrMapOvr>
+</p:sld>
+</file>
+
+<file path=ppt/slides/slide23.xml><?xml version="1.0" encoding="utf-8"?>
+<p:sld xmlns:a="http://schemas.openxmlformats.org/drawingml/2006/main" xmlns:r="http://schemas.openxmlformats.org/officeDocument/2006/relationships" xmlns:p="http://schemas.openxmlformats.org/presentationml/2006/main">
+  <p:cSld>
+    <p:spTree>
+      <p:nvGrpSpPr>
+        <p:cNvPr id="1" name=""/>
+        <p:cNvGrpSpPr/>
+        <p:nvPr/>
+      </p:nvGrpSpPr>
+      <p:grpSpPr>
+        <a:xfrm>
+          <a:off x="0" y="0"/>
+          <a:ext cx="0" cy="0"/>
+          <a:chOff x="0" y="0"/>
+          <a:chExt cx="0" cy="0"/>
+        </a:xfrm>
+      </p:grpSpPr>
+      <p:sp>
+        <p:nvSpPr>
+          <p:cNvPr id="2" name="Title 1"/>
+          <p:cNvSpPr>
+            <a:spLocks noGrp="1"/>
+          </p:cNvSpPr>
+          <p:nvPr>
+            <p:ph type="title"/>
+          </p:nvPr>
+        </p:nvSpPr>
+        <p:spPr/>
+        <p:txBody>
+          <a:bodyPr/>
+          <a:lstStyle/>
+          <a:p>
+            <a:endParaRPr lang="en-US"/>
+          </a:p>
+        </p:txBody>
+      </p:sp>
+      <p:pic>
+        <p:nvPicPr>
+          <p:cNvPr id="4" name="Picture 3"/>
+          <p:cNvPicPr>
+            <a:picLocks noChangeAspect="1"/>
+          </p:cNvPicPr>
+          <p:nvPr/>
+        </p:nvPicPr>
+        <p:blipFill>
+          <a:blip r:embed="rId2"/>
+          <a:stretch>
+            <a:fillRect/>
+          </a:stretch>
+        </p:blipFill>
+        <p:spPr>
+          <a:xfrm>
+            <a:off x="1789293" y="1778430"/>
+            <a:ext cx="5283200" cy="4241800"/>
+          </a:xfrm>
+          <a:prstGeom prst="rect">
+            <a:avLst/>
+          </a:prstGeom>
+        </p:spPr>
+      </p:pic>
+    </p:spTree>
+    <p:extLst>
+      <p:ext uri="{BB962C8B-B14F-4D97-AF65-F5344CB8AC3E}">
+        <p14:creationId xmlns:p14="http://schemas.microsoft.com/office/powerpoint/2010/main" val="2130588695"/>
       </p:ext>
     </p:extLst>
   </p:cSld>

</xml_diff>

<commit_message>
Eris methodology section updated. Only band tail extraction methodology left to do.
</commit_message>
<xml_diff>
--- a/figures.pptx
+++ b/figures.pptx
@@ -28,6 +28,7 @@
     <p:sldId id="276" r:id="rId22"/>
     <p:sldId id="277" r:id="rId23"/>
     <p:sldId id="278" r:id="rId24"/>
+    <p:sldId id="279" r:id="rId25"/>
   </p:sldIdLst>
   <p:sldSz cx="9144000" cy="6858000" type="screen4x3"/>
   <p:notesSz cx="6858000" cy="9144000"/>
@@ -6542,6 +6543,142 @@
     <p:extLst>
       <p:ext uri="{BB962C8B-B14F-4D97-AF65-F5344CB8AC3E}">
         <p14:creationId xmlns:p14="http://schemas.microsoft.com/office/powerpoint/2010/main" val="2130588695"/>
+      </p:ext>
+    </p:extLst>
+  </p:cSld>
+  <p:clrMapOvr>
+    <a:masterClrMapping/>
+  </p:clrMapOvr>
+</p:sld>
+</file>
+
+<file path=ppt/slides/slide24.xml><?xml version="1.0" encoding="utf-8"?>
+<p:sld xmlns:a="http://schemas.openxmlformats.org/drawingml/2006/main" xmlns:r="http://schemas.openxmlformats.org/officeDocument/2006/relationships" xmlns:p="http://schemas.openxmlformats.org/presentationml/2006/main">
+  <p:cSld>
+    <p:spTree>
+      <p:nvGrpSpPr>
+        <p:cNvPr id="1" name=""/>
+        <p:cNvGrpSpPr/>
+        <p:nvPr/>
+      </p:nvGrpSpPr>
+      <p:grpSpPr>
+        <a:xfrm>
+          <a:off x="0" y="0"/>
+          <a:ext cx="0" cy="0"/>
+          <a:chOff x="0" y="0"/>
+          <a:chExt cx="0" cy="0"/>
+        </a:xfrm>
+      </p:grpSpPr>
+      <p:pic>
+        <p:nvPicPr>
+          <p:cNvPr id="4" name="Picture 3"/>
+          <p:cNvPicPr>
+            <a:picLocks noChangeAspect="1"/>
+          </p:cNvPicPr>
+          <p:nvPr/>
+        </p:nvPicPr>
+        <p:blipFill rotWithShape="1">
+          <a:blip r:embed="rId2"/>
+          <a:srcRect b="29205"/>
+          <a:stretch/>
+        </p:blipFill>
+        <p:spPr>
+          <a:xfrm>
+            <a:off x="4535544" y="1019193"/>
+            <a:ext cx="3340100" cy="4603361"/>
+          </a:xfrm>
+          <a:prstGeom prst="rect">
+            <a:avLst/>
+          </a:prstGeom>
+        </p:spPr>
+      </p:pic>
+      <p:pic>
+        <p:nvPicPr>
+          <p:cNvPr id="6" name="Picture 5"/>
+          <p:cNvPicPr>
+            <a:picLocks noChangeAspect="1"/>
+          </p:cNvPicPr>
+          <p:nvPr/>
+        </p:nvPicPr>
+        <p:blipFill rotWithShape="1">
+          <a:blip r:embed="rId3"/>
+          <a:srcRect t="1353" r="8974" b="31626"/>
+          <a:stretch/>
+        </p:blipFill>
+        <p:spPr>
+          <a:xfrm>
+            <a:off x="579279" y="1066233"/>
+            <a:ext cx="3387171" cy="4562201"/>
+          </a:xfrm>
+          <a:prstGeom prst="rect">
+            <a:avLst/>
+          </a:prstGeom>
+        </p:spPr>
+      </p:pic>
+      <p:sp>
+        <p:nvSpPr>
+          <p:cNvPr id="7" name="TextBox 6"/>
+          <p:cNvSpPr txBox="1"/>
+          <p:nvPr/>
+        </p:nvSpPr>
+        <p:spPr>
+          <a:xfrm>
+            <a:off x="579279" y="478257"/>
+            <a:ext cx="336601" cy="461665"/>
+          </a:xfrm>
+          <a:prstGeom prst="rect">
+            <a:avLst/>
+          </a:prstGeom>
+          <a:noFill/>
+        </p:spPr>
+        <p:txBody>
+          <a:bodyPr wrap="none" rtlCol="0">
+            <a:spAutoFit/>
+          </a:bodyPr>
+          <a:lstStyle/>
+          <a:p>
+            <a:r>
+              <a:rPr lang="en-US" sz="2400" b="1" dirty="0" smtClean="0"/>
+              <a:t>a</a:t>
+            </a:r>
+            <a:endParaRPr lang="en-US" sz="2400" b="1" dirty="0"/>
+          </a:p>
+        </p:txBody>
+      </p:sp>
+      <p:sp>
+        <p:nvSpPr>
+          <p:cNvPr id="8" name="TextBox 7"/>
+          <p:cNvSpPr txBox="1"/>
+          <p:nvPr/>
+        </p:nvSpPr>
+        <p:spPr>
+          <a:xfrm>
+            <a:off x="4535544" y="481718"/>
+            <a:ext cx="349825" cy="461665"/>
+          </a:xfrm>
+          <a:prstGeom prst="rect">
+            <a:avLst/>
+          </a:prstGeom>
+          <a:noFill/>
+        </p:spPr>
+        <p:txBody>
+          <a:bodyPr wrap="none" rtlCol="0">
+            <a:spAutoFit/>
+          </a:bodyPr>
+          <a:lstStyle/>
+          <a:p>
+            <a:r>
+              <a:rPr lang="en-US" sz="2400" b="1" dirty="0"/>
+              <a:t>b</a:t>
+            </a:r>
+            <a:endParaRPr lang="en-US" sz="2400" b="1" dirty="0"/>
+          </a:p>
+        </p:txBody>
+      </p:sp>
+    </p:spTree>
+    <p:extLst>
+      <p:ext uri="{BB962C8B-B14F-4D97-AF65-F5344CB8AC3E}">
+        <p14:creationId xmlns:p14="http://schemas.microsoft.com/office/powerpoint/2010/main" val="3108767137"/>
       </p:ext>
     </p:extLst>
   </p:cSld>

</xml_diff>

<commit_message>
Last update of report draft before Wales trip
</commit_message>
<xml_diff>
--- a/figures.pptx
+++ b/figures.pptx
@@ -29,6 +29,7 @@
     <p:sldId id="277" r:id="rId23"/>
     <p:sldId id="278" r:id="rId24"/>
     <p:sldId id="279" r:id="rId25"/>
+    <p:sldId id="280" r:id="rId26"/>
   </p:sldIdLst>
   <p:sldSz cx="9144000" cy="6858000" type="screen4x3"/>
   <p:notesSz cx="6858000" cy="9144000"/>
@@ -6679,6 +6680,36 @@
     <p:extLst>
       <p:ext uri="{BB962C8B-B14F-4D97-AF65-F5344CB8AC3E}">
         <p14:creationId xmlns:p14="http://schemas.microsoft.com/office/powerpoint/2010/main" val="3108767137"/>
+      </p:ext>
+    </p:extLst>
+  </p:cSld>
+  <p:clrMapOvr>
+    <a:masterClrMapping/>
+  </p:clrMapOvr>
+</p:sld>
+</file>
+
+<file path=ppt/slides/slide25.xml><?xml version="1.0" encoding="utf-8"?>
+<p:sld xmlns:a="http://schemas.openxmlformats.org/drawingml/2006/main" xmlns:r="http://schemas.openxmlformats.org/officeDocument/2006/relationships" xmlns:p="http://schemas.openxmlformats.org/presentationml/2006/main">
+  <p:cSld>
+    <p:spTree>
+      <p:nvGrpSpPr>
+        <p:cNvPr id="1" name=""/>
+        <p:cNvGrpSpPr/>
+        <p:nvPr/>
+      </p:nvGrpSpPr>
+      <p:grpSpPr>
+        <a:xfrm>
+          <a:off x="0" y="0"/>
+          <a:ext cx="0" cy="0"/>
+          <a:chOff x="0" y="0"/>
+          <a:chExt cx="0" cy="0"/>
+        </a:xfrm>
+      </p:grpSpPr>
+    </p:spTree>
+    <p:extLst>
+      <p:ext uri="{BB962C8B-B14F-4D97-AF65-F5344CB8AC3E}">
+        <p14:creationId xmlns:p14="http://schemas.microsoft.com/office/powerpoint/2010/main" val="3725876543"/>
       </p:ext>
     </p:extLst>
   </p:cSld>

</xml_diff>

<commit_message>
Fairly dramatic cut down (commented out sulfur vacancies and band gap broadening sections)
</commit_message>
<xml_diff>
--- a/figures.pptx
+++ b/figures.pptx
@@ -6673,6 +6673,124 @@
               <a:t>b</a:t>
             </a:r>
             <a:endParaRPr lang="en-US" sz="2400" b="1" dirty="0"/>
+          </a:p>
+        </p:txBody>
+      </p:sp>
+      <p:sp>
+        <p:nvSpPr>
+          <p:cNvPr id="9" name="Oval 8"/>
+          <p:cNvSpPr/>
+          <p:nvPr/>
+        </p:nvSpPr>
+        <p:spPr>
+          <a:xfrm>
+            <a:off x="5205652" y="3747168"/>
+            <a:ext cx="934078" cy="860694"/>
+          </a:xfrm>
+          <a:prstGeom prst="ellipse">
+            <a:avLst/>
+          </a:prstGeom>
+          <a:noFill/>
+          <a:ln w="60325">
+            <a:solidFill>
+              <a:srgbClr val="9F02CE"/>
+            </a:solidFill>
+          </a:ln>
+        </p:spPr>
+        <p:style>
+          <a:lnRef idx="1">
+            <a:schemeClr val="accent1"/>
+          </a:lnRef>
+          <a:fillRef idx="3">
+            <a:schemeClr val="accent1"/>
+          </a:fillRef>
+          <a:effectRef idx="2">
+            <a:schemeClr val="accent1"/>
+          </a:effectRef>
+          <a:fontRef idx="minor">
+            <a:schemeClr val="lt1"/>
+          </a:fontRef>
+        </p:style>
+        <p:txBody>
+          <a:bodyPr rtlCol="0" anchor="ctr"/>
+          <a:lstStyle/>
+          <a:p>
+            <a:pPr algn="ctr"/>
+            <a:endParaRPr lang="en-US"/>
+          </a:p>
+        </p:txBody>
+      </p:sp>
+      <p:cxnSp>
+        <p:nvCxnSpPr>
+          <p:cNvPr id="11" name="Straight Arrow Connector 10"/>
+          <p:cNvCxnSpPr/>
+          <p:nvPr/>
+        </p:nvCxnSpPr>
+        <p:spPr>
+          <a:xfrm flipV="1">
+            <a:off x="4491972" y="4565877"/>
+            <a:ext cx="913088" cy="1165087"/>
+          </a:xfrm>
+          <a:prstGeom prst="straightConnector1">
+            <a:avLst/>
+          </a:prstGeom>
+          <a:ln w="38100" cmpd="sng">
+            <a:solidFill>
+              <a:srgbClr val="9F02CE"/>
+            </a:solidFill>
+            <a:tailEnd type="arrow"/>
+          </a:ln>
+        </p:spPr>
+        <p:style>
+          <a:lnRef idx="2">
+            <a:schemeClr val="accent1"/>
+          </a:lnRef>
+          <a:fillRef idx="0">
+            <a:schemeClr val="accent1"/>
+          </a:fillRef>
+          <a:effectRef idx="1">
+            <a:schemeClr val="accent1"/>
+          </a:effectRef>
+          <a:fontRef idx="minor">
+            <a:schemeClr val="tx1"/>
+          </a:fontRef>
+        </p:style>
+      </p:cxnSp>
+      <p:sp>
+        <p:nvSpPr>
+          <p:cNvPr id="14" name="TextBox 13"/>
+          <p:cNvSpPr txBox="1"/>
+          <p:nvPr/>
+        </p:nvSpPr>
+        <p:spPr>
+          <a:xfrm>
+            <a:off x="3568390" y="5638932"/>
+            <a:ext cx="2146742" cy="369332"/>
+          </a:xfrm>
+          <a:prstGeom prst="rect">
+            <a:avLst/>
+          </a:prstGeom>
+          <a:noFill/>
+        </p:spPr>
+        <p:txBody>
+          <a:bodyPr wrap="none" rtlCol="0">
+            <a:spAutoFit/>
+          </a:bodyPr>
+          <a:lstStyle/>
+          <a:p>
+            <a:r>
+              <a:rPr lang="en-US" b="1" dirty="0" smtClean="0">
+                <a:solidFill>
+                  <a:srgbClr val="9F02CE"/>
+                </a:solidFill>
+              </a:rPr>
+              <a:t>Clustering of Cu ions</a:t>
+            </a:r>
+            <a:endParaRPr lang="en-US" b="1" dirty="0">
+              <a:solidFill>
+                <a:srgbClr val="9F02CE"/>
+              </a:solidFill>
+            </a:endParaRPr>
           </a:p>
         </p:txBody>
       </p:sp>

</xml_diff>